<commit_message>
Initial structure / headings
Wrote an initial structure (in OneNote) and simply added some slides w/initial headings  to the powerpoint (following my initial structure idea)
</commit_message>
<xml_diff>
--- a/slides/slides.pptx
+++ b/slides/slides.pptx
@@ -6,6 +6,13 @@
   </p:sldMasterIdLst>
   <p:sldIdLst>
     <p:sldId id="256" r:id="rId2"/>
+    <p:sldId id="257" r:id="rId3"/>
+    <p:sldId id="258" r:id="rId4"/>
+    <p:sldId id="259" r:id="rId5"/>
+    <p:sldId id="260" r:id="rId6"/>
+    <p:sldId id="261" r:id="rId7"/>
+    <p:sldId id="262" r:id="rId8"/>
+    <p:sldId id="263" r:id="rId9"/>
   </p:sldIdLst>
   <p:sldSz cx="12192000" cy="6858000"/>
   <p:notesSz cx="6858000" cy="9144000"/>
@@ -243,7 +250,7 @@
           <a:p>
             <a:fld id="{F58C6CE7-BF83-4B1E-855D-EB8AAA078073}" type="datetimeFigureOut">
               <a:rPr lang="en-GB" smtClean="0"/>
-              <a:t>07/01/2021</a:t>
+              <a:t>12/01/2021</a:t>
             </a:fld>
             <a:endParaRPr lang="en-GB"/>
           </a:p>
@@ -413,7 +420,7 @@
           <a:p>
             <a:fld id="{F58C6CE7-BF83-4B1E-855D-EB8AAA078073}" type="datetimeFigureOut">
               <a:rPr lang="en-GB" smtClean="0"/>
-              <a:t>07/01/2021</a:t>
+              <a:t>12/01/2021</a:t>
             </a:fld>
             <a:endParaRPr lang="en-GB"/>
           </a:p>
@@ -593,7 +600,7 @@
           <a:p>
             <a:fld id="{F58C6CE7-BF83-4B1E-855D-EB8AAA078073}" type="datetimeFigureOut">
               <a:rPr lang="en-GB" smtClean="0"/>
-              <a:t>07/01/2021</a:t>
+              <a:t>12/01/2021</a:t>
             </a:fld>
             <a:endParaRPr lang="en-GB"/>
           </a:p>
@@ -763,7 +770,7 @@
           <a:p>
             <a:fld id="{F58C6CE7-BF83-4B1E-855D-EB8AAA078073}" type="datetimeFigureOut">
               <a:rPr lang="en-GB" smtClean="0"/>
-              <a:t>07/01/2021</a:t>
+              <a:t>12/01/2021</a:t>
             </a:fld>
             <a:endParaRPr lang="en-GB"/>
           </a:p>
@@ -1009,7 +1016,7 @@
           <a:p>
             <a:fld id="{F58C6CE7-BF83-4B1E-855D-EB8AAA078073}" type="datetimeFigureOut">
               <a:rPr lang="en-GB" smtClean="0"/>
-              <a:t>07/01/2021</a:t>
+              <a:t>12/01/2021</a:t>
             </a:fld>
             <a:endParaRPr lang="en-GB"/>
           </a:p>
@@ -1241,7 +1248,7 @@
           <a:p>
             <a:fld id="{F58C6CE7-BF83-4B1E-855D-EB8AAA078073}" type="datetimeFigureOut">
               <a:rPr lang="en-GB" smtClean="0"/>
-              <a:t>07/01/2021</a:t>
+              <a:t>12/01/2021</a:t>
             </a:fld>
             <a:endParaRPr lang="en-GB"/>
           </a:p>
@@ -1608,7 +1615,7 @@
           <a:p>
             <a:fld id="{F58C6CE7-BF83-4B1E-855D-EB8AAA078073}" type="datetimeFigureOut">
               <a:rPr lang="en-GB" smtClean="0"/>
-              <a:t>07/01/2021</a:t>
+              <a:t>12/01/2021</a:t>
             </a:fld>
             <a:endParaRPr lang="en-GB"/>
           </a:p>
@@ -1726,7 +1733,7 @@
           <a:p>
             <a:fld id="{F58C6CE7-BF83-4B1E-855D-EB8AAA078073}" type="datetimeFigureOut">
               <a:rPr lang="en-GB" smtClean="0"/>
-              <a:t>07/01/2021</a:t>
+              <a:t>12/01/2021</a:t>
             </a:fld>
             <a:endParaRPr lang="en-GB"/>
           </a:p>
@@ -1821,7 +1828,7 @@
           <a:p>
             <a:fld id="{F58C6CE7-BF83-4B1E-855D-EB8AAA078073}" type="datetimeFigureOut">
               <a:rPr lang="en-GB" smtClean="0"/>
-              <a:t>07/01/2021</a:t>
+              <a:t>12/01/2021</a:t>
             </a:fld>
             <a:endParaRPr lang="en-GB"/>
           </a:p>
@@ -2098,7 +2105,7 @@
           <a:p>
             <a:fld id="{F58C6CE7-BF83-4B1E-855D-EB8AAA078073}" type="datetimeFigureOut">
               <a:rPr lang="en-GB" smtClean="0"/>
-              <a:t>07/01/2021</a:t>
+              <a:t>12/01/2021</a:t>
             </a:fld>
             <a:endParaRPr lang="en-GB"/>
           </a:p>
@@ -2355,7 +2362,7 @@
           <a:p>
             <a:fld id="{F58C6CE7-BF83-4B1E-855D-EB8AAA078073}" type="datetimeFigureOut">
               <a:rPr lang="en-GB" smtClean="0"/>
-              <a:t>07/01/2021</a:t>
+              <a:t>12/01/2021</a:t>
             </a:fld>
             <a:endParaRPr lang="en-GB"/>
           </a:p>
@@ -2568,7 +2575,7 @@
           <a:p>
             <a:fld id="{F58C6CE7-BF83-4B1E-855D-EB8AAA078073}" type="datetimeFigureOut">
               <a:rPr lang="en-GB" smtClean="0"/>
-              <a:t>07/01/2021</a:t>
+              <a:t>12/01/2021</a:t>
             </a:fld>
             <a:endParaRPr lang="en-GB"/>
           </a:p>
@@ -3001,26 +3008,13 @@
           <a:p>
             <a:pPr algn="l"/>
             <a:r>
-              <a:rPr lang="es-ES" b="1" dirty="0">
+              <a:rPr lang="en-GB" b="1">
                 <a:solidFill>
                   <a:schemeClr val="accent1"/>
                 </a:solidFill>
               </a:rPr>
-              <a:t>Shadow </a:t>
-            </a:r>
-            <a:r>
-              <a:rPr lang="es-ES" b="1" dirty="0" err="1">
-                <a:solidFill>
-                  <a:schemeClr val="accent1"/>
-                </a:solidFill>
-              </a:rPr>
-              <a:t>Mapping</a:t>
-            </a:r>
-            <a:endParaRPr lang="en-GB" b="1" dirty="0">
-              <a:solidFill>
-                <a:schemeClr val="accent1"/>
-              </a:solidFill>
-            </a:endParaRPr>
+              <a:t>Shadow Mapping</a:t>
+            </a:r>
           </a:p>
         </p:txBody>
       </p:sp>
@@ -3058,22 +3052,14 @@
               </a:lnSpc>
             </a:pPr>
             <a:r>
-              <a:rPr lang="es-ES" sz="2600" b="1" dirty="0">
+              <a:rPr lang="en-GB" sz="2600" b="1">
                 <a:latin typeface="Lato" panose="020F0502020204030203" pitchFamily="34" charset="0"/>
                 <a:ea typeface="CMU Sans Serif" panose="02000603000000000000" pitchFamily="2" charset="0"/>
                 <a:cs typeface="Latha" panose="020B0502040204020203" pitchFamily="34" charset="0"/>
               </a:rPr>
-              <a:t>Alba </a:t>
-            </a:r>
-            <a:r>
-              <a:rPr lang="es-ES" sz="2600" b="1">
-                <a:latin typeface="Lato" panose="020F0502020204030203" pitchFamily="34" charset="0"/>
-                <a:ea typeface="CMU Sans Serif" panose="02000603000000000000" pitchFamily="2" charset="0"/>
-                <a:cs typeface="Latha" panose="020B0502040204020203" pitchFamily="34" charset="0"/>
-              </a:rPr>
-              <a:t>Navarro Rosales</a:t>
-            </a:r>
-            <a:endParaRPr lang="es-ES" sz="2600" dirty="0">
+              <a:t>Alba Navarro Rosales</a:t>
+            </a:r>
+            <a:endParaRPr lang="en-GB" sz="2600">
               <a:latin typeface="Lato" panose="020F0502020204030203" pitchFamily="34" charset="0"/>
               <a:ea typeface="CMU Sans Serif" panose="02000603000000000000" pitchFamily="2" charset="0"/>
               <a:cs typeface="Latha" panose="020B0502040204020203" pitchFamily="34" charset="0"/>
@@ -3161,8 +3147,8 @@
         </p:nvSpPr>
         <p:spPr>
           <a:xfrm>
-            <a:off x="1524000" y="4775200"/>
-            <a:ext cx="6096000" cy="369332"/>
+            <a:off x="1524000" y="4847423"/>
+            <a:ext cx="6096000" cy="307777"/>
           </a:xfrm>
           <a:prstGeom prst="rect">
             <a:avLst/>
@@ -3181,7 +3167,7 @@
               </a:lnSpc>
             </a:pPr>
             <a:r>
-              <a:rPr lang="es-ES" sz="1800" b="1" dirty="0" err="1">
+              <a:rPr lang="en-GB" sz="1400" b="1" i="1" dirty="0">
                 <a:solidFill>
                   <a:schemeClr val="bg2"/>
                 </a:solidFill>
@@ -3189,10 +3175,46 @@
                 <a:ea typeface="CMU Sans Serif" panose="02000603000000000000" pitchFamily="2" charset="0"/>
                 <a:cs typeface="Latha" panose="020B0502040204020203" pitchFamily="34" charset="0"/>
               </a:rPr>
-              <a:t>January</a:t>
-            </a:r>
-            <a:r>
-              <a:rPr lang="es-ES" sz="1800" b="1" dirty="0">
+              <a:t>January 27, 2021</a:t>
+            </a:r>
+          </a:p>
+        </p:txBody>
+      </p:sp>
+      <p:sp>
+        <p:nvSpPr>
+          <p:cNvPr id="7" name="CuadroTexto 6">
+            <a:extLst>
+              <a:ext uri="{FF2B5EF4-FFF2-40B4-BE49-F238E27FC236}">
+                <a16:creationId xmlns:a16="http://schemas.microsoft.com/office/drawing/2014/main" id="{D7564D09-9E89-40E8-ACAB-76D3C5E7ACC4}"/>
+              </a:ext>
+            </a:extLst>
+          </p:cNvPr>
+          <p:cNvSpPr txBox="1"/>
+          <p:nvPr/>
+        </p:nvSpPr>
+        <p:spPr>
+          <a:xfrm>
+            <a:off x="1524000" y="5154096"/>
+            <a:ext cx="6096000" cy="307777"/>
+          </a:xfrm>
+          <a:prstGeom prst="rect">
+            <a:avLst/>
+          </a:prstGeom>
+          <a:noFill/>
+        </p:spPr>
+        <p:txBody>
+          <a:bodyPr wrap="square">
+            <a:spAutoFit/>
+          </a:bodyPr>
+          <a:lstStyle/>
+          <a:p>
+            <a:pPr algn="l">
+              <a:lnSpc>
+                <a:spcPct val="100000"/>
+              </a:lnSpc>
+            </a:pPr>
+            <a:r>
+              <a:rPr lang="en-GB" sz="1400" b="1" i="1" dirty="0">
                 <a:solidFill>
                   <a:schemeClr val="bg2"/>
                 </a:solidFill>
@@ -3200,16 +3222,30 @@
                 <a:ea typeface="CMU Sans Serif" panose="02000603000000000000" pitchFamily="2" charset="0"/>
                 <a:cs typeface="Latha" panose="020B0502040204020203" pitchFamily="34" charset="0"/>
               </a:rPr>
-              <a:t> 27, 2021</a:t>
-            </a:r>
-            <a:endParaRPr lang="en-GB" sz="1800" b="1" dirty="0">
-              <a:solidFill>
-                <a:schemeClr val="bg2"/>
-              </a:solidFill>
-              <a:latin typeface="Lato" panose="020F0502020204030203" pitchFamily="34" charset="0"/>
-              <a:ea typeface="CMU Sans Serif" panose="02000603000000000000" pitchFamily="2" charset="0"/>
-              <a:cs typeface="Latha" panose="020B0502040204020203" pitchFamily="34" charset="0"/>
-            </a:endParaRPr>
+              <a:t>Churchill College </a:t>
+            </a:r>
+            <a:r>
+              <a:rPr lang="en-GB" sz="1400" b="1" i="1" dirty="0" err="1">
+                <a:solidFill>
+                  <a:schemeClr val="bg2"/>
+                </a:solidFill>
+                <a:latin typeface="Lato" panose="020F0502020204030203" pitchFamily="34" charset="0"/>
+                <a:ea typeface="CMU Sans Serif" panose="02000603000000000000" pitchFamily="2" charset="0"/>
+                <a:cs typeface="Latha" panose="020B0502040204020203" pitchFamily="34" charset="0"/>
+              </a:rPr>
+              <a:t>CompSci</a:t>
+            </a:r>
+            <a:r>
+              <a:rPr lang="en-GB" sz="1400" b="1" i="1" dirty="0">
+                <a:solidFill>
+                  <a:schemeClr val="bg2"/>
+                </a:solidFill>
+                <a:latin typeface="Lato" panose="020F0502020204030203" pitchFamily="34" charset="0"/>
+                <a:ea typeface="CMU Sans Serif" panose="02000603000000000000" pitchFamily="2" charset="0"/>
+                <a:cs typeface="Latha" panose="020B0502040204020203" pitchFamily="34" charset="0"/>
+              </a:rPr>
+              <a:t> Talks</a:t>
+            </a:r>
           </a:p>
         </p:txBody>
       </p:sp>
@@ -3217,6 +3253,705 @@
     <p:extLst>
       <p:ext uri="{BB962C8B-B14F-4D97-AF65-F5344CB8AC3E}">
         <p14:creationId xmlns:p14="http://schemas.microsoft.com/office/powerpoint/2010/main" val="2809042059"/>
+      </p:ext>
+    </p:extLst>
+  </p:cSld>
+  <p:clrMapOvr>
+    <a:masterClrMapping/>
+  </p:clrMapOvr>
+</p:sld>
+</file>
+
+<file path=ppt/slides/slide2.xml><?xml version="1.0" encoding="utf-8"?>
+<p:sld xmlns:a="http://schemas.openxmlformats.org/drawingml/2006/main" xmlns:r="http://schemas.openxmlformats.org/officeDocument/2006/relationships" xmlns:p="http://schemas.openxmlformats.org/presentationml/2006/main">
+  <p:cSld>
+    <p:spTree>
+      <p:nvGrpSpPr>
+        <p:cNvPr id="1" name=""/>
+        <p:cNvGrpSpPr/>
+        <p:nvPr/>
+      </p:nvGrpSpPr>
+      <p:grpSpPr>
+        <a:xfrm>
+          <a:off x="0" y="0"/>
+          <a:ext cx="0" cy="0"/>
+          <a:chOff x="0" y="0"/>
+          <a:chExt cx="0" cy="0"/>
+        </a:xfrm>
+      </p:grpSpPr>
+      <p:sp>
+        <p:nvSpPr>
+          <p:cNvPr id="2" name="Título 1">
+            <a:extLst>
+              <a:ext uri="{FF2B5EF4-FFF2-40B4-BE49-F238E27FC236}">
+                <a16:creationId xmlns:a16="http://schemas.microsoft.com/office/drawing/2014/main" id="{2E0613DD-C881-4C88-9856-F39677A98401}"/>
+              </a:ext>
+            </a:extLst>
+          </p:cNvPr>
+          <p:cNvSpPr>
+            <a:spLocks noGrp="1"/>
+          </p:cNvSpPr>
+          <p:nvPr>
+            <p:ph type="title"/>
+          </p:nvPr>
+        </p:nvSpPr>
+        <p:spPr/>
+        <p:txBody>
+          <a:bodyPr/>
+          <a:lstStyle/>
+          <a:p>
+            <a:r>
+              <a:rPr lang="en-GB" dirty="0">
+                <a:solidFill>
+                  <a:schemeClr val="accent1"/>
+                </a:solidFill>
+              </a:rPr>
+              <a:t>Outline</a:t>
+            </a:r>
+          </a:p>
+        </p:txBody>
+      </p:sp>
+      <p:sp>
+        <p:nvSpPr>
+          <p:cNvPr id="3" name="Marcador de contenido 2">
+            <a:extLst>
+              <a:ext uri="{FF2B5EF4-FFF2-40B4-BE49-F238E27FC236}">
+                <a16:creationId xmlns:a16="http://schemas.microsoft.com/office/drawing/2014/main" id="{05B26635-3519-47D6-BDA1-BA00C9DFBD8A}"/>
+              </a:ext>
+            </a:extLst>
+          </p:cNvPr>
+          <p:cNvSpPr>
+            <a:spLocks noGrp="1"/>
+          </p:cNvSpPr>
+          <p:nvPr>
+            <p:ph idx="1"/>
+          </p:nvPr>
+        </p:nvSpPr>
+        <p:spPr/>
+        <p:txBody>
+          <a:bodyPr/>
+          <a:lstStyle/>
+          <a:p>
+            <a:pPr>
+              <a:buClr>
+                <a:schemeClr val="accent1"/>
+              </a:buClr>
+            </a:pPr>
+            <a:r>
+              <a:rPr lang="en-GB" dirty="0"/>
+              <a:t>Lights &amp; Shadows</a:t>
+            </a:r>
+          </a:p>
+          <a:p>
+            <a:pPr>
+              <a:buClr>
+                <a:schemeClr val="accent1"/>
+              </a:buClr>
+            </a:pPr>
+            <a:r>
+              <a:rPr lang="en-GB" dirty="0"/>
+              <a:t>What is Shadow Mapping?</a:t>
+            </a:r>
+          </a:p>
+          <a:p>
+            <a:pPr>
+              <a:buClr>
+                <a:schemeClr val="accent1"/>
+              </a:buClr>
+            </a:pPr>
+            <a:r>
+              <a:rPr lang="en-GB" dirty="0"/>
+              <a:t>OpenGL rendering pipeline overview</a:t>
+            </a:r>
+          </a:p>
+          <a:p>
+            <a:pPr>
+              <a:buClr>
+                <a:schemeClr val="accent1"/>
+              </a:buClr>
+            </a:pPr>
+            <a:r>
+              <a:rPr lang="en-GB" dirty="0"/>
+              <a:t>Method</a:t>
+            </a:r>
+          </a:p>
+          <a:p>
+            <a:pPr>
+              <a:buClr>
+                <a:schemeClr val="accent1"/>
+              </a:buClr>
+            </a:pPr>
+            <a:r>
+              <a:rPr lang="en-GB" dirty="0"/>
+              <a:t>Demo time! :)</a:t>
+            </a:r>
+          </a:p>
+          <a:p>
+            <a:pPr>
+              <a:buClr>
+                <a:schemeClr val="accent1"/>
+              </a:buClr>
+            </a:pPr>
+            <a:r>
+              <a:rPr lang="en-GB" dirty="0"/>
+              <a:t>Artefacts that occur</a:t>
+            </a:r>
+          </a:p>
+          <a:p>
+            <a:pPr>
+              <a:buClr>
+                <a:schemeClr val="accent1"/>
+              </a:buClr>
+            </a:pPr>
+            <a:r>
+              <a:rPr lang="en-GB" dirty="0"/>
+              <a:t>Summary – key takeaways</a:t>
+            </a:r>
+          </a:p>
+          <a:p>
+            <a:endParaRPr lang="en-GB" dirty="0"/>
+          </a:p>
+        </p:txBody>
+      </p:sp>
+    </p:spTree>
+    <p:extLst>
+      <p:ext uri="{BB962C8B-B14F-4D97-AF65-F5344CB8AC3E}">
+        <p14:creationId xmlns:p14="http://schemas.microsoft.com/office/powerpoint/2010/main" val="1736948498"/>
+      </p:ext>
+    </p:extLst>
+  </p:cSld>
+  <p:clrMapOvr>
+    <a:masterClrMapping/>
+  </p:clrMapOvr>
+</p:sld>
+</file>
+
+<file path=ppt/slides/slide3.xml><?xml version="1.0" encoding="utf-8"?>
+<p:sld xmlns:a="http://schemas.openxmlformats.org/drawingml/2006/main" xmlns:r="http://schemas.openxmlformats.org/officeDocument/2006/relationships" xmlns:p="http://schemas.openxmlformats.org/presentationml/2006/main">
+  <p:cSld>
+    <p:spTree>
+      <p:nvGrpSpPr>
+        <p:cNvPr id="1" name=""/>
+        <p:cNvGrpSpPr/>
+        <p:nvPr/>
+      </p:nvGrpSpPr>
+      <p:grpSpPr>
+        <a:xfrm>
+          <a:off x="0" y="0"/>
+          <a:ext cx="0" cy="0"/>
+          <a:chOff x="0" y="0"/>
+          <a:chExt cx="0" cy="0"/>
+        </a:xfrm>
+      </p:grpSpPr>
+      <p:sp>
+        <p:nvSpPr>
+          <p:cNvPr id="2" name="Título 1">
+            <a:extLst>
+              <a:ext uri="{FF2B5EF4-FFF2-40B4-BE49-F238E27FC236}">
+                <a16:creationId xmlns:a16="http://schemas.microsoft.com/office/drawing/2014/main" id="{6FBC199F-903E-4038-A2EA-F930666D0259}"/>
+              </a:ext>
+            </a:extLst>
+          </p:cNvPr>
+          <p:cNvSpPr>
+            <a:spLocks noGrp="1"/>
+          </p:cNvSpPr>
+          <p:nvPr>
+            <p:ph type="title"/>
+          </p:nvPr>
+        </p:nvSpPr>
+        <p:spPr/>
+        <p:txBody>
+          <a:bodyPr/>
+          <a:lstStyle/>
+          <a:p>
+            <a:r>
+              <a:rPr lang="en-GB" dirty="0">
+                <a:solidFill>
+                  <a:schemeClr val="accent1"/>
+                </a:solidFill>
+              </a:rPr>
+              <a:t>Lights &amp; shadows</a:t>
+            </a:r>
+          </a:p>
+        </p:txBody>
+      </p:sp>
+      <p:sp>
+        <p:nvSpPr>
+          <p:cNvPr id="3" name="Marcador de contenido 2">
+            <a:extLst>
+              <a:ext uri="{FF2B5EF4-FFF2-40B4-BE49-F238E27FC236}">
+                <a16:creationId xmlns:a16="http://schemas.microsoft.com/office/drawing/2014/main" id="{E9AB5C14-65EC-469C-8F63-E2617BB744A6}"/>
+              </a:ext>
+            </a:extLst>
+          </p:cNvPr>
+          <p:cNvSpPr>
+            <a:spLocks noGrp="1"/>
+          </p:cNvSpPr>
+          <p:nvPr>
+            <p:ph idx="1"/>
+          </p:nvPr>
+        </p:nvSpPr>
+        <p:spPr/>
+        <p:txBody>
+          <a:bodyPr/>
+          <a:lstStyle/>
+          <a:p>
+            <a:endParaRPr lang="en-GB" dirty="0"/>
+          </a:p>
+        </p:txBody>
+      </p:sp>
+    </p:spTree>
+    <p:extLst>
+      <p:ext uri="{BB962C8B-B14F-4D97-AF65-F5344CB8AC3E}">
+        <p14:creationId xmlns:p14="http://schemas.microsoft.com/office/powerpoint/2010/main" val="1287606231"/>
+      </p:ext>
+    </p:extLst>
+  </p:cSld>
+  <p:clrMapOvr>
+    <a:masterClrMapping/>
+  </p:clrMapOvr>
+</p:sld>
+</file>
+
+<file path=ppt/slides/slide4.xml><?xml version="1.0" encoding="utf-8"?>
+<p:sld xmlns:a="http://schemas.openxmlformats.org/drawingml/2006/main" xmlns:r="http://schemas.openxmlformats.org/officeDocument/2006/relationships" xmlns:p="http://schemas.openxmlformats.org/presentationml/2006/main">
+  <p:cSld>
+    <p:spTree>
+      <p:nvGrpSpPr>
+        <p:cNvPr id="1" name=""/>
+        <p:cNvGrpSpPr/>
+        <p:nvPr/>
+      </p:nvGrpSpPr>
+      <p:grpSpPr>
+        <a:xfrm>
+          <a:off x="0" y="0"/>
+          <a:ext cx="0" cy="0"/>
+          <a:chOff x="0" y="0"/>
+          <a:chExt cx="0" cy="0"/>
+        </a:xfrm>
+      </p:grpSpPr>
+      <p:sp>
+        <p:nvSpPr>
+          <p:cNvPr id="2" name="Título 1">
+            <a:extLst>
+              <a:ext uri="{FF2B5EF4-FFF2-40B4-BE49-F238E27FC236}">
+                <a16:creationId xmlns:a16="http://schemas.microsoft.com/office/drawing/2014/main" id="{8E9568D9-EF8D-444D-8983-581501AFCDFD}"/>
+              </a:ext>
+            </a:extLst>
+          </p:cNvPr>
+          <p:cNvSpPr>
+            <a:spLocks noGrp="1"/>
+          </p:cNvSpPr>
+          <p:nvPr>
+            <p:ph type="title"/>
+          </p:nvPr>
+        </p:nvSpPr>
+        <p:spPr/>
+        <p:txBody>
+          <a:bodyPr/>
+          <a:lstStyle/>
+          <a:p>
+            <a:r>
+              <a:rPr lang="en-GB" dirty="0">
+                <a:solidFill>
+                  <a:schemeClr val="accent1"/>
+                </a:solidFill>
+              </a:rPr>
+              <a:t>Shadow Mapping</a:t>
+            </a:r>
+          </a:p>
+        </p:txBody>
+      </p:sp>
+      <p:sp>
+        <p:nvSpPr>
+          <p:cNvPr id="3" name="Marcador de contenido 2">
+            <a:extLst>
+              <a:ext uri="{FF2B5EF4-FFF2-40B4-BE49-F238E27FC236}">
+                <a16:creationId xmlns:a16="http://schemas.microsoft.com/office/drawing/2014/main" id="{D1256C17-EF5E-45D2-82AB-A91BB32D140F}"/>
+              </a:ext>
+            </a:extLst>
+          </p:cNvPr>
+          <p:cNvSpPr>
+            <a:spLocks noGrp="1"/>
+          </p:cNvSpPr>
+          <p:nvPr>
+            <p:ph idx="1"/>
+          </p:nvPr>
+        </p:nvSpPr>
+        <p:spPr/>
+        <p:txBody>
+          <a:bodyPr/>
+          <a:lstStyle/>
+          <a:p>
+            <a:endParaRPr lang="en-GB" dirty="0"/>
+          </a:p>
+        </p:txBody>
+      </p:sp>
+    </p:spTree>
+    <p:extLst>
+      <p:ext uri="{BB962C8B-B14F-4D97-AF65-F5344CB8AC3E}">
+        <p14:creationId xmlns:p14="http://schemas.microsoft.com/office/powerpoint/2010/main" val="3496095792"/>
+      </p:ext>
+    </p:extLst>
+  </p:cSld>
+  <p:clrMapOvr>
+    <a:masterClrMapping/>
+  </p:clrMapOvr>
+</p:sld>
+</file>
+
+<file path=ppt/slides/slide5.xml><?xml version="1.0" encoding="utf-8"?>
+<p:sld xmlns:a="http://schemas.openxmlformats.org/drawingml/2006/main" xmlns:r="http://schemas.openxmlformats.org/officeDocument/2006/relationships" xmlns:p="http://schemas.openxmlformats.org/presentationml/2006/main">
+  <p:cSld>
+    <p:spTree>
+      <p:nvGrpSpPr>
+        <p:cNvPr id="1" name=""/>
+        <p:cNvGrpSpPr/>
+        <p:nvPr/>
+      </p:nvGrpSpPr>
+      <p:grpSpPr>
+        <a:xfrm>
+          <a:off x="0" y="0"/>
+          <a:ext cx="0" cy="0"/>
+          <a:chOff x="0" y="0"/>
+          <a:chExt cx="0" cy="0"/>
+        </a:xfrm>
+      </p:grpSpPr>
+      <p:sp>
+        <p:nvSpPr>
+          <p:cNvPr id="2" name="Título 1">
+            <a:extLst>
+              <a:ext uri="{FF2B5EF4-FFF2-40B4-BE49-F238E27FC236}">
+                <a16:creationId xmlns:a16="http://schemas.microsoft.com/office/drawing/2014/main" id="{7E579DF9-F669-4B5B-BDB6-68986F88A319}"/>
+              </a:ext>
+            </a:extLst>
+          </p:cNvPr>
+          <p:cNvSpPr>
+            <a:spLocks noGrp="1"/>
+          </p:cNvSpPr>
+          <p:nvPr>
+            <p:ph type="title"/>
+          </p:nvPr>
+        </p:nvSpPr>
+        <p:spPr/>
+        <p:txBody>
+          <a:bodyPr/>
+          <a:lstStyle/>
+          <a:p>
+            <a:r>
+              <a:rPr lang="en-GB" dirty="0">
+                <a:solidFill>
+                  <a:schemeClr val="accent1"/>
+                </a:solidFill>
+              </a:rPr>
+              <a:t>OpenGL rendering pipeline</a:t>
+            </a:r>
+          </a:p>
+        </p:txBody>
+      </p:sp>
+      <p:sp>
+        <p:nvSpPr>
+          <p:cNvPr id="3" name="Marcador de contenido 2">
+            <a:extLst>
+              <a:ext uri="{FF2B5EF4-FFF2-40B4-BE49-F238E27FC236}">
+                <a16:creationId xmlns:a16="http://schemas.microsoft.com/office/drawing/2014/main" id="{71039F7C-FC6D-4ACB-9327-55D00C3AF28A}"/>
+              </a:ext>
+            </a:extLst>
+          </p:cNvPr>
+          <p:cNvSpPr>
+            <a:spLocks noGrp="1"/>
+          </p:cNvSpPr>
+          <p:nvPr>
+            <p:ph idx="1"/>
+          </p:nvPr>
+        </p:nvSpPr>
+        <p:spPr/>
+        <p:txBody>
+          <a:bodyPr/>
+          <a:lstStyle/>
+          <a:p>
+            <a:endParaRPr lang="en-GB" dirty="0"/>
+          </a:p>
+        </p:txBody>
+      </p:sp>
+    </p:spTree>
+    <p:extLst>
+      <p:ext uri="{BB962C8B-B14F-4D97-AF65-F5344CB8AC3E}">
+        <p14:creationId xmlns:p14="http://schemas.microsoft.com/office/powerpoint/2010/main" val="1766215850"/>
+      </p:ext>
+    </p:extLst>
+  </p:cSld>
+  <p:clrMapOvr>
+    <a:masterClrMapping/>
+  </p:clrMapOvr>
+</p:sld>
+</file>
+
+<file path=ppt/slides/slide6.xml><?xml version="1.0" encoding="utf-8"?>
+<p:sld xmlns:a="http://schemas.openxmlformats.org/drawingml/2006/main" xmlns:r="http://schemas.openxmlformats.org/officeDocument/2006/relationships" xmlns:p="http://schemas.openxmlformats.org/presentationml/2006/main">
+  <p:cSld>
+    <p:spTree>
+      <p:nvGrpSpPr>
+        <p:cNvPr id="1" name=""/>
+        <p:cNvGrpSpPr/>
+        <p:nvPr/>
+      </p:nvGrpSpPr>
+      <p:grpSpPr>
+        <a:xfrm>
+          <a:off x="0" y="0"/>
+          <a:ext cx="0" cy="0"/>
+          <a:chOff x="0" y="0"/>
+          <a:chExt cx="0" cy="0"/>
+        </a:xfrm>
+      </p:grpSpPr>
+      <p:sp>
+        <p:nvSpPr>
+          <p:cNvPr id="2" name="Título 1">
+            <a:extLst>
+              <a:ext uri="{FF2B5EF4-FFF2-40B4-BE49-F238E27FC236}">
+                <a16:creationId xmlns:a16="http://schemas.microsoft.com/office/drawing/2014/main" id="{B821BF0C-12EB-487F-87F9-7201A9BBFF36}"/>
+              </a:ext>
+            </a:extLst>
+          </p:cNvPr>
+          <p:cNvSpPr>
+            <a:spLocks noGrp="1"/>
+          </p:cNvSpPr>
+          <p:nvPr>
+            <p:ph type="title"/>
+          </p:nvPr>
+        </p:nvSpPr>
+        <p:spPr/>
+        <p:txBody>
+          <a:bodyPr/>
+          <a:lstStyle/>
+          <a:p>
+            <a:r>
+              <a:rPr lang="en-GB" dirty="0">
+                <a:solidFill>
+                  <a:schemeClr val="accent1"/>
+                </a:solidFill>
+              </a:rPr>
+              <a:t>Method</a:t>
+            </a:r>
+            <a:r>
+              <a:rPr lang="en-GB" sz="2400" dirty="0">
+                <a:solidFill>
+                  <a:schemeClr val="accent1"/>
+                </a:solidFill>
+              </a:rPr>
+              <a:t> (directional lights)</a:t>
+            </a:r>
+            <a:endParaRPr lang="en-GB" dirty="0">
+              <a:solidFill>
+                <a:schemeClr val="accent1"/>
+              </a:solidFill>
+            </a:endParaRPr>
+          </a:p>
+        </p:txBody>
+      </p:sp>
+      <p:sp>
+        <p:nvSpPr>
+          <p:cNvPr id="3" name="Marcador de contenido 2">
+            <a:extLst>
+              <a:ext uri="{FF2B5EF4-FFF2-40B4-BE49-F238E27FC236}">
+                <a16:creationId xmlns:a16="http://schemas.microsoft.com/office/drawing/2014/main" id="{FAF98818-5F5B-43A5-BAC3-BB889C63F6F1}"/>
+              </a:ext>
+            </a:extLst>
+          </p:cNvPr>
+          <p:cNvSpPr>
+            <a:spLocks noGrp="1"/>
+          </p:cNvSpPr>
+          <p:nvPr>
+            <p:ph idx="1"/>
+          </p:nvPr>
+        </p:nvSpPr>
+        <p:spPr/>
+        <p:txBody>
+          <a:bodyPr/>
+          <a:lstStyle/>
+          <a:p>
+            <a:endParaRPr lang="en-GB" dirty="0"/>
+          </a:p>
+        </p:txBody>
+      </p:sp>
+    </p:spTree>
+    <p:extLst>
+      <p:ext uri="{BB962C8B-B14F-4D97-AF65-F5344CB8AC3E}">
+        <p14:creationId xmlns:p14="http://schemas.microsoft.com/office/powerpoint/2010/main" val="2718962532"/>
+      </p:ext>
+    </p:extLst>
+  </p:cSld>
+  <p:clrMapOvr>
+    <a:masterClrMapping/>
+  </p:clrMapOvr>
+</p:sld>
+</file>
+
+<file path=ppt/slides/slide7.xml><?xml version="1.0" encoding="utf-8"?>
+<p:sld xmlns:a="http://schemas.openxmlformats.org/drawingml/2006/main" xmlns:r="http://schemas.openxmlformats.org/officeDocument/2006/relationships" xmlns:p="http://schemas.openxmlformats.org/presentationml/2006/main">
+  <p:cSld>
+    <p:spTree>
+      <p:nvGrpSpPr>
+        <p:cNvPr id="1" name=""/>
+        <p:cNvGrpSpPr/>
+        <p:nvPr/>
+      </p:nvGrpSpPr>
+      <p:grpSpPr>
+        <a:xfrm>
+          <a:off x="0" y="0"/>
+          <a:ext cx="0" cy="0"/>
+          <a:chOff x="0" y="0"/>
+          <a:chExt cx="0" cy="0"/>
+        </a:xfrm>
+      </p:grpSpPr>
+      <p:sp>
+        <p:nvSpPr>
+          <p:cNvPr id="2" name="Título 1">
+            <a:extLst>
+              <a:ext uri="{FF2B5EF4-FFF2-40B4-BE49-F238E27FC236}">
+                <a16:creationId xmlns:a16="http://schemas.microsoft.com/office/drawing/2014/main" id="{731BCFAA-58B0-4C24-B9E2-D7ABF3F599E5}"/>
+              </a:ext>
+            </a:extLst>
+          </p:cNvPr>
+          <p:cNvSpPr>
+            <a:spLocks noGrp="1"/>
+          </p:cNvSpPr>
+          <p:nvPr>
+            <p:ph type="title"/>
+          </p:nvPr>
+        </p:nvSpPr>
+        <p:spPr/>
+        <p:txBody>
+          <a:bodyPr/>
+          <a:lstStyle/>
+          <a:p>
+            <a:r>
+              <a:rPr lang="en-GB" dirty="0">
+                <a:solidFill>
+                  <a:schemeClr val="accent1"/>
+                </a:solidFill>
+              </a:rPr>
+              <a:t>Demo time! :)</a:t>
+            </a:r>
+          </a:p>
+        </p:txBody>
+      </p:sp>
+      <p:sp>
+        <p:nvSpPr>
+          <p:cNvPr id="3" name="Marcador de contenido 2">
+            <a:extLst>
+              <a:ext uri="{FF2B5EF4-FFF2-40B4-BE49-F238E27FC236}">
+                <a16:creationId xmlns:a16="http://schemas.microsoft.com/office/drawing/2014/main" id="{5A4C9F2D-F98A-4C81-ADA4-B5BA8CEAF3E1}"/>
+              </a:ext>
+            </a:extLst>
+          </p:cNvPr>
+          <p:cNvSpPr>
+            <a:spLocks noGrp="1"/>
+          </p:cNvSpPr>
+          <p:nvPr>
+            <p:ph idx="1"/>
+          </p:nvPr>
+        </p:nvSpPr>
+        <p:spPr/>
+        <p:txBody>
+          <a:bodyPr/>
+          <a:lstStyle/>
+          <a:p>
+            <a:endParaRPr lang="en-GB" dirty="0"/>
+          </a:p>
+        </p:txBody>
+      </p:sp>
+    </p:spTree>
+    <p:extLst>
+      <p:ext uri="{BB962C8B-B14F-4D97-AF65-F5344CB8AC3E}">
+        <p14:creationId xmlns:p14="http://schemas.microsoft.com/office/powerpoint/2010/main" val="2732236798"/>
+      </p:ext>
+    </p:extLst>
+  </p:cSld>
+  <p:clrMapOvr>
+    <a:masterClrMapping/>
+  </p:clrMapOvr>
+</p:sld>
+</file>
+
+<file path=ppt/slides/slide8.xml><?xml version="1.0" encoding="utf-8"?>
+<p:sld xmlns:a="http://schemas.openxmlformats.org/drawingml/2006/main" xmlns:r="http://schemas.openxmlformats.org/officeDocument/2006/relationships" xmlns:p="http://schemas.openxmlformats.org/presentationml/2006/main">
+  <p:cSld>
+    <p:spTree>
+      <p:nvGrpSpPr>
+        <p:cNvPr id="1" name=""/>
+        <p:cNvGrpSpPr/>
+        <p:nvPr/>
+      </p:nvGrpSpPr>
+      <p:grpSpPr>
+        <a:xfrm>
+          <a:off x="0" y="0"/>
+          <a:ext cx="0" cy="0"/>
+          <a:chOff x="0" y="0"/>
+          <a:chExt cx="0" cy="0"/>
+        </a:xfrm>
+      </p:grpSpPr>
+      <p:sp>
+        <p:nvSpPr>
+          <p:cNvPr id="2" name="Título 1">
+            <a:extLst>
+              <a:ext uri="{FF2B5EF4-FFF2-40B4-BE49-F238E27FC236}">
+                <a16:creationId xmlns:a16="http://schemas.microsoft.com/office/drawing/2014/main" id="{61EFCD24-8427-430C-B74F-EFB87EEB92BE}"/>
+              </a:ext>
+            </a:extLst>
+          </p:cNvPr>
+          <p:cNvSpPr>
+            <a:spLocks noGrp="1"/>
+          </p:cNvSpPr>
+          <p:nvPr>
+            <p:ph type="title"/>
+          </p:nvPr>
+        </p:nvSpPr>
+        <p:spPr/>
+        <p:txBody>
+          <a:bodyPr/>
+          <a:lstStyle/>
+          <a:p>
+            <a:r>
+              <a:rPr lang="en-GB" dirty="0">
+                <a:solidFill>
+                  <a:schemeClr val="accent1"/>
+                </a:solidFill>
+              </a:rPr>
+              <a:t>Summary – key takeaways</a:t>
+            </a:r>
+          </a:p>
+        </p:txBody>
+      </p:sp>
+      <p:sp>
+        <p:nvSpPr>
+          <p:cNvPr id="3" name="Marcador de contenido 2">
+            <a:extLst>
+              <a:ext uri="{FF2B5EF4-FFF2-40B4-BE49-F238E27FC236}">
+                <a16:creationId xmlns:a16="http://schemas.microsoft.com/office/drawing/2014/main" id="{89B21F77-0540-4F08-967D-4D36AD412E22}"/>
+              </a:ext>
+            </a:extLst>
+          </p:cNvPr>
+          <p:cNvSpPr>
+            <a:spLocks noGrp="1"/>
+          </p:cNvSpPr>
+          <p:nvPr>
+            <p:ph idx="1"/>
+          </p:nvPr>
+        </p:nvSpPr>
+        <p:spPr/>
+        <p:txBody>
+          <a:bodyPr/>
+          <a:lstStyle/>
+          <a:p>
+            <a:endParaRPr lang="en-GB"/>
+          </a:p>
+        </p:txBody>
+      </p:sp>
+    </p:spTree>
+    <p:extLst>
+      <p:ext uri="{BB962C8B-B14F-4D97-AF65-F5344CB8AC3E}">
+        <p14:creationId xmlns:p14="http://schemas.microsoft.com/office/powerpoint/2010/main" val="3244361321"/>
       </p:ext>
     </p:extLst>
   </p:cSld>

</xml_diff>

<commit_message>
Worked on slides & diagrams
Wrote slides for:
- light & shadows
- shadow mapping intro
- openGL rendering pipeline
- summary (initial version)
Also created appropriate diagrams for those slides (in resources folder).
(-> could add notes to slides w/o them)
</commit_message>
<xml_diff>
--- a/slides/slides.pptx
+++ b/slides/slides.pptx
@@ -4,15 +4,21 @@
   <p:sldMasterIdLst>
     <p:sldMasterId id="2147483672" r:id="rId1"/>
   </p:sldMasterIdLst>
+  <p:notesMasterIdLst>
+    <p:notesMasterId r:id="rId13"/>
+  </p:notesMasterIdLst>
   <p:sldIdLst>
     <p:sldId id="256" r:id="rId2"/>
     <p:sldId id="257" r:id="rId3"/>
     <p:sldId id="258" r:id="rId4"/>
     <p:sldId id="259" r:id="rId5"/>
     <p:sldId id="260" r:id="rId6"/>
-    <p:sldId id="261" r:id="rId7"/>
-    <p:sldId id="262" r:id="rId8"/>
-    <p:sldId id="263" r:id="rId9"/>
+    <p:sldId id="265" r:id="rId7"/>
+    <p:sldId id="266" r:id="rId8"/>
+    <p:sldId id="261" r:id="rId9"/>
+    <p:sldId id="267" r:id="rId10"/>
+    <p:sldId id="262" r:id="rId11"/>
+    <p:sldId id="263" r:id="rId12"/>
   </p:sldIdLst>
   <p:sldSz cx="12192000" cy="6858000"/>
   <p:notesSz cx="6858000" cy="9144000"/>
@@ -117,6 +123,980 @@
     </p:ext>
   </p:extLst>
 </p:presentation>
+</file>
+
+<file path=ppt/notesMasters/notesMaster1.xml><?xml version="1.0" encoding="utf-8"?>
+<p:notesMaster xmlns:a="http://schemas.openxmlformats.org/drawingml/2006/main" xmlns:r="http://schemas.openxmlformats.org/officeDocument/2006/relationships" xmlns:p="http://schemas.openxmlformats.org/presentationml/2006/main">
+  <p:cSld>
+    <p:bg>
+      <p:bgRef idx="1001">
+        <a:schemeClr val="bg1"/>
+      </p:bgRef>
+    </p:bg>
+    <p:spTree>
+      <p:nvGrpSpPr>
+        <p:cNvPr id="1" name=""/>
+        <p:cNvGrpSpPr/>
+        <p:nvPr/>
+      </p:nvGrpSpPr>
+      <p:grpSpPr>
+        <a:xfrm>
+          <a:off x="0" y="0"/>
+          <a:ext cx="0" cy="0"/>
+          <a:chOff x="0" y="0"/>
+          <a:chExt cx="0" cy="0"/>
+        </a:xfrm>
+      </p:grpSpPr>
+      <p:sp>
+        <p:nvSpPr>
+          <p:cNvPr id="2" name="Marcador de encabezado 1"/>
+          <p:cNvSpPr>
+            <a:spLocks noGrp="1"/>
+          </p:cNvSpPr>
+          <p:nvPr>
+            <p:ph type="hdr" sz="quarter"/>
+          </p:nvPr>
+        </p:nvSpPr>
+        <p:spPr>
+          <a:xfrm>
+            <a:off x="0" y="0"/>
+            <a:ext cx="2971800" cy="458788"/>
+          </a:xfrm>
+          <a:prstGeom prst="rect">
+            <a:avLst/>
+          </a:prstGeom>
+        </p:spPr>
+        <p:txBody>
+          <a:bodyPr vert="horz" lIns="91440" tIns="45720" rIns="91440" bIns="45720" rtlCol="0"/>
+          <a:lstStyle>
+            <a:lvl1pPr algn="l">
+              <a:defRPr sz="1200"/>
+            </a:lvl1pPr>
+          </a:lstStyle>
+          <a:p>
+            <a:endParaRPr lang="en-GB"/>
+          </a:p>
+        </p:txBody>
+      </p:sp>
+      <p:sp>
+        <p:nvSpPr>
+          <p:cNvPr id="3" name="Marcador de fecha 2"/>
+          <p:cNvSpPr>
+            <a:spLocks noGrp="1"/>
+          </p:cNvSpPr>
+          <p:nvPr>
+            <p:ph type="dt" idx="1"/>
+          </p:nvPr>
+        </p:nvSpPr>
+        <p:spPr>
+          <a:xfrm>
+            <a:off x="3884613" y="0"/>
+            <a:ext cx="2971800" cy="458788"/>
+          </a:xfrm>
+          <a:prstGeom prst="rect">
+            <a:avLst/>
+          </a:prstGeom>
+        </p:spPr>
+        <p:txBody>
+          <a:bodyPr vert="horz" lIns="91440" tIns="45720" rIns="91440" bIns="45720" rtlCol="0"/>
+          <a:lstStyle>
+            <a:lvl1pPr algn="r">
+              <a:defRPr sz="1200"/>
+            </a:lvl1pPr>
+          </a:lstStyle>
+          <a:p>
+            <a:fld id="{66499B1D-C816-4A11-8D96-9373C31AF530}" type="datetimeFigureOut">
+              <a:rPr lang="en-GB" smtClean="0"/>
+              <a:t>12/01/2021</a:t>
+            </a:fld>
+            <a:endParaRPr lang="en-GB"/>
+          </a:p>
+        </p:txBody>
+      </p:sp>
+      <p:sp>
+        <p:nvSpPr>
+          <p:cNvPr id="4" name="Marcador de imagen de diapositiva 3"/>
+          <p:cNvSpPr>
+            <a:spLocks noGrp="1" noRot="1" noChangeAspect="1"/>
+          </p:cNvSpPr>
+          <p:nvPr>
+            <p:ph type="sldImg" idx="2"/>
+          </p:nvPr>
+        </p:nvSpPr>
+        <p:spPr>
+          <a:xfrm>
+            <a:off x="685800" y="1143000"/>
+            <a:ext cx="5486400" cy="3086100"/>
+          </a:xfrm>
+          <a:prstGeom prst="rect">
+            <a:avLst/>
+          </a:prstGeom>
+          <a:noFill/>
+          <a:ln w="12700">
+            <a:solidFill>
+              <a:prstClr val="black"/>
+            </a:solidFill>
+          </a:ln>
+        </p:spPr>
+        <p:txBody>
+          <a:bodyPr vert="horz" lIns="91440" tIns="45720" rIns="91440" bIns="45720" rtlCol="0" anchor="ctr"/>
+          <a:lstStyle/>
+          <a:p>
+            <a:endParaRPr lang="en-GB"/>
+          </a:p>
+        </p:txBody>
+      </p:sp>
+      <p:sp>
+        <p:nvSpPr>
+          <p:cNvPr id="5" name="Marcador de notas 4"/>
+          <p:cNvSpPr>
+            <a:spLocks noGrp="1"/>
+          </p:cNvSpPr>
+          <p:nvPr>
+            <p:ph type="body" sz="quarter" idx="3"/>
+          </p:nvPr>
+        </p:nvSpPr>
+        <p:spPr>
+          <a:xfrm>
+            <a:off x="685800" y="4400550"/>
+            <a:ext cx="5486400" cy="3600450"/>
+          </a:xfrm>
+          <a:prstGeom prst="rect">
+            <a:avLst/>
+          </a:prstGeom>
+        </p:spPr>
+        <p:txBody>
+          <a:bodyPr vert="horz" lIns="91440" tIns="45720" rIns="91440" bIns="45720" rtlCol="0"/>
+          <a:lstStyle/>
+          <a:p>
+            <a:pPr lvl="0"/>
+            <a:r>
+              <a:rPr lang="es-ES"/>
+              <a:t>Haga clic para modificar los estilos de texto del patrón</a:t>
+            </a:r>
+          </a:p>
+          <a:p>
+            <a:pPr lvl="1"/>
+            <a:r>
+              <a:rPr lang="es-ES"/>
+              <a:t>Segundo nivel</a:t>
+            </a:r>
+          </a:p>
+          <a:p>
+            <a:pPr lvl="2"/>
+            <a:r>
+              <a:rPr lang="es-ES"/>
+              <a:t>Tercer nivel</a:t>
+            </a:r>
+          </a:p>
+          <a:p>
+            <a:pPr lvl="3"/>
+            <a:r>
+              <a:rPr lang="es-ES"/>
+              <a:t>Cuarto nivel</a:t>
+            </a:r>
+          </a:p>
+          <a:p>
+            <a:pPr lvl="4"/>
+            <a:r>
+              <a:rPr lang="es-ES"/>
+              <a:t>Quinto nivel</a:t>
+            </a:r>
+            <a:endParaRPr lang="en-GB"/>
+          </a:p>
+        </p:txBody>
+      </p:sp>
+      <p:sp>
+        <p:nvSpPr>
+          <p:cNvPr id="6" name="Marcador de pie de página 5"/>
+          <p:cNvSpPr>
+            <a:spLocks noGrp="1"/>
+          </p:cNvSpPr>
+          <p:nvPr>
+            <p:ph type="ftr" sz="quarter" idx="4"/>
+          </p:nvPr>
+        </p:nvSpPr>
+        <p:spPr>
+          <a:xfrm>
+            <a:off x="0" y="8685213"/>
+            <a:ext cx="2971800" cy="458787"/>
+          </a:xfrm>
+          <a:prstGeom prst="rect">
+            <a:avLst/>
+          </a:prstGeom>
+        </p:spPr>
+        <p:txBody>
+          <a:bodyPr vert="horz" lIns="91440" tIns="45720" rIns="91440" bIns="45720" rtlCol="0" anchor="b"/>
+          <a:lstStyle>
+            <a:lvl1pPr algn="l">
+              <a:defRPr sz="1200"/>
+            </a:lvl1pPr>
+          </a:lstStyle>
+          <a:p>
+            <a:endParaRPr lang="en-GB"/>
+          </a:p>
+        </p:txBody>
+      </p:sp>
+      <p:sp>
+        <p:nvSpPr>
+          <p:cNvPr id="7" name="Marcador de número de diapositiva 6"/>
+          <p:cNvSpPr>
+            <a:spLocks noGrp="1"/>
+          </p:cNvSpPr>
+          <p:nvPr>
+            <p:ph type="sldNum" sz="quarter" idx="5"/>
+          </p:nvPr>
+        </p:nvSpPr>
+        <p:spPr>
+          <a:xfrm>
+            <a:off x="3884613" y="8685213"/>
+            <a:ext cx="2971800" cy="458787"/>
+          </a:xfrm>
+          <a:prstGeom prst="rect">
+            <a:avLst/>
+          </a:prstGeom>
+        </p:spPr>
+        <p:txBody>
+          <a:bodyPr vert="horz" lIns="91440" tIns="45720" rIns="91440" bIns="45720" rtlCol="0" anchor="b"/>
+          <a:lstStyle>
+            <a:lvl1pPr algn="r">
+              <a:defRPr sz="1200"/>
+            </a:lvl1pPr>
+          </a:lstStyle>
+          <a:p>
+            <a:fld id="{FF0F2D60-35F9-4BC0-B9FA-A8D7F998FA00}" type="slidenum">
+              <a:rPr lang="en-GB" smtClean="0"/>
+              <a:t>‹Nº›</a:t>
+            </a:fld>
+            <a:endParaRPr lang="en-GB"/>
+          </a:p>
+        </p:txBody>
+      </p:sp>
+    </p:spTree>
+    <p:extLst>
+      <p:ext uri="{BB962C8B-B14F-4D97-AF65-F5344CB8AC3E}">
+        <p14:creationId xmlns:p14="http://schemas.microsoft.com/office/powerpoint/2010/main" val="1387628898"/>
+      </p:ext>
+    </p:extLst>
+  </p:cSld>
+  <p:clrMap bg1="lt1" tx1="dk1" bg2="lt2" tx2="dk2" accent1="accent1" accent2="accent2" accent3="accent3" accent4="accent4" accent5="accent5" accent6="accent6" hlink="hlink" folHlink="folHlink"/>
+  <p:notesStyle>
+    <a:lvl1pPr marL="0" algn="l" defTabSz="914400" rtl="0" eaLnBrk="1" latinLnBrk="0" hangingPunct="1">
+      <a:defRPr sz="1200" kern="1200">
+        <a:solidFill>
+          <a:schemeClr val="tx1"/>
+        </a:solidFill>
+        <a:latin typeface="+mn-lt"/>
+        <a:ea typeface="+mn-ea"/>
+        <a:cs typeface="+mn-cs"/>
+      </a:defRPr>
+    </a:lvl1pPr>
+    <a:lvl2pPr marL="457200" algn="l" defTabSz="914400" rtl="0" eaLnBrk="1" latinLnBrk="0" hangingPunct="1">
+      <a:defRPr sz="1200" kern="1200">
+        <a:solidFill>
+          <a:schemeClr val="tx1"/>
+        </a:solidFill>
+        <a:latin typeface="+mn-lt"/>
+        <a:ea typeface="+mn-ea"/>
+        <a:cs typeface="+mn-cs"/>
+      </a:defRPr>
+    </a:lvl2pPr>
+    <a:lvl3pPr marL="914400" algn="l" defTabSz="914400" rtl="0" eaLnBrk="1" latinLnBrk="0" hangingPunct="1">
+      <a:defRPr sz="1200" kern="1200">
+        <a:solidFill>
+          <a:schemeClr val="tx1"/>
+        </a:solidFill>
+        <a:latin typeface="+mn-lt"/>
+        <a:ea typeface="+mn-ea"/>
+        <a:cs typeface="+mn-cs"/>
+      </a:defRPr>
+    </a:lvl3pPr>
+    <a:lvl4pPr marL="1371600" algn="l" defTabSz="914400" rtl="0" eaLnBrk="1" latinLnBrk="0" hangingPunct="1">
+      <a:defRPr sz="1200" kern="1200">
+        <a:solidFill>
+          <a:schemeClr val="tx1"/>
+        </a:solidFill>
+        <a:latin typeface="+mn-lt"/>
+        <a:ea typeface="+mn-ea"/>
+        <a:cs typeface="+mn-cs"/>
+      </a:defRPr>
+    </a:lvl4pPr>
+    <a:lvl5pPr marL="1828800" algn="l" defTabSz="914400" rtl="0" eaLnBrk="1" latinLnBrk="0" hangingPunct="1">
+      <a:defRPr sz="1200" kern="1200">
+        <a:solidFill>
+          <a:schemeClr val="tx1"/>
+        </a:solidFill>
+        <a:latin typeface="+mn-lt"/>
+        <a:ea typeface="+mn-ea"/>
+        <a:cs typeface="+mn-cs"/>
+      </a:defRPr>
+    </a:lvl5pPr>
+    <a:lvl6pPr marL="2286000" algn="l" defTabSz="914400" rtl="0" eaLnBrk="1" latinLnBrk="0" hangingPunct="1">
+      <a:defRPr sz="1200" kern="1200">
+        <a:solidFill>
+          <a:schemeClr val="tx1"/>
+        </a:solidFill>
+        <a:latin typeface="+mn-lt"/>
+        <a:ea typeface="+mn-ea"/>
+        <a:cs typeface="+mn-cs"/>
+      </a:defRPr>
+    </a:lvl6pPr>
+    <a:lvl7pPr marL="2743200" algn="l" defTabSz="914400" rtl="0" eaLnBrk="1" latinLnBrk="0" hangingPunct="1">
+      <a:defRPr sz="1200" kern="1200">
+        <a:solidFill>
+          <a:schemeClr val="tx1"/>
+        </a:solidFill>
+        <a:latin typeface="+mn-lt"/>
+        <a:ea typeface="+mn-ea"/>
+        <a:cs typeface="+mn-cs"/>
+      </a:defRPr>
+    </a:lvl7pPr>
+    <a:lvl8pPr marL="3200400" algn="l" defTabSz="914400" rtl="0" eaLnBrk="1" latinLnBrk="0" hangingPunct="1">
+      <a:defRPr sz="1200" kern="1200">
+        <a:solidFill>
+          <a:schemeClr val="tx1"/>
+        </a:solidFill>
+        <a:latin typeface="+mn-lt"/>
+        <a:ea typeface="+mn-ea"/>
+        <a:cs typeface="+mn-cs"/>
+      </a:defRPr>
+    </a:lvl8pPr>
+    <a:lvl9pPr marL="3657600" algn="l" defTabSz="914400" rtl="0" eaLnBrk="1" latinLnBrk="0" hangingPunct="1">
+      <a:defRPr sz="1200" kern="1200">
+        <a:solidFill>
+          <a:schemeClr val="tx1"/>
+        </a:solidFill>
+        <a:latin typeface="+mn-lt"/>
+        <a:ea typeface="+mn-ea"/>
+        <a:cs typeface="+mn-cs"/>
+      </a:defRPr>
+    </a:lvl9pPr>
+  </p:notesStyle>
+</p:notesMaster>
+</file>
+
+<file path=ppt/notesSlides/notesSlide1.xml><?xml version="1.0" encoding="utf-8"?>
+<p:notes xmlns:a="http://schemas.openxmlformats.org/drawingml/2006/main" xmlns:r="http://schemas.openxmlformats.org/officeDocument/2006/relationships" xmlns:p="http://schemas.openxmlformats.org/presentationml/2006/main">
+  <p:cSld>
+    <p:spTree>
+      <p:nvGrpSpPr>
+        <p:cNvPr id="1" name=""/>
+        <p:cNvGrpSpPr/>
+        <p:nvPr/>
+      </p:nvGrpSpPr>
+      <p:grpSpPr>
+        <a:xfrm>
+          <a:off x="0" y="0"/>
+          <a:ext cx="0" cy="0"/>
+          <a:chOff x="0" y="0"/>
+          <a:chExt cx="0" cy="0"/>
+        </a:xfrm>
+      </p:grpSpPr>
+      <p:sp>
+        <p:nvSpPr>
+          <p:cNvPr id="2" name="Marcador de imagen de diapositiva 1"/>
+          <p:cNvSpPr>
+            <a:spLocks noGrp="1" noRot="1" noChangeAspect="1"/>
+          </p:cNvSpPr>
+          <p:nvPr>
+            <p:ph type="sldImg"/>
+          </p:nvPr>
+        </p:nvSpPr>
+        <p:spPr/>
+      </p:sp>
+      <p:sp>
+        <p:nvSpPr>
+          <p:cNvPr id="3" name="Marcador de notas 2"/>
+          <p:cNvSpPr>
+            <a:spLocks noGrp="1"/>
+          </p:cNvSpPr>
+          <p:nvPr>
+            <p:ph type="body" idx="1"/>
+          </p:nvPr>
+        </p:nvSpPr>
+        <p:spPr/>
+        <p:txBody>
+          <a:bodyPr/>
+          <a:lstStyle/>
+          <a:p>
+            <a:r>
+              <a:rPr lang="en-GB" dirty="0"/>
+              <a:t>Mention that here we’ll focus on *hard* shadows only (from directional &amp; point lights), not in soft shadows (from area lights).</a:t>
+            </a:r>
+          </a:p>
+        </p:txBody>
+      </p:sp>
+      <p:sp>
+        <p:nvSpPr>
+          <p:cNvPr id="4" name="Marcador de número de diapositiva 3"/>
+          <p:cNvSpPr>
+            <a:spLocks noGrp="1"/>
+          </p:cNvSpPr>
+          <p:nvPr>
+            <p:ph type="sldNum" sz="quarter" idx="5"/>
+          </p:nvPr>
+        </p:nvSpPr>
+        <p:spPr/>
+        <p:txBody>
+          <a:bodyPr/>
+          <a:lstStyle/>
+          <a:p>
+            <a:fld id="{FF0F2D60-35F9-4BC0-B9FA-A8D7F998FA00}" type="slidenum">
+              <a:rPr lang="en-GB" smtClean="0"/>
+              <a:t>3</a:t>
+            </a:fld>
+            <a:endParaRPr lang="en-GB"/>
+          </a:p>
+        </p:txBody>
+      </p:sp>
+    </p:spTree>
+    <p:extLst>
+      <p:ext uri="{BB962C8B-B14F-4D97-AF65-F5344CB8AC3E}">
+        <p14:creationId xmlns:p14="http://schemas.microsoft.com/office/powerpoint/2010/main" val="2536057673"/>
+      </p:ext>
+    </p:extLst>
+  </p:cSld>
+  <p:clrMapOvr>
+    <a:masterClrMapping/>
+  </p:clrMapOvr>
+</p:notes>
+</file>
+
+<file path=ppt/notesSlides/notesSlide2.xml><?xml version="1.0" encoding="utf-8"?>
+<p:notes xmlns:a="http://schemas.openxmlformats.org/drawingml/2006/main" xmlns:r="http://schemas.openxmlformats.org/officeDocument/2006/relationships" xmlns:p="http://schemas.openxmlformats.org/presentationml/2006/main">
+  <p:cSld>
+    <p:spTree>
+      <p:nvGrpSpPr>
+        <p:cNvPr id="1" name=""/>
+        <p:cNvGrpSpPr/>
+        <p:nvPr/>
+      </p:nvGrpSpPr>
+      <p:grpSpPr>
+        <a:xfrm>
+          <a:off x="0" y="0"/>
+          <a:ext cx="0" cy="0"/>
+          <a:chOff x="0" y="0"/>
+          <a:chExt cx="0" cy="0"/>
+        </a:xfrm>
+      </p:grpSpPr>
+      <p:sp>
+        <p:nvSpPr>
+          <p:cNvPr id="2" name="Marcador de imagen de diapositiva 1"/>
+          <p:cNvSpPr>
+            <a:spLocks noGrp="1" noRot="1" noChangeAspect="1"/>
+          </p:cNvSpPr>
+          <p:nvPr>
+            <p:ph type="sldImg"/>
+          </p:nvPr>
+        </p:nvSpPr>
+        <p:spPr/>
+      </p:sp>
+      <p:sp>
+        <p:nvSpPr>
+          <p:cNvPr id="3" name="Marcador de notas 2"/>
+          <p:cNvSpPr>
+            <a:spLocks noGrp="1"/>
+          </p:cNvSpPr>
+          <p:nvPr>
+            <p:ph type="body" idx="1"/>
+          </p:nvPr>
+        </p:nvSpPr>
+        <p:spPr/>
+        <p:txBody>
+          <a:bodyPr/>
+          <a:lstStyle/>
+          <a:p>
+            <a:endParaRPr lang="en-GB" dirty="0"/>
+          </a:p>
+        </p:txBody>
+      </p:sp>
+      <p:sp>
+        <p:nvSpPr>
+          <p:cNvPr id="4" name="Marcador de número de diapositiva 3"/>
+          <p:cNvSpPr>
+            <a:spLocks noGrp="1"/>
+          </p:cNvSpPr>
+          <p:nvPr>
+            <p:ph type="sldNum" sz="quarter" idx="5"/>
+          </p:nvPr>
+        </p:nvSpPr>
+        <p:spPr/>
+        <p:txBody>
+          <a:bodyPr/>
+          <a:lstStyle/>
+          <a:p>
+            <a:fld id="{FF0F2D60-35F9-4BC0-B9FA-A8D7F998FA00}" type="slidenum">
+              <a:rPr lang="en-GB" smtClean="0"/>
+              <a:t>4</a:t>
+            </a:fld>
+            <a:endParaRPr lang="en-GB"/>
+          </a:p>
+        </p:txBody>
+      </p:sp>
+    </p:spTree>
+    <p:extLst>
+      <p:ext uri="{BB962C8B-B14F-4D97-AF65-F5344CB8AC3E}">
+        <p14:creationId xmlns:p14="http://schemas.microsoft.com/office/powerpoint/2010/main" val="282118558"/>
+      </p:ext>
+    </p:extLst>
+  </p:cSld>
+  <p:clrMapOvr>
+    <a:masterClrMapping/>
+  </p:clrMapOvr>
+</p:notes>
+</file>
+
+<file path=ppt/notesSlides/notesSlide3.xml><?xml version="1.0" encoding="utf-8"?>
+<p:notes xmlns:a="http://schemas.openxmlformats.org/drawingml/2006/main" xmlns:r="http://schemas.openxmlformats.org/officeDocument/2006/relationships" xmlns:p="http://schemas.openxmlformats.org/presentationml/2006/main">
+  <p:cSld>
+    <p:spTree>
+      <p:nvGrpSpPr>
+        <p:cNvPr id="1" name=""/>
+        <p:cNvGrpSpPr/>
+        <p:nvPr/>
+      </p:nvGrpSpPr>
+      <p:grpSpPr>
+        <a:xfrm>
+          <a:off x="0" y="0"/>
+          <a:ext cx="0" cy="0"/>
+          <a:chOff x="0" y="0"/>
+          <a:chExt cx="0" cy="0"/>
+        </a:xfrm>
+      </p:grpSpPr>
+      <p:sp>
+        <p:nvSpPr>
+          <p:cNvPr id="2" name="Marcador de imagen de diapositiva 1"/>
+          <p:cNvSpPr>
+            <a:spLocks noGrp="1" noRot="1" noChangeAspect="1"/>
+          </p:cNvSpPr>
+          <p:nvPr>
+            <p:ph type="sldImg"/>
+          </p:nvPr>
+        </p:nvSpPr>
+        <p:spPr/>
+      </p:sp>
+      <p:sp>
+        <p:nvSpPr>
+          <p:cNvPr id="3" name="Marcador de notas 2"/>
+          <p:cNvSpPr>
+            <a:spLocks noGrp="1"/>
+          </p:cNvSpPr>
+          <p:nvPr>
+            <p:ph type="body" idx="1"/>
+          </p:nvPr>
+        </p:nvSpPr>
+        <p:spPr/>
+        <p:txBody>
+          <a:bodyPr/>
+          <a:lstStyle/>
+          <a:p>
+            <a:r>
+              <a:rPr lang="en-GB" dirty="0"/>
+              <a:t>Consists of a set of fixed &amp; programmable stages for processing the geometry data.</a:t>
+            </a:r>
+          </a:p>
+          <a:p>
+            <a:r>
+              <a:rPr lang="en-GB" dirty="0"/>
+              <a:t>Start with the vertex data (position &amp; other attributes such as </a:t>
+            </a:r>
+            <a:r>
+              <a:rPr lang="en-GB" dirty="0" err="1"/>
+              <a:t>tex</a:t>
+            </a:r>
+            <a:r>
+              <a:rPr lang="en-GB" dirty="0"/>
+              <a:t> cords, normal), and process it, ending up with fragment data (colour, depth &amp; stencil) written to the currently active framebuffer -&gt; this could be the screen buffer meaning that the image is rendered to the screen or another FBO.</a:t>
+            </a:r>
+          </a:p>
+          <a:p>
+            <a:r>
+              <a:rPr lang="en-GB" dirty="0"/>
+              <a:t>We’re mainly focussed in the vertex &amp; fragment shaders here =&gt; NEXT SLIDE</a:t>
+            </a:r>
+          </a:p>
+        </p:txBody>
+      </p:sp>
+      <p:sp>
+        <p:nvSpPr>
+          <p:cNvPr id="4" name="Marcador de número de diapositiva 3"/>
+          <p:cNvSpPr>
+            <a:spLocks noGrp="1"/>
+          </p:cNvSpPr>
+          <p:nvPr>
+            <p:ph type="sldNum" sz="quarter" idx="5"/>
+          </p:nvPr>
+        </p:nvSpPr>
+        <p:spPr/>
+        <p:txBody>
+          <a:bodyPr/>
+          <a:lstStyle/>
+          <a:p>
+            <a:fld id="{FF0F2D60-35F9-4BC0-B9FA-A8D7F998FA00}" type="slidenum">
+              <a:rPr lang="en-GB" smtClean="0"/>
+              <a:t>5</a:t>
+            </a:fld>
+            <a:endParaRPr lang="en-GB"/>
+          </a:p>
+        </p:txBody>
+      </p:sp>
+    </p:spTree>
+    <p:extLst>
+      <p:ext uri="{BB962C8B-B14F-4D97-AF65-F5344CB8AC3E}">
+        <p14:creationId xmlns:p14="http://schemas.microsoft.com/office/powerpoint/2010/main" val="698017331"/>
+      </p:ext>
+    </p:extLst>
+  </p:cSld>
+  <p:clrMapOvr>
+    <a:masterClrMapping/>
+  </p:clrMapOvr>
+</p:notes>
+</file>
+
+<file path=ppt/notesSlides/notesSlide4.xml><?xml version="1.0" encoding="utf-8"?>
+<p:notes xmlns:a="http://schemas.openxmlformats.org/drawingml/2006/main" xmlns:r="http://schemas.openxmlformats.org/officeDocument/2006/relationships" xmlns:p="http://schemas.openxmlformats.org/presentationml/2006/main">
+  <p:cSld>
+    <p:spTree>
+      <p:nvGrpSpPr>
+        <p:cNvPr id="1" name=""/>
+        <p:cNvGrpSpPr/>
+        <p:nvPr/>
+      </p:nvGrpSpPr>
+      <p:grpSpPr>
+        <a:xfrm>
+          <a:off x="0" y="0"/>
+          <a:ext cx="0" cy="0"/>
+          <a:chOff x="0" y="0"/>
+          <a:chExt cx="0" cy="0"/>
+        </a:xfrm>
+      </p:grpSpPr>
+      <p:sp>
+        <p:nvSpPr>
+          <p:cNvPr id="2" name="Marcador de imagen de diapositiva 1"/>
+          <p:cNvSpPr>
+            <a:spLocks noGrp="1" noRot="1" noChangeAspect="1"/>
+          </p:cNvSpPr>
+          <p:nvPr>
+            <p:ph type="sldImg"/>
+          </p:nvPr>
+        </p:nvSpPr>
+        <p:spPr/>
+      </p:sp>
+      <p:sp>
+        <p:nvSpPr>
+          <p:cNvPr id="3" name="Marcador de notas 2"/>
+          <p:cNvSpPr>
+            <a:spLocks noGrp="1"/>
+          </p:cNvSpPr>
+          <p:nvPr>
+            <p:ph type="body" idx="1"/>
+          </p:nvPr>
+        </p:nvSpPr>
+        <p:spPr/>
+        <p:txBody>
+          <a:bodyPr/>
+          <a:lstStyle/>
+          <a:p>
+            <a:pPr marL="171450" indent="-171450">
+              <a:buFontTx/>
+              <a:buChar char="-"/>
+            </a:pPr>
+            <a:r>
+              <a:rPr lang="en-GB" dirty="0"/>
+              <a:t>Vertex shader: </a:t>
+            </a:r>
+          </a:p>
+          <a:p>
+            <a:pPr marL="628650" lvl="1" indent="-171450">
+              <a:buFontTx/>
+              <a:buChar char="-"/>
+            </a:pPr>
+            <a:r>
+              <a:rPr lang="en-GB" dirty="0"/>
+              <a:t>performs basic processing of each </a:t>
+            </a:r>
+            <a:r>
+              <a:rPr lang="en-GB" dirty="0" err="1"/>
+              <a:t>indiv</a:t>
+            </a:r>
+            <a:r>
+              <a:rPr lang="en-GB" dirty="0"/>
+              <a:t> vertex</a:t>
+            </a:r>
+          </a:p>
+          <a:p>
+            <a:pPr marL="628650" lvl="1" indent="-171450">
+              <a:buFontTx/>
+              <a:buChar char="-"/>
+            </a:pPr>
+            <a:r>
+              <a:rPr lang="en-GB" dirty="0"/>
+              <a:t>converts each incoming vertex into a single outgoing vertex based on a user-defined program.</a:t>
+            </a:r>
+          </a:p>
+          <a:p>
+            <a:pPr marL="628650" lvl="1" indent="-171450">
+              <a:buFontTx/>
+              <a:buChar char="-"/>
+            </a:pPr>
+            <a:r>
+              <a:rPr lang="en-GB" dirty="0"/>
+              <a:t>Here we do a series of </a:t>
+            </a:r>
+            <a:r>
+              <a:rPr lang="en-GB" dirty="0" err="1"/>
+              <a:t>transf</a:t>
+            </a:r>
+            <a:r>
+              <a:rPr lang="en-GB" dirty="0"/>
+              <a:t> to get from local object </a:t>
+            </a:r>
+            <a:r>
+              <a:rPr lang="en-GB" dirty="0" err="1"/>
+              <a:t>coords</a:t>
+            </a:r>
+            <a:r>
+              <a:rPr lang="en-GB" dirty="0"/>
+              <a:t> to screen cords (</a:t>
+            </a:r>
+            <a:r>
+              <a:rPr lang="en-GB" dirty="0" err="1"/>
+              <a:t>obj</a:t>
+            </a:r>
+            <a:r>
+              <a:rPr lang="en-GB" dirty="0"/>
+              <a:t> space -&gt; world space -&gt; camera space -&gt; screen space)</a:t>
+            </a:r>
+          </a:p>
+        </p:txBody>
+      </p:sp>
+      <p:sp>
+        <p:nvSpPr>
+          <p:cNvPr id="4" name="Marcador de número de diapositiva 3"/>
+          <p:cNvSpPr>
+            <a:spLocks noGrp="1"/>
+          </p:cNvSpPr>
+          <p:nvPr>
+            <p:ph type="sldNum" sz="quarter" idx="5"/>
+          </p:nvPr>
+        </p:nvSpPr>
+        <p:spPr/>
+        <p:txBody>
+          <a:bodyPr/>
+          <a:lstStyle/>
+          <a:p>
+            <a:fld id="{FF0F2D60-35F9-4BC0-B9FA-A8D7F998FA00}" type="slidenum">
+              <a:rPr lang="en-GB" smtClean="0"/>
+              <a:t>6</a:t>
+            </a:fld>
+            <a:endParaRPr lang="en-GB"/>
+          </a:p>
+        </p:txBody>
+      </p:sp>
+    </p:spTree>
+    <p:extLst>
+      <p:ext uri="{BB962C8B-B14F-4D97-AF65-F5344CB8AC3E}">
+        <p14:creationId xmlns:p14="http://schemas.microsoft.com/office/powerpoint/2010/main" val="3841563898"/>
+      </p:ext>
+    </p:extLst>
+  </p:cSld>
+  <p:clrMapOvr>
+    <a:masterClrMapping/>
+  </p:clrMapOvr>
+</p:notes>
+</file>
+
+<file path=ppt/notesSlides/notesSlide5.xml><?xml version="1.0" encoding="utf-8"?>
+<p:notes xmlns:a="http://schemas.openxmlformats.org/drawingml/2006/main" xmlns:r="http://schemas.openxmlformats.org/officeDocument/2006/relationships" xmlns:p="http://schemas.openxmlformats.org/presentationml/2006/main">
+  <p:cSld>
+    <p:spTree>
+      <p:nvGrpSpPr>
+        <p:cNvPr id="1" name=""/>
+        <p:cNvGrpSpPr/>
+        <p:nvPr/>
+      </p:nvGrpSpPr>
+      <p:grpSpPr>
+        <a:xfrm>
+          <a:off x="0" y="0"/>
+          <a:ext cx="0" cy="0"/>
+          <a:chOff x="0" y="0"/>
+          <a:chExt cx="0" cy="0"/>
+        </a:xfrm>
+      </p:grpSpPr>
+      <p:sp>
+        <p:nvSpPr>
+          <p:cNvPr id="2" name="Marcador de imagen de diapositiva 1"/>
+          <p:cNvSpPr>
+            <a:spLocks noGrp="1" noRot="1" noChangeAspect="1"/>
+          </p:cNvSpPr>
+          <p:nvPr>
+            <p:ph type="sldImg"/>
+          </p:nvPr>
+        </p:nvSpPr>
+        <p:spPr/>
+      </p:sp>
+      <p:sp>
+        <p:nvSpPr>
+          <p:cNvPr id="3" name="Marcador de notas 2"/>
+          <p:cNvSpPr>
+            <a:spLocks noGrp="1"/>
+          </p:cNvSpPr>
+          <p:nvPr>
+            <p:ph type="body" idx="1"/>
+          </p:nvPr>
+        </p:nvSpPr>
+        <p:spPr/>
+        <p:txBody>
+          <a:bodyPr/>
+          <a:lstStyle/>
+          <a:p>
+            <a:pPr marL="171450" indent="-171450">
+              <a:buFontTx/>
+              <a:buChar char="-"/>
+            </a:pPr>
+            <a:r>
+              <a:rPr lang="en-GB" dirty="0"/>
+              <a:t>Fragment shader: </a:t>
+            </a:r>
+          </a:p>
+          <a:p>
+            <a:pPr marL="628650" marR="0" lvl="1" indent="-171450" algn="l" defTabSz="914400" rtl="0" eaLnBrk="1" fontAlgn="auto" latinLnBrk="0" hangingPunct="1">
+              <a:lnSpc>
+                <a:spcPct val="100000"/>
+              </a:lnSpc>
+              <a:spcBef>
+                <a:spcPts val="0"/>
+              </a:spcBef>
+              <a:spcAft>
+                <a:spcPts val="0"/>
+              </a:spcAft>
+              <a:buClrTx/>
+              <a:buSzTx/>
+              <a:buFontTx/>
+              <a:buChar char="-"/>
+              <a:tabLst/>
+              <a:defRPr/>
+            </a:pPr>
+            <a:r>
+              <a:rPr lang="en-US" b="0" i="0" dirty="0">
+                <a:solidFill>
+                  <a:srgbClr val="202122"/>
+                </a:solidFill>
+                <a:effectLst/>
+                <a:latin typeface="Arial" panose="020B0604020202020204" pitchFamily="34" charset="0"/>
+              </a:rPr>
+              <a:t>data for each fragment from the rasterization stage is processed by a fragment shader. </a:t>
+            </a:r>
+            <a:endParaRPr lang="en-GB" dirty="0"/>
+          </a:p>
+          <a:p>
+            <a:pPr marL="628650" lvl="1" indent="-171450">
+              <a:buFontTx/>
+              <a:buChar char="-"/>
+            </a:pPr>
+            <a:r>
+              <a:rPr lang="en-GB" dirty="0"/>
+              <a:t>Calculates the colour for each fragment (pixel) e.g. using the </a:t>
+            </a:r>
+            <a:r>
+              <a:rPr lang="en-GB" dirty="0" err="1"/>
+              <a:t>Phong</a:t>
+            </a:r>
+            <a:r>
+              <a:rPr lang="en-GB" dirty="0"/>
+              <a:t> illumination model.</a:t>
+            </a:r>
+          </a:p>
+          <a:p>
+            <a:pPr marL="457200" lvl="1" indent="0">
+              <a:buFontTx/>
+              <a:buNone/>
+            </a:pPr>
+            <a:r>
+              <a:rPr lang="en-GB" sz="900" dirty="0"/>
+              <a:t>[“fragment” = “candidate pixel”… might or not be the final pixel, depending e.g. whether there’s a closer fragment or not, e.g. any later per-sample processing (stencil test…)]</a:t>
+            </a:r>
+          </a:p>
+          <a:p>
+            <a:pPr marL="628650" lvl="1" indent="-171450">
+              <a:buFontTx/>
+              <a:buChar char="-"/>
+            </a:pPr>
+            <a:r>
+              <a:rPr lang="en-US" b="0" i="0" dirty="0">
+                <a:solidFill>
+                  <a:srgbClr val="202122"/>
+                </a:solidFill>
+                <a:effectLst/>
+                <a:latin typeface="Arial" panose="020B0604020202020204" pitchFamily="34" charset="0"/>
+              </a:rPr>
+              <a:t>Output: a </a:t>
+            </a:r>
+            <a:r>
+              <a:rPr lang="en-US" b="0" i="0" dirty="0" err="1">
+                <a:solidFill>
+                  <a:srgbClr val="202122"/>
+                </a:solidFill>
+                <a:effectLst/>
+                <a:latin typeface="Arial" panose="020B0604020202020204" pitchFamily="34" charset="0"/>
+              </a:rPr>
+              <a:t>colour</a:t>
+            </a:r>
+            <a:r>
+              <a:rPr lang="en-US" b="0" i="0" dirty="0">
+                <a:solidFill>
+                  <a:srgbClr val="202122"/>
+                </a:solidFill>
+                <a:effectLst/>
+                <a:latin typeface="Arial" panose="020B0604020202020204" pitchFamily="34" charset="0"/>
+              </a:rPr>
+              <a:t> value, a depth value, &amp; a stencil value.</a:t>
+            </a:r>
+            <a:endParaRPr lang="en-GB" dirty="0"/>
+          </a:p>
+          <a:p>
+            <a:pPr marL="628650" lvl="1" indent="-171450">
+              <a:buFontTx/>
+              <a:buChar char="-"/>
+            </a:pPr>
+            <a:endParaRPr lang="en-GB" dirty="0"/>
+          </a:p>
+        </p:txBody>
+      </p:sp>
+      <p:sp>
+        <p:nvSpPr>
+          <p:cNvPr id="4" name="Marcador de número de diapositiva 3"/>
+          <p:cNvSpPr>
+            <a:spLocks noGrp="1"/>
+          </p:cNvSpPr>
+          <p:nvPr>
+            <p:ph type="sldNum" sz="quarter" idx="5"/>
+          </p:nvPr>
+        </p:nvSpPr>
+        <p:spPr/>
+        <p:txBody>
+          <a:bodyPr/>
+          <a:lstStyle/>
+          <a:p>
+            <a:fld id="{FF0F2D60-35F9-4BC0-B9FA-A8D7F998FA00}" type="slidenum">
+              <a:rPr lang="en-GB" smtClean="0"/>
+              <a:t>7</a:t>
+            </a:fld>
+            <a:endParaRPr lang="en-GB"/>
+          </a:p>
+        </p:txBody>
+      </p:sp>
+    </p:spTree>
+    <p:extLst>
+      <p:ext uri="{BB962C8B-B14F-4D97-AF65-F5344CB8AC3E}">
+        <p14:creationId xmlns:p14="http://schemas.microsoft.com/office/powerpoint/2010/main" val="1781319238"/>
+      </p:ext>
+    </p:extLst>
+  </p:cSld>
+  <p:clrMapOvr>
+    <a:masterClrMapping/>
+  </p:clrMapOvr>
+</p:notes>
 </file>
 
 <file path=ppt/slideLayouts/slideLayout1.xml><?xml version="1.0" encoding="utf-8"?>
@@ -3262,6 +4242,709 @@
 </p:sld>
 </file>
 
+<file path=ppt/slides/slide10.xml><?xml version="1.0" encoding="utf-8"?>
+<p:sld xmlns:a="http://schemas.openxmlformats.org/drawingml/2006/main" xmlns:r="http://schemas.openxmlformats.org/officeDocument/2006/relationships" xmlns:p="http://schemas.openxmlformats.org/presentationml/2006/main">
+  <p:cSld>
+    <p:spTree>
+      <p:nvGrpSpPr>
+        <p:cNvPr id="1" name=""/>
+        <p:cNvGrpSpPr/>
+        <p:nvPr/>
+      </p:nvGrpSpPr>
+      <p:grpSpPr>
+        <a:xfrm>
+          <a:off x="0" y="0"/>
+          <a:ext cx="0" cy="0"/>
+          <a:chOff x="0" y="0"/>
+          <a:chExt cx="0" cy="0"/>
+        </a:xfrm>
+      </p:grpSpPr>
+      <p:sp>
+        <p:nvSpPr>
+          <p:cNvPr id="2" name="Título 1">
+            <a:extLst>
+              <a:ext uri="{FF2B5EF4-FFF2-40B4-BE49-F238E27FC236}">
+                <a16:creationId xmlns:a16="http://schemas.microsoft.com/office/drawing/2014/main" id="{731BCFAA-58B0-4C24-B9E2-D7ABF3F599E5}"/>
+              </a:ext>
+            </a:extLst>
+          </p:cNvPr>
+          <p:cNvSpPr>
+            <a:spLocks noGrp="1"/>
+          </p:cNvSpPr>
+          <p:nvPr>
+            <p:ph type="title"/>
+          </p:nvPr>
+        </p:nvSpPr>
+        <p:spPr/>
+        <p:txBody>
+          <a:bodyPr/>
+          <a:lstStyle/>
+          <a:p>
+            <a:r>
+              <a:rPr lang="en-GB" dirty="0">
+                <a:solidFill>
+                  <a:schemeClr val="accent1"/>
+                </a:solidFill>
+              </a:rPr>
+              <a:t>Demo time! :)</a:t>
+            </a:r>
+          </a:p>
+        </p:txBody>
+      </p:sp>
+      <p:sp>
+        <p:nvSpPr>
+          <p:cNvPr id="3" name="Marcador de contenido 2">
+            <a:extLst>
+              <a:ext uri="{FF2B5EF4-FFF2-40B4-BE49-F238E27FC236}">
+                <a16:creationId xmlns:a16="http://schemas.microsoft.com/office/drawing/2014/main" id="{5A4C9F2D-F98A-4C81-ADA4-B5BA8CEAF3E1}"/>
+              </a:ext>
+            </a:extLst>
+          </p:cNvPr>
+          <p:cNvSpPr>
+            <a:spLocks noGrp="1"/>
+          </p:cNvSpPr>
+          <p:nvPr>
+            <p:ph idx="1"/>
+          </p:nvPr>
+        </p:nvSpPr>
+        <p:spPr/>
+        <p:txBody>
+          <a:bodyPr/>
+          <a:lstStyle/>
+          <a:p>
+            <a:endParaRPr lang="en-GB" dirty="0"/>
+          </a:p>
+        </p:txBody>
+      </p:sp>
+    </p:spTree>
+    <p:extLst>
+      <p:ext uri="{BB962C8B-B14F-4D97-AF65-F5344CB8AC3E}">
+        <p14:creationId xmlns:p14="http://schemas.microsoft.com/office/powerpoint/2010/main" val="2732236798"/>
+      </p:ext>
+    </p:extLst>
+  </p:cSld>
+  <p:clrMapOvr>
+    <a:masterClrMapping/>
+  </p:clrMapOvr>
+</p:sld>
+</file>
+
+<file path=ppt/slides/slide11.xml><?xml version="1.0" encoding="utf-8"?>
+<p:sld xmlns:a="http://schemas.openxmlformats.org/drawingml/2006/main" xmlns:r="http://schemas.openxmlformats.org/officeDocument/2006/relationships" xmlns:p="http://schemas.openxmlformats.org/presentationml/2006/main">
+  <p:cSld>
+    <p:spTree>
+      <p:nvGrpSpPr>
+        <p:cNvPr id="1" name=""/>
+        <p:cNvGrpSpPr/>
+        <p:nvPr/>
+      </p:nvGrpSpPr>
+      <p:grpSpPr>
+        <a:xfrm>
+          <a:off x="0" y="0"/>
+          <a:ext cx="0" cy="0"/>
+          <a:chOff x="0" y="0"/>
+          <a:chExt cx="0" cy="0"/>
+        </a:xfrm>
+      </p:grpSpPr>
+      <p:sp>
+        <p:nvSpPr>
+          <p:cNvPr id="2" name="Título 1">
+            <a:extLst>
+              <a:ext uri="{FF2B5EF4-FFF2-40B4-BE49-F238E27FC236}">
+                <a16:creationId xmlns:a16="http://schemas.microsoft.com/office/drawing/2014/main" id="{61EFCD24-8427-430C-B74F-EFB87EEB92BE}"/>
+              </a:ext>
+            </a:extLst>
+          </p:cNvPr>
+          <p:cNvSpPr>
+            <a:spLocks noGrp="1"/>
+          </p:cNvSpPr>
+          <p:nvPr>
+            <p:ph type="title"/>
+          </p:nvPr>
+        </p:nvSpPr>
+        <p:spPr/>
+        <p:txBody>
+          <a:bodyPr/>
+          <a:lstStyle/>
+          <a:p>
+            <a:r>
+              <a:rPr lang="en-GB" dirty="0">
+                <a:solidFill>
+                  <a:schemeClr val="accent1"/>
+                </a:solidFill>
+              </a:rPr>
+              <a:t>Summary – key takeaways</a:t>
+            </a:r>
+          </a:p>
+        </p:txBody>
+      </p:sp>
+      <p:sp>
+        <p:nvSpPr>
+          <p:cNvPr id="3" name="Marcador de contenido 2">
+            <a:extLst>
+              <a:ext uri="{FF2B5EF4-FFF2-40B4-BE49-F238E27FC236}">
+                <a16:creationId xmlns:a16="http://schemas.microsoft.com/office/drawing/2014/main" id="{89B21F77-0540-4F08-967D-4D36AD412E22}"/>
+              </a:ext>
+            </a:extLst>
+          </p:cNvPr>
+          <p:cNvSpPr>
+            <a:spLocks noGrp="1"/>
+          </p:cNvSpPr>
+          <p:nvPr>
+            <p:ph idx="1"/>
+          </p:nvPr>
+        </p:nvSpPr>
+        <p:spPr/>
+        <p:txBody>
+          <a:bodyPr>
+            <a:normAutofit/>
+          </a:bodyPr>
+          <a:lstStyle/>
+          <a:p>
+            <a:pPr>
+              <a:buClr>
+                <a:schemeClr val="accent1"/>
+              </a:buClr>
+            </a:pPr>
+            <a:r>
+              <a:rPr lang="en-GB" sz="2400" dirty="0"/>
+              <a:t>A technique for rendering shadows in real-time 3D graphics</a:t>
+            </a:r>
+          </a:p>
+          <a:p>
+            <a:pPr lvl="1">
+              <a:buClr>
+                <a:schemeClr val="accent1"/>
+              </a:buClr>
+              <a:buFont typeface="Wingdings" panose="05000000000000000000" pitchFamily="2" charset="2"/>
+              <a:buChar char="§"/>
+            </a:pPr>
+            <a:r>
+              <a:rPr lang="en-GB" sz="2000" dirty="0"/>
+              <a:t>Shadows add realism, convey depth &amp; convey spatial relationships between objects</a:t>
+            </a:r>
+          </a:p>
+          <a:p>
+            <a:pPr>
+              <a:buClr>
+                <a:schemeClr val="accent1"/>
+              </a:buClr>
+            </a:pPr>
+            <a:r>
+              <a:rPr lang="en-GB" sz="2400" dirty="0"/>
+              <a:t>Several advantages:</a:t>
+            </a:r>
+          </a:p>
+          <a:p>
+            <a:pPr lvl="1">
+              <a:buClr>
+                <a:schemeClr val="accent1"/>
+              </a:buClr>
+              <a:buFont typeface="Wingdings" panose="05000000000000000000" pitchFamily="2" charset="2"/>
+              <a:buChar char="§"/>
+            </a:pPr>
+            <a:r>
+              <a:rPr lang="en-US" sz="2000" dirty="0"/>
+              <a:t>Fast on modern GPUs</a:t>
+            </a:r>
+          </a:p>
+          <a:p>
+            <a:pPr lvl="1">
+              <a:buClr>
+                <a:schemeClr val="accent1"/>
+              </a:buClr>
+              <a:buFont typeface="Wingdings" panose="05000000000000000000" pitchFamily="2" charset="2"/>
+              <a:buChar char="§"/>
+            </a:pPr>
+            <a:r>
+              <a:rPr lang="en-US" sz="2000" dirty="0"/>
+              <a:t>Relatively easy to implement</a:t>
+            </a:r>
+          </a:p>
+          <a:p>
+            <a:pPr lvl="1">
+              <a:buClr>
+                <a:schemeClr val="accent1"/>
+              </a:buClr>
+              <a:buFont typeface="Wingdings" panose="05000000000000000000" pitchFamily="2" charset="2"/>
+              <a:buChar char="§"/>
+            </a:pPr>
+            <a:r>
+              <a:rPr lang="en-US" sz="2000" dirty="0"/>
+              <a:t>Transparent Shadows</a:t>
+            </a:r>
+          </a:p>
+          <a:p>
+            <a:pPr>
+              <a:buClr>
+                <a:schemeClr val="accent1"/>
+              </a:buClr>
+            </a:pPr>
+            <a:r>
+              <a:rPr lang="en-GB" sz="2400" dirty="0"/>
+              <a:t>…and some drawbacks:</a:t>
+            </a:r>
+          </a:p>
+          <a:p>
+            <a:pPr lvl="1">
+              <a:buClr>
+                <a:schemeClr val="accent1"/>
+              </a:buClr>
+              <a:buFont typeface="Wingdings" panose="05000000000000000000" pitchFamily="2" charset="2"/>
+              <a:buChar char="§"/>
+            </a:pPr>
+            <a:r>
+              <a:rPr lang="en-US" sz="2000" dirty="0"/>
+              <a:t>Aliasing!</a:t>
+            </a:r>
+          </a:p>
+          <a:p>
+            <a:pPr marL="914400" lvl="2" indent="0">
+              <a:buClr>
+                <a:schemeClr val="accent1"/>
+              </a:buClr>
+              <a:buNone/>
+            </a:pPr>
+            <a:r>
+              <a:rPr lang="en-US" sz="1800" dirty="0"/>
+              <a:t>…but many + advanced shadow mapping techniques improve this (at the expense of resources or flexibility)</a:t>
+            </a:r>
+          </a:p>
+          <a:p>
+            <a:pPr lvl="1">
+              <a:buClr>
+                <a:schemeClr val="accent1"/>
+              </a:buClr>
+              <a:buFont typeface="Wingdings" panose="05000000000000000000" pitchFamily="2" charset="2"/>
+              <a:buChar char="§"/>
+            </a:pPr>
+            <a:r>
+              <a:rPr lang="en-US" sz="2200" dirty="0"/>
+              <a:t>Omni-directional Shadow Mapping (for point lights) requires + renders</a:t>
+            </a:r>
+          </a:p>
+          <a:p>
+            <a:pPr lvl="1">
+              <a:buClr>
+                <a:schemeClr val="accent1"/>
+              </a:buClr>
+              <a:buFont typeface="Wingdings" panose="05000000000000000000" pitchFamily="2" charset="2"/>
+              <a:buChar char="§"/>
+            </a:pPr>
+            <a:endParaRPr lang="en-GB" dirty="0"/>
+          </a:p>
+        </p:txBody>
+      </p:sp>
+    </p:spTree>
+    <p:extLst>
+      <p:ext uri="{BB962C8B-B14F-4D97-AF65-F5344CB8AC3E}">
+        <p14:creationId xmlns:p14="http://schemas.microsoft.com/office/powerpoint/2010/main" val="3244361321"/>
+      </p:ext>
+    </p:extLst>
+  </p:cSld>
+  <p:clrMapOvr>
+    <a:masterClrMapping/>
+  </p:clrMapOvr>
+  <p:timing>
+    <p:tnLst>
+      <p:par>
+        <p:cTn id="1" dur="indefinite" restart="never" nodeType="tmRoot">
+          <p:childTnLst>
+            <p:seq concurrent="1" nextAc="seek">
+              <p:cTn id="2" dur="indefinite" nodeType="mainSeq">
+                <p:childTnLst>
+                  <p:par>
+                    <p:cTn id="3" fill="hold">
+                      <p:stCondLst>
+                        <p:cond delay="indefinite"/>
+                      </p:stCondLst>
+                      <p:childTnLst>
+                        <p:par>
+                          <p:cTn id="4" fill="hold">
+                            <p:stCondLst>
+                              <p:cond delay="0"/>
+                            </p:stCondLst>
+                            <p:childTnLst>
+                              <p:par>
+                                <p:cTn id="5" presetID="1" presetClass="entr" presetSubtype="0" fill="hold" grpId="0" nodeType="clickEffect">
+                                  <p:stCondLst>
+                                    <p:cond delay="0"/>
+                                  </p:stCondLst>
+                                  <p:childTnLst>
+                                    <p:set>
+                                      <p:cBhvr>
+                                        <p:cTn id="6" dur="1" fill="hold">
+                                          <p:stCondLst>
+                                            <p:cond delay="0"/>
+                                          </p:stCondLst>
+                                        </p:cTn>
+                                        <p:tgtEl>
+                                          <p:spTgt spid="3">
+                                            <p:txEl>
+                                              <p:pRg st="0" end="0"/>
+                                            </p:txEl>
+                                          </p:spTgt>
+                                        </p:tgtEl>
+                                        <p:attrNameLst>
+                                          <p:attrName>style.visibility</p:attrName>
+                                        </p:attrNameLst>
+                                      </p:cBhvr>
+                                      <p:to>
+                                        <p:strVal val="visible"/>
+                                      </p:to>
+                                    </p:set>
+                                  </p:childTnLst>
+                                </p:cTn>
+                              </p:par>
+                              <p:par>
+                                <p:cTn id="7" presetID="1" presetClass="entr" presetSubtype="0" fill="hold" grpId="0" nodeType="withEffect">
+                                  <p:stCondLst>
+                                    <p:cond delay="0"/>
+                                  </p:stCondLst>
+                                  <p:childTnLst>
+                                    <p:set>
+                                      <p:cBhvr>
+                                        <p:cTn id="8" dur="1" fill="hold">
+                                          <p:stCondLst>
+                                            <p:cond delay="0"/>
+                                          </p:stCondLst>
+                                        </p:cTn>
+                                        <p:tgtEl>
+                                          <p:spTgt spid="3">
+                                            <p:txEl>
+                                              <p:pRg st="1" end="1"/>
+                                            </p:txEl>
+                                          </p:spTgt>
+                                        </p:tgtEl>
+                                        <p:attrNameLst>
+                                          <p:attrName>style.visibility</p:attrName>
+                                        </p:attrNameLst>
+                                      </p:cBhvr>
+                                      <p:to>
+                                        <p:strVal val="visible"/>
+                                      </p:to>
+                                    </p:set>
+                                  </p:childTnLst>
+                                </p:cTn>
+                              </p:par>
+                            </p:childTnLst>
+                          </p:cTn>
+                        </p:par>
+                      </p:childTnLst>
+                    </p:cTn>
+                  </p:par>
+                  <p:par>
+                    <p:cTn id="9" fill="hold">
+                      <p:stCondLst>
+                        <p:cond delay="indefinite"/>
+                      </p:stCondLst>
+                      <p:childTnLst>
+                        <p:par>
+                          <p:cTn id="10" fill="hold">
+                            <p:stCondLst>
+                              <p:cond delay="0"/>
+                            </p:stCondLst>
+                            <p:childTnLst>
+                              <p:par>
+                                <p:cTn id="11" presetID="1" presetClass="entr" presetSubtype="0" fill="hold" grpId="0" nodeType="clickEffect">
+                                  <p:stCondLst>
+                                    <p:cond delay="0"/>
+                                  </p:stCondLst>
+                                  <p:childTnLst>
+                                    <p:set>
+                                      <p:cBhvr>
+                                        <p:cTn id="12" dur="1" fill="hold">
+                                          <p:stCondLst>
+                                            <p:cond delay="0"/>
+                                          </p:stCondLst>
+                                        </p:cTn>
+                                        <p:tgtEl>
+                                          <p:spTgt spid="3">
+                                            <p:txEl>
+                                              <p:pRg st="2" end="2"/>
+                                            </p:txEl>
+                                          </p:spTgt>
+                                        </p:tgtEl>
+                                        <p:attrNameLst>
+                                          <p:attrName>style.visibility</p:attrName>
+                                        </p:attrNameLst>
+                                      </p:cBhvr>
+                                      <p:to>
+                                        <p:strVal val="visible"/>
+                                      </p:to>
+                                    </p:set>
+                                  </p:childTnLst>
+                                </p:cTn>
+                              </p:par>
+                              <p:par>
+                                <p:cTn id="13" presetID="1" presetClass="entr" presetSubtype="0" fill="hold" grpId="0" nodeType="withEffect">
+                                  <p:stCondLst>
+                                    <p:cond delay="0"/>
+                                  </p:stCondLst>
+                                  <p:childTnLst>
+                                    <p:set>
+                                      <p:cBhvr>
+                                        <p:cTn id="14" dur="1" fill="hold">
+                                          <p:stCondLst>
+                                            <p:cond delay="0"/>
+                                          </p:stCondLst>
+                                        </p:cTn>
+                                        <p:tgtEl>
+                                          <p:spTgt spid="3">
+                                            <p:txEl>
+                                              <p:pRg st="3" end="3"/>
+                                            </p:txEl>
+                                          </p:spTgt>
+                                        </p:tgtEl>
+                                        <p:attrNameLst>
+                                          <p:attrName>style.visibility</p:attrName>
+                                        </p:attrNameLst>
+                                      </p:cBhvr>
+                                      <p:to>
+                                        <p:strVal val="visible"/>
+                                      </p:to>
+                                    </p:set>
+                                  </p:childTnLst>
+                                </p:cTn>
+                              </p:par>
+                              <p:par>
+                                <p:cTn id="15" presetID="1" presetClass="entr" presetSubtype="0" fill="hold" grpId="0" nodeType="withEffect">
+                                  <p:stCondLst>
+                                    <p:cond delay="0"/>
+                                  </p:stCondLst>
+                                  <p:childTnLst>
+                                    <p:set>
+                                      <p:cBhvr>
+                                        <p:cTn id="16" dur="1" fill="hold">
+                                          <p:stCondLst>
+                                            <p:cond delay="0"/>
+                                          </p:stCondLst>
+                                        </p:cTn>
+                                        <p:tgtEl>
+                                          <p:spTgt spid="3">
+                                            <p:txEl>
+                                              <p:pRg st="4" end="4"/>
+                                            </p:txEl>
+                                          </p:spTgt>
+                                        </p:tgtEl>
+                                        <p:attrNameLst>
+                                          <p:attrName>style.visibility</p:attrName>
+                                        </p:attrNameLst>
+                                      </p:cBhvr>
+                                      <p:to>
+                                        <p:strVal val="visible"/>
+                                      </p:to>
+                                    </p:set>
+                                  </p:childTnLst>
+                                </p:cTn>
+                              </p:par>
+                              <p:par>
+                                <p:cTn id="17" presetID="1" presetClass="entr" presetSubtype="0" fill="hold" grpId="0" nodeType="withEffect">
+                                  <p:stCondLst>
+                                    <p:cond delay="0"/>
+                                  </p:stCondLst>
+                                  <p:childTnLst>
+                                    <p:set>
+                                      <p:cBhvr>
+                                        <p:cTn id="18" dur="1" fill="hold">
+                                          <p:stCondLst>
+                                            <p:cond delay="0"/>
+                                          </p:stCondLst>
+                                        </p:cTn>
+                                        <p:tgtEl>
+                                          <p:spTgt spid="3">
+                                            <p:txEl>
+                                              <p:pRg st="5" end="5"/>
+                                            </p:txEl>
+                                          </p:spTgt>
+                                        </p:tgtEl>
+                                        <p:attrNameLst>
+                                          <p:attrName>style.visibility</p:attrName>
+                                        </p:attrNameLst>
+                                      </p:cBhvr>
+                                      <p:to>
+                                        <p:strVal val="visible"/>
+                                      </p:to>
+                                    </p:set>
+                                  </p:childTnLst>
+                                </p:cTn>
+                              </p:par>
+                            </p:childTnLst>
+                          </p:cTn>
+                        </p:par>
+                      </p:childTnLst>
+                    </p:cTn>
+                  </p:par>
+                  <p:par>
+                    <p:cTn id="19" fill="hold">
+                      <p:stCondLst>
+                        <p:cond delay="indefinite"/>
+                      </p:stCondLst>
+                      <p:childTnLst>
+                        <p:par>
+                          <p:cTn id="20" fill="hold">
+                            <p:stCondLst>
+                              <p:cond delay="0"/>
+                            </p:stCondLst>
+                            <p:childTnLst>
+                              <p:par>
+                                <p:cTn id="21" presetID="1" presetClass="entr" presetSubtype="0" fill="hold" grpId="0" nodeType="clickEffect">
+                                  <p:stCondLst>
+                                    <p:cond delay="0"/>
+                                  </p:stCondLst>
+                                  <p:childTnLst>
+                                    <p:set>
+                                      <p:cBhvr>
+                                        <p:cTn id="22" dur="1" fill="hold">
+                                          <p:stCondLst>
+                                            <p:cond delay="0"/>
+                                          </p:stCondLst>
+                                        </p:cTn>
+                                        <p:tgtEl>
+                                          <p:spTgt spid="3">
+                                            <p:txEl>
+                                              <p:pRg st="6" end="6"/>
+                                            </p:txEl>
+                                          </p:spTgt>
+                                        </p:tgtEl>
+                                        <p:attrNameLst>
+                                          <p:attrName>style.visibility</p:attrName>
+                                        </p:attrNameLst>
+                                      </p:cBhvr>
+                                      <p:to>
+                                        <p:strVal val="visible"/>
+                                      </p:to>
+                                    </p:set>
+                                  </p:childTnLst>
+                                </p:cTn>
+                              </p:par>
+                              <p:par>
+                                <p:cTn id="23" presetID="1" presetClass="entr" presetSubtype="0" fill="hold" grpId="0" nodeType="withEffect">
+                                  <p:stCondLst>
+                                    <p:cond delay="0"/>
+                                  </p:stCondLst>
+                                  <p:childTnLst>
+                                    <p:set>
+                                      <p:cBhvr>
+                                        <p:cTn id="24" dur="1" fill="hold">
+                                          <p:stCondLst>
+                                            <p:cond delay="0"/>
+                                          </p:stCondLst>
+                                        </p:cTn>
+                                        <p:tgtEl>
+                                          <p:spTgt spid="3">
+                                            <p:txEl>
+                                              <p:pRg st="7" end="7"/>
+                                            </p:txEl>
+                                          </p:spTgt>
+                                        </p:tgtEl>
+                                        <p:attrNameLst>
+                                          <p:attrName>style.visibility</p:attrName>
+                                        </p:attrNameLst>
+                                      </p:cBhvr>
+                                      <p:to>
+                                        <p:strVal val="visible"/>
+                                      </p:to>
+                                    </p:set>
+                                  </p:childTnLst>
+                                </p:cTn>
+                              </p:par>
+                              <p:par>
+                                <p:cTn id="25" presetID="1" presetClass="entr" presetSubtype="0" fill="hold" grpId="0" nodeType="withEffect">
+                                  <p:stCondLst>
+                                    <p:cond delay="0"/>
+                                  </p:stCondLst>
+                                  <p:childTnLst>
+                                    <p:set>
+                                      <p:cBhvr>
+                                        <p:cTn id="26" dur="1" fill="hold">
+                                          <p:stCondLst>
+                                            <p:cond delay="0"/>
+                                          </p:stCondLst>
+                                        </p:cTn>
+                                        <p:tgtEl>
+                                          <p:spTgt spid="3">
+                                            <p:txEl>
+                                              <p:pRg st="8" end="8"/>
+                                            </p:txEl>
+                                          </p:spTgt>
+                                        </p:tgtEl>
+                                        <p:attrNameLst>
+                                          <p:attrName>style.visibility</p:attrName>
+                                        </p:attrNameLst>
+                                      </p:cBhvr>
+                                      <p:to>
+                                        <p:strVal val="visible"/>
+                                      </p:to>
+                                    </p:set>
+                                  </p:childTnLst>
+                                </p:cTn>
+                              </p:par>
+                              <p:par>
+                                <p:cTn id="27" presetID="1" presetClass="entr" presetSubtype="0" fill="hold" grpId="0" nodeType="withEffect">
+                                  <p:stCondLst>
+                                    <p:cond delay="0"/>
+                                  </p:stCondLst>
+                                  <p:childTnLst>
+                                    <p:set>
+                                      <p:cBhvr>
+                                        <p:cTn id="28" dur="1" fill="hold">
+                                          <p:stCondLst>
+                                            <p:cond delay="0"/>
+                                          </p:stCondLst>
+                                        </p:cTn>
+                                        <p:tgtEl>
+                                          <p:spTgt spid="3">
+                                            <p:txEl>
+                                              <p:pRg st="9" end="9"/>
+                                            </p:txEl>
+                                          </p:spTgt>
+                                        </p:tgtEl>
+                                        <p:attrNameLst>
+                                          <p:attrName>style.visibility</p:attrName>
+                                        </p:attrNameLst>
+                                      </p:cBhvr>
+                                      <p:to>
+                                        <p:strVal val="visible"/>
+                                      </p:to>
+                                    </p:set>
+                                  </p:childTnLst>
+                                </p:cTn>
+                              </p:par>
+                            </p:childTnLst>
+                          </p:cTn>
+                        </p:par>
+                      </p:childTnLst>
+                    </p:cTn>
+                  </p:par>
+                </p:childTnLst>
+              </p:cTn>
+              <p:prevCondLst>
+                <p:cond evt="onPrev" delay="0">
+                  <p:tgtEl>
+                    <p:sldTgt/>
+                  </p:tgtEl>
+                </p:cond>
+              </p:prevCondLst>
+              <p:nextCondLst>
+                <p:cond evt="onNext" delay="0">
+                  <p:tgtEl>
+                    <p:sldTgt/>
+                  </p:tgtEl>
+                </p:cond>
+              </p:nextCondLst>
+            </p:seq>
+          </p:childTnLst>
+        </p:cTn>
+      </p:par>
+    </p:tnLst>
+    <p:bldLst>
+      <p:bldP spid="3" grpId="0" build="p"/>
+    </p:bldLst>
+  </p:timing>
+</p:sld>
+</file>
+
 <file path=ppt/slides/slide2.xml><?xml version="1.0" encoding="utf-8"?>
 <p:sld xmlns:a="http://schemas.openxmlformats.org/drawingml/2006/main" xmlns:r="http://schemas.openxmlformats.org/officeDocument/2006/relationships" xmlns:p="http://schemas.openxmlformats.org/presentationml/2006/main">
   <p:cSld>
@@ -3382,9 +5065,10 @@
               </a:buClr>
             </a:pPr>
             <a:r>
-              <a:rPr lang="en-GB" dirty="0"/>
-              <a:t>Demo time! :)</a:t>
-            </a:r>
+              <a:rPr lang="en-GB"/>
+              <a:t>Artefacts that occur</a:t>
+            </a:r>
+            <a:endParaRPr lang="en-GB" dirty="0"/>
           </a:p>
           <a:p>
             <a:pPr>
@@ -3394,7 +5078,7 @@
             </a:pPr>
             <a:r>
               <a:rPr lang="en-GB" dirty="0"/>
-              <a:t>Artefacts that occur</a:t>
+              <a:t>Demo time! :)</a:t>
             </a:r>
           </a:p>
           <a:p>
@@ -3423,6 +5107,382 @@
   <p:clrMapOvr>
     <a:masterClrMapping/>
   </p:clrMapOvr>
+  <p:timing>
+    <p:tnLst>
+      <p:par>
+        <p:cTn id="1" dur="indefinite" restart="never" nodeType="tmRoot">
+          <p:childTnLst>
+            <p:seq concurrent="1" nextAc="seek">
+              <p:cTn id="2" dur="indefinite" nodeType="mainSeq">
+                <p:childTnLst>
+                  <p:par>
+                    <p:cTn id="3" fill="hold">
+                      <p:stCondLst>
+                        <p:cond delay="indefinite"/>
+                      </p:stCondLst>
+                      <p:childTnLst>
+                        <p:par>
+                          <p:cTn id="4" fill="hold">
+                            <p:stCondLst>
+                              <p:cond delay="0"/>
+                            </p:stCondLst>
+                            <p:childTnLst>
+                              <p:par>
+                                <p:cTn id="5" presetID="1" presetClass="entr" presetSubtype="0" fill="hold" grpId="0" nodeType="clickEffect">
+                                  <p:stCondLst>
+                                    <p:cond delay="0"/>
+                                  </p:stCondLst>
+                                  <p:childTnLst>
+                                    <p:set>
+                                      <p:cBhvr>
+                                        <p:cTn id="6" dur="1" fill="hold">
+                                          <p:stCondLst>
+                                            <p:cond delay="0"/>
+                                          </p:stCondLst>
+                                        </p:cTn>
+                                        <p:tgtEl>
+                                          <p:spTgt spid="3">
+                                            <p:txEl>
+                                              <p:pRg st="0" end="0"/>
+                                            </p:txEl>
+                                          </p:spTgt>
+                                        </p:tgtEl>
+                                        <p:attrNameLst>
+                                          <p:attrName>style.visibility</p:attrName>
+                                        </p:attrNameLst>
+                                      </p:cBhvr>
+                                      <p:to>
+                                        <p:strVal val="visible"/>
+                                      </p:to>
+                                    </p:set>
+                                  </p:childTnLst>
+                                </p:cTn>
+                              </p:par>
+                            </p:childTnLst>
+                          </p:cTn>
+                        </p:par>
+                      </p:childTnLst>
+                    </p:cTn>
+                  </p:par>
+                  <p:par>
+                    <p:cTn id="7" fill="hold">
+                      <p:stCondLst>
+                        <p:cond delay="indefinite"/>
+                      </p:stCondLst>
+                      <p:childTnLst>
+                        <p:par>
+                          <p:cTn id="8" fill="hold">
+                            <p:stCondLst>
+                              <p:cond delay="0"/>
+                            </p:stCondLst>
+                            <p:childTnLst>
+                              <p:par>
+                                <p:cTn id="9" presetID="1" presetClass="entr" presetSubtype="0" fill="hold" grpId="0" nodeType="clickEffect">
+                                  <p:stCondLst>
+                                    <p:cond delay="0"/>
+                                  </p:stCondLst>
+                                  <p:childTnLst>
+                                    <p:set>
+                                      <p:cBhvr>
+                                        <p:cTn id="10" dur="1" fill="hold">
+                                          <p:stCondLst>
+                                            <p:cond delay="0"/>
+                                          </p:stCondLst>
+                                        </p:cTn>
+                                        <p:tgtEl>
+                                          <p:spTgt spid="3">
+                                            <p:txEl>
+                                              <p:pRg st="1" end="1"/>
+                                            </p:txEl>
+                                          </p:spTgt>
+                                        </p:tgtEl>
+                                        <p:attrNameLst>
+                                          <p:attrName>style.visibility</p:attrName>
+                                        </p:attrNameLst>
+                                      </p:cBhvr>
+                                      <p:to>
+                                        <p:strVal val="visible"/>
+                                      </p:to>
+                                    </p:set>
+                                  </p:childTnLst>
+                                </p:cTn>
+                              </p:par>
+                            </p:childTnLst>
+                          </p:cTn>
+                        </p:par>
+                      </p:childTnLst>
+                    </p:cTn>
+                  </p:par>
+                  <p:par>
+                    <p:cTn id="11" fill="hold">
+                      <p:stCondLst>
+                        <p:cond delay="indefinite"/>
+                      </p:stCondLst>
+                      <p:childTnLst>
+                        <p:par>
+                          <p:cTn id="12" fill="hold">
+                            <p:stCondLst>
+                              <p:cond delay="0"/>
+                            </p:stCondLst>
+                            <p:childTnLst>
+                              <p:par>
+                                <p:cTn id="13" presetID="1" presetClass="entr" presetSubtype="0" fill="hold" grpId="0" nodeType="clickEffect">
+                                  <p:stCondLst>
+                                    <p:cond delay="0"/>
+                                  </p:stCondLst>
+                                  <p:childTnLst>
+                                    <p:set>
+                                      <p:cBhvr>
+                                        <p:cTn id="14" dur="1" fill="hold">
+                                          <p:stCondLst>
+                                            <p:cond delay="0"/>
+                                          </p:stCondLst>
+                                        </p:cTn>
+                                        <p:tgtEl>
+                                          <p:spTgt spid="3">
+                                            <p:txEl>
+                                              <p:pRg st="2" end="2"/>
+                                            </p:txEl>
+                                          </p:spTgt>
+                                        </p:tgtEl>
+                                        <p:attrNameLst>
+                                          <p:attrName>style.visibility</p:attrName>
+                                        </p:attrNameLst>
+                                      </p:cBhvr>
+                                      <p:to>
+                                        <p:strVal val="visible"/>
+                                      </p:to>
+                                    </p:set>
+                                  </p:childTnLst>
+                                </p:cTn>
+                              </p:par>
+                            </p:childTnLst>
+                          </p:cTn>
+                        </p:par>
+                      </p:childTnLst>
+                    </p:cTn>
+                  </p:par>
+                  <p:par>
+                    <p:cTn id="15" fill="hold">
+                      <p:stCondLst>
+                        <p:cond delay="indefinite"/>
+                      </p:stCondLst>
+                      <p:childTnLst>
+                        <p:par>
+                          <p:cTn id="16" fill="hold">
+                            <p:stCondLst>
+                              <p:cond delay="0"/>
+                            </p:stCondLst>
+                            <p:childTnLst>
+                              <p:par>
+                                <p:cTn id="17" presetID="1" presetClass="entr" presetSubtype="0" fill="hold" grpId="0" nodeType="clickEffect">
+                                  <p:stCondLst>
+                                    <p:cond delay="0"/>
+                                  </p:stCondLst>
+                                  <p:childTnLst>
+                                    <p:set>
+                                      <p:cBhvr>
+                                        <p:cTn id="18" dur="1" fill="hold">
+                                          <p:stCondLst>
+                                            <p:cond delay="0"/>
+                                          </p:stCondLst>
+                                        </p:cTn>
+                                        <p:tgtEl>
+                                          <p:spTgt spid="3">
+                                            <p:txEl>
+                                              <p:pRg st="3" end="3"/>
+                                            </p:txEl>
+                                          </p:spTgt>
+                                        </p:tgtEl>
+                                        <p:attrNameLst>
+                                          <p:attrName>style.visibility</p:attrName>
+                                        </p:attrNameLst>
+                                      </p:cBhvr>
+                                      <p:to>
+                                        <p:strVal val="visible"/>
+                                      </p:to>
+                                    </p:set>
+                                  </p:childTnLst>
+                                </p:cTn>
+                              </p:par>
+                            </p:childTnLst>
+                          </p:cTn>
+                        </p:par>
+                      </p:childTnLst>
+                    </p:cTn>
+                  </p:par>
+                  <p:par>
+                    <p:cTn id="19" fill="hold">
+                      <p:stCondLst>
+                        <p:cond delay="indefinite"/>
+                      </p:stCondLst>
+                      <p:childTnLst>
+                        <p:par>
+                          <p:cTn id="20" fill="hold">
+                            <p:stCondLst>
+                              <p:cond delay="0"/>
+                            </p:stCondLst>
+                            <p:childTnLst>
+                              <p:par>
+                                <p:cTn id="21" presetID="1" presetClass="entr" presetSubtype="0" fill="hold" grpId="0" nodeType="clickEffect">
+                                  <p:stCondLst>
+                                    <p:cond delay="0"/>
+                                  </p:stCondLst>
+                                  <p:childTnLst>
+                                    <p:set>
+                                      <p:cBhvr>
+                                        <p:cTn id="22" dur="1" fill="hold">
+                                          <p:stCondLst>
+                                            <p:cond delay="0"/>
+                                          </p:stCondLst>
+                                        </p:cTn>
+                                        <p:tgtEl>
+                                          <p:spTgt spid="3">
+                                            <p:txEl>
+                                              <p:pRg st="4" end="4"/>
+                                            </p:txEl>
+                                          </p:spTgt>
+                                        </p:tgtEl>
+                                        <p:attrNameLst>
+                                          <p:attrName>style.visibility</p:attrName>
+                                        </p:attrNameLst>
+                                      </p:cBhvr>
+                                      <p:to>
+                                        <p:strVal val="visible"/>
+                                      </p:to>
+                                    </p:set>
+                                  </p:childTnLst>
+                                </p:cTn>
+                              </p:par>
+                            </p:childTnLst>
+                          </p:cTn>
+                        </p:par>
+                      </p:childTnLst>
+                    </p:cTn>
+                  </p:par>
+                  <p:par>
+                    <p:cTn id="23" fill="hold">
+                      <p:stCondLst>
+                        <p:cond delay="indefinite"/>
+                      </p:stCondLst>
+                      <p:childTnLst>
+                        <p:par>
+                          <p:cTn id="24" fill="hold">
+                            <p:stCondLst>
+                              <p:cond delay="0"/>
+                            </p:stCondLst>
+                            <p:childTnLst>
+                              <p:par>
+                                <p:cTn id="25" presetID="1" presetClass="entr" presetSubtype="0" fill="hold" grpId="0" nodeType="clickEffect">
+                                  <p:stCondLst>
+                                    <p:cond delay="0"/>
+                                  </p:stCondLst>
+                                  <p:childTnLst>
+                                    <p:set>
+                                      <p:cBhvr>
+                                        <p:cTn id="26" dur="1" fill="hold">
+                                          <p:stCondLst>
+                                            <p:cond delay="0"/>
+                                          </p:stCondLst>
+                                        </p:cTn>
+                                        <p:tgtEl>
+                                          <p:spTgt spid="3">
+                                            <p:txEl>
+                                              <p:pRg st="5" end="5"/>
+                                            </p:txEl>
+                                          </p:spTgt>
+                                        </p:tgtEl>
+                                        <p:attrNameLst>
+                                          <p:attrName>style.visibility</p:attrName>
+                                        </p:attrNameLst>
+                                      </p:cBhvr>
+                                      <p:to>
+                                        <p:strVal val="visible"/>
+                                      </p:to>
+                                    </p:set>
+                                  </p:childTnLst>
+                                </p:cTn>
+                              </p:par>
+                            </p:childTnLst>
+                          </p:cTn>
+                        </p:par>
+                      </p:childTnLst>
+                    </p:cTn>
+                  </p:par>
+                  <p:par>
+                    <p:cTn id="27" fill="hold">
+                      <p:stCondLst>
+                        <p:cond delay="indefinite"/>
+                      </p:stCondLst>
+                      <p:childTnLst>
+                        <p:par>
+                          <p:cTn id="28" fill="hold">
+                            <p:stCondLst>
+                              <p:cond delay="0"/>
+                            </p:stCondLst>
+                            <p:childTnLst>
+                              <p:par>
+                                <p:cTn id="29" presetID="1" presetClass="entr" presetSubtype="0" fill="hold" grpId="0" nodeType="clickEffect">
+                                  <p:stCondLst>
+                                    <p:cond delay="0"/>
+                                  </p:stCondLst>
+                                  <p:childTnLst>
+                                    <p:set>
+                                      <p:cBhvr>
+                                        <p:cTn id="30" dur="1" fill="hold">
+                                          <p:stCondLst>
+                                            <p:cond delay="0"/>
+                                          </p:stCondLst>
+                                        </p:cTn>
+                                        <p:tgtEl>
+                                          <p:spTgt spid="3">
+                                            <p:txEl>
+                                              <p:pRg st="6" end="6"/>
+                                            </p:txEl>
+                                          </p:spTgt>
+                                        </p:tgtEl>
+                                        <p:attrNameLst>
+                                          <p:attrName>style.visibility</p:attrName>
+                                        </p:attrNameLst>
+                                      </p:cBhvr>
+                                      <p:to>
+                                        <p:strVal val="visible"/>
+                                      </p:to>
+                                    </p:set>
+                                  </p:childTnLst>
+                                </p:cTn>
+                              </p:par>
+                            </p:childTnLst>
+                          </p:cTn>
+                        </p:par>
+                      </p:childTnLst>
+                    </p:cTn>
+                  </p:par>
+                </p:childTnLst>
+              </p:cTn>
+              <p:prevCondLst>
+                <p:cond evt="onPrev" delay="0">
+                  <p:tgtEl>
+                    <p:sldTgt/>
+                  </p:tgtEl>
+                </p:cond>
+              </p:prevCondLst>
+              <p:nextCondLst>
+                <p:cond evt="onNext" delay="0">
+                  <p:tgtEl>
+                    <p:sldTgt/>
+                  </p:tgtEl>
+                </p:cond>
+              </p:nextCondLst>
+            </p:seq>
+          </p:childTnLst>
+        </p:cTn>
+      </p:par>
+    </p:tnLst>
+    <p:bldLst>
+      <p:bldP spid="3" grpId="0" build="p"/>
+    </p:bldLst>
+  </p:timing>
 </p:sld>
 </file>
 
@@ -3491,12 +5551,311 @@
             <p:ph idx="1"/>
           </p:nvPr>
         </p:nvSpPr>
-        <p:spPr/>
-        <p:txBody>
-          <a:bodyPr/>
-          <a:lstStyle/>
-          <a:p>
-            <a:endParaRPr lang="en-GB" dirty="0"/>
+        <p:spPr>
+          <a:xfrm>
+            <a:off x="838200" y="1825625"/>
+            <a:ext cx="10515600" cy="1854835"/>
+          </a:xfrm>
+        </p:spPr>
+        <p:txBody>
+          <a:bodyPr>
+            <a:normAutofit fontScale="92500" lnSpcReduction="10000"/>
+          </a:bodyPr>
+          <a:lstStyle/>
+          <a:p>
+            <a:pPr>
+              <a:buClr>
+                <a:schemeClr val="accent1"/>
+              </a:buClr>
+            </a:pPr>
+            <a:r>
+              <a:rPr lang="en-GB" dirty="0"/>
+              <a:t>Shadows…</a:t>
+            </a:r>
+          </a:p>
+          <a:p>
+            <a:pPr lvl="1">
+              <a:buClr>
+                <a:schemeClr val="accent1"/>
+              </a:buClr>
+              <a:buFont typeface="Wingdings" panose="05000000000000000000" pitchFamily="2" charset="2"/>
+              <a:buChar char="§"/>
+            </a:pPr>
+            <a:r>
+              <a:rPr lang="en-GB" dirty="0"/>
+              <a:t>Add realism</a:t>
+            </a:r>
+          </a:p>
+          <a:p>
+            <a:pPr lvl="1">
+              <a:buClr>
+                <a:schemeClr val="accent1"/>
+              </a:buClr>
+              <a:buFont typeface="Wingdings" panose="05000000000000000000" pitchFamily="2" charset="2"/>
+              <a:buChar char="§"/>
+            </a:pPr>
+            <a:r>
+              <a:rPr lang="en-GB" dirty="0"/>
+              <a:t>Convey depth</a:t>
+            </a:r>
+          </a:p>
+          <a:p>
+            <a:pPr lvl="1">
+              <a:buClr>
+                <a:schemeClr val="accent1"/>
+              </a:buClr>
+              <a:buFont typeface="Wingdings" panose="05000000000000000000" pitchFamily="2" charset="2"/>
+              <a:buChar char="§"/>
+            </a:pPr>
+            <a:r>
+              <a:rPr lang="en-GB" dirty="0"/>
+              <a:t>Convey spatial relationships between objects</a:t>
+            </a:r>
+          </a:p>
+          <a:p>
+            <a:pPr>
+              <a:buClr>
+                <a:schemeClr val="accent1"/>
+              </a:buClr>
+            </a:pPr>
+            <a:r>
+              <a:rPr lang="en-GB" dirty="0"/>
+              <a:t>Different lights cast different shadows</a:t>
+            </a:r>
+          </a:p>
+        </p:txBody>
+      </p:sp>
+      <p:sp>
+        <p:nvSpPr>
+          <p:cNvPr id="6" name="CuadroTexto 5">
+            <a:extLst>
+              <a:ext uri="{FF2B5EF4-FFF2-40B4-BE49-F238E27FC236}">
+                <a16:creationId xmlns:a16="http://schemas.microsoft.com/office/drawing/2014/main" id="{71555D1D-2CBA-4A3E-81CA-80175423319C}"/>
+              </a:ext>
+            </a:extLst>
+          </p:cNvPr>
+          <p:cNvSpPr txBox="1"/>
+          <p:nvPr/>
+        </p:nvSpPr>
+        <p:spPr>
+          <a:xfrm>
+            <a:off x="1280160" y="3680460"/>
+            <a:ext cx="3634740" cy="769441"/>
+          </a:xfrm>
+          <a:prstGeom prst="rect">
+            <a:avLst/>
+          </a:prstGeom>
+          <a:noFill/>
+        </p:spPr>
+        <p:txBody>
+          <a:bodyPr wrap="square" rtlCol="0">
+            <a:spAutoFit/>
+          </a:bodyPr>
+          <a:lstStyle/>
+          <a:p>
+            <a:pPr marL="285750" indent="-285750">
+              <a:buClr>
+                <a:schemeClr val="accent1"/>
+              </a:buClr>
+              <a:buFont typeface="Wingdings" panose="05000000000000000000" pitchFamily="2" charset="2"/>
+              <a:buChar char="§"/>
+            </a:pPr>
+            <a:r>
+              <a:rPr lang="en-GB" sz="2200" dirty="0"/>
+              <a:t>Directional Light:</a:t>
+            </a:r>
+          </a:p>
+          <a:p>
+            <a:endParaRPr lang="en-GB" sz="2200" dirty="0"/>
+          </a:p>
+        </p:txBody>
+      </p:sp>
+      <p:pic>
+        <p:nvPicPr>
+          <p:cNvPr id="9" name="Imagen 8" descr="Forma, Esquemático&#10;&#10;Descripción generada automáticamente">
+            <a:extLst>
+              <a:ext uri="{FF2B5EF4-FFF2-40B4-BE49-F238E27FC236}">
+                <a16:creationId xmlns:a16="http://schemas.microsoft.com/office/drawing/2014/main" id="{31BA7006-0F5C-42AD-AA97-9810B521147E}"/>
+              </a:ext>
+            </a:extLst>
+          </p:cNvPr>
+          <p:cNvPicPr>
+            <a:picLocks noChangeAspect="1"/>
+          </p:cNvPicPr>
+          <p:nvPr/>
+        </p:nvPicPr>
+        <p:blipFill>
+          <a:blip r:embed="rId3">
+            <a:extLst>
+              <a:ext uri="{28A0092B-C50C-407E-A947-70E740481C1C}">
+                <a14:useLocalDpi xmlns:a14="http://schemas.microsoft.com/office/drawing/2010/main" val="0"/>
+              </a:ext>
+            </a:extLst>
+          </a:blip>
+          <a:stretch>
+            <a:fillRect/>
+          </a:stretch>
+        </p:blipFill>
+        <p:spPr>
+          <a:xfrm>
+            <a:off x="2436450" y="4026403"/>
+            <a:ext cx="2581236" cy="1878223"/>
+          </a:xfrm>
+          <a:prstGeom prst="rect">
+            <a:avLst/>
+          </a:prstGeom>
+        </p:spPr>
+      </p:pic>
+      <p:sp>
+        <p:nvSpPr>
+          <p:cNvPr id="10" name="CuadroTexto 9">
+            <a:extLst>
+              <a:ext uri="{FF2B5EF4-FFF2-40B4-BE49-F238E27FC236}">
+                <a16:creationId xmlns:a16="http://schemas.microsoft.com/office/drawing/2014/main" id="{3C68ABD3-532C-4565-84B7-B85AE38758DE}"/>
+              </a:ext>
+            </a:extLst>
+          </p:cNvPr>
+          <p:cNvSpPr txBox="1"/>
+          <p:nvPr/>
+        </p:nvSpPr>
+        <p:spPr>
+          <a:xfrm>
+            <a:off x="6096000" y="3657600"/>
+            <a:ext cx="3634740" cy="769441"/>
+          </a:xfrm>
+          <a:prstGeom prst="rect">
+            <a:avLst/>
+          </a:prstGeom>
+          <a:noFill/>
+        </p:spPr>
+        <p:txBody>
+          <a:bodyPr wrap="square" rtlCol="0">
+            <a:spAutoFit/>
+          </a:bodyPr>
+          <a:lstStyle/>
+          <a:p>
+            <a:pPr marL="285750" indent="-285750">
+              <a:buClr>
+                <a:schemeClr val="accent1"/>
+              </a:buClr>
+              <a:buFont typeface="Wingdings" panose="05000000000000000000" pitchFamily="2" charset="2"/>
+              <a:buChar char="§"/>
+            </a:pPr>
+            <a:r>
+              <a:rPr lang="en-GB" sz="2200" dirty="0"/>
+              <a:t>Point Light:</a:t>
+            </a:r>
+          </a:p>
+          <a:p>
+            <a:endParaRPr lang="en-GB" sz="2200" dirty="0"/>
+          </a:p>
+        </p:txBody>
+      </p:sp>
+      <p:sp>
+        <p:nvSpPr>
+          <p:cNvPr id="11" name="CuadroTexto 10">
+            <a:extLst>
+              <a:ext uri="{FF2B5EF4-FFF2-40B4-BE49-F238E27FC236}">
+                <a16:creationId xmlns:a16="http://schemas.microsoft.com/office/drawing/2014/main" id="{D9E4A6F3-6F55-4D6F-8EF3-E8341BEBD114}"/>
+              </a:ext>
+            </a:extLst>
+          </p:cNvPr>
+          <p:cNvSpPr txBox="1"/>
+          <p:nvPr/>
+        </p:nvSpPr>
+        <p:spPr>
+          <a:xfrm>
+            <a:off x="1857456" y="5852160"/>
+            <a:ext cx="3634740" cy="369332"/>
+          </a:xfrm>
+          <a:prstGeom prst="rect">
+            <a:avLst/>
+          </a:prstGeom>
+          <a:noFill/>
+        </p:spPr>
+        <p:txBody>
+          <a:bodyPr wrap="square" rtlCol="0">
+            <a:spAutoFit/>
+          </a:bodyPr>
+          <a:lstStyle/>
+          <a:p>
+            <a:pPr algn="ctr"/>
+            <a:r>
+              <a:rPr lang="en-GB" dirty="0"/>
+              <a:t>Orthographic Projection</a:t>
+            </a:r>
+          </a:p>
+        </p:txBody>
+      </p:sp>
+      <p:pic>
+        <p:nvPicPr>
+          <p:cNvPr id="13" name="Imagen 12" descr="Esquemático&#10;&#10;Descripción generada automáticamente con confianza media">
+            <a:extLst>
+              <a:ext uri="{FF2B5EF4-FFF2-40B4-BE49-F238E27FC236}">
+                <a16:creationId xmlns:a16="http://schemas.microsoft.com/office/drawing/2014/main" id="{0E096A93-7DA9-4607-B3BA-D5005847E1DC}"/>
+              </a:ext>
+            </a:extLst>
+          </p:cNvPr>
+          <p:cNvPicPr>
+            <a:picLocks noChangeAspect="1"/>
+          </p:cNvPicPr>
+          <p:nvPr/>
+        </p:nvPicPr>
+        <p:blipFill>
+          <a:blip r:embed="rId4">
+            <a:extLst>
+              <a:ext uri="{28A0092B-C50C-407E-A947-70E740481C1C}">
+                <a14:useLocalDpi xmlns:a14="http://schemas.microsoft.com/office/drawing/2010/main" val="0"/>
+              </a:ext>
+            </a:extLst>
+          </a:blip>
+          <a:stretch>
+            <a:fillRect/>
+          </a:stretch>
+        </p:blipFill>
+        <p:spPr>
+          <a:xfrm>
+            <a:off x="7149504" y="4003383"/>
+            <a:ext cx="2581236" cy="1935137"/>
+          </a:xfrm>
+          <a:prstGeom prst="rect">
+            <a:avLst/>
+          </a:prstGeom>
+        </p:spPr>
+      </p:pic>
+      <p:sp>
+        <p:nvSpPr>
+          <p:cNvPr id="14" name="CuadroTexto 13">
+            <a:extLst>
+              <a:ext uri="{FF2B5EF4-FFF2-40B4-BE49-F238E27FC236}">
+                <a16:creationId xmlns:a16="http://schemas.microsoft.com/office/drawing/2014/main" id="{7FFB48AD-AA2C-41BB-86EC-0BB666499DA1}"/>
+              </a:ext>
+            </a:extLst>
+          </p:cNvPr>
+          <p:cNvSpPr txBox="1"/>
+          <p:nvPr/>
+        </p:nvSpPr>
+        <p:spPr>
+          <a:xfrm>
+            <a:off x="6777776" y="5904627"/>
+            <a:ext cx="3634740" cy="369332"/>
+          </a:xfrm>
+          <a:prstGeom prst="rect">
+            <a:avLst/>
+          </a:prstGeom>
+          <a:noFill/>
+        </p:spPr>
+        <p:txBody>
+          <a:bodyPr wrap="square" rtlCol="0">
+            <a:spAutoFit/>
+          </a:bodyPr>
+          <a:lstStyle/>
+          <a:p>
+            <a:pPr algn="ctr"/>
+            <a:r>
+              <a:rPr lang="en-GB" dirty="0"/>
+              <a:t>Perspective Projection</a:t>
+            </a:r>
           </a:p>
         </p:txBody>
       </p:sp>
@@ -3510,6 +5869,432 @@
   <p:clrMapOvr>
     <a:masterClrMapping/>
   </p:clrMapOvr>
+  <p:timing>
+    <p:tnLst>
+      <p:par>
+        <p:cTn id="1" dur="indefinite" restart="never" nodeType="tmRoot">
+          <p:childTnLst>
+            <p:seq concurrent="1" nextAc="seek">
+              <p:cTn id="2" dur="indefinite" nodeType="mainSeq">
+                <p:childTnLst>
+                  <p:par>
+                    <p:cTn id="3" fill="hold">
+                      <p:stCondLst>
+                        <p:cond delay="indefinite"/>
+                      </p:stCondLst>
+                      <p:childTnLst>
+                        <p:par>
+                          <p:cTn id="4" fill="hold">
+                            <p:stCondLst>
+                              <p:cond delay="0"/>
+                            </p:stCondLst>
+                            <p:childTnLst>
+                              <p:par>
+                                <p:cTn id="5" presetID="1" presetClass="entr" presetSubtype="0" fill="hold" grpId="0" nodeType="clickEffect">
+                                  <p:stCondLst>
+                                    <p:cond delay="0"/>
+                                  </p:stCondLst>
+                                  <p:childTnLst>
+                                    <p:set>
+                                      <p:cBhvr>
+                                        <p:cTn id="6" dur="1" fill="hold">
+                                          <p:stCondLst>
+                                            <p:cond delay="0"/>
+                                          </p:stCondLst>
+                                        </p:cTn>
+                                        <p:tgtEl>
+                                          <p:spTgt spid="3">
+                                            <p:txEl>
+                                              <p:pRg st="0" end="0"/>
+                                            </p:txEl>
+                                          </p:spTgt>
+                                        </p:tgtEl>
+                                        <p:attrNameLst>
+                                          <p:attrName>style.visibility</p:attrName>
+                                        </p:attrNameLst>
+                                      </p:cBhvr>
+                                      <p:to>
+                                        <p:strVal val="visible"/>
+                                      </p:to>
+                                    </p:set>
+                                  </p:childTnLst>
+                                </p:cTn>
+                              </p:par>
+                              <p:par>
+                                <p:cTn id="7" presetID="1" presetClass="entr" presetSubtype="0" fill="hold" grpId="0" nodeType="withEffect">
+                                  <p:stCondLst>
+                                    <p:cond delay="0"/>
+                                  </p:stCondLst>
+                                  <p:childTnLst>
+                                    <p:set>
+                                      <p:cBhvr>
+                                        <p:cTn id="8" dur="1" fill="hold">
+                                          <p:stCondLst>
+                                            <p:cond delay="0"/>
+                                          </p:stCondLst>
+                                        </p:cTn>
+                                        <p:tgtEl>
+                                          <p:spTgt spid="3">
+                                            <p:txEl>
+                                              <p:pRg st="1" end="1"/>
+                                            </p:txEl>
+                                          </p:spTgt>
+                                        </p:tgtEl>
+                                        <p:attrNameLst>
+                                          <p:attrName>style.visibility</p:attrName>
+                                        </p:attrNameLst>
+                                      </p:cBhvr>
+                                      <p:to>
+                                        <p:strVal val="visible"/>
+                                      </p:to>
+                                    </p:set>
+                                  </p:childTnLst>
+                                </p:cTn>
+                              </p:par>
+                              <p:par>
+                                <p:cTn id="9" presetID="1" presetClass="entr" presetSubtype="0" fill="hold" grpId="0" nodeType="withEffect">
+                                  <p:stCondLst>
+                                    <p:cond delay="0"/>
+                                  </p:stCondLst>
+                                  <p:childTnLst>
+                                    <p:set>
+                                      <p:cBhvr>
+                                        <p:cTn id="10" dur="1" fill="hold">
+                                          <p:stCondLst>
+                                            <p:cond delay="0"/>
+                                          </p:stCondLst>
+                                        </p:cTn>
+                                        <p:tgtEl>
+                                          <p:spTgt spid="3">
+                                            <p:txEl>
+                                              <p:pRg st="2" end="2"/>
+                                            </p:txEl>
+                                          </p:spTgt>
+                                        </p:tgtEl>
+                                        <p:attrNameLst>
+                                          <p:attrName>style.visibility</p:attrName>
+                                        </p:attrNameLst>
+                                      </p:cBhvr>
+                                      <p:to>
+                                        <p:strVal val="visible"/>
+                                      </p:to>
+                                    </p:set>
+                                  </p:childTnLst>
+                                </p:cTn>
+                              </p:par>
+                              <p:par>
+                                <p:cTn id="11" presetID="1" presetClass="entr" presetSubtype="0" fill="hold" grpId="0" nodeType="withEffect">
+                                  <p:stCondLst>
+                                    <p:cond delay="0"/>
+                                  </p:stCondLst>
+                                  <p:childTnLst>
+                                    <p:set>
+                                      <p:cBhvr>
+                                        <p:cTn id="12" dur="1" fill="hold">
+                                          <p:stCondLst>
+                                            <p:cond delay="0"/>
+                                          </p:stCondLst>
+                                        </p:cTn>
+                                        <p:tgtEl>
+                                          <p:spTgt spid="3">
+                                            <p:txEl>
+                                              <p:pRg st="3" end="3"/>
+                                            </p:txEl>
+                                          </p:spTgt>
+                                        </p:tgtEl>
+                                        <p:attrNameLst>
+                                          <p:attrName>style.visibility</p:attrName>
+                                        </p:attrNameLst>
+                                      </p:cBhvr>
+                                      <p:to>
+                                        <p:strVal val="visible"/>
+                                      </p:to>
+                                    </p:set>
+                                  </p:childTnLst>
+                                </p:cTn>
+                              </p:par>
+                            </p:childTnLst>
+                          </p:cTn>
+                        </p:par>
+                      </p:childTnLst>
+                    </p:cTn>
+                  </p:par>
+                  <p:par>
+                    <p:cTn id="13" fill="hold">
+                      <p:stCondLst>
+                        <p:cond delay="indefinite"/>
+                      </p:stCondLst>
+                      <p:childTnLst>
+                        <p:par>
+                          <p:cTn id="14" fill="hold">
+                            <p:stCondLst>
+                              <p:cond delay="0"/>
+                            </p:stCondLst>
+                            <p:childTnLst>
+                              <p:par>
+                                <p:cTn id="15" presetID="1" presetClass="entr" presetSubtype="0" fill="hold" grpId="0" nodeType="clickEffect">
+                                  <p:stCondLst>
+                                    <p:cond delay="0"/>
+                                  </p:stCondLst>
+                                  <p:childTnLst>
+                                    <p:set>
+                                      <p:cBhvr>
+                                        <p:cTn id="16" dur="1" fill="hold">
+                                          <p:stCondLst>
+                                            <p:cond delay="0"/>
+                                          </p:stCondLst>
+                                        </p:cTn>
+                                        <p:tgtEl>
+                                          <p:spTgt spid="3">
+                                            <p:txEl>
+                                              <p:pRg st="4" end="4"/>
+                                            </p:txEl>
+                                          </p:spTgt>
+                                        </p:tgtEl>
+                                        <p:attrNameLst>
+                                          <p:attrName>style.visibility</p:attrName>
+                                        </p:attrNameLst>
+                                      </p:cBhvr>
+                                      <p:to>
+                                        <p:strVal val="visible"/>
+                                      </p:to>
+                                    </p:set>
+                                  </p:childTnLst>
+                                </p:cTn>
+                              </p:par>
+                            </p:childTnLst>
+                          </p:cTn>
+                        </p:par>
+                      </p:childTnLst>
+                    </p:cTn>
+                  </p:par>
+                  <p:par>
+                    <p:cTn id="17" fill="hold">
+                      <p:stCondLst>
+                        <p:cond delay="indefinite"/>
+                      </p:stCondLst>
+                      <p:childTnLst>
+                        <p:par>
+                          <p:cTn id="18" fill="hold">
+                            <p:stCondLst>
+                              <p:cond delay="0"/>
+                            </p:stCondLst>
+                            <p:childTnLst>
+                              <p:par>
+                                <p:cTn id="19" presetID="1" presetClass="entr" presetSubtype="0" fill="hold" grpId="0" nodeType="clickEffect">
+                                  <p:stCondLst>
+                                    <p:cond delay="0"/>
+                                  </p:stCondLst>
+                                  <p:childTnLst>
+                                    <p:set>
+                                      <p:cBhvr>
+                                        <p:cTn id="20" dur="1" fill="hold">
+                                          <p:stCondLst>
+                                            <p:cond delay="0"/>
+                                          </p:stCondLst>
+                                        </p:cTn>
+                                        <p:tgtEl>
+                                          <p:spTgt spid="6"/>
+                                        </p:tgtEl>
+                                        <p:attrNameLst>
+                                          <p:attrName>style.visibility</p:attrName>
+                                        </p:attrNameLst>
+                                      </p:cBhvr>
+                                      <p:to>
+                                        <p:strVal val="visible"/>
+                                      </p:to>
+                                    </p:set>
+                                  </p:childTnLst>
+                                </p:cTn>
+                              </p:par>
+                              <p:par>
+                                <p:cTn id="21" presetID="1" presetClass="entr" presetSubtype="0" fill="hold" nodeType="withEffect">
+                                  <p:stCondLst>
+                                    <p:cond delay="0"/>
+                                  </p:stCondLst>
+                                  <p:childTnLst>
+                                    <p:set>
+                                      <p:cBhvr>
+                                        <p:cTn id="22" dur="1" fill="hold">
+                                          <p:stCondLst>
+                                            <p:cond delay="0"/>
+                                          </p:stCondLst>
+                                        </p:cTn>
+                                        <p:tgtEl>
+                                          <p:spTgt spid="9"/>
+                                        </p:tgtEl>
+                                        <p:attrNameLst>
+                                          <p:attrName>style.visibility</p:attrName>
+                                        </p:attrNameLst>
+                                      </p:cBhvr>
+                                      <p:to>
+                                        <p:strVal val="visible"/>
+                                      </p:to>
+                                    </p:set>
+                                  </p:childTnLst>
+                                </p:cTn>
+                              </p:par>
+                              <p:par>
+                                <p:cTn id="23" presetID="1" presetClass="entr" presetSubtype="0" fill="hold" grpId="0" nodeType="withEffect">
+                                  <p:stCondLst>
+                                    <p:cond delay="0"/>
+                                  </p:stCondLst>
+                                  <p:childTnLst>
+                                    <p:set>
+                                      <p:cBhvr>
+                                        <p:cTn id="24" dur="1" fill="hold">
+                                          <p:stCondLst>
+                                            <p:cond delay="0"/>
+                                          </p:stCondLst>
+                                        </p:cTn>
+                                        <p:tgtEl>
+                                          <p:spTgt spid="11"/>
+                                        </p:tgtEl>
+                                        <p:attrNameLst>
+                                          <p:attrName>style.visibility</p:attrName>
+                                        </p:attrNameLst>
+                                      </p:cBhvr>
+                                      <p:to>
+                                        <p:strVal val="visible"/>
+                                      </p:to>
+                                    </p:set>
+                                  </p:childTnLst>
+                                </p:cTn>
+                              </p:par>
+                            </p:childTnLst>
+                          </p:cTn>
+                        </p:par>
+                      </p:childTnLst>
+                    </p:cTn>
+                  </p:par>
+                  <p:par>
+                    <p:cTn id="25" fill="hold">
+                      <p:stCondLst>
+                        <p:cond delay="indefinite"/>
+                      </p:stCondLst>
+                      <p:childTnLst>
+                        <p:par>
+                          <p:cTn id="26" fill="hold">
+                            <p:stCondLst>
+                              <p:cond delay="0"/>
+                            </p:stCondLst>
+                            <p:childTnLst>
+                              <p:par>
+                                <p:cTn id="27" presetID="1" presetClass="entr" presetSubtype="0" fill="hold" grpId="0" nodeType="clickEffect">
+                                  <p:stCondLst>
+                                    <p:cond delay="0"/>
+                                  </p:stCondLst>
+                                  <p:childTnLst>
+                                    <p:set>
+                                      <p:cBhvr>
+                                        <p:cTn id="28" dur="1" fill="hold">
+                                          <p:stCondLst>
+                                            <p:cond delay="0"/>
+                                          </p:stCondLst>
+                                        </p:cTn>
+                                        <p:tgtEl>
+                                          <p:spTgt spid="10"/>
+                                        </p:tgtEl>
+                                        <p:attrNameLst>
+                                          <p:attrName>style.visibility</p:attrName>
+                                        </p:attrNameLst>
+                                      </p:cBhvr>
+                                      <p:to>
+                                        <p:strVal val="visible"/>
+                                      </p:to>
+                                    </p:set>
+                                  </p:childTnLst>
+                                </p:cTn>
+                              </p:par>
+                              <p:par>
+                                <p:cTn id="29" presetID="1" presetClass="entr" presetSubtype="0" fill="hold" nodeType="withEffect">
+                                  <p:stCondLst>
+                                    <p:cond delay="0"/>
+                                  </p:stCondLst>
+                                  <p:childTnLst>
+                                    <p:set>
+                                      <p:cBhvr>
+                                        <p:cTn id="30" dur="1" fill="hold">
+                                          <p:stCondLst>
+                                            <p:cond delay="0"/>
+                                          </p:stCondLst>
+                                        </p:cTn>
+                                        <p:tgtEl>
+                                          <p:spTgt spid="13"/>
+                                        </p:tgtEl>
+                                        <p:attrNameLst>
+                                          <p:attrName>style.visibility</p:attrName>
+                                        </p:attrNameLst>
+                                      </p:cBhvr>
+                                      <p:to>
+                                        <p:strVal val="visible"/>
+                                      </p:to>
+                                    </p:set>
+                                  </p:childTnLst>
+                                </p:cTn>
+                              </p:par>
+                              <p:par>
+                                <p:cTn id="31" presetID="1" presetClass="entr" presetSubtype="0" fill="hold" grpId="0" nodeType="withEffect">
+                                  <p:stCondLst>
+                                    <p:cond delay="0"/>
+                                  </p:stCondLst>
+                                  <p:childTnLst>
+                                    <p:set>
+                                      <p:cBhvr>
+                                        <p:cTn id="32" dur="1" fill="hold">
+                                          <p:stCondLst>
+                                            <p:cond delay="0"/>
+                                          </p:stCondLst>
+                                        </p:cTn>
+                                        <p:tgtEl>
+                                          <p:spTgt spid="14"/>
+                                        </p:tgtEl>
+                                        <p:attrNameLst>
+                                          <p:attrName>style.visibility</p:attrName>
+                                        </p:attrNameLst>
+                                      </p:cBhvr>
+                                      <p:to>
+                                        <p:strVal val="visible"/>
+                                      </p:to>
+                                    </p:set>
+                                  </p:childTnLst>
+                                </p:cTn>
+                              </p:par>
+                            </p:childTnLst>
+                          </p:cTn>
+                        </p:par>
+                      </p:childTnLst>
+                    </p:cTn>
+                  </p:par>
+                </p:childTnLst>
+              </p:cTn>
+              <p:prevCondLst>
+                <p:cond evt="onPrev" delay="0">
+                  <p:tgtEl>
+                    <p:sldTgt/>
+                  </p:tgtEl>
+                </p:cond>
+              </p:prevCondLst>
+              <p:nextCondLst>
+                <p:cond evt="onNext" delay="0">
+                  <p:tgtEl>
+                    <p:sldTgt/>
+                  </p:tgtEl>
+                </p:cond>
+              </p:nextCondLst>
+            </p:seq>
+          </p:childTnLst>
+        </p:cTn>
+      </p:par>
+    </p:tnLst>
+    <p:bldLst>
+      <p:bldP spid="3" grpId="0" build="p"/>
+      <p:bldP spid="6" grpId="0"/>
+      <p:bldP spid="10" grpId="0"/>
+      <p:bldP spid="11" grpId="0"/>
+      <p:bldP spid="14" grpId="0"/>
+    </p:bldLst>
+  </p:timing>
 </p:sld>
 </file>
 
@@ -3564,10 +6349,10 @@
       </p:sp>
       <p:sp>
         <p:nvSpPr>
-          <p:cNvPr id="3" name="Marcador de contenido 2">
+          <p:cNvPr id="4" name="Marcador de contenido 2">
             <a:extLst>
               <a:ext uri="{FF2B5EF4-FFF2-40B4-BE49-F238E27FC236}">
-                <a16:creationId xmlns:a16="http://schemas.microsoft.com/office/drawing/2014/main" id="{D1256C17-EF5E-45D2-82AB-A91BB32D140F}"/>
+                <a16:creationId xmlns:a16="http://schemas.microsoft.com/office/drawing/2014/main" id="{4B1CD49C-9E1A-4E0D-AF81-8BCFB755FB9E}"/>
               </a:ext>
             </a:extLst>
           </p:cNvPr>
@@ -3578,12 +6363,144 @@
             <p:ph idx="1"/>
           </p:nvPr>
         </p:nvSpPr>
-        <p:spPr/>
+        <p:spPr>
+          <a:xfrm>
+            <a:off x="838200" y="1825625"/>
+            <a:ext cx="10515600" cy="4351338"/>
+          </a:xfrm>
+        </p:spPr>
         <p:txBody>
           <a:bodyPr/>
           <a:lstStyle/>
           <a:p>
-            <a:endParaRPr lang="en-GB" dirty="0"/>
+            <a:pPr>
+              <a:buClr>
+                <a:schemeClr val="accent1"/>
+              </a:buClr>
+            </a:pPr>
+            <a:r>
+              <a:rPr lang="en-GB" dirty="0"/>
+              <a:t>A technique for rendering shadows in real-time 3D graphics</a:t>
+            </a:r>
+          </a:p>
+          <a:p>
+            <a:pPr>
+              <a:buClr>
+                <a:schemeClr val="accent1"/>
+              </a:buClr>
+            </a:pPr>
+            <a:r>
+              <a:rPr lang="en-GB" dirty="0"/>
+              <a:t>2 pass algorithm:</a:t>
+            </a:r>
+          </a:p>
+          <a:p>
+            <a:pPr marL="914400" lvl="1" indent="-457200">
+              <a:buClr>
+                <a:schemeClr val="accent1"/>
+              </a:buClr>
+              <a:buFont typeface="+mj-lt"/>
+              <a:buAutoNum type="arabicPeriod"/>
+            </a:pPr>
+            <a:r>
+              <a:rPr lang="en-GB" dirty="0"/>
+              <a:t>Generate Depth Map by rendering scene from light’s POV</a:t>
+            </a:r>
+          </a:p>
+          <a:p>
+            <a:pPr marL="914400" lvl="1" indent="-457200">
+              <a:buClr>
+                <a:schemeClr val="accent1"/>
+              </a:buClr>
+              <a:buFont typeface="+mj-lt"/>
+              <a:buAutoNum type="arabicPeriod"/>
+            </a:pPr>
+            <a:r>
+              <a:rPr lang="en-GB" dirty="0"/>
+              <a:t>Render scene from camera’s POV…</a:t>
+            </a:r>
+          </a:p>
+          <a:p>
+            <a:pPr marL="457200" lvl="1" indent="0">
+              <a:buClr>
+                <a:schemeClr val="accent1"/>
+              </a:buClr>
+              <a:buNone/>
+            </a:pPr>
+            <a:r>
+              <a:rPr lang="en-GB" dirty="0"/>
+              <a:t>		…using generated Depth Map to determine if fragment is lit </a:t>
+            </a:r>
+          </a:p>
+          <a:p>
+            <a:pPr marL="457200" lvl="1" indent="0">
+              <a:buClr>
+                <a:schemeClr val="accent1"/>
+              </a:buClr>
+              <a:buNone/>
+            </a:pPr>
+            <a:r>
+              <a:rPr lang="en-GB" dirty="0"/>
+              <a:t>		    or in shadow</a:t>
+            </a:r>
+          </a:p>
+        </p:txBody>
+      </p:sp>
+      <p:sp>
+        <p:nvSpPr>
+          <p:cNvPr id="5" name="Título 1">
+            <a:extLst>
+              <a:ext uri="{FF2B5EF4-FFF2-40B4-BE49-F238E27FC236}">
+                <a16:creationId xmlns:a16="http://schemas.microsoft.com/office/drawing/2014/main" id="{30829E18-6476-41C5-BAA3-FBF438A1732F}"/>
+              </a:ext>
+            </a:extLst>
+          </p:cNvPr>
+          <p:cNvSpPr txBox="1">
+            <a:spLocks/>
+          </p:cNvSpPr>
+          <p:nvPr/>
+        </p:nvSpPr>
+        <p:spPr>
+          <a:xfrm>
+            <a:off x="1493520" y="4746625"/>
+            <a:ext cx="10515600" cy="1325563"/>
+          </a:xfrm>
+          <a:prstGeom prst="rect">
+            <a:avLst/>
+          </a:prstGeom>
+        </p:spPr>
+        <p:txBody>
+          <a:bodyPr vert="horz" lIns="91440" tIns="45720" rIns="91440" bIns="45720" rtlCol="0" anchor="ctr">
+            <a:normAutofit/>
+          </a:bodyPr>
+          <a:lstStyle>
+            <a:lvl1pPr algn="l" defTabSz="914400" rtl="0" eaLnBrk="1" latinLnBrk="0" hangingPunct="1">
+              <a:lnSpc>
+                <a:spcPct val="90000"/>
+              </a:lnSpc>
+              <a:spcBef>
+                <a:spcPct val="0"/>
+              </a:spcBef>
+              <a:buNone/>
+              <a:defRPr sz="4400" kern="1200">
+                <a:solidFill>
+                  <a:schemeClr val="tx1"/>
+                </a:solidFill>
+                <a:latin typeface="+mj-lt"/>
+                <a:ea typeface="+mj-ea"/>
+                <a:cs typeface="+mj-cs"/>
+              </a:defRPr>
+            </a:lvl1pPr>
+          </a:lstStyle>
+          <a:p>
+            <a:r>
+              <a:rPr lang="en-GB" sz="2400" dirty="0">
+                <a:solidFill>
+                  <a:schemeClr val="accent4"/>
+                </a:solidFill>
+              </a:rPr>
+              <a:t>TODO – image of shadows rendered using shadow mapping?</a:t>
+            </a:r>
           </a:p>
         </p:txBody>
       </p:sp>
@@ -3597,6 +6514,343 @@
   <p:clrMapOvr>
     <a:masterClrMapping/>
   </p:clrMapOvr>
+  <p:timing>
+    <p:tnLst>
+      <p:par>
+        <p:cTn id="1" dur="indefinite" restart="never" nodeType="tmRoot">
+          <p:childTnLst>
+            <p:seq concurrent="1" nextAc="seek">
+              <p:cTn id="2" dur="indefinite" nodeType="mainSeq">
+                <p:childTnLst>
+                  <p:par>
+                    <p:cTn id="3" fill="hold">
+                      <p:stCondLst>
+                        <p:cond delay="indefinite"/>
+                      </p:stCondLst>
+                      <p:childTnLst>
+                        <p:par>
+                          <p:cTn id="4" fill="hold">
+                            <p:stCondLst>
+                              <p:cond delay="0"/>
+                            </p:stCondLst>
+                            <p:childTnLst>
+                              <p:par>
+                                <p:cTn id="5" presetID="1" presetClass="entr" presetSubtype="0" fill="hold" grpId="0" nodeType="clickEffect">
+                                  <p:stCondLst>
+                                    <p:cond delay="0"/>
+                                  </p:stCondLst>
+                                  <p:childTnLst>
+                                    <p:set>
+                                      <p:cBhvr>
+                                        <p:cTn id="6" dur="1" fill="hold">
+                                          <p:stCondLst>
+                                            <p:cond delay="0"/>
+                                          </p:stCondLst>
+                                        </p:cTn>
+                                        <p:tgtEl>
+                                          <p:spTgt spid="4">
+                                            <p:txEl>
+                                              <p:pRg st="0" end="0"/>
+                                            </p:txEl>
+                                          </p:spTgt>
+                                        </p:tgtEl>
+                                        <p:attrNameLst>
+                                          <p:attrName>style.visibility</p:attrName>
+                                        </p:attrNameLst>
+                                      </p:cBhvr>
+                                      <p:to>
+                                        <p:strVal val="visible"/>
+                                      </p:to>
+                                    </p:set>
+                                  </p:childTnLst>
+                                </p:cTn>
+                              </p:par>
+                            </p:childTnLst>
+                          </p:cTn>
+                        </p:par>
+                      </p:childTnLst>
+                    </p:cTn>
+                  </p:par>
+                  <p:par>
+                    <p:cTn id="7" fill="hold">
+                      <p:stCondLst>
+                        <p:cond delay="indefinite"/>
+                      </p:stCondLst>
+                      <p:childTnLst>
+                        <p:par>
+                          <p:cTn id="8" fill="hold">
+                            <p:stCondLst>
+                              <p:cond delay="0"/>
+                            </p:stCondLst>
+                            <p:childTnLst>
+                              <p:par>
+                                <p:cTn id="9" presetID="1" presetClass="entr" presetSubtype="0" fill="hold" grpId="0" nodeType="clickEffect">
+                                  <p:stCondLst>
+                                    <p:cond delay="0"/>
+                                  </p:stCondLst>
+                                  <p:childTnLst>
+                                    <p:set>
+                                      <p:cBhvr>
+                                        <p:cTn id="10" dur="1" fill="hold">
+                                          <p:stCondLst>
+                                            <p:cond delay="0"/>
+                                          </p:stCondLst>
+                                        </p:cTn>
+                                        <p:tgtEl>
+                                          <p:spTgt spid="4">
+                                            <p:txEl>
+                                              <p:pRg st="1" end="1"/>
+                                            </p:txEl>
+                                          </p:spTgt>
+                                        </p:tgtEl>
+                                        <p:attrNameLst>
+                                          <p:attrName>style.visibility</p:attrName>
+                                        </p:attrNameLst>
+                                      </p:cBhvr>
+                                      <p:to>
+                                        <p:strVal val="visible"/>
+                                      </p:to>
+                                    </p:set>
+                                  </p:childTnLst>
+                                </p:cTn>
+                              </p:par>
+                            </p:childTnLst>
+                          </p:cTn>
+                        </p:par>
+                      </p:childTnLst>
+                    </p:cTn>
+                  </p:par>
+                  <p:par>
+                    <p:cTn id="11" fill="hold">
+                      <p:stCondLst>
+                        <p:cond delay="indefinite"/>
+                      </p:stCondLst>
+                      <p:childTnLst>
+                        <p:par>
+                          <p:cTn id="12" fill="hold">
+                            <p:stCondLst>
+                              <p:cond delay="0"/>
+                            </p:stCondLst>
+                            <p:childTnLst>
+                              <p:par>
+                                <p:cTn id="13" presetID="1" presetClass="entr" presetSubtype="0" fill="hold" grpId="0" nodeType="clickEffect">
+                                  <p:stCondLst>
+                                    <p:cond delay="0"/>
+                                  </p:stCondLst>
+                                  <p:childTnLst>
+                                    <p:set>
+                                      <p:cBhvr>
+                                        <p:cTn id="14" dur="1" fill="hold">
+                                          <p:stCondLst>
+                                            <p:cond delay="0"/>
+                                          </p:stCondLst>
+                                        </p:cTn>
+                                        <p:tgtEl>
+                                          <p:spTgt spid="4">
+                                            <p:txEl>
+                                              <p:pRg st="2" end="2"/>
+                                            </p:txEl>
+                                          </p:spTgt>
+                                        </p:tgtEl>
+                                        <p:attrNameLst>
+                                          <p:attrName>style.visibility</p:attrName>
+                                        </p:attrNameLst>
+                                      </p:cBhvr>
+                                      <p:to>
+                                        <p:strVal val="visible"/>
+                                      </p:to>
+                                    </p:set>
+                                  </p:childTnLst>
+                                </p:cTn>
+                              </p:par>
+                            </p:childTnLst>
+                          </p:cTn>
+                        </p:par>
+                      </p:childTnLst>
+                    </p:cTn>
+                  </p:par>
+                  <p:par>
+                    <p:cTn id="15" fill="hold">
+                      <p:stCondLst>
+                        <p:cond delay="indefinite"/>
+                      </p:stCondLst>
+                      <p:childTnLst>
+                        <p:par>
+                          <p:cTn id="16" fill="hold">
+                            <p:stCondLst>
+                              <p:cond delay="0"/>
+                            </p:stCondLst>
+                            <p:childTnLst>
+                              <p:par>
+                                <p:cTn id="17" presetID="1" presetClass="entr" presetSubtype="0" fill="hold" grpId="0" nodeType="clickEffect">
+                                  <p:stCondLst>
+                                    <p:cond delay="0"/>
+                                  </p:stCondLst>
+                                  <p:childTnLst>
+                                    <p:set>
+                                      <p:cBhvr>
+                                        <p:cTn id="18" dur="1" fill="hold">
+                                          <p:stCondLst>
+                                            <p:cond delay="0"/>
+                                          </p:stCondLst>
+                                        </p:cTn>
+                                        <p:tgtEl>
+                                          <p:spTgt spid="4">
+                                            <p:txEl>
+                                              <p:pRg st="3" end="3"/>
+                                            </p:txEl>
+                                          </p:spTgt>
+                                        </p:tgtEl>
+                                        <p:attrNameLst>
+                                          <p:attrName>style.visibility</p:attrName>
+                                        </p:attrNameLst>
+                                      </p:cBhvr>
+                                      <p:to>
+                                        <p:strVal val="visible"/>
+                                      </p:to>
+                                    </p:set>
+                                  </p:childTnLst>
+                                </p:cTn>
+                              </p:par>
+                              <p:par>
+                                <p:cTn id="19" presetID="1" presetClass="entr" presetSubtype="0" fill="hold" grpId="0" nodeType="withEffect">
+                                  <p:stCondLst>
+                                    <p:cond delay="0"/>
+                                  </p:stCondLst>
+                                  <p:childTnLst>
+                                    <p:set>
+                                      <p:cBhvr>
+                                        <p:cTn id="20" dur="1" fill="hold">
+                                          <p:stCondLst>
+                                            <p:cond delay="0"/>
+                                          </p:stCondLst>
+                                        </p:cTn>
+                                        <p:tgtEl>
+                                          <p:spTgt spid="4">
+                                            <p:txEl>
+                                              <p:pRg st="4" end="4"/>
+                                            </p:txEl>
+                                          </p:spTgt>
+                                        </p:tgtEl>
+                                        <p:attrNameLst>
+                                          <p:attrName>style.visibility</p:attrName>
+                                        </p:attrNameLst>
+                                      </p:cBhvr>
+                                      <p:to>
+                                        <p:strVal val="visible"/>
+                                      </p:to>
+                                    </p:set>
+                                  </p:childTnLst>
+                                </p:cTn>
+                              </p:par>
+                              <p:par>
+                                <p:cTn id="21" presetID="1" presetClass="entr" presetSubtype="0" fill="hold" grpId="0" nodeType="withEffect">
+                                  <p:stCondLst>
+                                    <p:cond delay="0"/>
+                                  </p:stCondLst>
+                                  <p:childTnLst>
+                                    <p:set>
+                                      <p:cBhvr>
+                                        <p:cTn id="22" dur="1" fill="hold">
+                                          <p:stCondLst>
+                                            <p:cond delay="0"/>
+                                          </p:stCondLst>
+                                        </p:cTn>
+                                        <p:tgtEl>
+                                          <p:spTgt spid="4">
+                                            <p:txEl>
+                                              <p:pRg st="5" end="5"/>
+                                            </p:txEl>
+                                          </p:spTgt>
+                                        </p:tgtEl>
+                                        <p:attrNameLst>
+                                          <p:attrName>style.visibility</p:attrName>
+                                        </p:attrNameLst>
+                                      </p:cBhvr>
+                                      <p:to>
+                                        <p:strVal val="visible"/>
+                                      </p:to>
+                                    </p:set>
+                                  </p:childTnLst>
+                                </p:cTn>
+                              </p:par>
+                            </p:childTnLst>
+                          </p:cTn>
+                        </p:par>
+                      </p:childTnLst>
+                    </p:cTn>
+                  </p:par>
+                  <p:par>
+                    <p:cTn id="23" fill="hold">
+                      <p:stCondLst>
+                        <p:cond delay="indefinite"/>
+                      </p:stCondLst>
+                      <p:childTnLst>
+                        <p:par>
+                          <p:cTn id="24" fill="hold">
+                            <p:stCondLst>
+                              <p:cond delay="0"/>
+                            </p:stCondLst>
+                            <p:childTnLst>
+                              <p:par>
+                                <p:cTn id="25" presetID="1" presetClass="entr" presetSubtype="0" fill="hold" grpId="0" nodeType="clickEffect">
+                                  <p:stCondLst>
+                                    <p:cond delay="0"/>
+                                  </p:stCondLst>
+                                  <p:childTnLst>
+                                    <p:set>
+                                      <p:cBhvr>
+                                        <p:cTn id="26" dur="1" fill="hold">
+                                          <p:stCondLst>
+                                            <p:cond delay="0"/>
+                                          </p:stCondLst>
+                                        </p:cTn>
+                                        <p:tgtEl>
+                                          <p:spTgt spid="5"/>
+                                        </p:tgtEl>
+                                        <p:attrNameLst>
+                                          <p:attrName>style.visibility</p:attrName>
+                                        </p:attrNameLst>
+                                      </p:cBhvr>
+                                      <p:to>
+                                        <p:strVal val="visible"/>
+                                      </p:to>
+                                    </p:set>
+                                  </p:childTnLst>
+                                </p:cTn>
+                              </p:par>
+                            </p:childTnLst>
+                          </p:cTn>
+                        </p:par>
+                      </p:childTnLst>
+                    </p:cTn>
+                  </p:par>
+                </p:childTnLst>
+              </p:cTn>
+              <p:prevCondLst>
+                <p:cond evt="onPrev" delay="0">
+                  <p:tgtEl>
+                    <p:sldTgt/>
+                  </p:tgtEl>
+                </p:cond>
+              </p:prevCondLst>
+              <p:nextCondLst>
+                <p:cond evt="onNext" delay="0">
+                  <p:tgtEl>
+                    <p:sldTgt/>
+                  </p:tgtEl>
+                </p:cond>
+              </p:nextCondLst>
+            </p:seq>
+          </p:childTnLst>
+        </p:cTn>
+      </p:par>
+    </p:tnLst>
+    <p:bldLst>
+      <p:bldP spid="4" grpId="0" uiExpand="1" build="p"/>
+      <p:bldP spid="5" grpId="0"/>
+    </p:bldLst>
+  </p:timing>
 </p:sld>
 </file>
 
@@ -3649,31 +6903,111 @@
           </a:p>
         </p:txBody>
       </p:sp>
-      <p:sp>
-        <p:nvSpPr>
-          <p:cNvPr id="3" name="Marcador de contenido 2">
+      <p:pic>
+        <p:nvPicPr>
+          <p:cNvPr id="5" name="Marcador de contenido 4" descr="Diagrama&#10;&#10;Descripción generada automáticamente">
             <a:extLst>
               <a:ext uri="{FF2B5EF4-FFF2-40B4-BE49-F238E27FC236}">
-                <a16:creationId xmlns:a16="http://schemas.microsoft.com/office/drawing/2014/main" id="{71039F7C-FC6D-4ACB-9327-55D00C3AF28A}"/>
+                <a16:creationId xmlns:a16="http://schemas.microsoft.com/office/drawing/2014/main" id="{3DAEF447-A637-48CF-A22A-9A8B1E117808}"/>
               </a:ext>
             </a:extLst>
           </p:cNvPr>
-          <p:cNvSpPr>
-            <a:spLocks noGrp="1"/>
-          </p:cNvSpPr>
+          <p:cNvPicPr>
+            <a:picLocks noGrp="1" noChangeAspect="1"/>
+          </p:cNvPicPr>
           <p:nvPr>
             <p:ph idx="1"/>
           </p:nvPr>
-        </p:nvSpPr>
-        <p:spPr/>
-        <p:txBody>
-          <a:bodyPr/>
-          <a:lstStyle/>
-          <a:p>
-            <a:endParaRPr lang="en-GB" dirty="0"/>
-          </a:p>
-        </p:txBody>
-      </p:sp>
+        </p:nvPicPr>
+        <p:blipFill>
+          <a:blip r:embed="rId3">
+            <a:extLst>
+              <a:ext uri="{28A0092B-C50C-407E-A947-70E740481C1C}">
+                <a14:useLocalDpi xmlns:a14="http://schemas.microsoft.com/office/drawing/2010/main" val="0"/>
+              </a:ext>
+            </a:extLst>
+          </a:blip>
+          <a:stretch>
+            <a:fillRect/>
+          </a:stretch>
+        </p:blipFill>
+        <p:spPr>
+          <a:xfrm>
+            <a:off x="2433657" y="1027906"/>
+            <a:ext cx="7324686" cy="5493515"/>
+          </a:xfrm>
+        </p:spPr>
+      </p:pic>
+      <p:pic>
+        <p:nvPicPr>
+          <p:cNvPr id="7" name="Imagen 6" descr="Imagen que contiene Texto&#10;&#10;Descripción generada automáticamente">
+            <a:extLst>
+              <a:ext uri="{FF2B5EF4-FFF2-40B4-BE49-F238E27FC236}">
+                <a16:creationId xmlns:a16="http://schemas.microsoft.com/office/drawing/2014/main" id="{E5AF2750-0702-47B6-9A4C-3948BFB87E14}"/>
+              </a:ext>
+            </a:extLst>
+          </p:cNvPr>
+          <p:cNvPicPr>
+            <a:picLocks noChangeAspect="1"/>
+          </p:cNvPicPr>
+          <p:nvPr/>
+        </p:nvPicPr>
+        <p:blipFill rotWithShape="1">
+          <a:blip r:embed="rId4">
+            <a:extLst>
+              <a:ext uri="{28A0092B-C50C-407E-A947-70E740481C1C}">
+                <a14:useLocalDpi xmlns:a14="http://schemas.microsoft.com/office/drawing/2010/main" val="0"/>
+              </a:ext>
+            </a:extLst>
+          </a:blip>
+          <a:srcRect b="51480"/>
+          <a:stretch/>
+        </p:blipFill>
+        <p:spPr>
+          <a:xfrm>
+            <a:off x="7769480" y="4923246"/>
+            <a:ext cx="1584245" cy="768667"/>
+          </a:xfrm>
+          <a:prstGeom prst="rect">
+            <a:avLst/>
+          </a:prstGeom>
+        </p:spPr>
+      </p:pic>
+      <p:pic>
+        <p:nvPicPr>
+          <p:cNvPr id="9" name="Imagen 8" descr="Imagen que contiene Texto&#10;&#10;Descripción generada automáticamente">
+            <a:extLst>
+              <a:ext uri="{FF2B5EF4-FFF2-40B4-BE49-F238E27FC236}">
+                <a16:creationId xmlns:a16="http://schemas.microsoft.com/office/drawing/2014/main" id="{2A433DBA-85F5-4FE7-B175-4A10F36BB217}"/>
+              </a:ext>
+            </a:extLst>
+          </p:cNvPr>
+          <p:cNvPicPr>
+            <a:picLocks noChangeAspect="1"/>
+          </p:cNvPicPr>
+          <p:nvPr/>
+        </p:nvPicPr>
+        <p:blipFill rotWithShape="1">
+          <a:blip r:embed="rId4">
+            <a:extLst>
+              <a:ext uri="{28A0092B-C50C-407E-A947-70E740481C1C}">
+                <a14:useLocalDpi xmlns:a14="http://schemas.microsoft.com/office/drawing/2010/main" val="0"/>
+              </a:ext>
+            </a:extLst>
+          </a:blip>
+          <a:srcRect t="45638"/>
+          <a:stretch/>
+        </p:blipFill>
+        <p:spPr>
+          <a:xfrm>
+            <a:off x="9600986" y="4923246"/>
+            <a:ext cx="1455706" cy="791350"/>
+          </a:xfrm>
+          <a:prstGeom prst="rect">
+            <a:avLst/>
+          </a:prstGeom>
+        </p:spPr>
+      </p:pic>
     </p:spTree>
     <p:extLst>
       <p:ext uri="{BB962C8B-B14F-4D97-AF65-F5344CB8AC3E}">
@@ -3709,7 +7043,7 @@
           <p:cNvPr id="2" name="Título 1">
             <a:extLst>
               <a:ext uri="{FF2B5EF4-FFF2-40B4-BE49-F238E27FC236}">
-                <a16:creationId xmlns:a16="http://schemas.microsoft.com/office/drawing/2014/main" id="{B821BF0C-12EB-487F-87F9-7201A9BBFF36}"/>
+                <a16:creationId xmlns:a16="http://schemas.microsoft.com/office/drawing/2014/main" id="{7E579DF9-F669-4B5B-BDB6-68986F88A319}"/>
               </a:ext>
             </a:extLst>
           </p:cNvPr>
@@ -3731,59 +7065,315 @@
                   <a:schemeClr val="accent1"/>
                 </a:solidFill>
               </a:rPr>
-              <a:t>Method</a:t>
-            </a:r>
-            <a:r>
-              <a:rPr lang="en-GB" sz="2400" dirty="0">
-                <a:solidFill>
-                  <a:schemeClr val="accent1"/>
-                </a:solidFill>
-              </a:rPr>
-              <a:t> (directional lights)</a:t>
-            </a:r>
-            <a:endParaRPr lang="en-GB" dirty="0">
-              <a:solidFill>
-                <a:schemeClr val="accent1"/>
-              </a:solidFill>
-            </a:endParaRPr>
-          </a:p>
-        </p:txBody>
-      </p:sp>
-      <p:sp>
-        <p:nvSpPr>
-          <p:cNvPr id="3" name="Marcador de contenido 2">
+              <a:t>OpenGL rendering pipeline</a:t>
+            </a:r>
+          </a:p>
+        </p:txBody>
+      </p:sp>
+      <p:pic>
+        <p:nvPicPr>
+          <p:cNvPr id="5" name="Marcador de contenido 4">
             <a:extLst>
               <a:ext uri="{FF2B5EF4-FFF2-40B4-BE49-F238E27FC236}">
-                <a16:creationId xmlns:a16="http://schemas.microsoft.com/office/drawing/2014/main" id="{FAF98818-5F5B-43A5-BAC3-BB889C63F6F1}"/>
+                <a16:creationId xmlns:a16="http://schemas.microsoft.com/office/drawing/2014/main" id="{3DAEF447-A637-48CF-A22A-9A8B1E117808}"/>
               </a:ext>
             </a:extLst>
           </p:cNvPr>
-          <p:cNvSpPr>
-            <a:spLocks noGrp="1"/>
-          </p:cNvSpPr>
+          <p:cNvPicPr>
+            <a:picLocks noGrp="1" noChangeAspect="1"/>
+          </p:cNvPicPr>
           <p:nvPr>
             <p:ph idx="1"/>
           </p:nvPr>
-        </p:nvSpPr>
-        <p:spPr/>
-        <p:txBody>
-          <a:bodyPr/>
-          <a:lstStyle/>
-          <a:p>
-            <a:endParaRPr lang="en-GB" dirty="0"/>
-          </a:p>
-        </p:txBody>
-      </p:sp>
+        </p:nvPicPr>
+        <p:blipFill>
+          <a:blip r:embed="rId3">
+            <a:extLst>
+              <a:ext uri="{28A0092B-C50C-407E-A947-70E740481C1C}">
+                <a14:useLocalDpi xmlns:a14="http://schemas.microsoft.com/office/drawing/2010/main" val="0"/>
+              </a:ext>
+            </a:extLst>
+          </a:blip>
+          <a:srcRect/>
+          <a:stretch/>
+        </p:blipFill>
+        <p:spPr>
+          <a:xfrm>
+            <a:off x="2433657" y="1027906"/>
+            <a:ext cx="7324686" cy="5493514"/>
+          </a:xfrm>
+        </p:spPr>
+      </p:pic>
+      <p:pic>
+        <p:nvPicPr>
+          <p:cNvPr id="7" name="Imagen 6" descr="Imagen que contiene Texto&#10;&#10;Descripción generada automáticamente">
+            <a:extLst>
+              <a:ext uri="{FF2B5EF4-FFF2-40B4-BE49-F238E27FC236}">
+                <a16:creationId xmlns:a16="http://schemas.microsoft.com/office/drawing/2014/main" id="{E5AF2750-0702-47B6-9A4C-3948BFB87E14}"/>
+              </a:ext>
+            </a:extLst>
+          </p:cNvPr>
+          <p:cNvPicPr>
+            <a:picLocks noChangeAspect="1"/>
+          </p:cNvPicPr>
+          <p:nvPr/>
+        </p:nvPicPr>
+        <p:blipFill rotWithShape="1">
+          <a:blip r:embed="rId4">
+            <a:extLst>
+              <a:ext uri="{28A0092B-C50C-407E-A947-70E740481C1C}">
+                <a14:useLocalDpi xmlns:a14="http://schemas.microsoft.com/office/drawing/2010/main" val="0"/>
+              </a:ext>
+            </a:extLst>
+          </a:blip>
+          <a:srcRect b="51480"/>
+          <a:stretch/>
+        </p:blipFill>
+        <p:spPr>
+          <a:xfrm>
+            <a:off x="7769480" y="4923246"/>
+            <a:ext cx="1584245" cy="768667"/>
+          </a:xfrm>
+          <a:prstGeom prst="rect">
+            <a:avLst/>
+          </a:prstGeom>
+        </p:spPr>
+      </p:pic>
+      <p:pic>
+        <p:nvPicPr>
+          <p:cNvPr id="9" name="Imagen 8" descr="Imagen que contiene Texto&#10;&#10;Descripción generada automáticamente">
+            <a:extLst>
+              <a:ext uri="{FF2B5EF4-FFF2-40B4-BE49-F238E27FC236}">
+                <a16:creationId xmlns:a16="http://schemas.microsoft.com/office/drawing/2014/main" id="{2A433DBA-85F5-4FE7-B175-4A10F36BB217}"/>
+              </a:ext>
+            </a:extLst>
+          </p:cNvPr>
+          <p:cNvPicPr>
+            <a:picLocks noChangeAspect="1"/>
+          </p:cNvPicPr>
+          <p:nvPr/>
+        </p:nvPicPr>
+        <p:blipFill rotWithShape="1">
+          <a:blip r:embed="rId4">
+            <a:extLst>
+              <a:ext uri="{28A0092B-C50C-407E-A947-70E740481C1C}">
+                <a14:useLocalDpi xmlns:a14="http://schemas.microsoft.com/office/drawing/2010/main" val="0"/>
+              </a:ext>
+            </a:extLst>
+          </a:blip>
+          <a:srcRect t="45638"/>
+          <a:stretch/>
+        </p:blipFill>
+        <p:spPr>
+          <a:xfrm>
+            <a:off x="9600986" y="4923246"/>
+            <a:ext cx="1455706" cy="791350"/>
+          </a:xfrm>
+          <a:prstGeom prst="rect">
+            <a:avLst/>
+          </a:prstGeom>
+        </p:spPr>
+      </p:pic>
+      <p:pic>
+        <p:nvPicPr>
+          <p:cNvPr id="4" name="Imagen 3" descr="Diagrama&#10;&#10;Descripción generada automáticamente">
+            <a:extLst>
+              <a:ext uri="{FF2B5EF4-FFF2-40B4-BE49-F238E27FC236}">
+                <a16:creationId xmlns:a16="http://schemas.microsoft.com/office/drawing/2014/main" id="{65C6DD44-9345-4577-A010-DD9CBD0D6CA1}"/>
+              </a:ext>
+            </a:extLst>
+          </p:cNvPr>
+          <p:cNvPicPr>
+            <a:picLocks noChangeAspect="1"/>
+          </p:cNvPicPr>
+          <p:nvPr/>
+        </p:nvPicPr>
+        <p:blipFill>
+          <a:blip r:embed="rId5">
+            <a:extLst>
+              <a:ext uri="{28A0092B-C50C-407E-A947-70E740481C1C}">
+                <a14:useLocalDpi xmlns:a14="http://schemas.microsoft.com/office/drawing/2010/main" val="0"/>
+              </a:ext>
+            </a:extLst>
+          </a:blip>
+          <a:stretch>
+            <a:fillRect/>
+          </a:stretch>
+        </p:blipFill>
+        <p:spPr>
+          <a:xfrm>
+            <a:off x="4674869" y="926180"/>
+            <a:ext cx="6678931" cy="1328134"/>
+          </a:xfrm>
+          <a:prstGeom prst="rect">
+            <a:avLst/>
+          </a:prstGeom>
+          <a:solidFill>
+            <a:schemeClr val="bg1">
+              <a:lumMod val="90000"/>
+              <a:lumOff val="10000"/>
+            </a:schemeClr>
+          </a:solidFill>
+          <a:ln w="28575">
+            <a:noFill/>
+          </a:ln>
+          <a:effectLst>
+            <a:outerShdw blurRad="190500" dist="127000" dir="5400000" algn="t" rotWithShape="0">
+              <a:prstClr val="black">
+                <a:alpha val="40000"/>
+              </a:prstClr>
+            </a:outerShdw>
+          </a:effectLst>
+        </p:spPr>
+      </p:pic>
+      <p:pic>
+        <p:nvPicPr>
+          <p:cNvPr id="21" name="Imagen 20" descr="Dibujo de un animal con la boca abierta&#10;&#10;Descripción generada automáticamente con confianza baja">
+            <a:extLst>
+              <a:ext uri="{FF2B5EF4-FFF2-40B4-BE49-F238E27FC236}">
+                <a16:creationId xmlns:a16="http://schemas.microsoft.com/office/drawing/2014/main" id="{67CB96A8-7B55-46A5-BD83-DC5E267F5141}"/>
+              </a:ext>
+            </a:extLst>
+          </p:cNvPr>
+          <p:cNvPicPr>
+            <a:picLocks noChangeAspect="1"/>
+          </p:cNvPicPr>
+          <p:nvPr/>
+        </p:nvPicPr>
+        <p:blipFill>
+          <a:blip r:embed="rId6">
+            <a:extLst>
+              <a:ext uri="{28A0092B-C50C-407E-A947-70E740481C1C}">
+                <a14:useLocalDpi xmlns:a14="http://schemas.microsoft.com/office/drawing/2010/main" val="0"/>
+              </a:ext>
+            </a:extLst>
+          </a:blip>
+          <a:stretch>
+            <a:fillRect/>
+          </a:stretch>
+        </p:blipFill>
+        <p:spPr>
+          <a:xfrm rot="20138033">
+            <a:off x="4341847" y="1653707"/>
+            <a:ext cx="899366" cy="1021639"/>
+          </a:xfrm>
+          <a:prstGeom prst="rect">
+            <a:avLst/>
+          </a:prstGeom>
+        </p:spPr>
+      </p:pic>
     </p:spTree>
     <p:extLst>
       <p:ext uri="{BB962C8B-B14F-4D97-AF65-F5344CB8AC3E}">
-        <p14:creationId xmlns:p14="http://schemas.microsoft.com/office/powerpoint/2010/main" val="2718962532"/>
+        <p14:creationId xmlns:p14="http://schemas.microsoft.com/office/powerpoint/2010/main" val="3846421672"/>
       </p:ext>
     </p:extLst>
   </p:cSld>
   <p:clrMapOvr>
     <a:masterClrMapping/>
   </p:clrMapOvr>
+  <p:timing>
+    <p:tnLst>
+      <p:par>
+        <p:cTn id="1" dur="indefinite" restart="never" nodeType="tmRoot">
+          <p:childTnLst>
+            <p:seq concurrent="1" nextAc="seek">
+              <p:cTn id="2" dur="indefinite" nodeType="mainSeq">
+                <p:childTnLst>
+                  <p:par>
+                    <p:cTn id="3" fill="hold">
+                      <p:stCondLst>
+                        <p:cond delay="indefinite"/>
+                      </p:stCondLst>
+                      <p:childTnLst>
+                        <p:par>
+                          <p:cTn id="4" fill="hold">
+                            <p:stCondLst>
+                              <p:cond delay="0"/>
+                            </p:stCondLst>
+                            <p:childTnLst>
+                              <p:par>
+                                <p:cTn id="5" presetID="1" presetClass="entr" presetSubtype="0" fill="hold" nodeType="clickEffect">
+                                  <p:stCondLst>
+                                    <p:cond delay="0"/>
+                                  </p:stCondLst>
+                                  <p:childTnLst>
+                                    <p:set>
+                                      <p:cBhvr>
+                                        <p:cTn id="6" dur="1" fill="hold">
+                                          <p:stCondLst>
+                                            <p:cond delay="0"/>
+                                          </p:stCondLst>
+                                        </p:cTn>
+                                        <p:tgtEl>
+                                          <p:spTgt spid="4"/>
+                                        </p:tgtEl>
+                                        <p:attrNameLst>
+                                          <p:attrName>style.visibility</p:attrName>
+                                        </p:attrNameLst>
+                                      </p:cBhvr>
+                                      <p:to>
+                                        <p:strVal val="visible"/>
+                                      </p:to>
+                                    </p:set>
+                                  </p:childTnLst>
+                                </p:cTn>
+                              </p:par>
+                              <p:par>
+                                <p:cTn id="7" presetID="1" presetClass="entr" presetSubtype="0" fill="hold" nodeType="withEffect">
+                                  <p:stCondLst>
+                                    <p:cond delay="0"/>
+                                  </p:stCondLst>
+                                  <p:childTnLst>
+                                    <p:set>
+                                      <p:cBhvr>
+                                        <p:cTn id="8" dur="1" fill="hold">
+                                          <p:stCondLst>
+                                            <p:cond delay="0"/>
+                                          </p:stCondLst>
+                                        </p:cTn>
+                                        <p:tgtEl>
+                                          <p:spTgt spid="21"/>
+                                        </p:tgtEl>
+                                        <p:attrNameLst>
+                                          <p:attrName>style.visibility</p:attrName>
+                                        </p:attrNameLst>
+                                      </p:cBhvr>
+                                      <p:to>
+                                        <p:strVal val="visible"/>
+                                      </p:to>
+                                    </p:set>
+                                  </p:childTnLst>
+                                </p:cTn>
+                              </p:par>
+                            </p:childTnLst>
+                          </p:cTn>
+                        </p:par>
+                      </p:childTnLst>
+                    </p:cTn>
+                  </p:par>
+                </p:childTnLst>
+              </p:cTn>
+              <p:prevCondLst>
+                <p:cond evt="onPrev" delay="0">
+                  <p:tgtEl>
+                    <p:sldTgt/>
+                  </p:tgtEl>
+                </p:cond>
+              </p:prevCondLst>
+              <p:nextCondLst>
+                <p:cond evt="onNext" delay="0">
+                  <p:tgtEl>
+                    <p:sldTgt/>
+                  </p:tgtEl>
+                </p:cond>
+              </p:nextCondLst>
+            </p:seq>
+          </p:childTnLst>
+        </p:cTn>
+      </p:par>
+    </p:tnLst>
+  </p:timing>
 </p:sld>
 </file>
 
@@ -3809,7 +7399,7 @@
           <p:cNvPr id="2" name="Título 1">
             <a:extLst>
               <a:ext uri="{FF2B5EF4-FFF2-40B4-BE49-F238E27FC236}">
-                <a16:creationId xmlns:a16="http://schemas.microsoft.com/office/drawing/2014/main" id="{731BCFAA-58B0-4C24-B9E2-D7ABF3F599E5}"/>
+                <a16:creationId xmlns:a16="http://schemas.microsoft.com/office/drawing/2014/main" id="{7E579DF9-F669-4B5B-BDB6-68986F88A319}"/>
               </a:ext>
             </a:extLst>
           </p:cNvPr>
@@ -3831,40 +7421,119 @@
                   <a:schemeClr val="accent1"/>
                 </a:solidFill>
               </a:rPr>
-              <a:t>Demo time! :)</a:t>
-            </a:r>
-          </a:p>
-        </p:txBody>
-      </p:sp>
-      <p:sp>
-        <p:nvSpPr>
-          <p:cNvPr id="3" name="Marcador de contenido 2">
+              <a:t>OpenGL rendering pipeline</a:t>
+            </a:r>
+          </a:p>
+        </p:txBody>
+      </p:sp>
+      <p:pic>
+        <p:nvPicPr>
+          <p:cNvPr id="5" name="Marcador de contenido 4">
             <a:extLst>
               <a:ext uri="{FF2B5EF4-FFF2-40B4-BE49-F238E27FC236}">
-                <a16:creationId xmlns:a16="http://schemas.microsoft.com/office/drawing/2014/main" id="{5A4C9F2D-F98A-4C81-ADA4-B5BA8CEAF3E1}"/>
+                <a16:creationId xmlns:a16="http://schemas.microsoft.com/office/drawing/2014/main" id="{3DAEF447-A637-48CF-A22A-9A8B1E117808}"/>
               </a:ext>
             </a:extLst>
           </p:cNvPr>
-          <p:cNvSpPr>
-            <a:spLocks noGrp="1"/>
-          </p:cNvSpPr>
+          <p:cNvPicPr>
+            <a:picLocks noGrp="1" noChangeAspect="1"/>
+          </p:cNvPicPr>
           <p:nvPr>
             <p:ph idx="1"/>
           </p:nvPr>
-        </p:nvSpPr>
-        <p:spPr/>
-        <p:txBody>
-          <a:bodyPr/>
-          <a:lstStyle/>
-          <a:p>
-            <a:endParaRPr lang="en-GB" dirty="0"/>
-          </a:p>
-        </p:txBody>
-      </p:sp>
+        </p:nvPicPr>
+        <p:blipFill>
+          <a:blip r:embed="rId3">
+            <a:extLst>
+              <a:ext uri="{28A0092B-C50C-407E-A947-70E740481C1C}">
+                <a14:useLocalDpi xmlns:a14="http://schemas.microsoft.com/office/drawing/2010/main" val="0"/>
+              </a:ext>
+            </a:extLst>
+          </a:blip>
+          <a:srcRect/>
+          <a:stretch/>
+        </p:blipFill>
+        <p:spPr>
+          <a:xfrm>
+            <a:off x="2433657" y="1027906"/>
+            <a:ext cx="7324686" cy="5493514"/>
+          </a:xfrm>
+        </p:spPr>
+      </p:pic>
+      <p:pic>
+        <p:nvPicPr>
+          <p:cNvPr id="7" name="Imagen 6" descr="Imagen que contiene Texto&#10;&#10;Descripción generada automáticamente">
+            <a:extLst>
+              <a:ext uri="{FF2B5EF4-FFF2-40B4-BE49-F238E27FC236}">
+                <a16:creationId xmlns:a16="http://schemas.microsoft.com/office/drawing/2014/main" id="{E5AF2750-0702-47B6-9A4C-3948BFB87E14}"/>
+              </a:ext>
+            </a:extLst>
+          </p:cNvPr>
+          <p:cNvPicPr>
+            <a:picLocks noChangeAspect="1"/>
+          </p:cNvPicPr>
+          <p:nvPr/>
+        </p:nvPicPr>
+        <p:blipFill rotWithShape="1">
+          <a:blip r:embed="rId4">
+            <a:extLst>
+              <a:ext uri="{28A0092B-C50C-407E-A947-70E740481C1C}">
+                <a14:useLocalDpi xmlns:a14="http://schemas.microsoft.com/office/drawing/2010/main" val="0"/>
+              </a:ext>
+            </a:extLst>
+          </a:blip>
+          <a:srcRect b="51480"/>
+          <a:stretch/>
+        </p:blipFill>
+        <p:spPr>
+          <a:xfrm>
+            <a:off x="7769480" y="4923246"/>
+            <a:ext cx="1584245" cy="768667"/>
+          </a:xfrm>
+          <a:prstGeom prst="rect">
+            <a:avLst/>
+          </a:prstGeom>
+        </p:spPr>
+      </p:pic>
+      <p:pic>
+        <p:nvPicPr>
+          <p:cNvPr id="9" name="Imagen 8" descr="Imagen que contiene Texto&#10;&#10;Descripción generada automáticamente">
+            <a:extLst>
+              <a:ext uri="{FF2B5EF4-FFF2-40B4-BE49-F238E27FC236}">
+                <a16:creationId xmlns:a16="http://schemas.microsoft.com/office/drawing/2014/main" id="{2A433DBA-85F5-4FE7-B175-4A10F36BB217}"/>
+              </a:ext>
+            </a:extLst>
+          </p:cNvPr>
+          <p:cNvPicPr>
+            <a:picLocks noChangeAspect="1"/>
+          </p:cNvPicPr>
+          <p:nvPr/>
+        </p:nvPicPr>
+        <p:blipFill rotWithShape="1">
+          <a:blip r:embed="rId4">
+            <a:extLst>
+              <a:ext uri="{28A0092B-C50C-407E-A947-70E740481C1C}">
+                <a14:useLocalDpi xmlns:a14="http://schemas.microsoft.com/office/drawing/2010/main" val="0"/>
+              </a:ext>
+            </a:extLst>
+          </a:blip>
+          <a:srcRect t="45638"/>
+          <a:stretch/>
+        </p:blipFill>
+        <p:spPr>
+          <a:xfrm>
+            <a:off x="9600986" y="4923246"/>
+            <a:ext cx="1455706" cy="791350"/>
+          </a:xfrm>
+          <a:prstGeom prst="rect">
+            <a:avLst/>
+          </a:prstGeom>
+        </p:spPr>
+      </p:pic>
     </p:spTree>
     <p:extLst>
       <p:ext uri="{BB962C8B-B14F-4D97-AF65-F5344CB8AC3E}">
-        <p14:creationId xmlns:p14="http://schemas.microsoft.com/office/powerpoint/2010/main" val="2732236798"/>
+        <p14:creationId xmlns:p14="http://schemas.microsoft.com/office/powerpoint/2010/main" val="708253023"/>
       </p:ext>
     </p:extLst>
   </p:cSld>
@@ -3896,7 +7565,7 @@
           <p:cNvPr id="2" name="Título 1">
             <a:extLst>
               <a:ext uri="{FF2B5EF4-FFF2-40B4-BE49-F238E27FC236}">
-                <a16:creationId xmlns:a16="http://schemas.microsoft.com/office/drawing/2014/main" id="{61EFCD24-8427-430C-B74F-EFB87EEB92BE}"/>
+                <a16:creationId xmlns:a16="http://schemas.microsoft.com/office/drawing/2014/main" id="{B821BF0C-12EB-487F-87F9-7201A9BBFF36}"/>
               </a:ext>
             </a:extLst>
           </p:cNvPr>
@@ -3918,8 +7587,21 @@
                   <a:schemeClr val="accent1"/>
                 </a:solidFill>
               </a:rPr>
-              <a:t>Summary – key takeaways</a:t>
-            </a:r>
+              <a:t>Method</a:t>
+            </a:r>
+            <a:r>
+              <a:rPr lang="en-GB" sz="2400" dirty="0">
+                <a:solidFill>
+                  <a:schemeClr val="accent1"/>
+                </a:solidFill>
+              </a:rPr>
+              <a:t> (directional lights)</a:t>
+            </a:r>
+            <a:endParaRPr lang="en-GB" dirty="0">
+              <a:solidFill>
+                <a:schemeClr val="accent1"/>
+              </a:solidFill>
+            </a:endParaRPr>
           </a:p>
         </p:txBody>
       </p:sp>
@@ -3928,7 +7610,7 @@
           <p:cNvPr id="3" name="Marcador de contenido 2">
             <a:extLst>
               <a:ext uri="{FF2B5EF4-FFF2-40B4-BE49-F238E27FC236}">
-                <a16:creationId xmlns:a16="http://schemas.microsoft.com/office/drawing/2014/main" id="{89B21F77-0540-4F08-967D-4D36AD412E22}"/>
+                <a16:creationId xmlns:a16="http://schemas.microsoft.com/office/drawing/2014/main" id="{FAF98818-5F5B-43A5-BAC3-BB889C63F6F1}"/>
               </a:ext>
             </a:extLst>
           </p:cNvPr>
@@ -3944,14 +7626,101 @@
           <a:bodyPr/>
           <a:lstStyle/>
           <a:p>
-            <a:endParaRPr lang="en-GB"/>
+            <a:endParaRPr lang="en-GB" dirty="0"/>
           </a:p>
         </p:txBody>
       </p:sp>
     </p:spTree>
     <p:extLst>
       <p:ext uri="{BB962C8B-B14F-4D97-AF65-F5344CB8AC3E}">
-        <p14:creationId xmlns:p14="http://schemas.microsoft.com/office/powerpoint/2010/main" val="3244361321"/>
+        <p14:creationId xmlns:p14="http://schemas.microsoft.com/office/powerpoint/2010/main" val="2718962532"/>
+      </p:ext>
+    </p:extLst>
+  </p:cSld>
+  <p:clrMapOvr>
+    <a:masterClrMapping/>
+  </p:clrMapOvr>
+</p:sld>
+</file>
+
+<file path=ppt/slides/slide9.xml><?xml version="1.0" encoding="utf-8"?>
+<p:sld xmlns:a="http://schemas.openxmlformats.org/drawingml/2006/main" xmlns:r="http://schemas.openxmlformats.org/officeDocument/2006/relationships" xmlns:p="http://schemas.openxmlformats.org/presentationml/2006/main">
+  <p:cSld>
+    <p:spTree>
+      <p:nvGrpSpPr>
+        <p:cNvPr id="1" name=""/>
+        <p:cNvGrpSpPr/>
+        <p:nvPr/>
+      </p:nvGrpSpPr>
+      <p:grpSpPr>
+        <a:xfrm>
+          <a:off x="0" y="0"/>
+          <a:ext cx="0" cy="0"/>
+          <a:chOff x="0" y="0"/>
+          <a:chExt cx="0" cy="0"/>
+        </a:xfrm>
+      </p:grpSpPr>
+      <p:sp>
+        <p:nvSpPr>
+          <p:cNvPr id="2" name="Título 1">
+            <a:extLst>
+              <a:ext uri="{FF2B5EF4-FFF2-40B4-BE49-F238E27FC236}">
+                <a16:creationId xmlns:a16="http://schemas.microsoft.com/office/drawing/2014/main" id="{915E278F-12D6-4B47-8D6E-BC7AC686A418}"/>
+              </a:ext>
+            </a:extLst>
+          </p:cNvPr>
+          <p:cNvSpPr>
+            <a:spLocks noGrp="1"/>
+          </p:cNvSpPr>
+          <p:nvPr>
+            <p:ph type="title"/>
+          </p:nvPr>
+        </p:nvSpPr>
+        <p:spPr/>
+        <p:txBody>
+          <a:bodyPr/>
+          <a:lstStyle/>
+          <a:p>
+            <a:r>
+              <a:rPr lang="en-GB" dirty="0">
+                <a:solidFill>
+                  <a:schemeClr val="accent1"/>
+                </a:solidFill>
+              </a:rPr>
+              <a:t>Artefacts</a:t>
+            </a:r>
+          </a:p>
+        </p:txBody>
+      </p:sp>
+      <p:sp>
+        <p:nvSpPr>
+          <p:cNvPr id="3" name="Marcador de contenido 2">
+            <a:extLst>
+              <a:ext uri="{FF2B5EF4-FFF2-40B4-BE49-F238E27FC236}">
+                <a16:creationId xmlns:a16="http://schemas.microsoft.com/office/drawing/2014/main" id="{F3C30E42-5474-45A7-83AD-F61C1E804525}"/>
+              </a:ext>
+            </a:extLst>
+          </p:cNvPr>
+          <p:cNvSpPr>
+            <a:spLocks noGrp="1"/>
+          </p:cNvSpPr>
+          <p:nvPr>
+            <p:ph idx="1"/>
+          </p:nvPr>
+        </p:nvSpPr>
+        <p:spPr/>
+        <p:txBody>
+          <a:bodyPr/>
+          <a:lstStyle/>
+          <a:p>
+            <a:endParaRPr lang="en-GB" dirty="0"/>
+          </a:p>
+        </p:txBody>
+      </p:sp>
+    </p:spTree>
+    <p:extLst>
+      <p:ext uri="{BB962C8B-B14F-4D97-AF65-F5344CB8AC3E}">
+        <p14:creationId xmlns:p14="http://schemas.microsoft.com/office/powerpoint/2010/main" val="4135688092"/>
       </p:ext>
     </p:extLst>
   </p:cSld>
@@ -4160,4 +7929,299 @@
     </a:ext>
   </a:extLst>
 </a:theme>
+</file>
+
+<file path=ppt/theme/theme2.xml><?xml version="1.0" encoding="utf-8"?>
+<a:theme xmlns:a="http://schemas.openxmlformats.org/drawingml/2006/main" name="Tema de Office">
+  <a:themeElements>
+    <a:clrScheme name="Office">
+      <a:dk1>
+        <a:sysClr val="windowText" lastClr="000000"/>
+      </a:dk1>
+      <a:lt1>
+        <a:sysClr val="window" lastClr="FFFFFF"/>
+      </a:lt1>
+      <a:dk2>
+        <a:srgbClr val="44546A"/>
+      </a:dk2>
+      <a:lt2>
+        <a:srgbClr val="E7E6E6"/>
+      </a:lt2>
+      <a:accent1>
+        <a:srgbClr val="4472C4"/>
+      </a:accent1>
+      <a:accent2>
+        <a:srgbClr val="ED7D31"/>
+      </a:accent2>
+      <a:accent3>
+        <a:srgbClr val="A5A5A5"/>
+      </a:accent3>
+      <a:accent4>
+        <a:srgbClr val="FFC000"/>
+      </a:accent4>
+      <a:accent5>
+        <a:srgbClr val="5B9BD5"/>
+      </a:accent5>
+      <a:accent6>
+        <a:srgbClr val="70AD47"/>
+      </a:accent6>
+      <a:hlink>
+        <a:srgbClr val="0563C1"/>
+      </a:hlink>
+      <a:folHlink>
+        <a:srgbClr val="954F72"/>
+      </a:folHlink>
+    </a:clrScheme>
+    <a:fontScheme name="Office">
+      <a:majorFont>
+        <a:latin typeface="Calibri Light" panose="020F0302020204030204"/>
+        <a:ea typeface=""/>
+        <a:cs typeface=""/>
+        <a:font script="Jpan" typeface="游ゴシック Light"/>
+        <a:font script="Hang" typeface="맑은 고딕"/>
+        <a:font script="Hans" typeface="等线 Light"/>
+        <a:font script="Hant" typeface="新細明體"/>
+        <a:font script="Arab" typeface="Times New Roman"/>
+        <a:font script="Hebr" typeface="Times New Roman"/>
+        <a:font script="Thai" typeface="Angsana New"/>
+        <a:font script="Ethi" typeface="Nyala"/>
+        <a:font script="Beng" typeface="Vrinda"/>
+        <a:font script="Gujr" typeface="Shruti"/>
+        <a:font script="Khmr" typeface="MoolBoran"/>
+        <a:font script="Knda" typeface="Tunga"/>
+        <a:font script="Guru" typeface="Raavi"/>
+        <a:font script="Cans" typeface="Euphemia"/>
+        <a:font script="Cher" typeface="Plantagenet Cherokee"/>
+        <a:font script="Yiii" typeface="Microsoft Yi Baiti"/>
+        <a:font script="Tibt" typeface="Microsoft Himalaya"/>
+        <a:font script="Thaa" typeface="MV Boli"/>
+        <a:font script="Deva" typeface="Mangal"/>
+        <a:font script="Telu" typeface="Gautami"/>
+        <a:font script="Taml" typeface="Latha"/>
+        <a:font script="Syrc" typeface="Estrangelo Edessa"/>
+        <a:font script="Orya" typeface="Kalinga"/>
+        <a:font script="Mlym" typeface="Kartika"/>
+        <a:font script="Laoo" typeface="DokChampa"/>
+        <a:font script="Sinh" typeface="Iskoola Pota"/>
+        <a:font script="Mong" typeface="Mongolian Baiti"/>
+        <a:font script="Viet" typeface="Times New Roman"/>
+        <a:font script="Uigh" typeface="Microsoft Uighur"/>
+        <a:font script="Geor" typeface="Sylfaen"/>
+        <a:font script="Armn" typeface="Arial"/>
+        <a:font script="Bugi" typeface="Leelawadee UI"/>
+        <a:font script="Bopo" typeface="Microsoft JhengHei"/>
+        <a:font script="Java" typeface="Javanese Text"/>
+        <a:font script="Lisu" typeface="Segoe UI"/>
+        <a:font script="Mymr" typeface="Myanmar Text"/>
+        <a:font script="Nkoo" typeface="Ebrima"/>
+        <a:font script="Olck" typeface="Nirmala UI"/>
+        <a:font script="Osma" typeface="Ebrima"/>
+        <a:font script="Phag" typeface="Phagspa"/>
+        <a:font script="Syrn" typeface="Estrangelo Edessa"/>
+        <a:font script="Syrj" typeface="Estrangelo Edessa"/>
+        <a:font script="Syre" typeface="Estrangelo Edessa"/>
+        <a:font script="Sora" typeface="Nirmala UI"/>
+        <a:font script="Tale" typeface="Microsoft Tai Le"/>
+        <a:font script="Talu" typeface="Microsoft New Tai Lue"/>
+        <a:font script="Tfng" typeface="Ebrima"/>
+      </a:majorFont>
+      <a:minorFont>
+        <a:latin typeface="Calibri" panose="020F0502020204030204"/>
+        <a:ea typeface=""/>
+        <a:cs typeface=""/>
+        <a:font script="Jpan" typeface="游ゴシック"/>
+        <a:font script="Hang" typeface="맑은 고딕"/>
+        <a:font script="Hans" typeface="等线"/>
+        <a:font script="Hant" typeface="新細明體"/>
+        <a:font script="Arab" typeface="Arial"/>
+        <a:font script="Hebr" typeface="Arial"/>
+        <a:font script="Thai" typeface="Cordia New"/>
+        <a:font script="Ethi" typeface="Nyala"/>
+        <a:font script="Beng" typeface="Vrinda"/>
+        <a:font script="Gujr" typeface="Shruti"/>
+        <a:font script="Khmr" typeface="DaunPenh"/>
+        <a:font script="Knda" typeface="Tunga"/>
+        <a:font script="Guru" typeface="Raavi"/>
+        <a:font script="Cans" typeface="Euphemia"/>
+        <a:font script="Cher" typeface="Plantagenet Cherokee"/>
+        <a:font script="Yiii" typeface="Microsoft Yi Baiti"/>
+        <a:font script="Tibt" typeface="Microsoft Himalaya"/>
+        <a:font script="Thaa" typeface="MV Boli"/>
+        <a:font script="Deva" typeface="Mangal"/>
+        <a:font script="Telu" typeface="Gautami"/>
+        <a:font script="Taml" typeface="Latha"/>
+        <a:font script="Syrc" typeface="Estrangelo Edessa"/>
+        <a:font script="Orya" typeface="Kalinga"/>
+        <a:font script="Mlym" typeface="Kartika"/>
+        <a:font script="Laoo" typeface="DokChampa"/>
+        <a:font script="Sinh" typeface="Iskoola Pota"/>
+        <a:font script="Mong" typeface="Mongolian Baiti"/>
+        <a:font script="Viet" typeface="Arial"/>
+        <a:font script="Uigh" typeface="Microsoft Uighur"/>
+        <a:font script="Geor" typeface="Sylfaen"/>
+        <a:font script="Armn" typeface="Arial"/>
+        <a:font script="Bugi" typeface="Leelawadee UI"/>
+        <a:font script="Bopo" typeface="Microsoft JhengHei"/>
+        <a:font script="Java" typeface="Javanese Text"/>
+        <a:font script="Lisu" typeface="Segoe UI"/>
+        <a:font script="Mymr" typeface="Myanmar Text"/>
+        <a:font script="Nkoo" typeface="Ebrima"/>
+        <a:font script="Olck" typeface="Nirmala UI"/>
+        <a:font script="Osma" typeface="Ebrima"/>
+        <a:font script="Phag" typeface="Phagspa"/>
+        <a:font script="Syrn" typeface="Estrangelo Edessa"/>
+        <a:font script="Syrj" typeface="Estrangelo Edessa"/>
+        <a:font script="Syre" typeface="Estrangelo Edessa"/>
+        <a:font script="Sora" typeface="Nirmala UI"/>
+        <a:font script="Tale" typeface="Microsoft Tai Le"/>
+        <a:font script="Talu" typeface="Microsoft New Tai Lue"/>
+        <a:font script="Tfng" typeface="Ebrima"/>
+      </a:minorFont>
+    </a:fontScheme>
+    <a:fmtScheme name="Office">
+      <a:fillStyleLst>
+        <a:solidFill>
+          <a:schemeClr val="phClr"/>
+        </a:solidFill>
+        <a:gradFill rotWithShape="1">
+          <a:gsLst>
+            <a:gs pos="0">
+              <a:schemeClr val="phClr">
+                <a:lumMod val="110000"/>
+                <a:satMod val="105000"/>
+                <a:tint val="67000"/>
+              </a:schemeClr>
+            </a:gs>
+            <a:gs pos="50000">
+              <a:schemeClr val="phClr">
+                <a:lumMod val="105000"/>
+                <a:satMod val="103000"/>
+                <a:tint val="73000"/>
+              </a:schemeClr>
+            </a:gs>
+            <a:gs pos="100000">
+              <a:schemeClr val="phClr">
+                <a:lumMod val="105000"/>
+                <a:satMod val="109000"/>
+                <a:tint val="81000"/>
+              </a:schemeClr>
+            </a:gs>
+          </a:gsLst>
+          <a:lin ang="5400000" scaled="0"/>
+        </a:gradFill>
+        <a:gradFill rotWithShape="1">
+          <a:gsLst>
+            <a:gs pos="0">
+              <a:schemeClr val="phClr">
+                <a:satMod val="103000"/>
+                <a:lumMod val="102000"/>
+                <a:tint val="94000"/>
+              </a:schemeClr>
+            </a:gs>
+            <a:gs pos="50000">
+              <a:schemeClr val="phClr">
+                <a:satMod val="110000"/>
+                <a:lumMod val="100000"/>
+                <a:shade val="100000"/>
+              </a:schemeClr>
+            </a:gs>
+            <a:gs pos="100000">
+              <a:schemeClr val="phClr">
+                <a:lumMod val="99000"/>
+                <a:satMod val="120000"/>
+                <a:shade val="78000"/>
+              </a:schemeClr>
+            </a:gs>
+          </a:gsLst>
+          <a:lin ang="5400000" scaled="0"/>
+        </a:gradFill>
+      </a:fillStyleLst>
+      <a:lnStyleLst>
+        <a:ln w="6350" cap="flat" cmpd="sng" algn="ctr">
+          <a:solidFill>
+            <a:schemeClr val="phClr"/>
+          </a:solidFill>
+          <a:prstDash val="solid"/>
+          <a:miter lim="800000"/>
+        </a:ln>
+        <a:ln w="12700" cap="flat" cmpd="sng" algn="ctr">
+          <a:solidFill>
+            <a:schemeClr val="phClr"/>
+          </a:solidFill>
+          <a:prstDash val="solid"/>
+          <a:miter lim="800000"/>
+        </a:ln>
+        <a:ln w="19050" cap="flat" cmpd="sng" algn="ctr">
+          <a:solidFill>
+            <a:schemeClr val="phClr"/>
+          </a:solidFill>
+          <a:prstDash val="solid"/>
+          <a:miter lim="800000"/>
+        </a:ln>
+      </a:lnStyleLst>
+      <a:effectStyleLst>
+        <a:effectStyle>
+          <a:effectLst/>
+        </a:effectStyle>
+        <a:effectStyle>
+          <a:effectLst/>
+        </a:effectStyle>
+        <a:effectStyle>
+          <a:effectLst>
+            <a:outerShdw blurRad="57150" dist="19050" dir="5400000" algn="ctr" rotWithShape="0">
+              <a:srgbClr val="000000">
+                <a:alpha val="63000"/>
+              </a:srgbClr>
+            </a:outerShdw>
+          </a:effectLst>
+        </a:effectStyle>
+      </a:effectStyleLst>
+      <a:bgFillStyleLst>
+        <a:solidFill>
+          <a:schemeClr val="phClr"/>
+        </a:solidFill>
+        <a:solidFill>
+          <a:schemeClr val="phClr">
+            <a:tint val="95000"/>
+            <a:satMod val="170000"/>
+          </a:schemeClr>
+        </a:solidFill>
+        <a:gradFill rotWithShape="1">
+          <a:gsLst>
+            <a:gs pos="0">
+              <a:schemeClr val="phClr">
+                <a:tint val="93000"/>
+                <a:satMod val="150000"/>
+                <a:shade val="98000"/>
+                <a:lumMod val="102000"/>
+              </a:schemeClr>
+            </a:gs>
+            <a:gs pos="50000">
+              <a:schemeClr val="phClr">
+                <a:tint val="98000"/>
+                <a:satMod val="130000"/>
+                <a:shade val="90000"/>
+                <a:lumMod val="103000"/>
+              </a:schemeClr>
+            </a:gs>
+            <a:gs pos="100000">
+              <a:schemeClr val="phClr">
+                <a:shade val="63000"/>
+                <a:satMod val="120000"/>
+              </a:schemeClr>
+            </a:gs>
+          </a:gsLst>
+          <a:lin ang="5400000" scaled="0"/>
+        </a:gradFill>
+      </a:bgFillStyleLst>
+    </a:fmtScheme>
+  </a:themeElements>
+  <a:objectDefaults/>
+  <a:extraClrSchemeLst/>
+  <a:extLst>
+    <a:ext uri="{05A4C25C-085E-4340-85A3-A5531E510DB2}">
+      <thm15:themeFamily xmlns:thm15="http://schemas.microsoft.com/office/thememl/2012/main" name="Office Theme" id="{62F939B6-93AF-4DB8-9C6B-D6C7DFDC589F}" vid="{4A3C46E8-61CC-4603-A589-7422A47A8E4A}"/>
+    </a:ext>
+  </a:extLst>
+</a:theme>
 </file>
</xml_diff>

<commit_message>
Worked on method part of slides
Added more details/structure to the method part of the slides.

Maybe too much content -> too long... Maybe instead of going into specifics of the actual impl in code, just explain process in detail but 'higher level' (w/diagrams & imgs).
</commit_message>
<xml_diff>
--- a/slides/slides.pptx
+++ b/slides/slides.pptx
@@ -5,7 +5,7 @@
     <p:sldMasterId id="2147483672" r:id="rId1"/>
   </p:sldMasterIdLst>
   <p:notesMasterIdLst>
-    <p:notesMasterId r:id="rId13"/>
+    <p:notesMasterId r:id="rId19"/>
   </p:notesMasterIdLst>
   <p:sldIdLst>
     <p:sldId id="256" r:id="rId2"/>
@@ -16,9 +16,15 @@
     <p:sldId id="265" r:id="rId7"/>
     <p:sldId id="266" r:id="rId8"/>
     <p:sldId id="261" r:id="rId9"/>
-    <p:sldId id="267" r:id="rId10"/>
-    <p:sldId id="262" r:id="rId11"/>
-    <p:sldId id="263" r:id="rId12"/>
+    <p:sldId id="268" r:id="rId10"/>
+    <p:sldId id="270" r:id="rId11"/>
+    <p:sldId id="271" r:id="rId12"/>
+    <p:sldId id="272" r:id="rId13"/>
+    <p:sldId id="273" r:id="rId14"/>
+    <p:sldId id="269" r:id="rId15"/>
+    <p:sldId id="267" r:id="rId16"/>
+    <p:sldId id="262" r:id="rId17"/>
+    <p:sldId id="263" r:id="rId18"/>
   </p:sldIdLst>
   <p:sldSz cx="12192000" cy="6858000"/>
   <p:notesSz cx="6858000" cy="9144000"/>
@@ -207,7 +213,7 @@
           <a:p>
             <a:fld id="{66499B1D-C816-4A11-8D96-9373C31AF530}" type="datetimeFigureOut">
               <a:rPr lang="en-GB" smtClean="0"/>
-              <a:t>12/01/2021</a:t>
+              <a:t>13/01/2021</a:t>
             </a:fld>
             <a:endParaRPr lang="en-GB"/>
           </a:p>
@@ -1099,6 +1105,93 @@
 </p:notes>
 </file>
 
+<file path=ppt/notesSlides/notesSlide6.xml><?xml version="1.0" encoding="utf-8"?>
+<p:notes xmlns:a="http://schemas.openxmlformats.org/drawingml/2006/main" xmlns:r="http://schemas.openxmlformats.org/officeDocument/2006/relationships" xmlns:p="http://schemas.openxmlformats.org/presentationml/2006/main">
+  <p:cSld>
+    <p:spTree>
+      <p:nvGrpSpPr>
+        <p:cNvPr id="1" name=""/>
+        <p:cNvGrpSpPr/>
+        <p:nvPr/>
+      </p:nvGrpSpPr>
+      <p:grpSpPr>
+        <a:xfrm>
+          <a:off x="0" y="0"/>
+          <a:ext cx="0" cy="0"/>
+          <a:chOff x="0" y="0"/>
+          <a:chExt cx="0" cy="0"/>
+        </a:xfrm>
+      </p:grpSpPr>
+      <p:sp>
+        <p:nvSpPr>
+          <p:cNvPr id="2" name="Marcador de imagen de diapositiva 1"/>
+          <p:cNvSpPr>
+            <a:spLocks noGrp="1" noRot="1" noChangeAspect="1"/>
+          </p:cNvSpPr>
+          <p:nvPr>
+            <p:ph type="sldImg"/>
+          </p:nvPr>
+        </p:nvSpPr>
+        <p:spPr/>
+      </p:sp>
+      <p:sp>
+        <p:nvSpPr>
+          <p:cNvPr id="3" name="Marcador de notas 2"/>
+          <p:cNvSpPr>
+            <a:spLocks noGrp="1"/>
+          </p:cNvSpPr>
+          <p:nvPr>
+            <p:ph type="body" idx="1"/>
+          </p:nvPr>
+        </p:nvSpPr>
+        <p:spPr/>
+        <p:txBody>
+          <a:bodyPr/>
+          <a:lstStyle/>
+          <a:p>
+            <a:r>
+              <a:rPr lang="en-GB" dirty="0"/>
+              <a:t>Briefly mention here what a framebuffer is. Just say it has colour &amp; depth buffers to which we can render…… TODO</a:t>
+            </a:r>
+          </a:p>
+        </p:txBody>
+      </p:sp>
+      <p:sp>
+        <p:nvSpPr>
+          <p:cNvPr id="4" name="Marcador de número de diapositiva 3"/>
+          <p:cNvSpPr>
+            <a:spLocks noGrp="1"/>
+          </p:cNvSpPr>
+          <p:nvPr>
+            <p:ph type="sldNum" sz="quarter" idx="5"/>
+          </p:nvPr>
+        </p:nvSpPr>
+        <p:spPr/>
+        <p:txBody>
+          <a:bodyPr/>
+          <a:lstStyle/>
+          <a:p>
+            <a:fld id="{FF0F2D60-35F9-4BC0-B9FA-A8D7F998FA00}" type="slidenum">
+              <a:rPr lang="en-GB" smtClean="0"/>
+              <a:t>11</a:t>
+            </a:fld>
+            <a:endParaRPr lang="en-GB"/>
+          </a:p>
+        </p:txBody>
+      </p:sp>
+    </p:spTree>
+    <p:extLst>
+      <p:ext uri="{BB962C8B-B14F-4D97-AF65-F5344CB8AC3E}">
+        <p14:creationId xmlns:p14="http://schemas.microsoft.com/office/powerpoint/2010/main" val="2582622379"/>
+      </p:ext>
+    </p:extLst>
+  </p:cSld>
+  <p:clrMapOvr>
+    <a:masterClrMapping/>
+  </p:clrMapOvr>
+</p:notes>
+</file>
+
 <file path=ppt/slideLayouts/slideLayout1.xml><?xml version="1.0" encoding="utf-8"?>
 <p:sldLayout xmlns:a="http://schemas.openxmlformats.org/drawingml/2006/main" xmlns:r="http://schemas.openxmlformats.org/officeDocument/2006/relationships" xmlns:p="http://schemas.openxmlformats.org/presentationml/2006/main" type="title" preserve="1">
   <p:cSld name="Diapositiva de título">
@@ -1230,7 +1323,7 @@
           <a:p>
             <a:fld id="{F58C6CE7-BF83-4B1E-855D-EB8AAA078073}" type="datetimeFigureOut">
               <a:rPr lang="en-GB" smtClean="0"/>
-              <a:t>12/01/2021</a:t>
+              <a:t>13/01/2021</a:t>
             </a:fld>
             <a:endParaRPr lang="en-GB"/>
           </a:p>
@@ -1400,7 +1493,7 @@
           <a:p>
             <a:fld id="{F58C6CE7-BF83-4B1E-855D-EB8AAA078073}" type="datetimeFigureOut">
               <a:rPr lang="en-GB" smtClean="0"/>
-              <a:t>12/01/2021</a:t>
+              <a:t>13/01/2021</a:t>
             </a:fld>
             <a:endParaRPr lang="en-GB"/>
           </a:p>
@@ -1580,7 +1673,7 @@
           <a:p>
             <a:fld id="{F58C6CE7-BF83-4B1E-855D-EB8AAA078073}" type="datetimeFigureOut">
               <a:rPr lang="en-GB" smtClean="0"/>
-              <a:t>12/01/2021</a:t>
+              <a:t>13/01/2021</a:t>
             </a:fld>
             <a:endParaRPr lang="en-GB"/>
           </a:p>
@@ -1750,7 +1843,7 @@
           <a:p>
             <a:fld id="{F58C6CE7-BF83-4B1E-855D-EB8AAA078073}" type="datetimeFigureOut">
               <a:rPr lang="en-GB" smtClean="0"/>
-              <a:t>12/01/2021</a:t>
+              <a:t>13/01/2021</a:t>
             </a:fld>
             <a:endParaRPr lang="en-GB"/>
           </a:p>
@@ -1996,7 +2089,7 @@
           <a:p>
             <a:fld id="{F58C6CE7-BF83-4B1E-855D-EB8AAA078073}" type="datetimeFigureOut">
               <a:rPr lang="en-GB" smtClean="0"/>
-              <a:t>12/01/2021</a:t>
+              <a:t>13/01/2021</a:t>
             </a:fld>
             <a:endParaRPr lang="en-GB"/>
           </a:p>
@@ -2228,7 +2321,7 @@
           <a:p>
             <a:fld id="{F58C6CE7-BF83-4B1E-855D-EB8AAA078073}" type="datetimeFigureOut">
               <a:rPr lang="en-GB" smtClean="0"/>
-              <a:t>12/01/2021</a:t>
+              <a:t>13/01/2021</a:t>
             </a:fld>
             <a:endParaRPr lang="en-GB"/>
           </a:p>
@@ -2595,7 +2688,7 @@
           <a:p>
             <a:fld id="{F58C6CE7-BF83-4B1E-855D-EB8AAA078073}" type="datetimeFigureOut">
               <a:rPr lang="en-GB" smtClean="0"/>
-              <a:t>12/01/2021</a:t>
+              <a:t>13/01/2021</a:t>
             </a:fld>
             <a:endParaRPr lang="en-GB"/>
           </a:p>
@@ -2713,7 +2806,7 @@
           <a:p>
             <a:fld id="{F58C6CE7-BF83-4B1E-855D-EB8AAA078073}" type="datetimeFigureOut">
               <a:rPr lang="en-GB" smtClean="0"/>
-              <a:t>12/01/2021</a:t>
+              <a:t>13/01/2021</a:t>
             </a:fld>
             <a:endParaRPr lang="en-GB"/>
           </a:p>
@@ -2808,7 +2901,7 @@
           <a:p>
             <a:fld id="{F58C6CE7-BF83-4B1E-855D-EB8AAA078073}" type="datetimeFigureOut">
               <a:rPr lang="en-GB" smtClean="0"/>
-              <a:t>12/01/2021</a:t>
+              <a:t>13/01/2021</a:t>
             </a:fld>
             <a:endParaRPr lang="en-GB"/>
           </a:p>
@@ -3085,7 +3178,7 @@
           <a:p>
             <a:fld id="{F58C6CE7-BF83-4B1E-855D-EB8AAA078073}" type="datetimeFigureOut">
               <a:rPr lang="en-GB" smtClean="0"/>
-              <a:t>12/01/2021</a:t>
+              <a:t>13/01/2021</a:t>
             </a:fld>
             <a:endParaRPr lang="en-GB"/>
           </a:p>
@@ -3342,7 +3435,7 @@
           <a:p>
             <a:fld id="{F58C6CE7-BF83-4B1E-855D-EB8AAA078073}" type="datetimeFigureOut">
               <a:rPr lang="en-GB" smtClean="0"/>
-              <a:t>12/01/2021</a:t>
+              <a:t>13/01/2021</a:t>
             </a:fld>
             <a:endParaRPr lang="en-GB"/>
           </a:p>
@@ -3555,7 +3648,7 @@
           <a:p>
             <a:fld id="{F58C6CE7-BF83-4B1E-855D-EB8AAA078073}" type="datetimeFigureOut">
               <a:rPr lang="en-GB" smtClean="0"/>
-              <a:t>12/01/2021</a:t>
+              <a:t>13/01/2021</a:t>
             </a:fld>
             <a:endParaRPr lang="en-GB"/>
           </a:p>
@@ -4264,6 +4357,1086 @@
           <p:cNvPr id="2" name="Título 1">
             <a:extLst>
               <a:ext uri="{FF2B5EF4-FFF2-40B4-BE49-F238E27FC236}">
+                <a16:creationId xmlns:a16="http://schemas.microsoft.com/office/drawing/2014/main" id="{ACB7C790-2E9C-4B76-88EC-56FA8D07D236}"/>
+              </a:ext>
+            </a:extLst>
+          </p:cNvPr>
+          <p:cNvSpPr>
+            <a:spLocks noGrp="1"/>
+          </p:cNvSpPr>
+          <p:nvPr>
+            <p:ph type="title"/>
+          </p:nvPr>
+        </p:nvSpPr>
+        <p:spPr/>
+        <p:txBody>
+          <a:bodyPr/>
+          <a:lstStyle/>
+          <a:p>
+            <a:r>
+              <a:rPr lang="en-GB" dirty="0">
+                <a:solidFill>
+                  <a:schemeClr val="accent1"/>
+                </a:solidFill>
+              </a:rPr>
+              <a:t>Step 1) generate depth map (1/4)</a:t>
+            </a:r>
+          </a:p>
+        </p:txBody>
+      </p:sp>
+      <p:sp>
+        <p:nvSpPr>
+          <p:cNvPr id="3" name="Marcador de contenido 2">
+            <a:extLst>
+              <a:ext uri="{FF2B5EF4-FFF2-40B4-BE49-F238E27FC236}">
+                <a16:creationId xmlns:a16="http://schemas.microsoft.com/office/drawing/2014/main" id="{E82D6E48-B112-4914-958E-E5F86C248155}"/>
+              </a:ext>
+            </a:extLst>
+          </p:cNvPr>
+          <p:cNvSpPr>
+            <a:spLocks noGrp="1"/>
+          </p:cNvSpPr>
+          <p:nvPr>
+            <p:ph idx="1"/>
+          </p:nvPr>
+        </p:nvSpPr>
+        <p:spPr/>
+        <p:txBody>
+          <a:bodyPr>
+            <a:normAutofit/>
+          </a:bodyPr>
+          <a:lstStyle/>
+          <a:p>
+            <a:pPr>
+              <a:buClr>
+                <a:schemeClr val="accent1"/>
+              </a:buClr>
+            </a:pPr>
+            <a:r>
+              <a:rPr lang="en-GB" dirty="0"/>
+              <a:t>Render scene from light’s POV</a:t>
+            </a:r>
+          </a:p>
+          <a:p>
+            <a:pPr>
+              <a:buClr>
+                <a:schemeClr val="accent1"/>
+              </a:buClr>
+            </a:pPr>
+            <a:r>
+              <a:rPr lang="en-GB" dirty="0"/>
+              <a:t>Record depth values only (not colour)</a:t>
+            </a:r>
+          </a:p>
+          <a:p>
+            <a:pPr lvl="1">
+              <a:buClr>
+                <a:schemeClr val="accent1"/>
+              </a:buClr>
+              <a:buFont typeface="Wingdings" panose="05000000000000000000" pitchFamily="2" charset="2"/>
+              <a:buChar char="§"/>
+            </a:pPr>
+            <a:r>
+              <a:rPr lang="en-GB" dirty="0"/>
+              <a:t>Depth values stored in a depth buffer - This is our depth map!</a:t>
+            </a:r>
+          </a:p>
+          <a:p>
+            <a:pPr lvl="1">
+              <a:buClr>
+                <a:schemeClr val="accent1"/>
+              </a:buClr>
+              <a:buFont typeface="Wingdings" panose="05000000000000000000" pitchFamily="2" charset="2"/>
+              <a:buChar char="§"/>
+            </a:pPr>
+            <a:r>
+              <a:rPr lang="en-GB" dirty="0"/>
+              <a:t>So, depth map stores depth of the closest fragments as seen from the light’s perspective</a:t>
+            </a:r>
+          </a:p>
+          <a:p>
+            <a:pPr lvl="1">
+              <a:buClr>
+                <a:schemeClr val="accent1"/>
+              </a:buClr>
+              <a:buFont typeface="Wingdings" panose="05000000000000000000" pitchFamily="2" charset="2"/>
+              <a:buChar char="§"/>
+            </a:pPr>
+            <a:endParaRPr lang="en-GB" dirty="0"/>
+          </a:p>
+          <a:p>
+            <a:pPr marL="0" indent="0">
+              <a:buNone/>
+            </a:pPr>
+            <a:r>
+              <a:rPr lang="en-GB" sz="2400" dirty="0">
+                <a:solidFill>
+                  <a:schemeClr val="accent4"/>
+                </a:solidFill>
+              </a:rPr>
+              <a:t>TODO: </a:t>
+            </a:r>
+            <a:r>
+              <a:rPr lang="en-GB" sz="2400" dirty="0" err="1">
+                <a:solidFill>
+                  <a:schemeClr val="accent4"/>
+                </a:solidFill>
+              </a:rPr>
+              <a:t>imgs</a:t>
+            </a:r>
+            <a:r>
+              <a:rPr lang="en-GB" sz="2400" dirty="0">
+                <a:solidFill>
+                  <a:schemeClr val="accent4"/>
+                </a:solidFill>
+              </a:rPr>
+              <a:t>: </a:t>
+            </a:r>
+          </a:p>
+          <a:p>
+            <a:pPr marL="0" indent="0">
+              <a:buNone/>
+            </a:pPr>
+            <a:r>
+              <a:rPr lang="en-GB" sz="2400" dirty="0">
+                <a:solidFill>
+                  <a:schemeClr val="accent4"/>
+                </a:solidFill>
+              </a:rPr>
+              <a:t>	1. scene, indicate where light is coming from</a:t>
+            </a:r>
+          </a:p>
+          <a:p>
+            <a:pPr marL="0" indent="0">
+              <a:buNone/>
+            </a:pPr>
+            <a:r>
+              <a:rPr lang="en-GB" sz="2400" dirty="0">
+                <a:solidFill>
+                  <a:schemeClr val="accent4"/>
+                </a:solidFill>
+              </a:rPr>
+              <a:t>	2. scene as seen from light</a:t>
+            </a:r>
+          </a:p>
+          <a:p>
+            <a:pPr marL="0" indent="0">
+              <a:buNone/>
+            </a:pPr>
+            <a:r>
+              <a:rPr lang="en-GB" sz="2400" dirty="0">
+                <a:solidFill>
+                  <a:schemeClr val="accent4"/>
+                </a:solidFill>
+              </a:rPr>
+              <a:t>	3. depth values of scene as seen from light (i.e. shadow map)</a:t>
+            </a:r>
+          </a:p>
+          <a:p>
+            <a:pPr marL="0" indent="0">
+              <a:buNone/>
+            </a:pPr>
+            <a:endParaRPr lang="en-GB" dirty="0"/>
+          </a:p>
+        </p:txBody>
+      </p:sp>
+    </p:spTree>
+    <p:extLst>
+      <p:ext uri="{BB962C8B-B14F-4D97-AF65-F5344CB8AC3E}">
+        <p14:creationId xmlns:p14="http://schemas.microsoft.com/office/powerpoint/2010/main" val="1510555823"/>
+      </p:ext>
+    </p:extLst>
+  </p:cSld>
+  <p:clrMapOvr>
+    <a:masterClrMapping/>
+  </p:clrMapOvr>
+</p:sld>
+</file>
+
+<file path=ppt/slides/slide11.xml><?xml version="1.0" encoding="utf-8"?>
+<p:sld xmlns:a="http://schemas.openxmlformats.org/drawingml/2006/main" xmlns:r="http://schemas.openxmlformats.org/officeDocument/2006/relationships" xmlns:p="http://schemas.openxmlformats.org/presentationml/2006/main">
+  <p:cSld>
+    <p:spTree>
+      <p:nvGrpSpPr>
+        <p:cNvPr id="1" name=""/>
+        <p:cNvGrpSpPr/>
+        <p:nvPr/>
+      </p:nvGrpSpPr>
+      <p:grpSpPr>
+        <a:xfrm>
+          <a:off x="0" y="0"/>
+          <a:ext cx="0" cy="0"/>
+          <a:chOff x="0" y="0"/>
+          <a:chExt cx="0" cy="0"/>
+        </a:xfrm>
+      </p:grpSpPr>
+      <p:sp>
+        <p:nvSpPr>
+          <p:cNvPr id="2" name="Título 1">
+            <a:extLst>
+              <a:ext uri="{FF2B5EF4-FFF2-40B4-BE49-F238E27FC236}">
+                <a16:creationId xmlns:a16="http://schemas.microsoft.com/office/drawing/2014/main" id="{ACB7C790-2E9C-4B76-88EC-56FA8D07D236}"/>
+              </a:ext>
+            </a:extLst>
+          </p:cNvPr>
+          <p:cNvSpPr>
+            <a:spLocks noGrp="1"/>
+          </p:cNvSpPr>
+          <p:nvPr>
+            <p:ph type="title"/>
+          </p:nvPr>
+        </p:nvSpPr>
+        <p:spPr/>
+        <p:txBody>
+          <a:bodyPr/>
+          <a:lstStyle/>
+          <a:p>
+            <a:r>
+              <a:rPr lang="en-GB" dirty="0">
+                <a:solidFill>
+                  <a:schemeClr val="accent1"/>
+                </a:solidFill>
+              </a:rPr>
+              <a:t>Step 1) generate depth map (2/4)</a:t>
+            </a:r>
+          </a:p>
+        </p:txBody>
+      </p:sp>
+      <p:sp>
+        <p:nvSpPr>
+          <p:cNvPr id="3" name="Marcador de contenido 2">
+            <a:extLst>
+              <a:ext uri="{FF2B5EF4-FFF2-40B4-BE49-F238E27FC236}">
+                <a16:creationId xmlns:a16="http://schemas.microsoft.com/office/drawing/2014/main" id="{E82D6E48-B112-4914-958E-E5F86C248155}"/>
+              </a:ext>
+            </a:extLst>
+          </p:cNvPr>
+          <p:cNvSpPr>
+            <a:spLocks noGrp="1"/>
+          </p:cNvSpPr>
+          <p:nvPr>
+            <p:ph idx="1"/>
+          </p:nvPr>
+        </p:nvSpPr>
+        <p:spPr/>
+        <p:txBody>
+          <a:bodyPr/>
+          <a:lstStyle/>
+          <a:p>
+            <a:pPr marL="914400" lvl="1" indent="-457200">
+              <a:buClr>
+                <a:schemeClr val="accent1"/>
+              </a:buClr>
+              <a:buFont typeface="+mj-lt"/>
+              <a:buAutoNum type="arabicPeriod"/>
+            </a:pPr>
+            <a:r>
+              <a:rPr lang="en-GB" dirty="0"/>
+              <a:t>Create framebuffer (FBO) to which to render depth map.</a:t>
+            </a:r>
+          </a:p>
+          <a:p>
+            <a:pPr marL="457200" lvl="1" indent="0">
+              <a:buClr>
+                <a:schemeClr val="accent1"/>
+              </a:buClr>
+              <a:buNone/>
+            </a:pPr>
+            <a:r>
+              <a:rPr lang="en-GB" dirty="0"/>
+              <a:t>	</a:t>
+            </a:r>
+            <a:r>
+              <a:rPr lang="en-GB" dirty="0">
+                <a:solidFill>
+                  <a:schemeClr val="accent4"/>
+                </a:solidFill>
+              </a:rPr>
+              <a:t>TODO: [code snippet] create FBO</a:t>
+            </a:r>
+            <a:endParaRPr lang="en-GB" dirty="0"/>
+          </a:p>
+          <a:p>
+            <a:pPr marL="1428750" lvl="2" indent="-514350">
+              <a:buClr>
+                <a:schemeClr val="accent1"/>
+              </a:buClr>
+              <a:buFont typeface="+mj-lt"/>
+              <a:buAutoNum type="romanLcPeriod"/>
+            </a:pPr>
+            <a:r>
+              <a:rPr lang="en-GB" dirty="0"/>
+              <a:t>Create 2D texture to use as FBO’s depth buffer</a:t>
+            </a:r>
+          </a:p>
+          <a:p>
+            <a:pPr marL="914400" lvl="2" indent="0">
+              <a:buClr>
+                <a:schemeClr val="accent1"/>
+              </a:buClr>
+              <a:buNone/>
+            </a:pPr>
+            <a:r>
+              <a:rPr lang="en-GB" dirty="0">
+                <a:solidFill>
+                  <a:schemeClr val="accent4"/>
+                </a:solidFill>
+              </a:rPr>
+              <a:t>TODO: [code snippet] create 2D </a:t>
+            </a:r>
+            <a:r>
+              <a:rPr lang="en-GB" dirty="0" err="1">
+                <a:solidFill>
+                  <a:schemeClr val="accent4"/>
+                </a:solidFill>
+              </a:rPr>
+              <a:t>tex</a:t>
+            </a:r>
+            <a:r>
+              <a:rPr lang="en-GB" dirty="0">
+                <a:solidFill>
+                  <a:schemeClr val="accent4"/>
+                </a:solidFill>
+              </a:rPr>
+              <a:t> &amp; attach it as FBO’s depth buffer component</a:t>
+            </a:r>
+            <a:endParaRPr lang="en-GB" dirty="0"/>
+          </a:p>
+          <a:p>
+            <a:pPr marL="1428750" lvl="2" indent="-514350">
+              <a:buClr>
+                <a:schemeClr val="accent1"/>
+              </a:buClr>
+              <a:buFont typeface="+mj-lt"/>
+              <a:buAutoNum type="romanLcPeriod" startAt="2"/>
+            </a:pPr>
+            <a:r>
+              <a:rPr lang="en-GB" dirty="0"/>
+              <a:t>Complete FBO set-up (no colour data)</a:t>
+            </a:r>
+          </a:p>
+          <a:p>
+            <a:pPr marL="914400" lvl="2" indent="0">
+              <a:buClr>
+                <a:schemeClr val="accent1"/>
+              </a:buClr>
+              <a:buNone/>
+            </a:pPr>
+            <a:r>
+              <a:rPr lang="en-GB" dirty="0">
+                <a:solidFill>
+                  <a:schemeClr val="accent4"/>
+                </a:solidFill>
+              </a:rPr>
+              <a:t>TODO: [code snippet] tell OpenGL that won’t render colour data </a:t>
+            </a:r>
+            <a:endParaRPr lang="en-GB" dirty="0"/>
+          </a:p>
+          <a:p>
+            <a:endParaRPr lang="en-GB" dirty="0"/>
+          </a:p>
+        </p:txBody>
+      </p:sp>
+    </p:spTree>
+    <p:extLst>
+      <p:ext uri="{BB962C8B-B14F-4D97-AF65-F5344CB8AC3E}">
+        <p14:creationId xmlns:p14="http://schemas.microsoft.com/office/powerpoint/2010/main" val="1837007626"/>
+      </p:ext>
+    </p:extLst>
+  </p:cSld>
+  <p:clrMapOvr>
+    <a:masterClrMapping/>
+  </p:clrMapOvr>
+</p:sld>
+</file>
+
+<file path=ppt/slides/slide12.xml><?xml version="1.0" encoding="utf-8"?>
+<p:sld xmlns:a="http://schemas.openxmlformats.org/drawingml/2006/main" xmlns:r="http://schemas.openxmlformats.org/officeDocument/2006/relationships" xmlns:p="http://schemas.openxmlformats.org/presentationml/2006/main">
+  <p:cSld>
+    <p:spTree>
+      <p:nvGrpSpPr>
+        <p:cNvPr id="1" name=""/>
+        <p:cNvGrpSpPr/>
+        <p:nvPr/>
+      </p:nvGrpSpPr>
+      <p:grpSpPr>
+        <a:xfrm>
+          <a:off x="0" y="0"/>
+          <a:ext cx="0" cy="0"/>
+          <a:chOff x="0" y="0"/>
+          <a:chExt cx="0" cy="0"/>
+        </a:xfrm>
+      </p:grpSpPr>
+      <p:sp>
+        <p:nvSpPr>
+          <p:cNvPr id="2" name="Título 1">
+            <a:extLst>
+              <a:ext uri="{FF2B5EF4-FFF2-40B4-BE49-F238E27FC236}">
+                <a16:creationId xmlns:a16="http://schemas.microsoft.com/office/drawing/2014/main" id="{ACB7C790-2E9C-4B76-88EC-56FA8D07D236}"/>
+              </a:ext>
+            </a:extLst>
+          </p:cNvPr>
+          <p:cNvSpPr>
+            <a:spLocks noGrp="1"/>
+          </p:cNvSpPr>
+          <p:nvPr>
+            <p:ph type="title"/>
+          </p:nvPr>
+        </p:nvSpPr>
+        <p:spPr/>
+        <p:txBody>
+          <a:bodyPr/>
+          <a:lstStyle/>
+          <a:p>
+            <a:r>
+              <a:rPr lang="en-GB" dirty="0">
+                <a:solidFill>
+                  <a:schemeClr val="accent1"/>
+                </a:solidFill>
+              </a:rPr>
+              <a:t>Step 1) generate depth map (3/4)</a:t>
+            </a:r>
+          </a:p>
+        </p:txBody>
+      </p:sp>
+      <p:sp>
+        <p:nvSpPr>
+          <p:cNvPr id="3" name="Marcador de contenido 2">
+            <a:extLst>
+              <a:ext uri="{FF2B5EF4-FFF2-40B4-BE49-F238E27FC236}">
+                <a16:creationId xmlns:a16="http://schemas.microsoft.com/office/drawing/2014/main" id="{E82D6E48-B112-4914-958E-E5F86C248155}"/>
+              </a:ext>
+            </a:extLst>
+          </p:cNvPr>
+          <p:cNvSpPr>
+            <a:spLocks noGrp="1"/>
+          </p:cNvSpPr>
+          <p:nvPr>
+            <p:ph idx="1"/>
+          </p:nvPr>
+        </p:nvSpPr>
+        <p:spPr/>
+        <p:txBody>
+          <a:bodyPr/>
+          <a:lstStyle/>
+          <a:p>
+            <a:pPr marL="914400" lvl="1" indent="-457200">
+              <a:buClr>
+                <a:schemeClr val="accent1"/>
+              </a:buClr>
+              <a:buFont typeface="+mj-lt"/>
+              <a:buAutoNum type="arabicPeriod" startAt="2"/>
+            </a:pPr>
+            <a:r>
+              <a:rPr lang="en-GB" dirty="0"/>
+              <a:t>Transform scene to light space</a:t>
+            </a:r>
+          </a:p>
+          <a:p>
+            <a:pPr marL="457200" lvl="1" indent="0">
+              <a:buClr>
+                <a:schemeClr val="accent1"/>
+              </a:buClr>
+              <a:buNone/>
+            </a:pPr>
+            <a:r>
+              <a:rPr lang="en-GB" dirty="0"/>
+              <a:t>	</a:t>
+            </a:r>
+            <a:r>
+              <a:rPr lang="en-GB" dirty="0">
+                <a:solidFill>
+                  <a:schemeClr val="accent4"/>
+                </a:solidFill>
+              </a:rPr>
+              <a:t> </a:t>
+            </a:r>
+            <a:r>
+              <a:rPr lang="en-GB" sz="2000" dirty="0">
+                <a:solidFill>
+                  <a:schemeClr val="accent4"/>
+                </a:solidFill>
+              </a:rPr>
+              <a:t>TODO: diagram of </a:t>
+            </a:r>
+            <a:r>
+              <a:rPr lang="en-GB" sz="2000" dirty="0" err="1">
+                <a:solidFill>
+                  <a:schemeClr val="accent4"/>
+                </a:solidFill>
+              </a:rPr>
+              <a:t>transf</a:t>
+            </a:r>
+            <a:r>
+              <a:rPr lang="en-GB" sz="2000" dirty="0">
+                <a:solidFill>
+                  <a:schemeClr val="accent4"/>
+                </a:solidFill>
+              </a:rPr>
+              <a:t> process from local space (</a:t>
+            </a:r>
+            <a:r>
+              <a:rPr lang="en-GB" sz="2000" dirty="0" err="1">
+                <a:solidFill>
+                  <a:schemeClr val="accent4"/>
+                </a:solidFill>
+              </a:rPr>
+              <a:t>obj</a:t>
+            </a:r>
+            <a:r>
+              <a:rPr lang="en-GB" sz="2000" dirty="0">
+                <a:solidFill>
+                  <a:schemeClr val="accent4"/>
+                </a:solidFill>
+              </a:rPr>
+              <a:t> </a:t>
+            </a:r>
+            <a:r>
+              <a:rPr lang="en-GB" sz="2000" dirty="0" err="1">
+                <a:solidFill>
+                  <a:schemeClr val="accent4"/>
+                </a:solidFill>
+              </a:rPr>
+              <a:t>coord</a:t>
+            </a:r>
+            <a:r>
+              <a:rPr lang="en-GB" sz="2000" dirty="0">
+                <a:solidFill>
+                  <a:schemeClr val="accent4"/>
+                </a:solidFill>
+              </a:rPr>
+              <a:t>) to light space</a:t>
+            </a:r>
+            <a:endParaRPr lang="en-GB" sz="2000" dirty="0"/>
+          </a:p>
+          <a:p>
+            <a:pPr lvl="2">
+              <a:buClr>
+                <a:schemeClr val="accent1"/>
+              </a:buClr>
+            </a:pPr>
+            <a:r>
+              <a:rPr lang="en-GB" dirty="0"/>
+              <a:t>Use view &amp; projection matrices specific to the light source</a:t>
+            </a:r>
+          </a:p>
+          <a:p>
+            <a:pPr lvl="2">
+              <a:buClr>
+                <a:schemeClr val="accent1"/>
+              </a:buClr>
+            </a:pPr>
+            <a:r>
+              <a:rPr lang="en-GB" dirty="0"/>
+              <a:t>Multiply them to calculate an MVP matrix to use in the vertex shader</a:t>
+            </a:r>
+          </a:p>
+          <a:p>
+            <a:pPr marL="914400" lvl="2" indent="0">
+              <a:buClr>
+                <a:schemeClr val="accent1"/>
+              </a:buClr>
+              <a:buNone/>
+            </a:pPr>
+            <a:r>
+              <a:rPr lang="en-GB" dirty="0">
+                <a:solidFill>
+                  <a:schemeClr val="accent4"/>
+                </a:solidFill>
+              </a:rPr>
+              <a:t>TODO: [code snippet] code for creating view &amp; </a:t>
+            </a:r>
+            <a:r>
+              <a:rPr lang="en-GB" dirty="0" err="1">
+                <a:solidFill>
+                  <a:schemeClr val="accent4"/>
+                </a:solidFill>
+              </a:rPr>
+              <a:t>proj</a:t>
+            </a:r>
+            <a:r>
+              <a:rPr lang="en-GB" dirty="0">
+                <a:solidFill>
+                  <a:schemeClr val="accent4"/>
+                </a:solidFill>
+              </a:rPr>
+              <a:t> matrices</a:t>
+            </a:r>
+            <a:endParaRPr lang="en-GB" dirty="0"/>
+          </a:p>
+          <a:p>
+            <a:pPr marL="0" indent="0">
+              <a:buNone/>
+            </a:pPr>
+            <a:endParaRPr lang="en-GB" dirty="0"/>
+          </a:p>
+        </p:txBody>
+      </p:sp>
+    </p:spTree>
+    <p:extLst>
+      <p:ext uri="{BB962C8B-B14F-4D97-AF65-F5344CB8AC3E}">
+        <p14:creationId xmlns:p14="http://schemas.microsoft.com/office/powerpoint/2010/main" val="4253474431"/>
+      </p:ext>
+    </p:extLst>
+  </p:cSld>
+  <p:clrMapOvr>
+    <a:masterClrMapping/>
+  </p:clrMapOvr>
+</p:sld>
+</file>
+
+<file path=ppt/slides/slide13.xml><?xml version="1.0" encoding="utf-8"?>
+<p:sld xmlns:a="http://schemas.openxmlformats.org/drawingml/2006/main" xmlns:r="http://schemas.openxmlformats.org/officeDocument/2006/relationships" xmlns:p="http://schemas.openxmlformats.org/presentationml/2006/main">
+  <p:cSld>
+    <p:spTree>
+      <p:nvGrpSpPr>
+        <p:cNvPr id="1" name=""/>
+        <p:cNvGrpSpPr/>
+        <p:nvPr/>
+      </p:nvGrpSpPr>
+      <p:grpSpPr>
+        <a:xfrm>
+          <a:off x="0" y="0"/>
+          <a:ext cx="0" cy="0"/>
+          <a:chOff x="0" y="0"/>
+          <a:chExt cx="0" cy="0"/>
+        </a:xfrm>
+      </p:grpSpPr>
+      <p:sp>
+        <p:nvSpPr>
+          <p:cNvPr id="2" name="Título 1">
+            <a:extLst>
+              <a:ext uri="{FF2B5EF4-FFF2-40B4-BE49-F238E27FC236}">
+                <a16:creationId xmlns:a16="http://schemas.microsoft.com/office/drawing/2014/main" id="{ACB7C790-2E9C-4B76-88EC-56FA8D07D236}"/>
+              </a:ext>
+            </a:extLst>
+          </p:cNvPr>
+          <p:cNvSpPr>
+            <a:spLocks noGrp="1"/>
+          </p:cNvSpPr>
+          <p:nvPr>
+            <p:ph type="title"/>
+          </p:nvPr>
+        </p:nvSpPr>
+        <p:spPr/>
+        <p:txBody>
+          <a:bodyPr/>
+          <a:lstStyle/>
+          <a:p>
+            <a:r>
+              <a:rPr lang="en-GB" dirty="0">
+                <a:solidFill>
+                  <a:schemeClr val="accent1"/>
+                </a:solidFill>
+              </a:rPr>
+              <a:t>Step 1) generate depth map (4/4)</a:t>
+            </a:r>
+          </a:p>
+        </p:txBody>
+      </p:sp>
+      <p:sp>
+        <p:nvSpPr>
+          <p:cNvPr id="3" name="Marcador de contenido 2">
+            <a:extLst>
+              <a:ext uri="{FF2B5EF4-FFF2-40B4-BE49-F238E27FC236}">
+                <a16:creationId xmlns:a16="http://schemas.microsoft.com/office/drawing/2014/main" id="{E82D6E48-B112-4914-958E-E5F86C248155}"/>
+              </a:ext>
+            </a:extLst>
+          </p:cNvPr>
+          <p:cNvSpPr>
+            <a:spLocks noGrp="1"/>
+          </p:cNvSpPr>
+          <p:nvPr>
+            <p:ph idx="1"/>
+          </p:nvPr>
+        </p:nvSpPr>
+        <p:spPr/>
+        <p:txBody>
+          <a:bodyPr/>
+          <a:lstStyle/>
+          <a:p>
+            <a:pPr marL="914400" lvl="1" indent="-457200">
+              <a:buClr>
+                <a:schemeClr val="accent1"/>
+              </a:buClr>
+              <a:buFont typeface="+mj-lt"/>
+              <a:buAutoNum type="arabicPeriod" startAt="3"/>
+            </a:pPr>
+            <a:r>
+              <a:rPr lang="en-GB" dirty="0"/>
+              <a:t>Render to depth map</a:t>
+            </a:r>
+            <a:endParaRPr lang="en-GB" sz="2000" dirty="0"/>
+          </a:p>
+          <a:p>
+            <a:pPr lvl="2">
+              <a:buClr>
+                <a:schemeClr val="accent1"/>
+              </a:buClr>
+            </a:pPr>
+            <a:r>
+              <a:rPr lang="en-GB" dirty="0"/>
+              <a:t>Vertex shader – transforms vertices to light space using calculated matrix</a:t>
+            </a:r>
+          </a:p>
+          <a:p>
+            <a:pPr marL="914400" lvl="2" indent="0">
+              <a:buClr>
+                <a:schemeClr val="accent1"/>
+              </a:buClr>
+              <a:buNone/>
+            </a:pPr>
+            <a:r>
+              <a:rPr lang="en-GB" dirty="0">
+                <a:solidFill>
+                  <a:schemeClr val="accent4"/>
+                </a:solidFill>
+              </a:rPr>
+              <a:t>TODO: [code snippet] vertex shader?</a:t>
+            </a:r>
+            <a:endParaRPr lang="en-GB" dirty="0"/>
+          </a:p>
+          <a:p>
+            <a:pPr lvl="2">
+              <a:buClr>
+                <a:schemeClr val="accent1"/>
+              </a:buClr>
+            </a:pPr>
+            <a:endParaRPr lang="en-GB" dirty="0"/>
+          </a:p>
+          <a:p>
+            <a:pPr lvl="2">
+              <a:buClr>
+                <a:schemeClr val="accent1"/>
+              </a:buClr>
+            </a:pPr>
+            <a:r>
+              <a:rPr lang="en-GB" dirty="0"/>
+              <a:t>Fragment shader – empty</a:t>
+            </a:r>
+          </a:p>
+          <a:p>
+            <a:pPr marL="914400" lvl="2" indent="0">
+              <a:buClr>
+                <a:schemeClr val="accent1"/>
+              </a:buClr>
+              <a:buNone/>
+            </a:pPr>
+            <a:r>
+              <a:rPr lang="en-GB" dirty="0">
+                <a:solidFill>
+                  <a:schemeClr val="accent4"/>
+                </a:solidFill>
+              </a:rPr>
+              <a:t>TODO: [code snippet] frag shader</a:t>
+            </a:r>
+            <a:endParaRPr lang="en-GB" dirty="0"/>
+          </a:p>
+          <a:p>
+            <a:pPr marL="0" indent="0">
+              <a:buNone/>
+            </a:pPr>
+            <a:endParaRPr lang="en-GB" dirty="0"/>
+          </a:p>
+        </p:txBody>
+      </p:sp>
+    </p:spTree>
+    <p:extLst>
+      <p:ext uri="{BB962C8B-B14F-4D97-AF65-F5344CB8AC3E}">
+        <p14:creationId xmlns:p14="http://schemas.microsoft.com/office/powerpoint/2010/main" val="646798937"/>
+      </p:ext>
+    </p:extLst>
+  </p:cSld>
+  <p:clrMapOvr>
+    <a:masterClrMapping/>
+  </p:clrMapOvr>
+</p:sld>
+</file>
+
+<file path=ppt/slides/slide14.xml><?xml version="1.0" encoding="utf-8"?>
+<p:sld xmlns:a="http://schemas.openxmlformats.org/drawingml/2006/main" xmlns:r="http://schemas.openxmlformats.org/officeDocument/2006/relationships" xmlns:p="http://schemas.openxmlformats.org/presentationml/2006/main">
+  <p:cSld>
+    <p:spTree>
+      <p:nvGrpSpPr>
+        <p:cNvPr id="1" name=""/>
+        <p:cNvGrpSpPr/>
+        <p:nvPr/>
+      </p:nvGrpSpPr>
+      <p:grpSpPr>
+        <a:xfrm>
+          <a:off x="0" y="0"/>
+          <a:ext cx="0" cy="0"/>
+          <a:chOff x="0" y="0"/>
+          <a:chExt cx="0" cy="0"/>
+        </a:xfrm>
+      </p:grpSpPr>
+      <p:sp>
+        <p:nvSpPr>
+          <p:cNvPr id="2" name="Título 1">
+            <a:extLst>
+              <a:ext uri="{FF2B5EF4-FFF2-40B4-BE49-F238E27FC236}">
+                <a16:creationId xmlns:a16="http://schemas.microsoft.com/office/drawing/2014/main" id="{B821BF0C-12EB-487F-87F9-7201A9BBFF36}"/>
+              </a:ext>
+            </a:extLst>
+          </p:cNvPr>
+          <p:cNvSpPr>
+            <a:spLocks noGrp="1"/>
+          </p:cNvSpPr>
+          <p:nvPr>
+            <p:ph type="title"/>
+          </p:nvPr>
+        </p:nvSpPr>
+        <p:spPr/>
+        <p:txBody>
+          <a:bodyPr/>
+          <a:lstStyle/>
+          <a:p>
+            <a:r>
+              <a:rPr lang="en-GB" dirty="0">
+                <a:solidFill>
+                  <a:schemeClr val="accent1"/>
+                </a:solidFill>
+              </a:rPr>
+              <a:t>Method</a:t>
+            </a:r>
+            <a:r>
+              <a:rPr lang="en-GB" sz="2400" dirty="0">
+                <a:solidFill>
+                  <a:schemeClr val="accent1"/>
+                </a:solidFill>
+              </a:rPr>
+              <a:t> (directional lights)</a:t>
+            </a:r>
+            <a:endParaRPr lang="en-GB" dirty="0">
+              <a:solidFill>
+                <a:schemeClr val="accent1"/>
+              </a:solidFill>
+            </a:endParaRPr>
+          </a:p>
+        </p:txBody>
+      </p:sp>
+      <p:sp>
+        <p:nvSpPr>
+          <p:cNvPr id="3" name="Marcador de contenido 2">
+            <a:extLst>
+              <a:ext uri="{FF2B5EF4-FFF2-40B4-BE49-F238E27FC236}">
+                <a16:creationId xmlns:a16="http://schemas.microsoft.com/office/drawing/2014/main" id="{FAF98818-5F5B-43A5-BAC3-BB889C63F6F1}"/>
+              </a:ext>
+            </a:extLst>
+          </p:cNvPr>
+          <p:cNvSpPr>
+            <a:spLocks noGrp="1"/>
+          </p:cNvSpPr>
+          <p:nvPr>
+            <p:ph idx="1"/>
+          </p:nvPr>
+        </p:nvSpPr>
+        <p:spPr/>
+        <p:txBody>
+          <a:bodyPr/>
+          <a:lstStyle/>
+          <a:p>
+            <a:pPr>
+              <a:buClr>
+                <a:schemeClr val="accent1"/>
+              </a:buClr>
+            </a:pPr>
+            <a:r>
+              <a:rPr lang="en-GB" dirty="0">
+                <a:solidFill>
+                  <a:schemeClr val="tx2"/>
+                </a:solidFill>
+              </a:rPr>
+              <a:t>2 pass algorithm:</a:t>
+            </a:r>
+          </a:p>
+          <a:p>
+            <a:pPr marL="914400" lvl="1" indent="-457200">
+              <a:buClr>
+                <a:schemeClr val="accent1"/>
+              </a:buClr>
+              <a:buFont typeface="+mj-lt"/>
+              <a:buAutoNum type="arabicPeriod"/>
+            </a:pPr>
+            <a:r>
+              <a:rPr lang="en-GB" dirty="0">
+                <a:solidFill>
+                  <a:schemeClr val="tx2"/>
+                </a:solidFill>
+              </a:rPr>
+              <a:t>Generate Depth Map by rendering scene from light’s POV</a:t>
+            </a:r>
+          </a:p>
+          <a:p>
+            <a:pPr marL="914400" lvl="1" indent="-457200">
+              <a:buClr>
+                <a:schemeClr val="accent1"/>
+              </a:buClr>
+              <a:buFont typeface="+mj-lt"/>
+              <a:buAutoNum type="arabicPeriod"/>
+            </a:pPr>
+            <a:r>
+              <a:rPr lang="en-GB" dirty="0"/>
+              <a:t>Render scene from camera’s POV…</a:t>
+            </a:r>
+          </a:p>
+          <a:p>
+            <a:pPr marL="457200" lvl="1" indent="0">
+              <a:buClr>
+                <a:schemeClr val="accent1"/>
+              </a:buClr>
+              <a:buNone/>
+            </a:pPr>
+            <a:r>
+              <a:rPr lang="en-GB" dirty="0"/>
+              <a:t>		…using generated Depth Map to determine if fragment is lit </a:t>
+            </a:r>
+          </a:p>
+          <a:p>
+            <a:pPr marL="457200" lvl="1" indent="0">
+              <a:buClr>
+                <a:schemeClr val="accent1"/>
+              </a:buClr>
+              <a:buNone/>
+            </a:pPr>
+            <a:r>
+              <a:rPr lang="en-GB" dirty="0"/>
+              <a:t>		    or in shadow</a:t>
+            </a:r>
+          </a:p>
+          <a:p>
+            <a:pPr marL="0" indent="0">
+              <a:buClr>
+                <a:schemeClr val="accent1"/>
+              </a:buClr>
+              <a:buNone/>
+            </a:pPr>
+            <a:endParaRPr lang="en-GB" dirty="0"/>
+          </a:p>
+        </p:txBody>
+      </p:sp>
+    </p:spTree>
+    <p:extLst>
+      <p:ext uri="{BB962C8B-B14F-4D97-AF65-F5344CB8AC3E}">
+        <p14:creationId xmlns:p14="http://schemas.microsoft.com/office/powerpoint/2010/main" val="1859927173"/>
+      </p:ext>
+    </p:extLst>
+  </p:cSld>
+  <p:clrMapOvr>
+    <a:masterClrMapping/>
+  </p:clrMapOvr>
+</p:sld>
+</file>
+
+<file path=ppt/slides/slide15.xml><?xml version="1.0" encoding="utf-8"?>
+<p:sld xmlns:a="http://schemas.openxmlformats.org/drawingml/2006/main" xmlns:r="http://schemas.openxmlformats.org/officeDocument/2006/relationships" xmlns:p="http://schemas.openxmlformats.org/presentationml/2006/main">
+  <p:cSld>
+    <p:spTree>
+      <p:nvGrpSpPr>
+        <p:cNvPr id="1" name=""/>
+        <p:cNvGrpSpPr/>
+        <p:nvPr/>
+      </p:nvGrpSpPr>
+      <p:grpSpPr>
+        <a:xfrm>
+          <a:off x="0" y="0"/>
+          <a:ext cx="0" cy="0"/>
+          <a:chOff x="0" y="0"/>
+          <a:chExt cx="0" cy="0"/>
+        </a:xfrm>
+      </p:grpSpPr>
+      <p:sp>
+        <p:nvSpPr>
+          <p:cNvPr id="2" name="Título 1">
+            <a:extLst>
+              <a:ext uri="{FF2B5EF4-FFF2-40B4-BE49-F238E27FC236}">
+                <a16:creationId xmlns:a16="http://schemas.microsoft.com/office/drawing/2014/main" id="{915E278F-12D6-4B47-8D6E-BC7AC686A418}"/>
+              </a:ext>
+            </a:extLst>
+          </p:cNvPr>
+          <p:cNvSpPr>
+            <a:spLocks noGrp="1"/>
+          </p:cNvSpPr>
+          <p:nvPr>
+            <p:ph type="title"/>
+          </p:nvPr>
+        </p:nvSpPr>
+        <p:spPr/>
+        <p:txBody>
+          <a:bodyPr/>
+          <a:lstStyle/>
+          <a:p>
+            <a:r>
+              <a:rPr lang="en-GB" dirty="0">
+                <a:solidFill>
+                  <a:schemeClr val="accent1"/>
+                </a:solidFill>
+              </a:rPr>
+              <a:t>Artefacts</a:t>
+            </a:r>
+          </a:p>
+        </p:txBody>
+      </p:sp>
+      <p:sp>
+        <p:nvSpPr>
+          <p:cNvPr id="3" name="Marcador de contenido 2">
+            <a:extLst>
+              <a:ext uri="{FF2B5EF4-FFF2-40B4-BE49-F238E27FC236}">
+                <a16:creationId xmlns:a16="http://schemas.microsoft.com/office/drawing/2014/main" id="{F3C30E42-5474-45A7-83AD-F61C1E804525}"/>
+              </a:ext>
+            </a:extLst>
+          </p:cNvPr>
+          <p:cNvSpPr>
+            <a:spLocks noGrp="1"/>
+          </p:cNvSpPr>
+          <p:nvPr>
+            <p:ph idx="1"/>
+          </p:nvPr>
+        </p:nvSpPr>
+        <p:spPr/>
+        <p:txBody>
+          <a:bodyPr/>
+          <a:lstStyle/>
+          <a:p>
+            <a:endParaRPr lang="en-GB" dirty="0"/>
+          </a:p>
+        </p:txBody>
+      </p:sp>
+    </p:spTree>
+    <p:extLst>
+      <p:ext uri="{BB962C8B-B14F-4D97-AF65-F5344CB8AC3E}">
+        <p14:creationId xmlns:p14="http://schemas.microsoft.com/office/powerpoint/2010/main" val="4135688092"/>
+      </p:ext>
+    </p:extLst>
+  </p:cSld>
+  <p:clrMapOvr>
+    <a:masterClrMapping/>
+  </p:clrMapOvr>
+</p:sld>
+</file>
+
+<file path=ppt/slides/slide16.xml><?xml version="1.0" encoding="utf-8"?>
+<p:sld xmlns:a="http://schemas.openxmlformats.org/drawingml/2006/main" xmlns:r="http://schemas.openxmlformats.org/officeDocument/2006/relationships" xmlns:p="http://schemas.openxmlformats.org/presentationml/2006/main">
+  <p:cSld>
+    <p:spTree>
+      <p:nvGrpSpPr>
+        <p:cNvPr id="1" name=""/>
+        <p:cNvGrpSpPr/>
+        <p:nvPr/>
+      </p:nvGrpSpPr>
+      <p:grpSpPr>
+        <a:xfrm>
+          <a:off x="0" y="0"/>
+          <a:ext cx="0" cy="0"/>
+          <a:chOff x="0" y="0"/>
+          <a:chExt cx="0" cy="0"/>
+        </a:xfrm>
+      </p:grpSpPr>
+      <p:sp>
+        <p:nvSpPr>
+          <p:cNvPr id="2" name="Título 1">
+            <a:extLst>
+              <a:ext uri="{FF2B5EF4-FFF2-40B4-BE49-F238E27FC236}">
                 <a16:creationId xmlns:a16="http://schemas.microsoft.com/office/drawing/2014/main" id="{731BCFAA-58B0-4C24-B9E2-D7ABF3F599E5}"/>
               </a:ext>
             </a:extLst>
@@ -4329,7 +5502,7 @@
 </p:sld>
 </file>
 
-<file path=ppt/slides/slide11.xml><?xml version="1.0" encoding="utf-8"?>
+<file path=ppt/slides/slide17.xml><?xml version="1.0" encoding="utf-8"?>
 <p:sld xmlns:a="http://schemas.openxmlformats.org/drawingml/2006/main" xmlns:r="http://schemas.openxmlformats.org/officeDocument/2006/relationships" xmlns:p="http://schemas.openxmlformats.org/presentationml/2006/main">
   <p:cSld>
     <p:spTree>
@@ -7626,6 +8799,73 @@
           <a:bodyPr/>
           <a:lstStyle/>
           <a:p>
+            <a:pPr>
+              <a:buClr>
+                <a:schemeClr val="accent1"/>
+              </a:buClr>
+            </a:pPr>
+            <a:r>
+              <a:rPr lang="en-GB" dirty="0"/>
+              <a:t>2 pass algorithm:</a:t>
+            </a:r>
+          </a:p>
+          <a:p>
+            <a:pPr marL="914400" lvl="1" indent="-457200">
+              <a:buClr>
+                <a:schemeClr val="accent1"/>
+              </a:buClr>
+              <a:buFont typeface="+mj-lt"/>
+              <a:buAutoNum type="arabicPeriod"/>
+            </a:pPr>
+            <a:r>
+              <a:rPr lang="en-GB" dirty="0"/>
+              <a:t>Generate Depth Map by rendering scene from light’s POV</a:t>
+            </a:r>
+          </a:p>
+          <a:p>
+            <a:pPr marL="914400" lvl="1" indent="-457200">
+              <a:buClr>
+                <a:schemeClr val="accent1"/>
+              </a:buClr>
+              <a:buFont typeface="+mj-lt"/>
+              <a:buAutoNum type="arabicPeriod"/>
+            </a:pPr>
+            <a:r>
+              <a:rPr lang="en-GB" dirty="0"/>
+              <a:t>Render scene from camera’s POV…</a:t>
+            </a:r>
+          </a:p>
+          <a:p>
+            <a:pPr marL="457200" lvl="1" indent="0">
+              <a:buClr>
+                <a:schemeClr val="accent1"/>
+              </a:buClr>
+              <a:buNone/>
+            </a:pPr>
+            <a:r>
+              <a:rPr lang="en-GB" dirty="0"/>
+              <a:t>		…using generated Depth Map to determine if fragment is lit </a:t>
+            </a:r>
+          </a:p>
+          <a:p>
+            <a:pPr marL="457200" lvl="1" indent="0">
+              <a:buClr>
+                <a:schemeClr val="accent1"/>
+              </a:buClr>
+              <a:buNone/>
+            </a:pPr>
+            <a:r>
+              <a:rPr lang="en-GB" dirty="0"/>
+              <a:t>		    or in shadow</a:t>
+            </a:r>
+          </a:p>
+          <a:p>
+            <a:pPr marL="0" indent="0">
+              <a:buClr>
+                <a:schemeClr val="accent1"/>
+              </a:buClr>
+              <a:buNone/>
+            </a:pPr>
             <a:endParaRPr lang="en-GB" dirty="0"/>
           </a:p>
         </p:txBody>
@@ -7665,7 +8905,7 @@
           <p:cNvPr id="2" name="Título 1">
             <a:extLst>
               <a:ext uri="{FF2B5EF4-FFF2-40B4-BE49-F238E27FC236}">
-                <a16:creationId xmlns:a16="http://schemas.microsoft.com/office/drawing/2014/main" id="{915E278F-12D6-4B47-8D6E-BC7AC686A418}"/>
+                <a16:creationId xmlns:a16="http://schemas.microsoft.com/office/drawing/2014/main" id="{B821BF0C-12EB-487F-87F9-7201A9BBFF36}"/>
               </a:ext>
             </a:extLst>
           </p:cNvPr>
@@ -7687,8 +8927,21 @@
                   <a:schemeClr val="accent1"/>
                 </a:solidFill>
               </a:rPr>
-              <a:t>Artefacts</a:t>
-            </a:r>
+              <a:t>Method</a:t>
+            </a:r>
+            <a:r>
+              <a:rPr lang="en-GB" sz="2400" dirty="0">
+                <a:solidFill>
+                  <a:schemeClr val="accent1"/>
+                </a:solidFill>
+              </a:rPr>
+              <a:t> (directional lights)</a:t>
+            </a:r>
+            <a:endParaRPr lang="en-GB" dirty="0">
+              <a:solidFill>
+                <a:schemeClr val="accent1"/>
+              </a:solidFill>
+            </a:endParaRPr>
           </a:p>
         </p:txBody>
       </p:sp>
@@ -7697,7 +8950,7 @@
           <p:cNvPr id="3" name="Marcador de contenido 2">
             <a:extLst>
               <a:ext uri="{FF2B5EF4-FFF2-40B4-BE49-F238E27FC236}">
-                <a16:creationId xmlns:a16="http://schemas.microsoft.com/office/drawing/2014/main" id="{F3C30E42-5474-45A7-83AD-F61C1E804525}"/>
+                <a16:creationId xmlns:a16="http://schemas.microsoft.com/office/drawing/2014/main" id="{FAF98818-5F5B-43A5-BAC3-BB889C63F6F1}"/>
               </a:ext>
             </a:extLst>
           </p:cNvPr>
@@ -7713,6 +8966,89 @@
           <a:bodyPr/>
           <a:lstStyle/>
           <a:p>
+            <a:pPr>
+              <a:buClr>
+                <a:schemeClr val="accent1"/>
+              </a:buClr>
+            </a:pPr>
+            <a:r>
+              <a:rPr lang="en-GB" dirty="0">
+                <a:solidFill>
+                  <a:schemeClr val="tx2"/>
+                </a:solidFill>
+              </a:rPr>
+              <a:t>2 pass algorithm:</a:t>
+            </a:r>
+          </a:p>
+          <a:p>
+            <a:pPr marL="914400" lvl="1" indent="-457200">
+              <a:buClr>
+                <a:schemeClr val="accent1"/>
+              </a:buClr>
+              <a:buFont typeface="+mj-lt"/>
+              <a:buAutoNum type="arabicPeriod"/>
+            </a:pPr>
+            <a:r>
+              <a:rPr lang="en-GB" dirty="0"/>
+              <a:t>Generate Depth Map by rendering scene from light’s POV</a:t>
+            </a:r>
+          </a:p>
+          <a:p>
+            <a:pPr marL="914400" lvl="1" indent="-457200">
+              <a:buClr>
+                <a:schemeClr val="accent1"/>
+              </a:buClr>
+              <a:buFont typeface="+mj-lt"/>
+              <a:buAutoNum type="arabicPeriod"/>
+            </a:pPr>
+            <a:r>
+              <a:rPr lang="en-GB" dirty="0">
+                <a:solidFill>
+                  <a:schemeClr val="tx2"/>
+                </a:solidFill>
+              </a:rPr>
+              <a:t>Render scene from camera’s POV…</a:t>
+            </a:r>
+          </a:p>
+          <a:p>
+            <a:pPr marL="457200" lvl="1" indent="0">
+              <a:buClr>
+                <a:schemeClr val="accent1"/>
+              </a:buClr>
+              <a:buNone/>
+            </a:pPr>
+            <a:r>
+              <a:rPr lang="en-GB" dirty="0">
+                <a:solidFill>
+                  <a:schemeClr val="tx2"/>
+                </a:solidFill>
+              </a:rPr>
+              <a:t>		…using generated Depth Map to determine if fragment is lit </a:t>
+            </a:r>
+          </a:p>
+          <a:p>
+            <a:pPr marL="457200" lvl="1" indent="0">
+              <a:buClr>
+                <a:schemeClr val="accent1"/>
+              </a:buClr>
+              <a:buNone/>
+            </a:pPr>
+            <a:r>
+              <a:rPr lang="en-GB" dirty="0">
+                <a:solidFill>
+                  <a:schemeClr val="tx2"/>
+                </a:solidFill>
+              </a:rPr>
+              <a:t>		    or in shadow</a:t>
+            </a:r>
+          </a:p>
+          <a:p>
+            <a:pPr marL="0" indent="0">
+              <a:buClr>
+                <a:schemeClr val="accent1"/>
+              </a:buClr>
+              <a:buNone/>
+            </a:pPr>
             <a:endParaRPr lang="en-GB" dirty="0"/>
           </a:p>
         </p:txBody>
@@ -7720,7 +9056,7 @@
     </p:spTree>
     <p:extLst>
       <p:ext uri="{BB962C8B-B14F-4D97-AF65-F5344CB8AC3E}">
-        <p14:creationId xmlns:p14="http://schemas.microsoft.com/office/powerpoint/2010/main" val="4135688092"/>
+        <p14:creationId xmlns:p14="http://schemas.microsoft.com/office/powerpoint/2010/main" val="693978881"/>
       </p:ext>
     </p:extLst>
   </p:cSld>

</xml_diff>

<commit_message>
Created & added some diagrams to slides
Diagrams for transformations to light space.
</commit_message>
<xml_diff>
--- a/slides/slides.pptx
+++ b/slides/slides.pptx
@@ -5,7 +5,7 @@
     <p:sldMasterId id="2147483672" r:id="rId1"/>
   </p:sldMasterIdLst>
   <p:notesMasterIdLst>
-    <p:notesMasterId r:id="rId19"/>
+    <p:notesMasterId r:id="rId21"/>
   </p:notesMasterIdLst>
   <p:sldIdLst>
     <p:sldId id="256" r:id="rId2"/>
@@ -18,13 +18,15 @@
     <p:sldId id="261" r:id="rId9"/>
     <p:sldId id="268" r:id="rId10"/>
     <p:sldId id="270" r:id="rId11"/>
-    <p:sldId id="271" r:id="rId12"/>
-    <p:sldId id="269" r:id="rId13"/>
-    <p:sldId id="272" r:id="rId14"/>
-    <p:sldId id="273" r:id="rId15"/>
-    <p:sldId id="267" r:id="rId16"/>
-    <p:sldId id="262" r:id="rId17"/>
-    <p:sldId id="263" r:id="rId18"/>
+    <p:sldId id="274" r:id="rId12"/>
+    <p:sldId id="275" r:id="rId13"/>
+    <p:sldId id="271" r:id="rId14"/>
+    <p:sldId id="269" r:id="rId15"/>
+    <p:sldId id="272" r:id="rId16"/>
+    <p:sldId id="273" r:id="rId17"/>
+    <p:sldId id="267" r:id="rId18"/>
+    <p:sldId id="262" r:id="rId19"/>
+    <p:sldId id="263" r:id="rId20"/>
   </p:sldIdLst>
   <p:sldSz cx="12192000" cy="6858000"/>
   <p:notesSz cx="6858000" cy="9144000"/>
@@ -213,7 +215,7 @@
           <a:p>
             <a:fld id="{66499B1D-C816-4A11-8D96-9373C31AF530}" type="datetimeFigureOut">
               <a:rPr lang="en-GB" smtClean="0"/>
-              <a:t>13/01/2021</a:t>
+              <a:t>14/01/2021</a:t>
             </a:fld>
             <a:endParaRPr lang="en-GB"/>
           </a:p>
@@ -568,6 +570,90 @@
 </p:notes>
 </file>
 
+<file path=ppt/notesSlides/notesSlide10.xml><?xml version="1.0" encoding="utf-8"?>
+<p:notes xmlns:a="http://schemas.openxmlformats.org/drawingml/2006/main" xmlns:r="http://schemas.openxmlformats.org/officeDocument/2006/relationships" xmlns:p="http://schemas.openxmlformats.org/presentationml/2006/main">
+  <p:cSld>
+    <p:spTree>
+      <p:nvGrpSpPr>
+        <p:cNvPr id="1" name=""/>
+        <p:cNvGrpSpPr/>
+        <p:nvPr/>
+      </p:nvGrpSpPr>
+      <p:grpSpPr>
+        <a:xfrm>
+          <a:off x="0" y="0"/>
+          <a:ext cx="0" cy="0"/>
+          <a:chOff x="0" y="0"/>
+          <a:chExt cx="0" cy="0"/>
+        </a:xfrm>
+      </p:grpSpPr>
+      <p:sp>
+        <p:nvSpPr>
+          <p:cNvPr id="2" name="Marcador de imagen de diapositiva 1"/>
+          <p:cNvSpPr>
+            <a:spLocks noGrp="1" noRot="1" noChangeAspect="1"/>
+          </p:cNvSpPr>
+          <p:nvPr>
+            <p:ph type="sldImg"/>
+          </p:nvPr>
+        </p:nvSpPr>
+        <p:spPr/>
+      </p:sp>
+      <p:sp>
+        <p:nvSpPr>
+          <p:cNvPr id="3" name="Marcador de notas 2"/>
+          <p:cNvSpPr>
+            <a:spLocks noGrp="1"/>
+          </p:cNvSpPr>
+          <p:nvPr>
+            <p:ph type="body" idx="1"/>
+          </p:nvPr>
+        </p:nvSpPr>
+        <p:spPr/>
+        <p:txBody>
+          <a:bodyPr/>
+          <a:lstStyle/>
+          <a:p>
+            <a:endParaRPr lang="en-GB" dirty="0"/>
+          </a:p>
+        </p:txBody>
+      </p:sp>
+      <p:sp>
+        <p:nvSpPr>
+          <p:cNvPr id="4" name="Marcador de número de diapositiva 3"/>
+          <p:cNvSpPr>
+            <a:spLocks noGrp="1"/>
+          </p:cNvSpPr>
+          <p:nvPr>
+            <p:ph type="sldNum" sz="quarter" idx="5"/>
+          </p:nvPr>
+        </p:nvSpPr>
+        <p:spPr/>
+        <p:txBody>
+          <a:bodyPr/>
+          <a:lstStyle/>
+          <a:p>
+            <a:fld id="{FF0F2D60-35F9-4BC0-B9FA-A8D7F998FA00}" type="slidenum">
+              <a:rPr lang="en-GB" smtClean="0"/>
+              <a:t>16</a:t>
+            </a:fld>
+            <a:endParaRPr lang="en-GB"/>
+          </a:p>
+        </p:txBody>
+      </p:sp>
+    </p:spTree>
+    <p:extLst>
+      <p:ext uri="{BB962C8B-B14F-4D97-AF65-F5344CB8AC3E}">
+        <p14:creationId xmlns:p14="http://schemas.microsoft.com/office/powerpoint/2010/main" val="3598862928"/>
+      </p:ext>
+    </p:extLst>
+  </p:cSld>
+  <p:clrMapOvr>
+    <a:masterClrMapping/>
+  </p:clrMapOvr>
+</p:notes>
+</file>
+
 <file path=ppt/notesSlides/notesSlide2.xml><?xml version="1.0" encoding="utf-8"?>
 <p:notes xmlns:a="http://schemas.openxmlformats.org/drawingml/2006/main" xmlns:r="http://schemas.openxmlformats.org/officeDocument/2006/relationships" xmlns:p="http://schemas.openxmlformats.org/presentationml/2006/main">
   <p:cSld>
@@ -1179,7 +1265,7 @@
     </p:spTree>
     <p:extLst>
       <p:ext uri="{BB962C8B-B14F-4D97-AF65-F5344CB8AC3E}">
-        <p14:creationId xmlns:p14="http://schemas.microsoft.com/office/powerpoint/2010/main" val="2582622379"/>
+        <p14:creationId xmlns:p14="http://schemas.microsoft.com/office/powerpoint/2010/main" val="710573939"/>
       </p:ext>
     </p:extLst>
   </p:cSld>
@@ -1254,7 +1340,7 @@
           <a:p>
             <a:fld id="{FF0F2D60-35F9-4BC0-B9FA-A8D7F998FA00}" type="slidenum">
               <a:rPr lang="en-GB" smtClean="0"/>
-              <a:t>13</a:t>
+              <a:t>12</a:t>
             </a:fld>
             <a:endParaRPr lang="en-GB"/>
           </a:p>
@@ -1263,7 +1349,7 @@
     </p:spTree>
     <p:extLst>
       <p:ext uri="{BB962C8B-B14F-4D97-AF65-F5344CB8AC3E}">
-        <p14:creationId xmlns:p14="http://schemas.microsoft.com/office/powerpoint/2010/main" val="194238764"/>
+        <p14:creationId xmlns:p14="http://schemas.microsoft.com/office/powerpoint/2010/main" val="4007139516"/>
       </p:ext>
     </p:extLst>
   </p:cSld>
@@ -1338,7 +1424,7 @@
           <a:p>
             <a:fld id="{FF0F2D60-35F9-4BC0-B9FA-A8D7F998FA00}" type="slidenum">
               <a:rPr lang="en-GB" smtClean="0"/>
-              <a:t>14</a:t>
+              <a:t>13</a:t>
             </a:fld>
             <a:endParaRPr lang="en-GB"/>
           </a:p>
@@ -1347,7 +1433,91 @@
     </p:spTree>
     <p:extLst>
       <p:ext uri="{BB962C8B-B14F-4D97-AF65-F5344CB8AC3E}">
-        <p14:creationId xmlns:p14="http://schemas.microsoft.com/office/powerpoint/2010/main" val="3598862928"/>
+        <p14:creationId xmlns:p14="http://schemas.microsoft.com/office/powerpoint/2010/main" val="2582622379"/>
+      </p:ext>
+    </p:extLst>
+  </p:cSld>
+  <p:clrMapOvr>
+    <a:masterClrMapping/>
+  </p:clrMapOvr>
+</p:notes>
+</file>
+
+<file path=ppt/notesSlides/notesSlide9.xml><?xml version="1.0" encoding="utf-8"?>
+<p:notes xmlns:a="http://schemas.openxmlformats.org/drawingml/2006/main" xmlns:r="http://schemas.openxmlformats.org/officeDocument/2006/relationships" xmlns:p="http://schemas.openxmlformats.org/presentationml/2006/main">
+  <p:cSld>
+    <p:spTree>
+      <p:nvGrpSpPr>
+        <p:cNvPr id="1" name=""/>
+        <p:cNvGrpSpPr/>
+        <p:nvPr/>
+      </p:nvGrpSpPr>
+      <p:grpSpPr>
+        <a:xfrm>
+          <a:off x="0" y="0"/>
+          <a:ext cx="0" cy="0"/>
+          <a:chOff x="0" y="0"/>
+          <a:chExt cx="0" cy="0"/>
+        </a:xfrm>
+      </p:grpSpPr>
+      <p:sp>
+        <p:nvSpPr>
+          <p:cNvPr id="2" name="Marcador de imagen de diapositiva 1"/>
+          <p:cNvSpPr>
+            <a:spLocks noGrp="1" noRot="1" noChangeAspect="1"/>
+          </p:cNvSpPr>
+          <p:nvPr>
+            <p:ph type="sldImg"/>
+          </p:nvPr>
+        </p:nvSpPr>
+        <p:spPr/>
+      </p:sp>
+      <p:sp>
+        <p:nvSpPr>
+          <p:cNvPr id="3" name="Marcador de notas 2"/>
+          <p:cNvSpPr>
+            <a:spLocks noGrp="1"/>
+          </p:cNvSpPr>
+          <p:nvPr>
+            <p:ph type="body" idx="1"/>
+          </p:nvPr>
+        </p:nvSpPr>
+        <p:spPr/>
+        <p:txBody>
+          <a:bodyPr/>
+          <a:lstStyle/>
+          <a:p>
+            <a:endParaRPr lang="en-GB" dirty="0"/>
+          </a:p>
+        </p:txBody>
+      </p:sp>
+      <p:sp>
+        <p:nvSpPr>
+          <p:cNvPr id="4" name="Marcador de número de diapositiva 3"/>
+          <p:cNvSpPr>
+            <a:spLocks noGrp="1"/>
+          </p:cNvSpPr>
+          <p:nvPr>
+            <p:ph type="sldNum" sz="quarter" idx="5"/>
+          </p:nvPr>
+        </p:nvSpPr>
+        <p:spPr/>
+        <p:txBody>
+          <a:bodyPr/>
+          <a:lstStyle/>
+          <a:p>
+            <a:fld id="{FF0F2D60-35F9-4BC0-B9FA-A8D7F998FA00}" type="slidenum">
+              <a:rPr lang="en-GB" smtClean="0"/>
+              <a:t>15</a:t>
+            </a:fld>
+            <a:endParaRPr lang="en-GB"/>
+          </a:p>
+        </p:txBody>
+      </p:sp>
+    </p:spTree>
+    <p:extLst>
+      <p:ext uri="{BB962C8B-B14F-4D97-AF65-F5344CB8AC3E}">
+        <p14:creationId xmlns:p14="http://schemas.microsoft.com/office/powerpoint/2010/main" val="194238764"/>
       </p:ext>
     </p:extLst>
   </p:cSld>
@@ -1488,7 +1658,7 @@
           <a:p>
             <a:fld id="{F58C6CE7-BF83-4B1E-855D-EB8AAA078073}" type="datetimeFigureOut">
               <a:rPr lang="en-GB" smtClean="0"/>
-              <a:t>13/01/2021</a:t>
+              <a:t>14/01/2021</a:t>
             </a:fld>
             <a:endParaRPr lang="en-GB"/>
           </a:p>
@@ -1658,7 +1828,7 @@
           <a:p>
             <a:fld id="{F58C6CE7-BF83-4B1E-855D-EB8AAA078073}" type="datetimeFigureOut">
               <a:rPr lang="en-GB" smtClean="0"/>
-              <a:t>13/01/2021</a:t>
+              <a:t>14/01/2021</a:t>
             </a:fld>
             <a:endParaRPr lang="en-GB"/>
           </a:p>
@@ -1838,7 +2008,7 @@
           <a:p>
             <a:fld id="{F58C6CE7-BF83-4B1E-855D-EB8AAA078073}" type="datetimeFigureOut">
               <a:rPr lang="en-GB" smtClean="0"/>
-              <a:t>13/01/2021</a:t>
+              <a:t>14/01/2021</a:t>
             </a:fld>
             <a:endParaRPr lang="en-GB"/>
           </a:p>
@@ -2008,7 +2178,7 @@
           <a:p>
             <a:fld id="{F58C6CE7-BF83-4B1E-855D-EB8AAA078073}" type="datetimeFigureOut">
               <a:rPr lang="en-GB" smtClean="0"/>
-              <a:t>13/01/2021</a:t>
+              <a:t>14/01/2021</a:t>
             </a:fld>
             <a:endParaRPr lang="en-GB"/>
           </a:p>
@@ -2254,7 +2424,7 @@
           <a:p>
             <a:fld id="{F58C6CE7-BF83-4B1E-855D-EB8AAA078073}" type="datetimeFigureOut">
               <a:rPr lang="en-GB" smtClean="0"/>
-              <a:t>13/01/2021</a:t>
+              <a:t>14/01/2021</a:t>
             </a:fld>
             <a:endParaRPr lang="en-GB"/>
           </a:p>
@@ -2486,7 +2656,7 @@
           <a:p>
             <a:fld id="{F58C6CE7-BF83-4B1E-855D-EB8AAA078073}" type="datetimeFigureOut">
               <a:rPr lang="en-GB" smtClean="0"/>
-              <a:t>13/01/2021</a:t>
+              <a:t>14/01/2021</a:t>
             </a:fld>
             <a:endParaRPr lang="en-GB"/>
           </a:p>
@@ -2853,7 +3023,7 @@
           <a:p>
             <a:fld id="{F58C6CE7-BF83-4B1E-855D-EB8AAA078073}" type="datetimeFigureOut">
               <a:rPr lang="en-GB" smtClean="0"/>
-              <a:t>13/01/2021</a:t>
+              <a:t>14/01/2021</a:t>
             </a:fld>
             <a:endParaRPr lang="en-GB"/>
           </a:p>
@@ -2971,7 +3141,7 @@
           <a:p>
             <a:fld id="{F58C6CE7-BF83-4B1E-855D-EB8AAA078073}" type="datetimeFigureOut">
               <a:rPr lang="en-GB" smtClean="0"/>
-              <a:t>13/01/2021</a:t>
+              <a:t>14/01/2021</a:t>
             </a:fld>
             <a:endParaRPr lang="en-GB"/>
           </a:p>
@@ -3066,7 +3236,7 @@
           <a:p>
             <a:fld id="{F58C6CE7-BF83-4B1E-855D-EB8AAA078073}" type="datetimeFigureOut">
               <a:rPr lang="en-GB" smtClean="0"/>
-              <a:t>13/01/2021</a:t>
+              <a:t>14/01/2021</a:t>
             </a:fld>
             <a:endParaRPr lang="en-GB"/>
           </a:p>
@@ -3343,7 +3513,7 @@
           <a:p>
             <a:fld id="{F58C6CE7-BF83-4B1E-855D-EB8AAA078073}" type="datetimeFigureOut">
               <a:rPr lang="en-GB" smtClean="0"/>
-              <a:t>13/01/2021</a:t>
+              <a:t>14/01/2021</a:t>
             </a:fld>
             <a:endParaRPr lang="en-GB"/>
           </a:p>
@@ -3600,7 +3770,7 @@
           <a:p>
             <a:fld id="{F58C6CE7-BF83-4B1E-855D-EB8AAA078073}" type="datetimeFigureOut">
               <a:rPr lang="en-GB" smtClean="0"/>
-              <a:t>13/01/2021</a:t>
+              <a:t>14/01/2021</a:t>
             </a:fld>
             <a:endParaRPr lang="en-GB"/>
           </a:p>
@@ -3813,7 +3983,7 @@
           <a:p>
             <a:fld id="{F58C6CE7-BF83-4B1E-855D-EB8AAA078073}" type="datetimeFigureOut">
               <a:rPr lang="en-GB" smtClean="0"/>
-              <a:t>13/01/2021</a:t>
+              <a:t>14/01/2021</a:t>
             </a:fld>
             <a:endParaRPr lang="en-GB"/>
           </a:p>
@@ -4668,7 +4838,7 @@
                   <a:schemeClr val="accent4"/>
                 </a:solidFill>
               </a:rPr>
-              <a:t>	1. scene, indicate where light is coming from</a:t>
+              <a:t>	1. example scene, &amp; indicate light direction</a:t>
             </a:r>
           </a:p>
           <a:p>
@@ -4681,7 +4851,7 @@
                   <a:schemeClr val="accent4"/>
                 </a:solidFill>
               </a:rPr>
-              <a:t>	2. scene as seen from light</a:t>
+              <a:t>	2. scene as seen from light’s POV</a:t>
             </a:r>
           </a:p>
           <a:p>
@@ -4978,7 +5148,9 @@
         </p:nvSpPr>
         <p:spPr/>
         <p:txBody>
-          <a:bodyPr/>
+          <a:bodyPr>
+            <a:normAutofit/>
+          </a:bodyPr>
           <a:lstStyle/>
           <a:p>
             <a:pPr marL="457200" indent="-457200">
@@ -4989,8 +5161,8 @@
               <a:buAutoNum type="arabicPeriod"/>
             </a:pPr>
             <a:r>
-              <a:rPr lang="en-GB" dirty="0"/>
-              <a:t>Create a texture object that’ll be our depth map.</a:t>
+              <a:rPr lang="en-GB" sz="2600" dirty="0"/>
+              <a:t>Create a texture object → our depth map.</a:t>
             </a:r>
           </a:p>
           <a:p>
@@ -5002,142 +5174,9 @@
               <a:buAutoNum type="arabicPeriod"/>
             </a:pPr>
             <a:r>
-              <a:rPr lang="en-GB" dirty="0"/>
+              <a:rPr lang="en-GB" sz="2600" dirty="0"/>
               <a:t>Transform scene to light space</a:t>
             </a:r>
-          </a:p>
-          <a:p>
-            <a:pPr marL="0" indent="0">
-              <a:buClr>
-                <a:schemeClr val="accent1"/>
-              </a:buClr>
-              <a:buNone/>
-            </a:pPr>
-            <a:r>
-              <a:rPr lang="en-GB" sz="2400" dirty="0">
-                <a:solidFill>
-                  <a:schemeClr val="accent4"/>
-                </a:solidFill>
-              </a:rPr>
-              <a:t>TODO: diagram of </a:t>
-            </a:r>
-            <a:r>
-              <a:rPr lang="en-GB" sz="2400" dirty="0" err="1">
-                <a:solidFill>
-                  <a:schemeClr val="accent4"/>
-                </a:solidFill>
-              </a:rPr>
-              <a:t>transf</a:t>
-            </a:r>
-            <a:r>
-              <a:rPr lang="en-GB" sz="2400" dirty="0">
-                <a:solidFill>
-                  <a:schemeClr val="accent4"/>
-                </a:solidFill>
-              </a:rPr>
-              <a:t> process from local space (</a:t>
-            </a:r>
-            <a:r>
-              <a:rPr lang="en-GB" sz="2400" dirty="0" err="1">
-                <a:solidFill>
-                  <a:schemeClr val="accent4"/>
-                </a:solidFill>
-              </a:rPr>
-              <a:t>obj</a:t>
-            </a:r>
-            <a:r>
-              <a:rPr lang="en-GB" sz="2400" dirty="0">
-                <a:solidFill>
-                  <a:schemeClr val="accent4"/>
-                </a:solidFill>
-              </a:rPr>
-              <a:t> </a:t>
-            </a:r>
-            <a:r>
-              <a:rPr lang="en-GB" sz="2400" dirty="0" err="1">
-                <a:solidFill>
-                  <a:schemeClr val="accent4"/>
-                </a:solidFill>
-              </a:rPr>
-              <a:t>coord</a:t>
-            </a:r>
-            <a:r>
-              <a:rPr lang="en-GB" sz="2400" dirty="0">
-                <a:solidFill>
-                  <a:schemeClr val="accent4"/>
-                </a:solidFill>
-              </a:rPr>
-              <a:t>) to light space</a:t>
-            </a:r>
-            <a:endParaRPr lang="en-GB" sz="2400" dirty="0"/>
-          </a:p>
-          <a:p>
-            <a:pPr lvl="1">
-              <a:buClr>
-                <a:schemeClr val="accent1"/>
-              </a:buClr>
-            </a:pPr>
-            <a:r>
-              <a:rPr lang="en-GB" dirty="0"/>
-              <a:t>Use view &amp; projection matrices specific to the light source</a:t>
-            </a:r>
-          </a:p>
-          <a:p>
-            <a:pPr lvl="1">
-              <a:buClr>
-                <a:schemeClr val="accent1"/>
-              </a:buClr>
-            </a:pPr>
-            <a:r>
-              <a:rPr lang="en-GB" dirty="0"/>
-              <a:t>Then, calculate an MVP matrix to use in the vertex shader</a:t>
-            </a:r>
-          </a:p>
-          <a:p>
-            <a:pPr marL="457200" indent="-457200">
-              <a:buClr>
-                <a:schemeClr val="accent1"/>
-              </a:buClr>
-              <a:buFont typeface="+mj-lt"/>
-              <a:buAutoNum type="arabicPeriod" startAt="3"/>
-            </a:pPr>
-            <a:r>
-              <a:rPr lang="en-GB" dirty="0"/>
-              <a:t>Render to depth map</a:t>
-            </a:r>
-            <a:endParaRPr lang="en-GB" sz="2400" dirty="0"/>
-          </a:p>
-          <a:p>
-            <a:pPr lvl="1">
-              <a:buClr>
-                <a:schemeClr val="accent1"/>
-              </a:buClr>
-            </a:pPr>
-            <a:r>
-              <a:rPr lang="en-GB" dirty="0"/>
-              <a:t>Vertex shader – transforms vertices to light space using calculated matrix</a:t>
-            </a:r>
-          </a:p>
-          <a:p>
-            <a:pPr lvl="1">
-              <a:buClr>
-                <a:schemeClr val="accent1"/>
-              </a:buClr>
-            </a:pPr>
-            <a:r>
-              <a:rPr lang="en-GB" dirty="0"/>
-              <a:t>Fragment shader – empty,  since no colour data</a:t>
-            </a:r>
-          </a:p>
-          <a:p>
-            <a:pPr marL="914400" lvl="1" indent="-457200">
-              <a:buClr>
-                <a:schemeClr val="accent1"/>
-              </a:buClr>
-              <a:buFont typeface="+mj-lt"/>
-              <a:buAutoNum type="arabicPeriod" startAt="3"/>
-            </a:pPr>
-            <a:endParaRPr lang="en-GB" dirty="0"/>
           </a:p>
           <a:p>
             <a:pPr marL="457200" lvl="1" indent="0">
@@ -5148,18 +5187,239 @@
             </a:pPr>
             <a:endParaRPr lang="en-GB" dirty="0"/>
           </a:p>
-        </p:txBody>
-      </p:sp>
+          <a:p>
+            <a:pPr marL="457200" lvl="1" indent="0">
+              <a:buClr>
+                <a:schemeClr val="accent1"/>
+              </a:buClr>
+              <a:buNone/>
+            </a:pPr>
+            <a:endParaRPr lang="en-GB" dirty="0"/>
+          </a:p>
+        </p:txBody>
+      </p:sp>
+      <p:pic>
+        <p:nvPicPr>
+          <p:cNvPr id="5" name="Imagen 4" descr="Imagen de la pantalla de un celular de un mensaje en letras negras&#10;&#10;Descripción generada automáticamente con confianza baja">
+            <a:extLst>
+              <a:ext uri="{FF2B5EF4-FFF2-40B4-BE49-F238E27FC236}">
+                <a16:creationId xmlns:a16="http://schemas.microsoft.com/office/drawing/2014/main" id="{89422A0B-CF7F-4BC0-9C1C-9538D7600F56}"/>
+              </a:ext>
+            </a:extLst>
+          </p:cNvPr>
+          <p:cNvPicPr>
+            <a:picLocks noChangeAspect="1"/>
+          </p:cNvPicPr>
+          <p:nvPr/>
+        </p:nvPicPr>
+        <p:blipFill>
+          <a:blip r:embed="rId3">
+            <a:extLst>
+              <a:ext uri="{28A0092B-C50C-407E-A947-70E740481C1C}">
+                <a14:useLocalDpi xmlns:a14="http://schemas.microsoft.com/office/drawing/2010/main" val="0"/>
+              </a:ext>
+            </a:extLst>
+          </a:blip>
+          <a:stretch>
+            <a:fillRect/>
+          </a:stretch>
+        </p:blipFill>
+        <p:spPr>
+          <a:xfrm>
+            <a:off x="1323974" y="2990920"/>
+            <a:ext cx="8943975" cy="2931250"/>
+          </a:xfrm>
+          <a:prstGeom prst="rect">
+            <a:avLst/>
+          </a:prstGeom>
+        </p:spPr>
+      </p:pic>
     </p:spTree>
     <p:extLst>
       <p:ext uri="{BB962C8B-B14F-4D97-AF65-F5344CB8AC3E}">
-        <p14:creationId xmlns:p14="http://schemas.microsoft.com/office/powerpoint/2010/main" val="1837007626"/>
+        <p14:creationId xmlns:p14="http://schemas.microsoft.com/office/powerpoint/2010/main" val="3228683748"/>
       </p:ext>
     </p:extLst>
   </p:cSld>
   <p:clrMapOvr>
     <a:masterClrMapping/>
   </p:clrMapOvr>
+  <p:timing>
+    <p:tnLst>
+      <p:par>
+        <p:cTn id="1" dur="indefinite" restart="never" nodeType="tmRoot">
+          <p:childTnLst>
+            <p:seq concurrent="1" nextAc="seek">
+              <p:cTn id="2" dur="indefinite" nodeType="mainSeq">
+                <p:childTnLst>
+                  <p:par>
+                    <p:cTn id="3" fill="hold">
+                      <p:stCondLst>
+                        <p:cond delay="indefinite"/>
+                      </p:stCondLst>
+                      <p:childTnLst>
+                        <p:par>
+                          <p:cTn id="4" fill="hold">
+                            <p:stCondLst>
+                              <p:cond delay="0"/>
+                            </p:stCondLst>
+                            <p:childTnLst>
+                              <p:par>
+                                <p:cTn id="5" presetID="1" presetClass="entr" presetSubtype="0" fill="hold" grpId="0" nodeType="clickEffect">
+                                  <p:stCondLst>
+                                    <p:cond delay="0"/>
+                                  </p:stCondLst>
+                                  <p:childTnLst>
+                                    <p:set>
+                                      <p:cBhvr>
+                                        <p:cTn id="6" dur="1" fill="hold">
+                                          <p:stCondLst>
+                                            <p:cond delay="0"/>
+                                          </p:stCondLst>
+                                        </p:cTn>
+                                        <p:tgtEl>
+                                          <p:spTgt spid="3">
+                                            <p:txEl>
+                                              <p:pRg st="0" end="0"/>
+                                            </p:txEl>
+                                          </p:spTgt>
+                                        </p:tgtEl>
+                                        <p:attrNameLst>
+                                          <p:attrName>style.visibility</p:attrName>
+                                        </p:attrNameLst>
+                                      </p:cBhvr>
+                                      <p:to>
+                                        <p:strVal val="visible"/>
+                                      </p:to>
+                                    </p:set>
+                                  </p:childTnLst>
+                                </p:cTn>
+                              </p:par>
+                            </p:childTnLst>
+                          </p:cTn>
+                        </p:par>
+                      </p:childTnLst>
+                    </p:cTn>
+                  </p:par>
+                  <p:par>
+                    <p:cTn id="7" fill="hold">
+                      <p:stCondLst>
+                        <p:cond delay="indefinite"/>
+                      </p:stCondLst>
+                      <p:childTnLst>
+                        <p:par>
+                          <p:cTn id="8" fill="hold">
+                            <p:stCondLst>
+                              <p:cond delay="0"/>
+                            </p:stCondLst>
+                            <p:childTnLst>
+                              <p:par>
+                                <p:cTn id="9" presetID="1" presetClass="entr" presetSubtype="0" fill="hold" grpId="0" nodeType="clickEffect">
+                                  <p:stCondLst>
+                                    <p:cond delay="0"/>
+                                  </p:stCondLst>
+                                  <p:childTnLst>
+                                    <p:set>
+                                      <p:cBhvr>
+                                        <p:cTn id="10" dur="1" fill="hold">
+                                          <p:stCondLst>
+                                            <p:cond delay="0"/>
+                                          </p:stCondLst>
+                                        </p:cTn>
+                                        <p:tgtEl>
+                                          <p:spTgt spid="3">
+                                            <p:txEl>
+                                              <p:pRg st="1" end="1"/>
+                                            </p:txEl>
+                                          </p:spTgt>
+                                        </p:tgtEl>
+                                        <p:attrNameLst>
+                                          <p:attrName>style.visibility</p:attrName>
+                                        </p:attrNameLst>
+                                      </p:cBhvr>
+                                      <p:to>
+                                        <p:strVal val="visible"/>
+                                      </p:to>
+                                    </p:set>
+                                  </p:childTnLst>
+                                </p:cTn>
+                              </p:par>
+                            </p:childTnLst>
+                          </p:cTn>
+                        </p:par>
+                      </p:childTnLst>
+                    </p:cTn>
+                  </p:par>
+                  <p:par>
+                    <p:cTn id="11" fill="hold">
+                      <p:stCondLst>
+                        <p:cond delay="indefinite"/>
+                      </p:stCondLst>
+                      <p:childTnLst>
+                        <p:par>
+                          <p:cTn id="12" fill="hold">
+                            <p:stCondLst>
+                              <p:cond delay="0"/>
+                            </p:stCondLst>
+                            <p:childTnLst>
+                              <p:par>
+                                <p:cTn id="13" presetID="1" presetClass="entr" presetSubtype="0" fill="hold" nodeType="clickEffect">
+                                  <p:stCondLst>
+                                    <p:cond delay="0"/>
+                                  </p:stCondLst>
+                                  <p:childTnLst>
+                                    <p:set>
+                                      <p:cBhvr>
+                                        <p:cTn id="14" dur="1" fill="hold">
+                                          <p:stCondLst>
+                                            <p:cond delay="0"/>
+                                          </p:stCondLst>
+                                        </p:cTn>
+                                        <p:tgtEl>
+                                          <p:spTgt spid="5"/>
+                                        </p:tgtEl>
+                                        <p:attrNameLst>
+                                          <p:attrName>style.visibility</p:attrName>
+                                        </p:attrNameLst>
+                                      </p:cBhvr>
+                                      <p:to>
+                                        <p:strVal val="visible"/>
+                                      </p:to>
+                                    </p:set>
+                                  </p:childTnLst>
+                                </p:cTn>
+                              </p:par>
+                            </p:childTnLst>
+                          </p:cTn>
+                        </p:par>
+                      </p:childTnLst>
+                    </p:cTn>
+                  </p:par>
+                </p:childTnLst>
+              </p:cTn>
+              <p:prevCondLst>
+                <p:cond evt="onPrev" delay="0">
+                  <p:tgtEl>
+                    <p:sldTgt/>
+                  </p:tgtEl>
+                </p:cond>
+              </p:prevCondLst>
+              <p:nextCondLst>
+                <p:cond evt="onNext" delay="0">
+                  <p:tgtEl>
+                    <p:sldTgt/>
+                  </p:tgtEl>
+                </p:cond>
+              </p:nextCondLst>
+            </p:seq>
+          </p:childTnLst>
+        </p:cTn>
+      </p:par>
+    </p:tnLst>
+    <p:bldLst>
+      <p:bldP spid="3" grpId="0" uiExpand="1" build="p"/>
+    </p:bldLst>
+  </p:timing>
 </p:sld>
 </file>
 
@@ -5185,7 +5445,7 @@
           <p:cNvPr id="2" name="Título 1">
             <a:extLst>
               <a:ext uri="{FF2B5EF4-FFF2-40B4-BE49-F238E27FC236}">
-                <a16:creationId xmlns:a16="http://schemas.microsoft.com/office/drawing/2014/main" id="{B821BF0C-12EB-487F-87F9-7201A9BBFF36}"/>
+                <a16:creationId xmlns:a16="http://schemas.microsoft.com/office/drawing/2014/main" id="{ACB7C790-2E9C-4B76-88EC-56FA8D07D236}"/>
               </a:ext>
             </a:extLst>
           </p:cNvPr>
@@ -5207,21 +5467,8 @@
                   <a:schemeClr val="accent1"/>
                 </a:solidFill>
               </a:rPr>
-              <a:t>Method</a:t>
-            </a:r>
-            <a:r>
-              <a:rPr lang="en-GB" sz="2400" dirty="0">
-                <a:solidFill>
-                  <a:schemeClr val="accent1"/>
-                </a:solidFill>
-              </a:rPr>
-              <a:t> (directional lights)</a:t>
-            </a:r>
-            <a:endParaRPr lang="en-GB" dirty="0">
-              <a:solidFill>
-                <a:schemeClr val="accent1"/>
-              </a:solidFill>
-            </a:endParaRPr>
+              <a:t>Step 1) generate depth map (2/2)</a:t>
+            </a:r>
           </a:p>
         </p:txBody>
       </p:sp>
@@ -5230,7 +5477,7 @@
           <p:cNvPr id="3" name="Marcador de contenido 2">
             <a:extLst>
               <a:ext uri="{FF2B5EF4-FFF2-40B4-BE49-F238E27FC236}">
-                <a16:creationId xmlns:a16="http://schemas.microsoft.com/office/drawing/2014/main" id="{FAF98818-5F5B-43A5-BAC3-BB889C63F6F1}"/>
+                <a16:creationId xmlns:a16="http://schemas.microsoft.com/office/drawing/2014/main" id="{E82D6E48-B112-4914-958E-E5F86C248155}"/>
               </a:ext>
             </a:extLst>
           </p:cNvPr>
@@ -5243,25 +5490,12 @@
         </p:nvSpPr>
         <p:spPr/>
         <p:txBody>
-          <a:bodyPr/>
+          <a:bodyPr>
+            <a:normAutofit/>
+          </a:bodyPr>
           <a:lstStyle/>
           <a:p>
-            <a:pPr>
-              <a:buClr>
-                <a:schemeClr val="accent1"/>
-              </a:buClr>
-            </a:pPr>
-            <a:r>
-              <a:rPr lang="en-GB" dirty="0">
-                <a:solidFill>
-                  <a:schemeClr val="tx2"/>
-                </a:solidFill>
-              </a:rPr>
-              <a:t>2 pass algorithm:</a:t>
-            </a:r>
-          </a:p>
-          <a:p>
-            <a:pPr marL="914400" lvl="1" indent="-457200">
+            <a:pPr marL="457200" indent="-457200">
               <a:buClr>
                 <a:schemeClr val="accent1"/>
               </a:buClr>
@@ -5269,16 +5503,12 @@
               <a:buAutoNum type="arabicPeriod"/>
             </a:pPr>
             <a:r>
-              <a:rPr lang="en-GB" dirty="0">
-                <a:solidFill>
-                  <a:schemeClr val="tx2"/>
-                </a:solidFill>
-              </a:rPr>
-              <a:t>Generate Depth Map by rendering scene from light’s POV</a:t>
-            </a:r>
-          </a:p>
-          <a:p>
-            <a:pPr marL="914400" lvl="1" indent="-457200">
+              <a:rPr lang="en-GB" sz="2600" dirty="0"/>
+              <a:t>Create a texture object → our depth map.</a:t>
+            </a:r>
+          </a:p>
+          <a:p>
+            <a:pPr marL="457200" indent="-457200">
               <a:buClr>
                 <a:schemeClr val="accent1"/>
               </a:buClr>
@@ -5286,8 +5516,8 @@
               <a:buAutoNum type="arabicPeriod"/>
             </a:pPr>
             <a:r>
-              <a:rPr lang="en-GB" dirty="0"/>
-              <a:t>Render scene from camera’s POV…</a:t>
+              <a:rPr lang="en-GB" sz="2600" dirty="0"/>
+              <a:t>Transform scene to light space</a:t>
             </a:r>
           </a:p>
           <a:p>
@@ -5297,10 +5527,7 @@
               </a:buClr>
               <a:buNone/>
             </a:pPr>
-            <a:r>
-              <a:rPr lang="en-GB" dirty="0"/>
-              <a:t>		…using generated Depth Map to determine if fragment is lit </a:t>
-            </a:r>
+            <a:endParaRPr lang="en-GB" dirty="0"/>
           </a:p>
           <a:p>
             <a:pPr marL="457200" lvl="1" indent="0">
@@ -5309,26 +5536,49 @@
               </a:buClr>
               <a:buNone/>
             </a:pPr>
-            <a:r>
-              <a:rPr lang="en-GB" dirty="0"/>
-              <a:t>		    or in shadow</a:t>
-            </a:r>
-          </a:p>
-          <a:p>
-            <a:pPr marL="0" indent="0">
-              <a:buClr>
-                <a:schemeClr val="accent1"/>
-              </a:buClr>
-              <a:buNone/>
-            </a:pPr>
             <a:endParaRPr lang="en-GB" dirty="0"/>
           </a:p>
         </p:txBody>
       </p:sp>
+      <p:pic>
+        <p:nvPicPr>
+          <p:cNvPr id="5" name="Imagen 4">
+            <a:extLst>
+              <a:ext uri="{FF2B5EF4-FFF2-40B4-BE49-F238E27FC236}">
+                <a16:creationId xmlns:a16="http://schemas.microsoft.com/office/drawing/2014/main" id="{89422A0B-CF7F-4BC0-9C1C-9538D7600F56}"/>
+              </a:ext>
+            </a:extLst>
+          </p:cNvPr>
+          <p:cNvPicPr>
+            <a:picLocks noChangeAspect="1"/>
+          </p:cNvPicPr>
+          <p:nvPr/>
+        </p:nvPicPr>
+        <p:blipFill>
+          <a:blip r:embed="rId3">
+            <a:extLst>
+              <a:ext uri="{28A0092B-C50C-407E-A947-70E740481C1C}">
+                <a14:useLocalDpi xmlns:a14="http://schemas.microsoft.com/office/drawing/2010/main" val="0"/>
+              </a:ext>
+            </a:extLst>
+          </a:blip>
+          <a:srcRect/>
+          <a:stretch/>
+        </p:blipFill>
+        <p:spPr>
+          <a:xfrm>
+            <a:off x="1323974" y="2990920"/>
+            <a:ext cx="8943975" cy="2931249"/>
+          </a:xfrm>
+          <a:prstGeom prst="rect">
+            <a:avLst/>
+          </a:prstGeom>
+        </p:spPr>
+      </p:pic>
     </p:spTree>
     <p:extLst>
       <p:ext uri="{BB962C8B-B14F-4D97-AF65-F5344CB8AC3E}">
-        <p14:creationId xmlns:p14="http://schemas.microsoft.com/office/powerpoint/2010/main" val="1859927173"/>
+        <p14:creationId xmlns:p14="http://schemas.microsoft.com/office/powerpoint/2010/main" val="2700349773"/>
       </p:ext>
     </p:extLst>
   </p:cSld>
@@ -5382,13 +5632,589 @@
                   <a:schemeClr val="accent1"/>
                 </a:solidFill>
               </a:rPr>
+              <a:t>Step 1) generate depth map (2/2)</a:t>
+            </a:r>
+          </a:p>
+        </p:txBody>
+      </p:sp>
+      <p:sp>
+        <p:nvSpPr>
+          <p:cNvPr id="3" name="Marcador de contenido 2">
+            <a:extLst>
+              <a:ext uri="{FF2B5EF4-FFF2-40B4-BE49-F238E27FC236}">
+                <a16:creationId xmlns:a16="http://schemas.microsoft.com/office/drawing/2014/main" id="{E82D6E48-B112-4914-958E-E5F86C248155}"/>
+              </a:ext>
+            </a:extLst>
+          </p:cNvPr>
+          <p:cNvSpPr>
+            <a:spLocks noGrp="1"/>
+          </p:cNvSpPr>
+          <p:nvPr>
+            <p:ph idx="1"/>
+          </p:nvPr>
+        </p:nvSpPr>
+        <p:spPr/>
+        <p:txBody>
+          <a:bodyPr>
+            <a:normAutofit fontScale="92500"/>
+          </a:bodyPr>
+          <a:lstStyle/>
+          <a:p>
+            <a:pPr marL="457200" indent="-457200">
+              <a:buClr>
+                <a:schemeClr val="accent1"/>
+              </a:buClr>
+              <a:buFont typeface="+mj-lt"/>
+              <a:buAutoNum type="arabicPeriod"/>
+            </a:pPr>
+            <a:r>
+              <a:rPr lang="en-GB" dirty="0"/>
+              <a:t>Create a texture object → our depth map.</a:t>
+            </a:r>
+          </a:p>
+          <a:p>
+            <a:pPr marL="457200" indent="-457200">
+              <a:buClr>
+                <a:schemeClr val="accent1"/>
+              </a:buClr>
+              <a:buFont typeface="+mj-lt"/>
+              <a:buAutoNum type="arabicPeriod"/>
+            </a:pPr>
+            <a:r>
+              <a:rPr lang="en-GB" dirty="0"/>
+              <a:t>Transform scene to light space</a:t>
+            </a:r>
+          </a:p>
+          <a:p>
+            <a:pPr lvl="1">
+              <a:buClr>
+                <a:schemeClr val="accent1"/>
+              </a:buClr>
+            </a:pPr>
+            <a:endParaRPr lang="en-GB" dirty="0"/>
+          </a:p>
+          <a:p>
+            <a:pPr lvl="1">
+              <a:buClr>
+                <a:schemeClr val="accent1"/>
+              </a:buClr>
+            </a:pPr>
+            <a:endParaRPr lang="en-GB" dirty="0"/>
+          </a:p>
+          <a:p>
+            <a:pPr lvl="1">
+              <a:buClr>
+                <a:schemeClr val="accent1"/>
+              </a:buClr>
+            </a:pPr>
+            <a:endParaRPr lang="en-GB" dirty="0"/>
+          </a:p>
+          <a:p>
+            <a:pPr lvl="1">
+              <a:buClr>
+                <a:schemeClr val="accent1"/>
+              </a:buClr>
+            </a:pPr>
+            <a:endParaRPr lang="en-GB" dirty="0"/>
+          </a:p>
+          <a:p>
+            <a:pPr lvl="1">
+              <a:buClr>
+                <a:schemeClr val="accent1"/>
+              </a:buClr>
+            </a:pPr>
+            <a:r>
+              <a:rPr lang="en-GB" dirty="0"/>
+              <a:t>Use view &amp; projection matrices specific to the light source</a:t>
+            </a:r>
+          </a:p>
+          <a:p>
+            <a:pPr lvl="1">
+              <a:buClr>
+                <a:schemeClr val="accent1"/>
+              </a:buClr>
+            </a:pPr>
+            <a:r>
+              <a:rPr lang="en-GB" dirty="0"/>
+              <a:t>Then, calculate an MVP matrix to use in the vertex shader</a:t>
+            </a:r>
+          </a:p>
+          <a:p>
+            <a:pPr marL="457200" indent="-457200">
+              <a:buClr>
+                <a:schemeClr val="accent1"/>
+              </a:buClr>
+              <a:buFont typeface="+mj-lt"/>
+              <a:buAutoNum type="arabicPeriod" startAt="3"/>
+            </a:pPr>
+            <a:r>
+              <a:rPr lang="en-GB" dirty="0"/>
+              <a:t>Render to depth map</a:t>
+            </a:r>
+            <a:endParaRPr lang="en-GB" sz="2400" dirty="0"/>
+          </a:p>
+          <a:p>
+            <a:pPr lvl="1">
+              <a:buClr>
+                <a:schemeClr val="accent1"/>
+              </a:buClr>
+            </a:pPr>
+            <a:r>
+              <a:rPr lang="en-GB" dirty="0"/>
+              <a:t>Vertex shader – transforms vertices to light space using calculated matrix</a:t>
+            </a:r>
+          </a:p>
+          <a:p>
+            <a:pPr lvl="1">
+              <a:buClr>
+                <a:schemeClr val="accent1"/>
+              </a:buClr>
+            </a:pPr>
+            <a:r>
+              <a:rPr lang="en-GB" dirty="0"/>
+              <a:t>Fragment shader – empty,  since no colour data</a:t>
+            </a:r>
+          </a:p>
+          <a:p>
+            <a:pPr marL="914400" lvl="1" indent="-457200">
+              <a:buClr>
+                <a:schemeClr val="accent1"/>
+              </a:buClr>
+              <a:buFont typeface="+mj-lt"/>
+              <a:buAutoNum type="arabicPeriod" startAt="3"/>
+            </a:pPr>
+            <a:endParaRPr lang="en-GB" dirty="0"/>
+          </a:p>
+          <a:p>
+            <a:pPr marL="457200" lvl="1" indent="0">
+              <a:buClr>
+                <a:schemeClr val="accent1"/>
+              </a:buClr>
+              <a:buNone/>
+            </a:pPr>
+            <a:endParaRPr lang="en-GB" dirty="0"/>
+          </a:p>
+        </p:txBody>
+      </p:sp>
+      <p:pic>
+        <p:nvPicPr>
+          <p:cNvPr id="6" name="Imagen 5" descr="Diagrama&#10;&#10;Descripción generada automáticamente">
+            <a:extLst>
+              <a:ext uri="{FF2B5EF4-FFF2-40B4-BE49-F238E27FC236}">
+                <a16:creationId xmlns:a16="http://schemas.microsoft.com/office/drawing/2014/main" id="{DD967D67-A89F-4780-B68B-87A6CE520A01}"/>
+              </a:ext>
+            </a:extLst>
+          </p:cNvPr>
+          <p:cNvPicPr>
+            <a:picLocks noChangeAspect="1"/>
+          </p:cNvPicPr>
+          <p:nvPr/>
+        </p:nvPicPr>
+        <p:blipFill>
+          <a:blip r:embed="rId3">
+            <a:extLst>
+              <a:ext uri="{28A0092B-C50C-407E-A947-70E740481C1C}">
+                <a14:useLocalDpi xmlns:a14="http://schemas.microsoft.com/office/drawing/2010/main" val="0"/>
+              </a:ext>
+            </a:extLst>
+          </a:blip>
+          <a:stretch>
+            <a:fillRect/>
+          </a:stretch>
+        </p:blipFill>
+        <p:spPr>
+          <a:xfrm>
+            <a:off x="1783041" y="2551882"/>
+            <a:ext cx="8155709" cy="1754235"/>
+          </a:xfrm>
+          <a:prstGeom prst="rect">
+            <a:avLst/>
+          </a:prstGeom>
+        </p:spPr>
+      </p:pic>
+    </p:spTree>
+    <p:extLst>
+      <p:ext uri="{BB962C8B-B14F-4D97-AF65-F5344CB8AC3E}">
+        <p14:creationId xmlns:p14="http://schemas.microsoft.com/office/powerpoint/2010/main" val="1837007626"/>
+      </p:ext>
+    </p:extLst>
+  </p:cSld>
+  <p:clrMapOvr>
+    <a:masterClrMapping/>
+  </p:clrMapOvr>
+  <p:timing>
+    <p:tnLst>
+      <p:par>
+        <p:cTn id="1" dur="indefinite" restart="never" nodeType="tmRoot">
+          <p:childTnLst>
+            <p:seq concurrent="1" nextAc="seek">
+              <p:cTn id="2" dur="indefinite" nodeType="mainSeq">
+                <p:childTnLst>
+                  <p:par>
+                    <p:cTn id="3" fill="hold">
+                      <p:stCondLst>
+                        <p:cond delay="indefinite"/>
+                      </p:stCondLst>
+                      <p:childTnLst>
+                        <p:par>
+                          <p:cTn id="4" fill="hold">
+                            <p:stCondLst>
+                              <p:cond delay="0"/>
+                            </p:stCondLst>
+                            <p:childTnLst>
+                              <p:par>
+                                <p:cTn id="5" presetID="1" presetClass="entr" presetSubtype="0" fill="hold" grpId="0" nodeType="clickEffect">
+                                  <p:stCondLst>
+                                    <p:cond delay="0"/>
+                                  </p:stCondLst>
+                                  <p:childTnLst>
+                                    <p:set>
+                                      <p:cBhvr>
+                                        <p:cTn id="6" dur="1" fill="hold">
+                                          <p:stCondLst>
+                                            <p:cond delay="0"/>
+                                          </p:stCondLst>
+                                        </p:cTn>
+                                        <p:tgtEl>
+                                          <p:spTgt spid="3">
+                                            <p:txEl>
+                                              <p:pRg st="8" end="8"/>
+                                            </p:txEl>
+                                          </p:spTgt>
+                                        </p:tgtEl>
+                                        <p:attrNameLst>
+                                          <p:attrName>style.visibility</p:attrName>
+                                        </p:attrNameLst>
+                                      </p:cBhvr>
+                                      <p:to>
+                                        <p:strVal val="visible"/>
+                                      </p:to>
+                                    </p:set>
+                                  </p:childTnLst>
+                                </p:cTn>
+                              </p:par>
+                              <p:par>
+                                <p:cTn id="7" presetID="1" presetClass="entr" presetSubtype="0" fill="hold" grpId="0" nodeType="withEffect">
+                                  <p:stCondLst>
+                                    <p:cond delay="0"/>
+                                  </p:stCondLst>
+                                  <p:childTnLst>
+                                    <p:set>
+                                      <p:cBhvr>
+                                        <p:cTn id="8" dur="1" fill="hold">
+                                          <p:stCondLst>
+                                            <p:cond delay="0"/>
+                                          </p:stCondLst>
+                                        </p:cTn>
+                                        <p:tgtEl>
+                                          <p:spTgt spid="3">
+                                            <p:txEl>
+                                              <p:pRg st="9" end="9"/>
+                                            </p:txEl>
+                                          </p:spTgt>
+                                        </p:tgtEl>
+                                        <p:attrNameLst>
+                                          <p:attrName>style.visibility</p:attrName>
+                                        </p:attrNameLst>
+                                      </p:cBhvr>
+                                      <p:to>
+                                        <p:strVal val="visible"/>
+                                      </p:to>
+                                    </p:set>
+                                  </p:childTnLst>
+                                </p:cTn>
+                              </p:par>
+                              <p:par>
+                                <p:cTn id="9" presetID="1" presetClass="entr" presetSubtype="0" fill="hold" grpId="0" nodeType="withEffect">
+                                  <p:stCondLst>
+                                    <p:cond delay="0"/>
+                                  </p:stCondLst>
+                                  <p:childTnLst>
+                                    <p:set>
+                                      <p:cBhvr>
+                                        <p:cTn id="10" dur="1" fill="hold">
+                                          <p:stCondLst>
+                                            <p:cond delay="0"/>
+                                          </p:stCondLst>
+                                        </p:cTn>
+                                        <p:tgtEl>
+                                          <p:spTgt spid="3">
+                                            <p:txEl>
+                                              <p:pRg st="10" end="10"/>
+                                            </p:txEl>
+                                          </p:spTgt>
+                                        </p:tgtEl>
+                                        <p:attrNameLst>
+                                          <p:attrName>style.visibility</p:attrName>
+                                        </p:attrNameLst>
+                                      </p:cBhvr>
+                                      <p:to>
+                                        <p:strVal val="visible"/>
+                                      </p:to>
+                                    </p:set>
+                                  </p:childTnLst>
+                                </p:cTn>
+                              </p:par>
+                            </p:childTnLst>
+                          </p:cTn>
+                        </p:par>
+                      </p:childTnLst>
+                    </p:cTn>
+                  </p:par>
+                </p:childTnLst>
+              </p:cTn>
+              <p:prevCondLst>
+                <p:cond evt="onPrev" delay="0">
+                  <p:tgtEl>
+                    <p:sldTgt/>
+                  </p:tgtEl>
+                </p:cond>
+              </p:prevCondLst>
+              <p:nextCondLst>
+                <p:cond evt="onNext" delay="0">
+                  <p:tgtEl>
+                    <p:sldTgt/>
+                  </p:tgtEl>
+                </p:cond>
+              </p:nextCondLst>
+            </p:seq>
+          </p:childTnLst>
+        </p:cTn>
+      </p:par>
+    </p:tnLst>
+    <p:bldLst>
+      <p:bldP spid="3" grpId="0" uiExpand="1" build="p"/>
+    </p:bldLst>
+  </p:timing>
+</p:sld>
+</file>
+
+<file path=ppt/slides/slide14.xml><?xml version="1.0" encoding="utf-8"?>
+<p:sld xmlns:a="http://schemas.openxmlformats.org/drawingml/2006/main" xmlns:r="http://schemas.openxmlformats.org/officeDocument/2006/relationships" xmlns:p="http://schemas.openxmlformats.org/presentationml/2006/main">
+  <p:cSld>
+    <p:spTree>
+      <p:nvGrpSpPr>
+        <p:cNvPr id="1" name=""/>
+        <p:cNvGrpSpPr/>
+        <p:nvPr/>
+      </p:nvGrpSpPr>
+      <p:grpSpPr>
+        <a:xfrm>
+          <a:off x="0" y="0"/>
+          <a:ext cx="0" cy="0"/>
+          <a:chOff x="0" y="0"/>
+          <a:chExt cx="0" cy="0"/>
+        </a:xfrm>
+      </p:grpSpPr>
+      <p:sp>
+        <p:nvSpPr>
+          <p:cNvPr id="2" name="Título 1">
+            <a:extLst>
+              <a:ext uri="{FF2B5EF4-FFF2-40B4-BE49-F238E27FC236}">
+                <a16:creationId xmlns:a16="http://schemas.microsoft.com/office/drawing/2014/main" id="{B821BF0C-12EB-487F-87F9-7201A9BBFF36}"/>
+              </a:ext>
+            </a:extLst>
+          </p:cNvPr>
+          <p:cNvSpPr>
+            <a:spLocks noGrp="1"/>
+          </p:cNvSpPr>
+          <p:nvPr>
+            <p:ph type="title"/>
+          </p:nvPr>
+        </p:nvSpPr>
+        <p:spPr/>
+        <p:txBody>
+          <a:bodyPr/>
+          <a:lstStyle/>
+          <a:p>
+            <a:r>
+              <a:rPr lang="en-GB" dirty="0">
+                <a:solidFill>
+                  <a:schemeClr val="accent1"/>
+                </a:solidFill>
+              </a:rPr>
+              <a:t>Method</a:t>
+            </a:r>
+            <a:r>
+              <a:rPr lang="en-GB" sz="2400" dirty="0">
+                <a:solidFill>
+                  <a:schemeClr val="accent1"/>
+                </a:solidFill>
+              </a:rPr>
+              <a:t> (directional lights)</a:t>
+            </a:r>
+            <a:endParaRPr lang="en-GB" dirty="0">
+              <a:solidFill>
+                <a:schemeClr val="accent1"/>
+              </a:solidFill>
+            </a:endParaRPr>
+          </a:p>
+        </p:txBody>
+      </p:sp>
+      <p:sp>
+        <p:nvSpPr>
+          <p:cNvPr id="3" name="Marcador de contenido 2">
+            <a:extLst>
+              <a:ext uri="{FF2B5EF4-FFF2-40B4-BE49-F238E27FC236}">
+                <a16:creationId xmlns:a16="http://schemas.microsoft.com/office/drawing/2014/main" id="{FAF98818-5F5B-43A5-BAC3-BB889C63F6F1}"/>
+              </a:ext>
+            </a:extLst>
+          </p:cNvPr>
+          <p:cNvSpPr>
+            <a:spLocks noGrp="1"/>
+          </p:cNvSpPr>
+          <p:nvPr>
+            <p:ph idx="1"/>
+          </p:nvPr>
+        </p:nvSpPr>
+        <p:spPr/>
+        <p:txBody>
+          <a:bodyPr/>
+          <a:lstStyle/>
+          <a:p>
+            <a:pPr>
+              <a:buClr>
+                <a:schemeClr val="accent1"/>
+              </a:buClr>
+            </a:pPr>
+            <a:r>
+              <a:rPr lang="en-GB" dirty="0">
+                <a:solidFill>
+                  <a:schemeClr val="tx2"/>
+                </a:solidFill>
+              </a:rPr>
+              <a:t>2 pass algorithm:</a:t>
+            </a:r>
+          </a:p>
+          <a:p>
+            <a:pPr marL="914400" lvl="1" indent="-457200">
+              <a:buClr>
+                <a:schemeClr val="accent1"/>
+              </a:buClr>
+              <a:buFont typeface="+mj-lt"/>
+              <a:buAutoNum type="arabicPeriod"/>
+            </a:pPr>
+            <a:r>
+              <a:rPr lang="en-GB" dirty="0">
+                <a:solidFill>
+                  <a:schemeClr val="tx2"/>
+                </a:solidFill>
+              </a:rPr>
+              <a:t>Generate Depth Map by rendering scene from light’s POV</a:t>
+            </a:r>
+          </a:p>
+          <a:p>
+            <a:pPr marL="914400" lvl="1" indent="-457200">
+              <a:buClr>
+                <a:schemeClr val="accent1"/>
+              </a:buClr>
+              <a:buFont typeface="+mj-lt"/>
+              <a:buAutoNum type="arabicPeriod"/>
+            </a:pPr>
+            <a:r>
+              <a:rPr lang="en-GB" dirty="0"/>
+              <a:t>Render scene from camera’s POV…</a:t>
+            </a:r>
+          </a:p>
+          <a:p>
+            <a:pPr marL="457200" lvl="1" indent="0">
+              <a:buClr>
+                <a:schemeClr val="accent1"/>
+              </a:buClr>
+              <a:buNone/>
+            </a:pPr>
+            <a:r>
+              <a:rPr lang="en-GB" dirty="0"/>
+              <a:t>		…using generated Depth Map to determine if fragment is lit </a:t>
+            </a:r>
+          </a:p>
+          <a:p>
+            <a:pPr marL="457200" lvl="1" indent="0">
+              <a:buClr>
+                <a:schemeClr val="accent1"/>
+              </a:buClr>
+              <a:buNone/>
+            </a:pPr>
+            <a:r>
+              <a:rPr lang="en-GB" dirty="0"/>
+              <a:t>		    or in shadow</a:t>
+            </a:r>
+          </a:p>
+          <a:p>
+            <a:pPr marL="0" indent="0">
+              <a:buClr>
+                <a:schemeClr val="accent1"/>
+              </a:buClr>
+              <a:buNone/>
+            </a:pPr>
+            <a:endParaRPr lang="en-GB" dirty="0"/>
+          </a:p>
+        </p:txBody>
+      </p:sp>
+    </p:spTree>
+    <p:extLst>
+      <p:ext uri="{BB962C8B-B14F-4D97-AF65-F5344CB8AC3E}">
+        <p14:creationId xmlns:p14="http://schemas.microsoft.com/office/powerpoint/2010/main" val="1859927173"/>
+      </p:ext>
+    </p:extLst>
+  </p:cSld>
+  <p:clrMapOvr>
+    <a:masterClrMapping/>
+  </p:clrMapOvr>
+</p:sld>
+</file>
+
+<file path=ppt/slides/slide15.xml><?xml version="1.0" encoding="utf-8"?>
+<p:sld xmlns:a="http://schemas.openxmlformats.org/drawingml/2006/main" xmlns:r="http://schemas.openxmlformats.org/officeDocument/2006/relationships" xmlns:p="http://schemas.openxmlformats.org/presentationml/2006/main">
+  <p:cSld>
+    <p:spTree>
+      <p:nvGrpSpPr>
+        <p:cNvPr id="1" name=""/>
+        <p:cNvGrpSpPr/>
+        <p:nvPr/>
+      </p:nvGrpSpPr>
+      <p:grpSpPr>
+        <a:xfrm>
+          <a:off x="0" y="0"/>
+          <a:ext cx="0" cy="0"/>
+          <a:chOff x="0" y="0"/>
+          <a:chExt cx="0" cy="0"/>
+        </a:xfrm>
+      </p:grpSpPr>
+      <p:sp>
+        <p:nvSpPr>
+          <p:cNvPr id="2" name="Título 1">
+            <a:extLst>
+              <a:ext uri="{FF2B5EF4-FFF2-40B4-BE49-F238E27FC236}">
+                <a16:creationId xmlns:a16="http://schemas.microsoft.com/office/drawing/2014/main" id="{ACB7C790-2E9C-4B76-88EC-56FA8D07D236}"/>
+              </a:ext>
+            </a:extLst>
+          </p:cNvPr>
+          <p:cNvSpPr>
+            <a:spLocks noGrp="1"/>
+          </p:cNvSpPr>
+          <p:nvPr>
+            <p:ph type="title"/>
+          </p:nvPr>
+        </p:nvSpPr>
+        <p:spPr/>
+        <p:txBody>
+          <a:bodyPr/>
+          <a:lstStyle/>
+          <a:p>
+            <a:r>
+              <a:rPr lang="en-GB" dirty="0">
+                <a:solidFill>
+                  <a:schemeClr val="accent1"/>
+                </a:solidFill>
+              </a:rPr>
               <a:t>Step 2) render scene (1/2)</a:t>
             </a:r>
           </a:p>
         </p:txBody>
       </p:sp>
-      <mc:AlternateContent xmlns:mc="http://schemas.openxmlformats.org/markup-compatibility/2006">
-        <mc:Choice xmlns:a14="http://schemas.microsoft.com/office/drawing/2010/main" Requires="a14">
+      <mc:AlternateContent xmlns:mc="http://schemas.openxmlformats.org/markup-compatibility/2006" xmlns:a14="http://schemas.microsoft.com/office/drawing/2010/main">
+        <mc:Choice Requires="a14">
           <p:sp>
             <p:nvSpPr>
               <p:cNvPr id="3" name="Marcador de contenido 2">
@@ -5711,7 +6537,7 @@
             </p:txBody>
           </p:sp>
         </mc:Choice>
-        <mc:Fallback>
+        <mc:Fallback xmlns="">
           <p:sp>
             <p:nvSpPr>
               <p:cNvPr id="3" name="Marcador de contenido 2">
@@ -6179,7 +7005,7 @@
 </p:sld>
 </file>
 
-<file path=ppt/slides/slide14.xml><?xml version="1.0" encoding="utf-8"?>
+<file path=ppt/slides/slide16.xml><?xml version="1.0" encoding="utf-8"?>
 <p:sld xmlns:a="http://schemas.openxmlformats.org/drawingml/2006/main" xmlns:r="http://schemas.openxmlformats.org/officeDocument/2006/relationships" xmlns:p="http://schemas.openxmlformats.org/presentationml/2006/main">
   <p:cSld>
     <p:spTree>
@@ -6261,7 +7087,11 @@
                   <a:buChar char="§"/>
                 </a:pPr>
                 <a:r>
-                  <a:rPr lang="en-GB" sz="2000" dirty="0"/>
+                  <a:rPr lang="en-GB" sz="2000" dirty="0">
+                    <a:solidFill>
+                      <a:schemeClr val="tx2"/>
+                    </a:solidFill>
+                  </a:rPr>
                   <a:t>Fragment shader – checks if lit or in shadow:</a:t>
                 </a:r>
               </a:p>
@@ -6272,7 +7102,11 @@
                   </a:buClr>
                 </a:pPr>
                 <a:r>
-                  <a:rPr lang="en-GB" sz="1800" dirty="0"/>
+                  <a:rPr lang="en-GB" sz="1800" dirty="0">
+                    <a:solidFill>
+                      <a:schemeClr val="tx2"/>
+                    </a:solidFill>
+                  </a:rPr>
                   <a:t>Samples corresponding point in depth map → depth of closest object to light, </a:t>
                 </a:r>
                 <a14:m>
@@ -6281,6 +7115,9 @@
                       <m:sSubPr>
                         <m:ctrlPr>
                           <a:rPr lang="es-ES" sz="1800" b="0" i="1" smtClean="0">
+                            <a:solidFill>
+                              <a:schemeClr val="tx2"/>
+                            </a:solidFill>
                             <a:latin typeface="Cambria Math" panose="02040503050406030204" pitchFamily="18" charset="0"/>
                           </a:rPr>
                         </m:ctrlPr>
@@ -6288,6 +7125,9 @@
                       <m:e>
                         <m:r>
                           <a:rPr lang="es-ES" sz="1800" b="0" i="1" smtClean="0">
+                            <a:solidFill>
+                              <a:schemeClr val="tx2"/>
+                            </a:solidFill>
                             <a:latin typeface="Cambria Math" panose="02040503050406030204" pitchFamily="18" charset="0"/>
                           </a:rPr>
                           <m:t>𝑧</m:t>
@@ -6296,6 +7136,9 @@
                       <m:sub>
                         <m:r>
                           <a:rPr lang="es-ES" sz="1800" b="0" i="1" smtClean="0">
+                            <a:solidFill>
+                              <a:schemeClr val="tx2"/>
+                            </a:solidFill>
                             <a:latin typeface="Cambria Math" panose="02040503050406030204" pitchFamily="18" charset="0"/>
                           </a:rPr>
                           <m:t>𝑐</m:t>
@@ -6304,7 +7147,11 @@
                     </m:sSub>
                   </m:oMath>
                 </a14:m>
-                <a:endParaRPr lang="en-GB" sz="1800" dirty="0"/>
+                <a:endParaRPr lang="en-GB" sz="1800" dirty="0">
+                  <a:solidFill>
+                    <a:schemeClr val="tx2"/>
+                  </a:solidFill>
+                </a:endParaRPr>
               </a:p>
               <a:p>
                 <a:pPr lvl="2">
@@ -6313,7 +7160,11 @@
                   </a:buClr>
                 </a:pPr>
                 <a:r>
-                  <a:rPr lang="en-GB" sz="1800" dirty="0"/>
+                  <a:rPr lang="en-GB" sz="1800" dirty="0">
+                    <a:solidFill>
+                      <a:schemeClr val="tx2"/>
+                    </a:solidFill>
+                  </a:rPr>
                   <a:t>Compares with depth of fragment in light space, </a:t>
                 </a:r>
                 <a14:m>
@@ -6322,6 +7173,9 @@
                       <m:sSubPr>
                         <m:ctrlPr>
                           <a:rPr lang="es-ES" sz="1800" b="0" i="1" smtClean="0">
+                            <a:solidFill>
+                              <a:schemeClr val="tx2"/>
+                            </a:solidFill>
                             <a:latin typeface="Cambria Math" panose="02040503050406030204" pitchFamily="18" charset="0"/>
                           </a:rPr>
                         </m:ctrlPr>
@@ -6329,6 +7183,9 @@
                       <m:e>
                         <m:r>
                           <a:rPr lang="es-ES" sz="1800" b="0" i="1" smtClean="0">
+                            <a:solidFill>
+                              <a:schemeClr val="tx2"/>
+                            </a:solidFill>
                             <a:latin typeface="Cambria Math" panose="02040503050406030204" pitchFamily="18" charset="0"/>
                           </a:rPr>
                           <m:t>𝑧</m:t>
@@ -6337,6 +7194,9 @@
                       <m:sub>
                         <m:r>
                           <a:rPr lang="es-ES" sz="1800" b="0" i="1" smtClean="0">
+                            <a:solidFill>
+                              <a:schemeClr val="tx2"/>
+                            </a:solidFill>
                             <a:latin typeface="Cambria Math" panose="02040503050406030204" pitchFamily="18" charset="0"/>
                           </a:rPr>
                           <m:t>𝑓</m:t>
@@ -6345,7 +7205,11 @@
                     </m:sSub>
                   </m:oMath>
                 </a14:m>
-                <a:endParaRPr lang="en-GB" sz="1800" dirty="0"/>
+                <a:endParaRPr lang="en-GB" sz="1800" dirty="0">
+                  <a:solidFill>
+                    <a:schemeClr val="tx2"/>
+                  </a:solidFill>
+                </a:endParaRPr>
               </a:p>
               <a:p>
                 <a:pPr lvl="2">
@@ -6354,7 +7218,11 @@
                   </a:buClr>
                 </a:pPr>
                 <a:r>
-                  <a:rPr lang="en-GB" sz="1800" dirty="0"/>
+                  <a:rPr lang="en-GB" sz="1800" dirty="0">
+                    <a:solidFill>
+                      <a:schemeClr val="tx2"/>
+                    </a:solidFill>
+                  </a:rPr>
                   <a:t>If </a:t>
                 </a:r>
                 <a14:m>
@@ -6363,6 +7231,9 @@
                       <m:sSubPr>
                         <m:ctrlPr>
                           <a:rPr lang="es-ES" sz="1800" b="0" i="1" smtClean="0">
+                            <a:solidFill>
+                              <a:schemeClr val="tx2"/>
+                            </a:solidFill>
                             <a:latin typeface="Cambria Math" panose="02040503050406030204" pitchFamily="18" charset="0"/>
                           </a:rPr>
                         </m:ctrlPr>
@@ -6370,6 +7241,9 @@
                       <m:e>
                         <m:r>
                           <a:rPr lang="es-ES" sz="1800" b="0" i="1" smtClean="0">
+                            <a:solidFill>
+                              <a:schemeClr val="tx2"/>
+                            </a:solidFill>
                             <a:latin typeface="Cambria Math" panose="02040503050406030204" pitchFamily="18" charset="0"/>
                           </a:rPr>
                           <m:t>𝑧</m:t>
@@ -6378,6 +7252,9 @@
                       <m:sub>
                         <m:r>
                           <a:rPr lang="es-ES" sz="1800" b="0" i="1" smtClean="0">
+                            <a:solidFill>
+                              <a:schemeClr val="tx2"/>
+                            </a:solidFill>
                             <a:latin typeface="Cambria Math" panose="02040503050406030204" pitchFamily="18" charset="0"/>
                           </a:rPr>
                           <m:t>𝑓</m:t>
@@ -6386,6 +7263,9 @@
                     </m:sSub>
                     <m:r>
                       <a:rPr lang="es-ES" sz="1800" b="0" i="0" smtClean="0">
+                        <a:solidFill>
+                          <a:schemeClr val="tx2"/>
+                        </a:solidFill>
                         <a:latin typeface="Cambria Math" panose="02040503050406030204" pitchFamily="18" charset="0"/>
                       </a:rPr>
                       <m:t>&gt;</m:t>
@@ -6394,6 +7274,9 @@
                       <m:sSubPr>
                         <m:ctrlPr>
                           <a:rPr lang="es-ES" sz="1800" b="0" i="1" smtClean="0">
+                            <a:solidFill>
+                              <a:schemeClr val="tx2"/>
+                            </a:solidFill>
                             <a:latin typeface="Cambria Math" panose="02040503050406030204" pitchFamily="18" charset="0"/>
                           </a:rPr>
                         </m:ctrlPr>
@@ -6401,6 +7284,9 @@
                       <m:e>
                         <m:r>
                           <a:rPr lang="es-ES" sz="1800" b="0" i="1" smtClean="0">
+                            <a:solidFill>
+                              <a:schemeClr val="tx2"/>
+                            </a:solidFill>
                             <a:latin typeface="Cambria Math" panose="02040503050406030204" pitchFamily="18" charset="0"/>
                           </a:rPr>
                           <m:t>𝑧</m:t>
@@ -6409,6 +7295,9 @@
                       <m:sub>
                         <m:r>
                           <a:rPr lang="es-ES" sz="1800" b="0" i="1" smtClean="0">
+                            <a:solidFill>
+                              <a:schemeClr val="tx2"/>
+                            </a:solidFill>
                             <a:latin typeface="Cambria Math" panose="02040503050406030204" pitchFamily="18" charset="0"/>
                           </a:rPr>
                           <m:t>𝑠</m:t>
@@ -6417,6 +7306,9 @@
                     </m:sSub>
                     <m:r>
                       <a:rPr lang="es-ES" sz="1800" i="1">
+                        <a:solidFill>
+                          <a:schemeClr val="tx2"/>
+                        </a:solidFill>
                         <a:latin typeface="Cambria Math" panose="02040503050406030204" pitchFamily="18" charset="0"/>
                       </a:rPr>
                       <m:t>⇒</m:t>
@@ -6424,7 +7316,11 @@
                   </m:oMath>
                 </a14:m>
                 <a:r>
-                  <a:rPr lang="en-GB" sz="1800" dirty="0"/>
+                  <a:rPr lang="en-GB" sz="1800" dirty="0">
+                    <a:solidFill>
+                      <a:schemeClr val="tx2"/>
+                    </a:solidFill>
+                  </a:rPr>
                   <a:t> in shadow (not seen from light)</a:t>
                 </a:r>
               </a:p>
@@ -6550,148 +7446,6 @@
                                         <p:tgtEl>
                                           <p:spTgt spid="3">
                                             <p:txEl>
-                                              <p:pRg st="0" end="0"/>
-                                            </p:txEl>
-                                          </p:spTgt>
-                                        </p:tgtEl>
-                                        <p:attrNameLst>
-                                          <p:attrName>style.visibility</p:attrName>
-                                        </p:attrNameLst>
-                                      </p:cBhvr>
-                                      <p:to>
-                                        <p:strVal val="visible"/>
-                                      </p:to>
-                                    </p:set>
-                                  </p:childTnLst>
-                                </p:cTn>
-                              </p:par>
-                              <p:par>
-                                <p:cTn id="7" presetID="1" presetClass="entr" presetSubtype="0" fill="hold" grpId="0" nodeType="withEffect">
-                                  <p:stCondLst>
-                                    <p:cond delay="0"/>
-                                  </p:stCondLst>
-                                  <p:childTnLst>
-                                    <p:set>
-                                      <p:cBhvr>
-                                        <p:cTn id="8" dur="1" fill="hold">
-                                          <p:stCondLst>
-                                            <p:cond delay="0"/>
-                                          </p:stCondLst>
-                                        </p:cTn>
-                                        <p:tgtEl>
-                                          <p:spTgt spid="3">
-                                            <p:txEl>
-                                              <p:pRg st="1" end="1"/>
-                                            </p:txEl>
-                                          </p:spTgt>
-                                        </p:tgtEl>
-                                        <p:attrNameLst>
-                                          <p:attrName>style.visibility</p:attrName>
-                                        </p:attrNameLst>
-                                      </p:cBhvr>
-                                      <p:to>
-                                        <p:strVal val="visible"/>
-                                      </p:to>
-                                    </p:set>
-                                  </p:childTnLst>
-                                </p:cTn>
-                              </p:par>
-                              <p:par>
-                                <p:cTn id="9" presetID="1" presetClass="entr" presetSubtype="0" fill="hold" grpId="0" nodeType="withEffect">
-                                  <p:stCondLst>
-                                    <p:cond delay="0"/>
-                                  </p:stCondLst>
-                                  <p:childTnLst>
-                                    <p:set>
-                                      <p:cBhvr>
-                                        <p:cTn id="10" dur="1" fill="hold">
-                                          <p:stCondLst>
-                                            <p:cond delay="0"/>
-                                          </p:stCondLst>
-                                        </p:cTn>
-                                        <p:tgtEl>
-                                          <p:spTgt spid="3">
-                                            <p:txEl>
-                                              <p:pRg st="2" end="2"/>
-                                            </p:txEl>
-                                          </p:spTgt>
-                                        </p:tgtEl>
-                                        <p:attrNameLst>
-                                          <p:attrName>style.visibility</p:attrName>
-                                        </p:attrNameLst>
-                                      </p:cBhvr>
-                                      <p:to>
-                                        <p:strVal val="visible"/>
-                                      </p:to>
-                                    </p:set>
-                                  </p:childTnLst>
-                                </p:cTn>
-                              </p:par>
-                              <p:par>
-                                <p:cTn id="11" presetID="1" presetClass="entr" presetSubtype="0" fill="hold" grpId="0" nodeType="withEffect">
-                                  <p:stCondLst>
-                                    <p:cond delay="0"/>
-                                  </p:stCondLst>
-                                  <p:childTnLst>
-                                    <p:set>
-                                      <p:cBhvr>
-                                        <p:cTn id="12" dur="1" fill="hold">
-                                          <p:stCondLst>
-                                            <p:cond delay="0"/>
-                                          </p:stCondLst>
-                                        </p:cTn>
-                                        <p:tgtEl>
-                                          <p:spTgt spid="3">
-                                            <p:txEl>
-                                              <p:pRg st="3" end="3"/>
-                                            </p:txEl>
-                                          </p:spTgt>
-                                        </p:tgtEl>
-                                        <p:attrNameLst>
-                                          <p:attrName>style.visibility</p:attrName>
-                                        </p:attrNameLst>
-                                      </p:cBhvr>
-                                      <p:to>
-                                        <p:strVal val="visible"/>
-                                      </p:to>
-                                    </p:set>
-                                  </p:childTnLst>
-                                </p:cTn>
-                              </p:par>
-                            </p:childTnLst>
-                          </p:cTn>
-                        </p:par>
-                      </p:childTnLst>
-                    </p:cTn>
-                  </p:par>
-                  <p:par>
-                    <p:cTn id="13" fill="hold">
-                      <p:stCondLst>
-                        <p:cond delay="indefinite"/>
-                      </p:stCondLst>
-                      <p:childTnLst>
-                        <p:par>
-                          <p:cTn id="14" fill="hold">
-                            <p:stCondLst>
-                              <p:cond delay="0"/>
-                            </p:stCondLst>
-                            <p:childTnLst>
-                              <p:par>
-                                <p:cTn id="15" presetID="1" presetClass="entr" presetSubtype="0" fill="hold" grpId="0" nodeType="clickEffect">
-                                  <p:stCondLst>
-                                    <p:cond delay="0"/>
-                                  </p:stCondLst>
-                                  <p:childTnLst>
-                                    <p:set>
-                                      <p:cBhvr>
-                                        <p:cTn id="16" dur="1" fill="hold">
-                                          <p:stCondLst>
-                                            <p:cond delay="0"/>
-                                          </p:stCondLst>
-                                        </p:cTn>
-                                        <p:tgtEl>
-                                          <p:spTgt spid="3">
-                                            <p:txEl>
                                               <p:pRg st="5" end="5"/>
                                             </p:txEl>
                                           </p:spTgt>
@@ -6741,7 +7495,7 @@
 </p:sld>
 </file>
 
-<file path=ppt/slides/slide15.xml><?xml version="1.0" encoding="utf-8"?>
+<file path=ppt/slides/slide17.xml><?xml version="1.0" encoding="utf-8"?>
 <p:sld xmlns:a="http://schemas.openxmlformats.org/drawingml/2006/main" xmlns:r="http://schemas.openxmlformats.org/officeDocument/2006/relationships" xmlns:p="http://schemas.openxmlformats.org/presentationml/2006/main">
   <p:cSld>
     <p:spTree>
@@ -6909,7 +7663,7 @@
 </p:sld>
 </file>
 
-<file path=ppt/slides/slide16.xml><?xml version="1.0" encoding="utf-8"?>
+<file path=ppt/slides/slide18.xml><?xml version="1.0" encoding="utf-8"?>
 <p:sld xmlns:a="http://schemas.openxmlformats.org/drawingml/2006/main" xmlns:r="http://schemas.openxmlformats.org/officeDocument/2006/relationships" xmlns:p="http://schemas.openxmlformats.org/presentationml/2006/main">
   <p:cSld>
     <p:spTree>
@@ -6996,7 +7750,7 @@
 </p:sld>
 </file>
 
-<file path=ppt/slides/slide17.xml><?xml version="1.0" encoding="utf-8"?>
+<file path=ppt/slides/slide19.xml><?xml version="1.0" encoding="utf-8"?>
 <p:sld xmlns:a="http://schemas.openxmlformats.org/drawingml/2006/main" xmlns:r="http://schemas.openxmlformats.org/officeDocument/2006/relationships" xmlns:p="http://schemas.openxmlformats.org/presentationml/2006/main">
   <p:cSld>
     <p:spTree>

</xml_diff>

<commit_message>
Small animation fix & Proposed time allocations
Fixed some small animation mistakes for the artefacts part. Also proposed a rough initial plan for the time allocations for the different parts of the talk (deliverable to mentors, together w/this version of the slides).
</commit_message>
<xml_diff>
--- a/slides/slides.pptx
+++ b/slides/slides.pptx
@@ -7385,8 +7385,8 @@
           </a:p>
         </p:txBody>
       </p:sp>
-      <mc:AlternateContent xmlns:mc="http://schemas.openxmlformats.org/markup-compatibility/2006">
-        <mc:Choice xmlns:a14="http://schemas.microsoft.com/office/drawing/2010/main" Requires="a14">
+      <mc:AlternateContent xmlns:mc="http://schemas.openxmlformats.org/markup-compatibility/2006" xmlns:a14="http://schemas.microsoft.com/office/drawing/2010/main">
+        <mc:Choice Requires="a14">
           <p:sp>
             <p:nvSpPr>
               <p:cNvPr id="3" name="Marcador de contenido 2">
@@ -7709,7 +7709,7 @@
             </p:txBody>
           </p:sp>
         </mc:Choice>
-        <mc:Fallback>
+        <mc:Fallback xmlns="">
           <p:sp>
             <p:nvSpPr>
               <p:cNvPr id="3" name="Marcador de contenido 2">
@@ -8226,8 +8226,8 @@
           </a:p>
         </p:txBody>
       </p:sp>
-      <mc:AlternateContent xmlns:mc="http://schemas.openxmlformats.org/markup-compatibility/2006">
-        <mc:Choice xmlns:a14="http://schemas.microsoft.com/office/drawing/2010/main" Requires="a14">
+      <mc:AlternateContent xmlns:mc="http://schemas.openxmlformats.org/markup-compatibility/2006" xmlns:a14="http://schemas.microsoft.com/office/drawing/2010/main">
+        <mc:Choice Requires="a14">
           <p:sp>
             <p:nvSpPr>
               <p:cNvPr id="3" name="Marcador de contenido 2">
@@ -8512,7 +8512,7 @@
             </p:txBody>
           </p:sp>
         </mc:Choice>
-        <mc:Fallback>
+        <mc:Fallback xmlns="">
           <p:sp>
             <p:nvSpPr>
               <p:cNvPr id="3" name="Marcador de contenido 2">
@@ -9012,8 +9012,8 @@
           </a:p>
         </p:txBody>
       </p:sp>
-      <mc:AlternateContent xmlns:mc="http://schemas.openxmlformats.org/markup-compatibility/2006">
-        <mc:Choice xmlns:a14="http://schemas.microsoft.com/office/drawing/2010/main" Requires="a14">
+      <mc:AlternateContent xmlns:mc="http://schemas.openxmlformats.org/markup-compatibility/2006" xmlns:a14="http://schemas.microsoft.com/office/drawing/2010/main">
+        <mc:Choice Requires="a14">
           <p:sp>
             <p:nvSpPr>
               <p:cNvPr id="3" name="Marcador de contenido 2">
@@ -9114,7 +9114,7 @@
             </p:txBody>
           </p:sp>
         </mc:Choice>
-        <mc:Fallback>
+        <mc:Fallback xmlns="">
           <p:sp>
             <p:nvSpPr>
               <p:cNvPr id="3" name="Marcador de contenido 2">
@@ -9460,8 +9460,8 @@
           </a:p>
         </p:txBody>
       </p:sp>
-      <mc:AlternateContent xmlns:mc="http://schemas.openxmlformats.org/markup-compatibility/2006">
-        <mc:Choice xmlns:a14="http://schemas.microsoft.com/office/drawing/2010/main" Requires="a14">
+      <mc:AlternateContent xmlns:mc="http://schemas.openxmlformats.org/markup-compatibility/2006" xmlns:a14="http://schemas.microsoft.com/office/drawing/2010/main">
+        <mc:Choice Requires="a14">
           <p:sp>
             <p:nvSpPr>
               <p:cNvPr id="3" name="Marcador de contenido 2">
@@ -9736,7 +9736,7 @@
             </p:txBody>
           </p:sp>
         </mc:Choice>
-        <mc:Fallback>
+        <mc:Fallback xmlns="">
           <p:sp>
             <p:nvSpPr>
               <p:cNvPr id="3" name="Marcador de contenido 2">
@@ -10105,6 +10105,33 @@
                                   </p:childTnLst>
                                 </p:cTn>
                               </p:par>
+                              <p:par>
+                                <p:cTn id="15" presetID="1" presetClass="entr" presetSubtype="0" fill="hold" grpId="0" nodeType="withEffect">
+                                  <p:stCondLst>
+                                    <p:cond delay="0"/>
+                                  </p:stCondLst>
+                                  <p:childTnLst>
+                                    <p:set>
+                                      <p:cBhvr>
+                                        <p:cTn id="16" dur="1" fill="hold">
+                                          <p:stCondLst>
+                                            <p:cond delay="0"/>
+                                          </p:stCondLst>
+                                        </p:cTn>
+                                        <p:tgtEl>
+                                          <p:spTgt spid="5"/>
+                                        </p:tgtEl>
+                                        <p:attrNameLst>
+                                          <p:attrName>style.visibility</p:attrName>
+                                        </p:attrNameLst>
+                                      </p:cBhvr>
+                                      <p:to>
+                                        <p:strVal val="visible"/>
+                                      </p:to>
+                                    </p:set>
+                                  </p:childTnLst>
+                                </p:cTn>
+                              </p:par>
                             </p:childTnLst>
                           </p:cTn>
                         </p:par>
@@ -10133,7 +10160,8 @@
       </p:par>
     </p:tnLst>
     <p:bldLst>
-      <p:bldP spid="3" grpId="0" build="p"/>
+      <p:bldP spid="3" grpId="0" uiExpand="1" build="p"/>
+      <p:bldP spid="5" grpId="0" animBg="1"/>
     </p:bldLst>
   </p:timing>
 </p:sld>
@@ -10188,8 +10216,8 @@
           </a:p>
         </p:txBody>
       </p:sp>
-      <mc:AlternateContent xmlns:mc="http://schemas.openxmlformats.org/markup-compatibility/2006">
-        <mc:Choice xmlns:a14="http://schemas.microsoft.com/office/drawing/2010/main" Requires="a14">
+      <mc:AlternateContent xmlns:mc="http://schemas.openxmlformats.org/markup-compatibility/2006" xmlns:a14="http://schemas.microsoft.com/office/drawing/2010/main">
+        <mc:Choice Requires="a14">
           <p:sp>
             <p:nvSpPr>
               <p:cNvPr id="3" name="Marcador de contenido 2">
@@ -10503,7 +10531,7 @@
             </p:txBody>
           </p:sp>
         </mc:Choice>
-        <mc:Fallback>
+        <mc:Fallback xmlns="">
           <p:sp>
             <p:nvSpPr>
               <p:cNvPr id="3" name="Marcador de contenido 2">
@@ -10805,7 +10833,7 @@
                                         <p:tgtEl>
                                           <p:spTgt spid="3">
                                             <p:txEl>
-                                              <p:pRg st="0" end="0"/>
+                                              <p:pRg st="10" end="10"/>
                                             </p:txEl>
                                           </p:spTgt>
                                         </p:tgtEl>
@@ -10836,7 +10864,7 @@
                                         <p:tgtEl>
                                           <p:spTgt spid="3">
                                             <p:txEl>
-                                              <p:pRg st="1" end="1"/>
+                                              <p:pRg st="11" end="11"/>
                                             </p:txEl>
                                           </p:spTgt>
                                         </p:tgtEl>
@@ -10867,56 +10895,7 @@
                                         <p:tgtEl>
                                           <p:spTgt spid="3">
                                             <p:txEl>
-                                              <p:pRg st="2" end="2"/>
-                                            </p:txEl>
-                                          </p:spTgt>
-                                        </p:tgtEl>
-                                        <p:attrNameLst>
-                                          <p:attrName>style.visibility</p:attrName>
-                                        </p:attrNameLst>
-                                      </p:cBhvr>
-                                      <p:to>
-                                        <p:strVal val="visible"/>
-                                      </p:to>
-                                    </p:set>
-                                  </p:childTnLst>
-                                </p:cTn>
-                              </p:par>
-                            </p:childTnLst>
-                          </p:cTn>
-                        </p:par>
-                      </p:childTnLst>
-                    </p:cTn>
-                  </p:par>
-                  <p:par>
-                    <p:cTn id="11" fill="hold">
-                      <p:stCondLst>
-                        <p:cond delay="indefinite"/>
-                      </p:stCondLst>
-                      <p:childTnLst>
-                        <p:par>
-                          <p:cTn id="12" fill="hold">
-                            <p:stCondLst>
-                              <p:cond delay="0"/>
-                            </p:stCondLst>
-                            <p:childTnLst>
-                              <p:par>
-                                <p:cTn id="13" presetID="1" presetClass="entr" presetSubtype="0" fill="hold" grpId="0" nodeType="clickEffect">
-                                  <p:stCondLst>
-                                    <p:cond delay="0"/>
-                                  </p:stCondLst>
-                                  <p:childTnLst>
-                                    <p:set>
-                                      <p:cBhvr>
-                                        <p:cTn id="14" dur="1" fill="hold">
-                                          <p:stCondLst>
-                                            <p:cond delay="0"/>
-                                          </p:stCondLst>
-                                        </p:cTn>
-                                        <p:tgtEl>
-                                          <p:spTgt spid="3">
-                                            <p:txEl>
-                                              <p:pRg st="4" end="4"/>
+                                              <p:pRg st="12" end="12"/>
                                             </p:txEl>
                                           </p:spTgt>
                                         </p:tgtEl>
@@ -10932,228 +10911,20 @@
                                 </p:cTn>
                               </p:par>
                               <p:par>
-                                <p:cTn id="15" presetID="1" presetClass="entr" presetSubtype="0" fill="hold" grpId="0" nodeType="withEffect">
+                                <p:cTn id="11" presetID="1" presetClass="entr" presetSubtype="0" fill="hold" grpId="0" nodeType="withEffect">
                                   <p:stCondLst>
                                     <p:cond delay="0"/>
                                   </p:stCondLst>
                                   <p:childTnLst>
                                     <p:set>
                                       <p:cBhvr>
-                                        <p:cTn id="16" dur="1" fill="hold">
+                                        <p:cTn id="12" dur="1" fill="hold">
                                           <p:stCondLst>
                                             <p:cond delay="0"/>
                                           </p:stCondLst>
                                         </p:cTn>
                                         <p:tgtEl>
-                                          <p:spTgt spid="3">
-                                            <p:txEl>
-                                              <p:pRg st="5" end="5"/>
-                                            </p:txEl>
-                                          </p:spTgt>
-                                        </p:tgtEl>
-                                        <p:attrNameLst>
-                                          <p:attrName>style.visibility</p:attrName>
-                                        </p:attrNameLst>
-                                      </p:cBhvr>
-                                      <p:to>
-                                        <p:strVal val="visible"/>
-                                      </p:to>
-                                    </p:set>
-                                  </p:childTnLst>
-                                </p:cTn>
-                              </p:par>
-                              <p:par>
-                                <p:cTn id="17" presetID="1" presetClass="entr" presetSubtype="0" fill="hold" grpId="0" nodeType="withEffect">
-                                  <p:stCondLst>
-                                    <p:cond delay="0"/>
-                                  </p:stCondLst>
-                                  <p:childTnLst>
-                                    <p:set>
-                                      <p:cBhvr>
-                                        <p:cTn id="18" dur="1" fill="hold">
-                                          <p:stCondLst>
-                                            <p:cond delay="0"/>
-                                          </p:stCondLst>
-                                        </p:cTn>
-                                        <p:tgtEl>
-                                          <p:spTgt spid="3">
-                                            <p:txEl>
-                                              <p:pRg st="6" end="6"/>
-                                            </p:txEl>
-                                          </p:spTgt>
-                                        </p:tgtEl>
-                                        <p:attrNameLst>
-                                          <p:attrName>style.visibility</p:attrName>
-                                        </p:attrNameLst>
-                                      </p:cBhvr>
-                                      <p:to>
-                                        <p:strVal val="visible"/>
-                                      </p:to>
-                                    </p:set>
-                                  </p:childTnLst>
-                                </p:cTn>
-                              </p:par>
-                              <p:par>
-                                <p:cTn id="19" presetID="1" presetClass="entr" presetSubtype="0" fill="hold" grpId="0" nodeType="withEffect">
-                                  <p:stCondLst>
-                                    <p:cond delay="0"/>
-                                  </p:stCondLst>
-                                  <p:childTnLst>
-                                    <p:set>
-                                      <p:cBhvr>
-                                        <p:cTn id="20" dur="1" fill="hold">
-                                          <p:stCondLst>
-                                            <p:cond delay="0"/>
-                                          </p:stCondLst>
-                                        </p:cTn>
-                                        <p:tgtEl>
-                                          <p:spTgt spid="3">
-                                            <p:txEl>
-                                              <p:pRg st="7" end="7"/>
-                                            </p:txEl>
-                                          </p:spTgt>
-                                        </p:tgtEl>
-                                        <p:attrNameLst>
-                                          <p:attrName>style.visibility</p:attrName>
-                                        </p:attrNameLst>
-                                      </p:cBhvr>
-                                      <p:to>
-                                        <p:strVal val="visible"/>
-                                      </p:to>
-                                    </p:set>
-                                  </p:childTnLst>
-                                </p:cTn>
-                              </p:par>
-                              <p:par>
-                                <p:cTn id="21" presetID="1" presetClass="entr" presetSubtype="0" fill="hold" grpId="0" nodeType="withEffect">
-                                  <p:stCondLst>
-                                    <p:cond delay="0"/>
-                                  </p:stCondLst>
-                                  <p:childTnLst>
-                                    <p:set>
-                                      <p:cBhvr>
-                                        <p:cTn id="22" dur="1" fill="hold">
-                                          <p:stCondLst>
-                                            <p:cond delay="0"/>
-                                          </p:stCondLst>
-                                        </p:cTn>
-                                        <p:tgtEl>
-                                          <p:spTgt spid="3">
-                                            <p:txEl>
-                                              <p:pRg st="8" end="8"/>
-                                            </p:txEl>
-                                          </p:spTgt>
-                                        </p:tgtEl>
-                                        <p:attrNameLst>
-                                          <p:attrName>style.visibility</p:attrName>
-                                        </p:attrNameLst>
-                                      </p:cBhvr>
-                                      <p:to>
-                                        <p:strVal val="visible"/>
-                                      </p:to>
-                                    </p:set>
-                                  </p:childTnLst>
-                                </p:cTn>
-                              </p:par>
-                            </p:childTnLst>
-                          </p:cTn>
-                        </p:par>
-                      </p:childTnLst>
-                    </p:cTn>
-                  </p:par>
-                  <p:par>
-                    <p:cTn id="23" fill="hold">
-                      <p:stCondLst>
-                        <p:cond delay="indefinite"/>
-                      </p:stCondLst>
-                      <p:childTnLst>
-                        <p:par>
-                          <p:cTn id="24" fill="hold">
-                            <p:stCondLst>
-                              <p:cond delay="0"/>
-                            </p:stCondLst>
-                            <p:childTnLst>
-                              <p:par>
-                                <p:cTn id="25" presetID="1" presetClass="entr" presetSubtype="0" fill="hold" grpId="0" nodeType="clickEffect">
-                                  <p:stCondLst>
-                                    <p:cond delay="0"/>
-                                  </p:stCondLst>
-                                  <p:childTnLst>
-                                    <p:set>
-                                      <p:cBhvr>
-                                        <p:cTn id="26" dur="1" fill="hold">
-                                          <p:stCondLst>
-                                            <p:cond delay="0"/>
-                                          </p:stCondLst>
-                                        </p:cTn>
-                                        <p:tgtEl>
-                                          <p:spTgt spid="3">
-                                            <p:txEl>
-                                              <p:pRg st="10" end="10"/>
-                                            </p:txEl>
-                                          </p:spTgt>
-                                        </p:tgtEl>
-                                        <p:attrNameLst>
-                                          <p:attrName>style.visibility</p:attrName>
-                                        </p:attrNameLst>
-                                      </p:cBhvr>
-                                      <p:to>
-                                        <p:strVal val="visible"/>
-                                      </p:to>
-                                    </p:set>
-                                  </p:childTnLst>
-                                </p:cTn>
-                              </p:par>
-                              <p:par>
-                                <p:cTn id="27" presetID="1" presetClass="entr" presetSubtype="0" fill="hold" grpId="0" nodeType="withEffect">
-                                  <p:stCondLst>
-                                    <p:cond delay="0"/>
-                                  </p:stCondLst>
-                                  <p:childTnLst>
-                                    <p:set>
-                                      <p:cBhvr>
-                                        <p:cTn id="28" dur="1" fill="hold">
-                                          <p:stCondLst>
-                                            <p:cond delay="0"/>
-                                          </p:stCondLst>
-                                        </p:cTn>
-                                        <p:tgtEl>
-                                          <p:spTgt spid="3">
-                                            <p:txEl>
-                                              <p:pRg st="11" end="11"/>
-                                            </p:txEl>
-                                          </p:spTgt>
-                                        </p:tgtEl>
-                                        <p:attrNameLst>
-                                          <p:attrName>style.visibility</p:attrName>
-                                        </p:attrNameLst>
-                                      </p:cBhvr>
-                                      <p:to>
-                                        <p:strVal val="visible"/>
-                                      </p:to>
-                                    </p:set>
-                                  </p:childTnLst>
-                                </p:cTn>
-                              </p:par>
-                              <p:par>
-                                <p:cTn id="29" presetID="1" presetClass="entr" presetSubtype="0" fill="hold" grpId="0" nodeType="withEffect">
-                                  <p:stCondLst>
-                                    <p:cond delay="0"/>
-                                  </p:stCondLst>
-                                  <p:childTnLst>
-                                    <p:set>
-                                      <p:cBhvr>
-                                        <p:cTn id="30" dur="1" fill="hold">
-                                          <p:stCondLst>
-                                            <p:cond delay="0"/>
-                                          </p:stCondLst>
-                                        </p:cTn>
-                                        <p:tgtEl>
-                                          <p:spTgt spid="3">
-                                            <p:txEl>
-                                              <p:pRg st="12" end="12"/>
-                                            </p:txEl>
-                                          </p:spTgt>
+                                          <p:spTgt spid="6"/>
                                         </p:tgtEl>
                                         <p:attrNameLst>
                                           <p:attrName>style.visibility</p:attrName>
@@ -11194,7 +10965,8 @@
       </p:par>
     </p:tnLst>
     <p:bldLst>
-      <p:bldP spid="3" grpId="0" build="p"/>
+      <p:bldP spid="3" grpId="0" uiExpand="1" build="p"/>
+      <p:bldP spid="6" grpId="0" animBg="1"/>
     </p:bldLst>
   </p:timing>
 </p:sld>

</xml_diff>

<commit_message>
Created & added diagrams for step2 in method (slides)
</commit_message>
<xml_diff>
--- a/slides/slides.pptx
+++ b/slides/slides.pptx
@@ -217,7 +217,7 @@
           <a:p>
             <a:fld id="{66499B1D-C816-4A11-8D96-9373C31AF530}" type="datetimeFigureOut">
               <a:rPr lang="en-GB" smtClean="0"/>
-              <a:t>15/01/2021</a:t>
+              <a:t>23/01/2021</a:t>
             </a:fld>
             <a:endParaRPr lang="en-GB"/>
           </a:p>
@@ -2092,75 +2092,10 @@
           <a:bodyPr/>
           <a:lstStyle/>
           <a:p>
-            <a:pPr marL="0" indent="0">
-              <a:buNone/>
-            </a:pPr>
-            <a:r>
-              <a:rPr lang="en-GB" sz="1200" dirty="0">
-                <a:solidFill>
-                  <a:schemeClr val="accent4"/>
-                </a:solidFill>
-              </a:rPr>
-              <a:t>TODO: </a:t>
-            </a:r>
-            <a:r>
-              <a:rPr lang="en-GB" sz="1200" dirty="0" err="1">
-                <a:solidFill>
-                  <a:schemeClr val="accent4"/>
-                </a:solidFill>
-              </a:rPr>
-              <a:t>imgs</a:t>
-            </a:r>
-            <a:r>
-              <a:rPr lang="en-GB" sz="1200" dirty="0">
-                <a:solidFill>
-                  <a:schemeClr val="accent4"/>
-                </a:solidFill>
-              </a:rPr>
-              <a:t>: </a:t>
-            </a:r>
-          </a:p>
-          <a:p>
-            <a:pPr marL="0" indent="0">
-              <a:buNone/>
-            </a:pPr>
-            <a:r>
-              <a:rPr lang="en-GB" sz="1200" dirty="0">
-                <a:solidFill>
-                  <a:schemeClr val="accent4"/>
-                </a:solidFill>
-              </a:rPr>
-              <a:t>1. example scene, &amp; indicate light direction</a:t>
-            </a:r>
-          </a:p>
-          <a:p>
-            <a:pPr marL="0" indent="0">
-              <a:buNone/>
-            </a:pPr>
-            <a:r>
-              <a:rPr lang="en-GB" sz="1200" dirty="0">
-                <a:solidFill>
-                  <a:schemeClr val="accent4"/>
-                </a:solidFill>
-              </a:rPr>
-              <a:t>2. scene as seen from light’s POV</a:t>
-            </a:r>
-          </a:p>
-          <a:p>
-            <a:pPr marL="0" indent="0">
-              <a:buNone/>
-            </a:pPr>
-            <a:r>
-              <a:rPr lang="en-GB" sz="1200" dirty="0">
-                <a:solidFill>
-                  <a:schemeClr val="accent4"/>
-                </a:solidFill>
-              </a:rPr>
-              <a:t>3. depth values of scene as seen from light (i.e. shadow map)</a:t>
-            </a:r>
-          </a:p>
-          <a:p>
-            <a:endParaRPr lang="en-GB" dirty="0"/>
+            <a:r>
+              <a:rPr lang="en-GB" dirty="0"/>
+              <a:t>In shadow map: further away = whiter</a:t>
+            </a:r>
           </a:p>
         </p:txBody>
       </p:sp>
@@ -2583,7 +2518,7 @@
           <a:p>
             <a:fld id="{F58C6CE7-BF83-4B1E-855D-EB8AAA078073}" type="datetimeFigureOut">
               <a:rPr lang="en-GB" smtClean="0"/>
-              <a:t>15/01/2021</a:t>
+              <a:t>23/01/2021</a:t>
             </a:fld>
             <a:endParaRPr lang="en-GB"/>
           </a:p>
@@ -2753,7 +2688,7 @@
           <a:p>
             <a:fld id="{F58C6CE7-BF83-4B1E-855D-EB8AAA078073}" type="datetimeFigureOut">
               <a:rPr lang="en-GB" smtClean="0"/>
-              <a:t>15/01/2021</a:t>
+              <a:t>23/01/2021</a:t>
             </a:fld>
             <a:endParaRPr lang="en-GB"/>
           </a:p>
@@ -2933,7 +2868,7 @@
           <a:p>
             <a:fld id="{F58C6CE7-BF83-4B1E-855D-EB8AAA078073}" type="datetimeFigureOut">
               <a:rPr lang="en-GB" smtClean="0"/>
-              <a:t>15/01/2021</a:t>
+              <a:t>23/01/2021</a:t>
             </a:fld>
             <a:endParaRPr lang="en-GB"/>
           </a:p>
@@ -3103,7 +3038,7 @@
           <a:p>
             <a:fld id="{F58C6CE7-BF83-4B1E-855D-EB8AAA078073}" type="datetimeFigureOut">
               <a:rPr lang="en-GB" smtClean="0"/>
-              <a:t>15/01/2021</a:t>
+              <a:t>23/01/2021</a:t>
             </a:fld>
             <a:endParaRPr lang="en-GB"/>
           </a:p>
@@ -3349,7 +3284,7 @@
           <a:p>
             <a:fld id="{F58C6CE7-BF83-4B1E-855D-EB8AAA078073}" type="datetimeFigureOut">
               <a:rPr lang="en-GB" smtClean="0"/>
-              <a:t>15/01/2021</a:t>
+              <a:t>23/01/2021</a:t>
             </a:fld>
             <a:endParaRPr lang="en-GB"/>
           </a:p>
@@ -3581,7 +3516,7 @@
           <a:p>
             <a:fld id="{F58C6CE7-BF83-4B1E-855D-EB8AAA078073}" type="datetimeFigureOut">
               <a:rPr lang="en-GB" smtClean="0"/>
-              <a:t>15/01/2021</a:t>
+              <a:t>23/01/2021</a:t>
             </a:fld>
             <a:endParaRPr lang="en-GB"/>
           </a:p>
@@ -3948,7 +3883,7 @@
           <a:p>
             <a:fld id="{F58C6CE7-BF83-4B1E-855D-EB8AAA078073}" type="datetimeFigureOut">
               <a:rPr lang="en-GB" smtClean="0"/>
-              <a:t>15/01/2021</a:t>
+              <a:t>23/01/2021</a:t>
             </a:fld>
             <a:endParaRPr lang="en-GB"/>
           </a:p>
@@ -4066,7 +4001,7 @@
           <a:p>
             <a:fld id="{F58C6CE7-BF83-4B1E-855D-EB8AAA078073}" type="datetimeFigureOut">
               <a:rPr lang="en-GB" smtClean="0"/>
-              <a:t>15/01/2021</a:t>
+              <a:t>23/01/2021</a:t>
             </a:fld>
             <a:endParaRPr lang="en-GB"/>
           </a:p>
@@ -4161,7 +4096,7 @@
           <a:p>
             <a:fld id="{F58C6CE7-BF83-4B1E-855D-EB8AAA078073}" type="datetimeFigureOut">
               <a:rPr lang="en-GB" smtClean="0"/>
-              <a:t>15/01/2021</a:t>
+              <a:t>23/01/2021</a:t>
             </a:fld>
             <a:endParaRPr lang="en-GB"/>
           </a:p>
@@ -4438,7 +4373,7 @@
           <a:p>
             <a:fld id="{F58C6CE7-BF83-4B1E-855D-EB8AAA078073}" type="datetimeFigureOut">
               <a:rPr lang="en-GB" smtClean="0"/>
-              <a:t>15/01/2021</a:t>
+              <a:t>23/01/2021</a:t>
             </a:fld>
             <a:endParaRPr lang="en-GB"/>
           </a:p>
@@ -4695,7 +4630,7 @@
           <a:p>
             <a:fld id="{F58C6CE7-BF83-4B1E-855D-EB8AAA078073}" type="datetimeFigureOut">
               <a:rPr lang="en-GB" smtClean="0"/>
-              <a:t>15/01/2021</a:t>
+              <a:t>23/01/2021</a:t>
             </a:fld>
             <a:endParaRPr lang="en-GB"/>
           </a:p>
@@ -4908,7 +4843,7 @@
           <a:p>
             <a:fld id="{F58C6CE7-BF83-4B1E-855D-EB8AAA078073}" type="datetimeFigureOut">
               <a:rPr lang="en-GB" smtClean="0"/>
-              <a:t>15/01/2021</a:t>
+              <a:t>23/01/2021</a:t>
             </a:fld>
             <a:endParaRPr lang="en-GB"/>
           </a:p>
@@ -5612,6 +5547,114 @@
           <a:chExt cx="0" cy="0"/>
         </a:xfrm>
       </p:grpSpPr>
+      <p:pic>
+        <p:nvPicPr>
+          <p:cNvPr id="12" name="Imagen 11" descr="Imagen que contiene pájaro, playa&#10;&#10;Descripción generada automáticamente">
+            <a:extLst>
+              <a:ext uri="{FF2B5EF4-FFF2-40B4-BE49-F238E27FC236}">
+                <a16:creationId xmlns:a16="http://schemas.microsoft.com/office/drawing/2014/main" id="{D18939B9-4F6F-44F5-AE8F-E8CC9302CABF}"/>
+              </a:ext>
+            </a:extLst>
+          </p:cNvPr>
+          <p:cNvPicPr>
+            <a:picLocks noChangeAspect="1"/>
+          </p:cNvPicPr>
+          <p:nvPr/>
+        </p:nvPicPr>
+        <p:blipFill>
+          <a:blip r:embed="rId3">
+            <a:extLst>
+              <a:ext uri="{28A0092B-C50C-407E-A947-70E740481C1C}">
+                <a14:useLocalDpi xmlns:a14="http://schemas.microsoft.com/office/drawing/2010/main" val="0"/>
+              </a:ext>
+            </a:extLst>
+          </a:blip>
+          <a:stretch>
+            <a:fillRect/>
+          </a:stretch>
+        </p:blipFill>
+        <p:spPr>
+          <a:xfrm>
+            <a:off x="7988005" y="4195855"/>
+            <a:ext cx="2708939" cy="2031704"/>
+          </a:xfrm>
+          <a:prstGeom prst="rect">
+            <a:avLst/>
+          </a:prstGeom>
+        </p:spPr>
+      </p:pic>
+      <p:pic>
+        <p:nvPicPr>
+          <p:cNvPr id="10" name="Imagen 9" descr="Patrón de fondo&#10;&#10;Descripción generada automáticamente con confianza media">
+            <a:extLst>
+              <a:ext uri="{FF2B5EF4-FFF2-40B4-BE49-F238E27FC236}">
+                <a16:creationId xmlns:a16="http://schemas.microsoft.com/office/drawing/2014/main" id="{244F07F8-44E8-4F24-AE40-397C74A8B57B}"/>
+              </a:ext>
+            </a:extLst>
+          </p:cNvPr>
+          <p:cNvPicPr>
+            <a:picLocks noChangeAspect="1"/>
+          </p:cNvPicPr>
+          <p:nvPr/>
+        </p:nvPicPr>
+        <p:blipFill>
+          <a:blip r:embed="rId4">
+            <a:extLst>
+              <a:ext uri="{28A0092B-C50C-407E-A947-70E740481C1C}">
+                <a14:useLocalDpi xmlns:a14="http://schemas.microsoft.com/office/drawing/2010/main" val="0"/>
+              </a:ext>
+            </a:extLst>
+          </a:blip>
+          <a:stretch>
+            <a:fillRect/>
+          </a:stretch>
+        </p:blipFill>
+        <p:spPr>
+          <a:xfrm>
+            <a:off x="4664743" y="4195855"/>
+            <a:ext cx="2708939" cy="2031704"/>
+          </a:xfrm>
+          <a:prstGeom prst="rect">
+            <a:avLst/>
+          </a:prstGeom>
+        </p:spPr>
+      </p:pic>
+      <p:pic>
+        <p:nvPicPr>
+          <p:cNvPr id="8" name="Imagen 7" descr="Una caricatura de una persona&#10;&#10;Descripción generada automáticamente con confianza baja">
+            <a:extLst>
+              <a:ext uri="{FF2B5EF4-FFF2-40B4-BE49-F238E27FC236}">
+                <a16:creationId xmlns:a16="http://schemas.microsoft.com/office/drawing/2014/main" id="{764ED853-1666-48A4-9AE7-5EC1F1AA958D}"/>
+              </a:ext>
+            </a:extLst>
+          </p:cNvPr>
+          <p:cNvPicPr>
+            <a:picLocks noChangeAspect="1"/>
+          </p:cNvPicPr>
+          <p:nvPr/>
+        </p:nvPicPr>
+        <p:blipFill>
+          <a:blip r:embed="rId5">
+            <a:extLst>
+              <a:ext uri="{28A0092B-C50C-407E-A947-70E740481C1C}">
+                <a14:useLocalDpi xmlns:a14="http://schemas.microsoft.com/office/drawing/2010/main" val="0"/>
+              </a:ext>
+            </a:extLst>
+          </a:blip>
+          <a:stretch>
+            <a:fillRect/>
+          </a:stretch>
+        </p:blipFill>
+        <p:spPr>
+          <a:xfrm>
+            <a:off x="1375736" y="4195855"/>
+            <a:ext cx="2708939" cy="2031704"/>
+          </a:xfrm>
+          <a:prstGeom prst="rect">
+            <a:avLst/>
+          </a:prstGeom>
+        </p:spPr>
+      </p:pic>
       <p:sp>
         <p:nvSpPr>
           <p:cNvPr id="2" name="Título 1">
@@ -5660,7 +5703,12 @@
             <p:ph idx="1"/>
           </p:nvPr>
         </p:nvSpPr>
-        <p:spPr/>
+        <p:spPr>
+          <a:xfrm>
+            <a:off x="838200" y="1825625"/>
+            <a:ext cx="10515600" cy="2319634"/>
+          </a:xfrm>
+        </p:spPr>
         <p:txBody>
           <a:bodyPr>
             <a:normAutofit/>
@@ -5729,183 +5777,6 @@
               <a:buNone/>
             </a:pPr>
             <a:endParaRPr lang="en-GB" dirty="0"/>
-          </a:p>
-        </p:txBody>
-      </p:sp>
-      <p:sp>
-        <p:nvSpPr>
-          <p:cNvPr id="4" name="Rectángulo 3">
-            <a:extLst>
-              <a:ext uri="{FF2B5EF4-FFF2-40B4-BE49-F238E27FC236}">
-                <a16:creationId xmlns:a16="http://schemas.microsoft.com/office/drawing/2014/main" id="{1EE53B7D-098C-493C-BF43-726672670CC5}"/>
-              </a:ext>
-            </a:extLst>
-          </p:cNvPr>
-          <p:cNvSpPr/>
-          <p:nvPr/>
-        </p:nvSpPr>
-        <p:spPr>
-          <a:xfrm>
-            <a:off x="1375737" y="4195855"/>
-            <a:ext cx="2708939" cy="1981108"/>
-          </a:xfrm>
-          <a:prstGeom prst="rect">
-            <a:avLst/>
-          </a:prstGeom>
-          <a:solidFill>
-            <a:schemeClr val="accent4"/>
-          </a:solidFill>
-          <a:ln>
-            <a:noFill/>
-          </a:ln>
-        </p:spPr>
-        <p:style>
-          <a:lnRef idx="2">
-            <a:schemeClr val="accent4">
-              <a:shade val="50000"/>
-            </a:schemeClr>
-          </a:lnRef>
-          <a:fillRef idx="1">
-            <a:schemeClr val="accent4"/>
-          </a:fillRef>
-          <a:effectRef idx="0">
-            <a:schemeClr val="accent4"/>
-          </a:effectRef>
-          <a:fontRef idx="minor">
-            <a:schemeClr val="lt1"/>
-          </a:fontRef>
-        </p:style>
-        <p:txBody>
-          <a:bodyPr rtlCol="0" anchor="ctr"/>
-          <a:lstStyle/>
-          <a:p>
-            <a:pPr algn="ctr"/>
-            <a:r>
-              <a:rPr lang="en-GB" dirty="0">
-                <a:solidFill>
-                  <a:schemeClr val="tx1"/>
-                </a:solidFill>
-              </a:rPr>
-              <a:t>TODO: example scene</a:t>
-            </a:r>
-          </a:p>
-        </p:txBody>
-      </p:sp>
-      <p:sp>
-        <p:nvSpPr>
-          <p:cNvPr id="5" name="Rectángulo 4">
-            <a:extLst>
-              <a:ext uri="{FF2B5EF4-FFF2-40B4-BE49-F238E27FC236}">
-                <a16:creationId xmlns:a16="http://schemas.microsoft.com/office/drawing/2014/main" id="{5C89B363-1E49-48F7-8EFC-8D7DDBDDDE82}"/>
-              </a:ext>
-            </a:extLst>
-          </p:cNvPr>
-          <p:cNvSpPr/>
-          <p:nvPr/>
-        </p:nvSpPr>
-        <p:spPr>
-          <a:xfrm>
-            <a:off x="4681872" y="4195855"/>
-            <a:ext cx="2708939" cy="1981108"/>
-          </a:xfrm>
-          <a:prstGeom prst="rect">
-            <a:avLst/>
-          </a:prstGeom>
-          <a:solidFill>
-            <a:schemeClr val="accent4"/>
-          </a:solidFill>
-          <a:ln>
-            <a:noFill/>
-          </a:ln>
-        </p:spPr>
-        <p:style>
-          <a:lnRef idx="2">
-            <a:schemeClr val="accent4">
-              <a:shade val="50000"/>
-            </a:schemeClr>
-          </a:lnRef>
-          <a:fillRef idx="1">
-            <a:schemeClr val="accent4"/>
-          </a:fillRef>
-          <a:effectRef idx="0">
-            <a:schemeClr val="accent4"/>
-          </a:effectRef>
-          <a:fontRef idx="minor">
-            <a:schemeClr val="lt1"/>
-          </a:fontRef>
-        </p:style>
-        <p:txBody>
-          <a:bodyPr rtlCol="0" anchor="ctr"/>
-          <a:lstStyle/>
-          <a:p>
-            <a:pPr algn="ctr"/>
-            <a:r>
-              <a:rPr lang="en-GB" dirty="0">
-                <a:solidFill>
-                  <a:schemeClr val="tx1"/>
-                </a:solidFill>
-              </a:rPr>
-              <a:t>TODO: scene seen from light’s POV</a:t>
-            </a:r>
-          </a:p>
-        </p:txBody>
-      </p:sp>
-      <p:sp>
-        <p:nvSpPr>
-          <p:cNvPr id="6" name="Rectángulo 5">
-            <a:extLst>
-              <a:ext uri="{FF2B5EF4-FFF2-40B4-BE49-F238E27FC236}">
-                <a16:creationId xmlns:a16="http://schemas.microsoft.com/office/drawing/2014/main" id="{E6D2D8A0-E7F6-4437-BDB9-8431A743C004}"/>
-              </a:ext>
-            </a:extLst>
-          </p:cNvPr>
-          <p:cNvSpPr/>
-          <p:nvPr/>
-        </p:nvSpPr>
-        <p:spPr>
-          <a:xfrm>
-            <a:off x="7988007" y="4195855"/>
-            <a:ext cx="2708939" cy="1981108"/>
-          </a:xfrm>
-          <a:prstGeom prst="rect">
-            <a:avLst/>
-          </a:prstGeom>
-          <a:solidFill>
-            <a:schemeClr val="accent4"/>
-          </a:solidFill>
-          <a:ln>
-            <a:noFill/>
-          </a:ln>
-        </p:spPr>
-        <p:style>
-          <a:lnRef idx="2">
-            <a:schemeClr val="accent4">
-              <a:shade val="50000"/>
-            </a:schemeClr>
-          </a:lnRef>
-          <a:fillRef idx="1">
-            <a:schemeClr val="accent4"/>
-          </a:fillRef>
-          <a:effectRef idx="0">
-            <a:schemeClr val="accent4"/>
-          </a:effectRef>
-          <a:fontRef idx="minor">
-            <a:schemeClr val="lt1"/>
-          </a:fontRef>
-        </p:style>
-        <p:txBody>
-          <a:bodyPr rtlCol="0" anchor="ctr"/>
-          <a:lstStyle/>
-          <a:p>
-            <a:pPr algn="ctr"/>
-            <a:r>
-              <a:rPr lang="en-GB" dirty="0">
-                <a:solidFill>
-                  <a:schemeClr val="tx1"/>
-                </a:solidFill>
-              </a:rPr>
-              <a:t>TODO: shadow map</a:t>
-            </a:r>
           </a:p>
         </p:txBody>
       </p:sp>
@@ -6100,7 +5971,7 @@
                             </p:stCondLst>
                             <p:childTnLst>
                               <p:par>
-                                <p:cTn id="17" presetID="1" presetClass="entr" presetSubtype="0" fill="hold" grpId="1" nodeType="clickEffect">
+                                <p:cTn id="17" presetID="1" presetClass="entr" presetSubtype="0" fill="hold" nodeType="clickEffect">
                                   <p:stCondLst>
                                     <p:cond delay="0"/>
                                   </p:stCondLst>
@@ -6113,7 +5984,7 @@
                                           </p:stCondLst>
                                         </p:cTn>
                                         <p:tgtEl>
-                                          <p:spTgt spid="4"/>
+                                          <p:spTgt spid="8"/>
                                         </p:tgtEl>
                                         <p:attrNameLst>
                                           <p:attrName>style.visibility</p:attrName>
@@ -6145,7 +6016,7 @@
                             </p:stCondLst>
                             <p:childTnLst>
                               <p:par>
-                                <p:cTn id="21" presetID="1" presetClass="entr" presetSubtype="0" fill="hold" grpId="0" nodeType="clickEffect">
+                                <p:cTn id="21" presetID="1" presetClass="entr" presetSubtype="0" fill="hold" nodeType="clickEffect">
                                   <p:stCondLst>
                                     <p:cond delay="0"/>
                                   </p:stCondLst>
@@ -6158,7 +6029,7 @@
                                           </p:stCondLst>
                                         </p:cTn>
                                         <p:tgtEl>
-                                          <p:spTgt spid="5"/>
+                                          <p:spTgt spid="10"/>
                                         </p:tgtEl>
                                         <p:attrNameLst>
                                           <p:attrName>style.visibility</p:attrName>
@@ -6190,7 +6061,7 @@
                             </p:stCondLst>
                             <p:childTnLst>
                               <p:par>
-                                <p:cTn id="25" presetID="1" presetClass="entr" presetSubtype="0" fill="hold" grpId="0" nodeType="clickEffect">
+                                <p:cTn id="25" presetID="1" presetClass="entr" presetSubtype="0" fill="hold" nodeType="clickEffect">
                                   <p:stCondLst>
                                     <p:cond delay="0"/>
                                   </p:stCondLst>
@@ -6203,7 +6074,7 @@
                                           </p:stCondLst>
                                         </p:cTn>
                                         <p:tgtEl>
-                                          <p:spTgt spid="6"/>
+                                          <p:spTgt spid="12"/>
                                         </p:tgtEl>
                                         <p:attrNameLst>
                                           <p:attrName>style.visibility</p:attrName>
@@ -6245,9 +6116,6 @@
     </p:tnLst>
     <p:bldLst>
       <p:bldP spid="3" grpId="0" uiExpand="1" build="p"/>
-      <p:bldP spid="4" grpId="1" animBg="1"/>
-      <p:bldP spid="5" grpId="0" animBg="1"/>
-      <p:bldP spid="6" grpId="0" animBg="1"/>
     </p:bldLst>
   </p:timing>
 </p:sld>
@@ -8194,6 +8062,113 @@
           <a:chExt cx="0" cy="0"/>
         </a:xfrm>
       </p:grpSpPr>
+      <p:pic>
+        <p:nvPicPr>
+          <p:cNvPr id="12" name="Imagen 11">
+            <a:extLst>
+              <a:ext uri="{FF2B5EF4-FFF2-40B4-BE49-F238E27FC236}">
+                <a16:creationId xmlns:a16="http://schemas.microsoft.com/office/drawing/2014/main" id="{A5F790B7-C470-4758-A0E0-37438FC93677}"/>
+              </a:ext>
+            </a:extLst>
+          </p:cNvPr>
+          <p:cNvPicPr>
+            <a:picLocks noChangeAspect="1"/>
+          </p:cNvPicPr>
+          <p:nvPr/>
+        </p:nvPicPr>
+        <p:blipFill>
+          <a:blip r:embed="rId3">
+            <a:extLst>
+              <a:ext uri="{28A0092B-C50C-407E-A947-70E740481C1C}">
+                <a14:useLocalDpi xmlns:a14="http://schemas.microsoft.com/office/drawing/2010/main" val="0"/>
+              </a:ext>
+            </a:extLst>
+          </a:blip>
+          <a:srcRect/>
+          <a:stretch/>
+        </p:blipFill>
+        <p:spPr>
+          <a:xfrm>
+            <a:off x="6578835" y="3617558"/>
+            <a:ext cx="3470661" cy="2603647"/>
+          </a:xfrm>
+          <a:prstGeom prst="rect">
+            <a:avLst/>
+          </a:prstGeom>
+        </p:spPr>
+      </p:pic>
+      <p:pic>
+        <p:nvPicPr>
+          <p:cNvPr id="13" name="Imagen 12" descr="Diagrama&#10;&#10;Descripción generada automáticamente">
+            <a:extLst>
+              <a:ext uri="{FF2B5EF4-FFF2-40B4-BE49-F238E27FC236}">
+                <a16:creationId xmlns:a16="http://schemas.microsoft.com/office/drawing/2014/main" id="{09341BD4-2035-4AD1-9756-AD483C1C11B8}"/>
+              </a:ext>
+            </a:extLst>
+          </p:cNvPr>
+          <p:cNvPicPr>
+            <a:picLocks noChangeAspect="1"/>
+          </p:cNvPicPr>
+          <p:nvPr/>
+        </p:nvPicPr>
+        <p:blipFill>
+          <a:blip r:embed="rId4">
+            <a:extLst>
+              <a:ext uri="{28A0092B-C50C-407E-A947-70E740481C1C}">
+                <a14:useLocalDpi xmlns:a14="http://schemas.microsoft.com/office/drawing/2010/main" val="0"/>
+              </a:ext>
+            </a:extLst>
+          </a:blip>
+          <a:stretch>
+            <a:fillRect/>
+          </a:stretch>
+        </p:blipFill>
+        <p:spPr>
+          <a:xfrm>
+            <a:off x="6578834" y="3617557"/>
+            <a:ext cx="3470662" cy="2603647"/>
+          </a:xfrm>
+          <a:prstGeom prst="rect">
+            <a:avLst/>
+          </a:prstGeom>
+        </p:spPr>
+      </p:pic>
+      <p:pic>
+        <p:nvPicPr>
+          <p:cNvPr id="15" name="Imagen 14" descr="Diagrama&#10;&#10;Descripción generada automáticamente">
+            <a:extLst>
+              <a:ext uri="{FF2B5EF4-FFF2-40B4-BE49-F238E27FC236}">
+                <a16:creationId xmlns:a16="http://schemas.microsoft.com/office/drawing/2014/main" id="{1636F395-3577-44C7-8BF6-D2243B5C9BF4}"/>
+              </a:ext>
+            </a:extLst>
+          </p:cNvPr>
+          <p:cNvPicPr>
+            <a:picLocks noChangeAspect="1"/>
+          </p:cNvPicPr>
+          <p:nvPr/>
+        </p:nvPicPr>
+        <p:blipFill>
+          <a:blip r:embed="rId5">
+            <a:extLst>
+              <a:ext uri="{28A0092B-C50C-407E-A947-70E740481C1C}">
+                <a14:useLocalDpi xmlns:a14="http://schemas.microsoft.com/office/drawing/2010/main" val="0"/>
+              </a:ext>
+            </a:extLst>
+          </a:blip>
+          <a:stretch>
+            <a:fillRect/>
+          </a:stretch>
+        </p:blipFill>
+        <p:spPr>
+          <a:xfrm>
+            <a:off x="6578832" y="3617556"/>
+            <a:ext cx="3470663" cy="2603648"/>
+          </a:xfrm>
+          <a:prstGeom prst="rect">
+            <a:avLst/>
+          </a:prstGeom>
+        </p:spPr>
+      </p:pic>
       <p:sp>
         <p:nvSpPr>
           <p:cNvPr id="2" name="Título 1">
@@ -8535,7 +8510,7 @@
                 <a:ext cx="10515600" cy="4351338"/>
               </a:xfrm>
               <a:blipFill>
-                <a:blip r:embed="rId3"/>
+                <a:blip r:embed="rId6"/>
                 <a:stretch>
                   <a:fillRect l="-522" t="-1543"/>
                 </a:stretch>
@@ -8558,150 +8533,6 @@
       </mc:AlternateContent>
       <p:sp>
         <p:nvSpPr>
-          <p:cNvPr id="4" name="Rectángulo 3">
-            <a:extLst>
-              <a:ext uri="{FF2B5EF4-FFF2-40B4-BE49-F238E27FC236}">
-                <a16:creationId xmlns:a16="http://schemas.microsoft.com/office/drawing/2014/main" id="{C6DDDD91-4A02-4CCD-A7D2-CC8561612B28}"/>
-              </a:ext>
-            </a:extLst>
-          </p:cNvPr>
-          <p:cNvSpPr/>
-          <p:nvPr/>
-        </p:nvSpPr>
-        <p:spPr>
-          <a:xfrm>
-            <a:off x="1036676" y="3583172"/>
-            <a:ext cx="4412510" cy="2593791"/>
-          </a:xfrm>
-          <a:prstGeom prst="rect">
-            <a:avLst/>
-          </a:prstGeom>
-          <a:solidFill>
-            <a:schemeClr val="accent4"/>
-          </a:solidFill>
-          <a:ln>
-            <a:noFill/>
-          </a:ln>
-        </p:spPr>
-        <p:style>
-          <a:lnRef idx="2">
-            <a:schemeClr val="accent4">
-              <a:shade val="50000"/>
-            </a:schemeClr>
-          </a:lnRef>
-          <a:fillRef idx="1">
-            <a:schemeClr val="accent4"/>
-          </a:fillRef>
-          <a:effectRef idx="0">
-            <a:schemeClr val="accent4"/>
-          </a:effectRef>
-          <a:fontRef idx="minor">
-            <a:schemeClr val="lt1"/>
-          </a:fontRef>
-        </p:style>
-        <p:txBody>
-          <a:bodyPr rtlCol="0" anchor="ctr"/>
-          <a:lstStyle/>
-          <a:p>
-            <a:pPr algn="ctr"/>
-            <a:r>
-              <a:rPr lang="en-GB" dirty="0">
-                <a:solidFill>
-                  <a:schemeClr val="tx1"/>
-                </a:solidFill>
-              </a:rPr>
-              <a:t>TODO: example scene </a:t>
-            </a:r>
-            <a:r>
-              <a:rPr lang="en-GB" dirty="0" err="1">
-                <a:solidFill>
-                  <a:schemeClr val="tx1"/>
-                </a:solidFill>
-              </a:rPr>
-              <a:t>img</a:t>
-            </a:r>
-            <a:endParaRPr lang="en-GB" dirty="0">
-              <a:solidFill>
-                <a:schemeClr val="tx1"/>
-              </a:solidFill>
-            </a:endParaRPr>
-          </a:p>
-        </p:txBody>
-      </p:sp>
-      <p:sp>
-        <p:nvSpPr>
-          <p:cNvPr id="5" name="Rectángulo 4">
-            <a:extLst>
-              <a:ext uri="{FF2B5EF4-FFF2-40B4-BE49-F238E27FC236}">
-                <a16:creationId xmlns:a16="http://schemas.microsoft.com/office/drawing/2014/main" id="{2C389DE1-CE36-4BAC-B7CA-52BC0DFEF6C5}"/>
-              </a:ext>
-            </a:extLst>
-          </p:cNvPr>
-          <p:cNvSpPr/>
-          <p:nvPr/>
-        </p:nvSpPr>
-        <p:spPr>
-          <a:xfrm>
-            <a:off x="6496796" y="3617558"/>
-            <a:ext cx="4412510" cy="2593791"/>
-          </a:xfrm>
-          <a:prstGeom prst="rect">
-            <a:avLst/>
-          </a:prstGeom>
-          <a:solidFill>
-            <a:schemeClr val="accent4"/>
-          </a:solidFill>
-          <a:ln>
-            <a:noFill/>
-          </a:ln>
-        </p:spPr>
-        <p:style>
-          <a:lnRef idx="2">
-            <a:schemeClr val="accent4">
-              <a:shade val="50000"/>
-            </a:schemeClr>
-          </a:lnRef>
-          <a:fillRef idx="1">
-            <a:schemeClr val="accent4"/>
-          </a:fillRef>
-          <a:effectRef idx="0">
-            <a:schemeClr val="accent4"/>
-          </a:effectRef>
-          <a:fontRef idx="minor">
-            <a:schemeClr val="lt1"/>
-          </a:fontRef>
-        </p:style>
-        <p:txBody>
-          <a:bodyPr rtlCol="0" anchor="ctr"/>
-          <a:lstStyle/>
-          <a:p>
-            <a:pPr algn="ctr"/>
-            <a:r>
-              <a:rPr lang="en-GB" dirty="0">
-                <a:solidFill>
-                  <a:schemeClr val="tx1"/>
-                </a:solidFill>
-              </a:rPr>
-              <a:t>TODO: example scene </a:t>
-            </a:r>
-            <a:r>
-              <a:rPr lang="en-GB" dirty="0" err="1">
-                <a:solidFill>
-                  <a:schemeClr val="tx1"/>
-                </a:solidFill>
-              </a:rPr>
-              <a:t>img</a:t>
-            </a:r>
-            <a:endParaRPr lang="en-GB" dirty="0">
-              <a:solidFill>
-                <a:schemeClr val="tx1"/>
-              </a:solidFill>
-            </a:endParaRPr>
-          </a:p>
-        </p:txBody>
-      </p:sp>
-      <p:sp>
-        <p:nvSpPr>
           <p:cNvPr id="6" name="CuadroTexto 5">
             <a:extLst>
               <a:ext uri="{FF2B5EF4-FFF2-40B4-BE49-F238E27FC236}">
@@ -8770,6 +8601,113 @@
           </a:p>
         </p:txBody>
       </p:sp>
+      <p:pic>
+        <p:nvPicPr>
+          <p:cNvPr id="9" name="Imagen 8">
+            <a:extLst>
+              <a:ext uri="{FF2B5EF4-FFF2-40B4-BE49-F238E27FC236}">
+                <a16:creationId xmlns:a16="http://schemas.microsoft.com/office/drawing/2014/main" id="{EC1ED977-AF01-43E2-96A0-172D0B900492}"/>
+              </a:ext>
+            </a:extLst>
+          </p:cNvPr>
+          <p:cNvPicPr>
+            <a:picLocks noChangeAspect="1"/>
+          </p:cNvPicPr>
+          <p:nvPr/>
+        </p:nvPicPr>
+        <p:blipFill>
+          <a:blip r:embed="rId7">
+            <a:extLst>
+              <a:ext uri="{28A0092B-C50C-407E-A947-70E740481C1C}">
+                <a14:useLocalDpi xmlns:a14="http://schemas.microsoft.com/office/drawing/2010/main" val="0"/>
+              </a:ext>
+            </a:extLst>
+          </a:blip>
+          <a:srcRect/>
+          <a:stretch/>
+        </p:blipFill>
+        <p:spPr>
+          <a:xfrm>
+            <a:off x="1118715" y="3573315"/>
+            <a:ext cx="3470661" cy="2603647"/>
+          </a:xfrm>
+          <a:prstGeom prst="rect">
+            <a:avLst/>
+          </a:prstGeom>
+        </p:spPr>
+      </p:pic>
+      <p:pic>
+        <p:nvPicPr>
+          <p:cNvPr id="5" name="Imagen 4" descr="Imagen que contiene Diagrama&#10;&#10;Descripción generada automáticamente">
+            <a:extLst>
+              <a:ext uri="{FF2B5EF4-FFF2-40B4-BE49-F238E27FC236}">
+                <a16:creationId xmlns:a16="http://schemas.microsoft.com/office/drawing/2014/main" id="{7357600B-2F43-4A42-B312-BFB7F11527CA}"/>
+              </a:ext>
+            </a:extLst>
+          </p:cNvPr>
+          <p:cNvPicPr>
+            <a:picLocks noChangeAspect="1"/>
+          </p:cNvPicPr>
+          <p:nvPr/>
+        </p:nvPicPr>
+        <p:blipFill>
+          <a:blip r:embed="rId8">
+            <a:extLst>
+              <a:ext uri="{28A0092B-C50C-407E-A947-70E740481C1C}">
+                <a14:useLocalDpi xmlns:a14="http://schemas.microsoft.com/office/drawing/2010/main" val="0"/>
+              </a:ext>
+            </a:extLst>
+          </a:blip>
+          <a:stretch>
+            <a:fillRect/>
+          </a:stretch>
+        </p:blipFill>
+        <p:spPr>
+          <a:xfrm>
+            <a:off x="1118714" y="3575177"/>
+            <a:ext cx="3470661" cy="2603647"/>
+          </a:xfrm>
+          <a:prstGeom prst="rect">
+            <a:avLst/>
+          </a:prstGeom>
+        </p:spPr>
+      </p:pic>
+      <p:pic>
+        <p:nvPicPr>
+          <p:cNvPr id="10" name="Imagen 9" descr="Imagen que contiene Diagrama&#10;&#10;Descripción generada automáticamente">
+            <a:extLst>
+              <a:ext uri="{FF2B5EF4-FFF2-40B4-BE49-F238E27FC236}">
+                <a16:creationId xmlns:a16="http://schemas.microsoft.com/office/drawing/2014/main" id="{7192354F-73AC-4A00-97F6-86756698FA3D}"/>
+              </a:ext>
+            </a:extLst>
+          </p:cNvPr>
+          <p:cNvPicPr>
+            <a:picLocks noChangeAspect="1"/>
+          </p:cNvPicPr>
+          <p:nvPr/>
+        </p:nvPicPr>
+        <p:blipFill>
+          <a:blip r:embed="rId9">
+            <a:extLst>
+              <a:ext uri="{28A0092B-C50C-407E-A947-70E740481C1C}">
+                <a14:useLocalDpi xmlns:a14="http://schemas.microsoft.com/office/drawing/2010/main" val="0"/>
+              </a:ext>
+            </a:extLst>
+          </a:blip>
+          <a:stretch>
+            <a:fillRect/>
+          </a:stretch>
+        </p:blipFill>
+        <p:spPr>
+          <a:xfrm>
+            <a:off x="1118713" y="3573315"/>
+            <a:ext cx="3470661" cy="2603647"/>
+          </a:xfrm>
+          <a:prstGeom prst="rect">
+            <a:avLst/>
+          </a:prstGeom>
+        </p:spPr>
+      </p:pic>
     </p:spTree>
     <p:extLst>
       <p:ext uri="{BB962C8B-B14F-4D97-AF65-F5344CB8AC3E}">
@@ -8828,7 +8766,7 @@
                                 </p:cTn>
                               </p:par>
                               <p:par>
-                                <p:cTn id="7" presetID="1" presetClass="entr" presetSubtype="0" fill="hold" grpId="0" nodeType="withEffect">
+                                <p:cTn id="7" presetID="1" presetClass="entr" presetSubtype="0" fill="hold" nodeType="withEffect">
                                   <p:stCondLst>
                                     <p:cond delay="0"/>
                                   </p:stCondLst>
@@ -8841,7 +8779,7 @@
                                           </p:stCondLst>
                                         </p:cTn>
                                         <p:tgtEl>
-                                          <p:spTgt spid="4"/>
+                                          <p:spTgt spid="9"/>
                                         </p:tgtEl>
                                         <p:attrNameLst>
                                           <p:attrName>style.visibility</p:attrName>
@@ -8873,7 +8811,7 @@
                             </p:stCondLst>
                             <p:childTnLst>
                               <p:par>
-                                <p:cTn id="11" presetID="1" presetClass="entr" presetSubtype="0" fill="hold" grpId="0" nodeType="clickEffect">
+                                <p:cTn id="11" presetID="1" presetClass="entr" presetSubtype="0" fill="hold" nodeType="clickEffect">
                                   <p:stCondLst>
                                     <p:cond delay="0"/>
                                   </p:stCondLst>
@@ -8881,6 +8819,96 @@
                                     <p:set>
                                       <p:cBhvr>
                                         <p:cTn id="12" dur="1" fill="hold">
+                                          <p:stCondLst>
+                                            <p:cond delay="0"/>
+                                          </p:stCondLst>
+                                        </p:cTn>
+                                        <p:tgtEl>
+                                          <p:spTgt spid="5"/>
+                                        </p:tgtEl>
+                                        <p:attrNameLst>
+                                          <p:attrName>style.visibility</p:attrName>
+                                        </p:attrNameLst>
+                                      </p:cBhvr>
+                                      <p:to>
+                                        <p:strVal val="visible"/>
+                                      </p:to>
+                                    </p:set>
+                                  </p:childTnLst>
+                                </p:cTn>
+                              </p:par>
+                            </p:childTnLst>
+                          </p:cTn>
+                        </p:par>
+                      </p:childTnLst>
+                    </p:cTn>
+                  </p:par>
+                  <p:par>
+                    <p:cTn id="13" fill="hold">
+                      <p:stCondLst>
+                        <p:cond delay="indefinite"/>
+                      </p:stCondLst>
+                      <p:childTnLst>
+                        <p:par>
+                          <p:cTn id="14" fill="hold">
+                            <p:stCondLst>
+                              <p:cond delay="0"/>
+                            </p:stCondLst>
+                            <p:childTnLst>
+                              <p:par>
+                                <p:cTn id="15" presetID="1" presetClass="entr" presetSubtype="0" fill="hold" nodeType="clickEffect">
+                                  <p:stCondLst>
+                                    <p:cond delay="0"/>
+                                  </p:stCondLst>
+                                  <p:childTnLst>
+                                    <p:set>
+                                      <p:cBhvr>
+                                        <p:cTn id="16" dur="1" fill="hold">
+                                          <p:stCondLst>
+                                            <p:cond delay="0"/>
+                                          </p:stCondLst>
+                                        </p:cTn>
+                                        <p:tgtEl>
+                                          <p:spTgt spid="10"/>
+                                        </p:tgtEl>
+                                        <p:attrNameLst>
+                                          <p:attrName>style.visibility</p:attrName>
+                                        </p:attrNameLst>
+                                      </p:cBhvr>
+                                      <p:to>
+                                        <p:strVal val="visible"/>
+                                      </p:to>
+                                    </p:set>
+                                  </p:childTnLst>
+                                </p:cTn>
+                              </p:par>
+                            </p:childTnLst>
+                          </p:cTn>
+                        </p:par>
+                      </p:childTnLst>
+                    </p:cTn>
+                  </p:par>
+                  <p:par>
+                    <p:cTn id="17" fill="hold">
+                      <p:stCondLst>
+                        <p:cond delay="indefinite"/>
+                      </p:stCondLst>
+                      <p:childTnLst>
+                        <p:par>
+                          <p:cTn id="18" fill="hold">
+                            <p:stCondLst>
+                              <p:cond delay="0"/>
+                            </p:stCondLst>
+                            <p:childTnLst>
+                              <p:par>
+                                <p:cTn id="19" presetID="1" presetClass="entr" presetSubtype="0" fill="hold" grpId="0" nodeType="clickEffect">
+                                  <p:stCondLst>
+                                    <p:cond delay="0"/>
+                                  </p:stCondLst>
+                                  <p:childTnLst>
+                                    <p:set>
+                                      <p:cBhvr>
+                                        <p:cTn id="20" dur="1" fill="hold">
                                           <p:stCondLst>
                                             <p:cond delay="0"/>
                                           </p:stCondLst>
@@ -8900,20 +8928,110 @@
                                 </p:cTn>
                               </p:par>
                               <p:par>
-                                <p:cTn id="13" presetID="1" presetClass="entr" presetSubtype="0" fill="hold" grpId="0" nodeType="withEffect">
+                                <p:cTn id="21" presetID="1" presetClass="entr" presetSubtype="0" fill="hold" nodeType="withEffect">
                                   <p:stCondLst>
                                     <p:cond delay="0"/>
                                   </p:stCondLst>
                                   <p:childTnLst>
                                     <p:set>
                                       <p:cBhvr>
-                                        <p:cTn id="14" dur="1" fill="hold">
+                                        <p:cTn id="22" dur="1" fill="hold">
                                           <p:stCondLst>
                                             <p:cond delay="0"/>
                                           </p:stCondLst>
                                         </p:cTn>
                                         <p:tgtEl>
-                                          <p:spTgt spid="5"/>
+                                          <p:spTgt spid="12"/>
+                                        </p:tgtEl>
+                                        <p:attrNameLst>
+                                          <p:attrName>style.visibility</p:attrName>
+                                        </p:attrNameLst>
+                                      </p:cBhvr>
+                                      <p:to>
+                                        <p:strVal val="visible"/>
+                                      </p:to>
+                                    </p:set>
+                                  </p:childTnLst>
+                                </p:cTn>
+                              </p:par>
+                            </p:childTnLst>
+                          </p:cTn>
+                        </p:par>
+                      </p:childTnLst>
+                    </p:cTn>
+                  </p:par>
+                  <p:par>
+                    <p:cTn id="23" fill="hold">
+                      <p:stCondLst>
+                        <p:cond delay="indefinite"/>
+                      </p:stCondLst>
+                      <p:childTnLst>
+                        <p:par>
+                          <p:cTn id="24" fill="hold">
+                            <p:stCondLst>
+                              <p:cond delay="0"/>
+                            </p:stCondLst>
+                            <p:childTnLst>
+                              <p:par>
+                                <p:cTn id="25" presetID="1" presetClass="entr" presetSubtype="0" fill="hold" nodeType="clickEffect">
+                                  <p:stCondLst>
+                                    <p:cond delay="0"/>
+                                  </p:stCondLst>
+                                  <p:childTnLst>
+                                    <p:set>
+                                      <p:cBhvr>
+                                        <p:cTn id="26" dur="1" fill="hold">
+                                          <p:stCondLst>
+                                            <p:cond delay="0"/>
+                                          </p:stCondLst>
+                                        </p:cTn>
+                                        <p:tgtEl>
+                                          <p:spTgt spid="13"/>
+                                        </p:tgtEl>
+                                        <p:attrNameLst>
+                                          <p:attrName>style.visibility</p:attrName>
+                                        </p:attrNameLst>
+                                      </p:cBhvr>
+                                      <p:to>
+                                        <p:strVal val="visible"/>
+                                      </p:to>
+                                    </p:set>
+                                  </p:childTnLst>
+                                </p:cTn>
+                              </p:par>
+                            </p:childTnLst>
+                          </p:cTn>
+                        </p:par>
+                      </p:childTnLst>
+                    </p:cTn>
+                  </p:par>
+                  <p:par>
+                    <p:cTn id="27" fill="hold">
+                      <p:stCondLst>
+                        <p:cond delay="indefinite"/>
+                      </p:stCondLst>
+                      <p:childTnLst>
+                        <p:par>
+                          <p:cTn id="28" fill="hold">
+                            <p:stCondLst>
+                              <p:cond delay="0"/>
+                            </p:stCondLst>
+                            <p:childTnLst>
+                              <p:par>
+                                <p:cTn id="29" presetID="1" presetClass="entr" presetSubtype="0" fill="hold" nodeType="clickEffect">
+                                  <p:stCondLst>
+                                    <p:cond delay="0"/>
+                                  </p:stCondLst>
+                                  <p:childTnLst>
+                                    <p:set>
+                                      <p:cBhvr>
+                                        <p:cTn id="30" dur="1" fill="hold">
+                                          <p:stCondLst>
+                                            <p:cond delay="0"/>
+                                          </p:stCondLst>
+                                        </p:cTn>
+                                        <p:tgtEl>
+                                          <p:spTgt spid="15"/>
                                         </p:tgtEl>
                                         <p:attrNameLst>
                                           <p:attrName>style.visibility</p:attrName>
@@ -8954,8 +9072,6 @@
       </p:par>
     </p:tnLst>
     <p:bldLst>
-      <p:bldP spid="4" grpId="0" animBg="1"/>
-      <p:bldP spid="5" grpId="0" animBg="1"/>
       <p:bldP spid="6" grpId="0"/>
       <p:bldP spid="8" grpId="0"/>
     </p:bldLst>

</xml_diff>